<commit_message>
medal totals table code matches
</commit_message>
<xml_diff>
--- a/checkpoint2/G01A - Checkpoint2 Presentation.pptx
+++ b/checkpoint2/G01A - Checkpoint2 Presentation.pptx
@@ -130,7 +130,7 @@
   </p:defaultTextStyle>
   <p:extLst>
     <p:ext uri="{EFAFB233-063F-42B5-8137-9DF3F51BA10A}">
-      <p15:sldGuideLst xmlns="" xmlns:p15="http://schemas.microsoft.com/office/powerpoint/2012/main">
+      <p15:sldGuideLst xmlns:p15="http://schemas.microsoft.com/office/powerpoint/2012/main" xmlns="">
         <p15:guide id="1" orient="horz" pos="2160">
           <p15:clr>
             <a:srgbClr val="A4A3A4"/>
@@ -4067,11 +4067,6 @@
               </a:rPr>
               <a:t>G01-A</a:t>
             </a:r>
-            <a:endParaRPr lang="pt-PT" sz="4600" dirty="0" smtClean="0">
-              <a:solidFill>
-                <a:schemeClr val="bg2"/>
-              </a:solidFill>
-            </a:endParaRPr>
           </a:p>
         </p:txBody>
       </p:sp>
@@ -4268,11 +4263,6 @@
               </a:rPr>
               <a:t>76394 – Daniel Trindade</a:t>
             </a:r>
-            <a:endParaRPr lang="pt-PT" sz="2400" b="0" dirty="0">
-              <a:solidFill>
-                <a:schemeClr val="bg2"/>
-              </a:solidFill>
-            </a:endParaRPr>
           </a:p>
         </p:txBody>
       </p:sp>
@@ -4594,11 +4584,7 @@
           <a:p>
             <a:r>
               <a:rPr lang="en-US" sz="3600" dirty="0" smtClean="0"/>
-              <a:t>Dataset type</a:t>
-            </a:r>
-            <a:r>
-              <a:rPr lang="en-US" sz="3600" dirty="0" smtClean="0"/>
-              <a:t>:</a:t>
+              <a:t>Dataset type:</a:t>
             </a:r>
           </a:p>
           <a:p>
@@ -5662,11 +5648,15 @@
             <a:pPr lvl="1"/>
             <a:r>
               <a:rPr lang="en-GB" sz="3200" dirty="0" smtClean="0"/>
-              <a:t>All Winners – A </a:t>
+              <a:t>All Winners – </a:t>
+            </a:r>
+            <a:r>
+              <a:rPr lang="en-GB" sz="3200" dirty="0" smtClean="0"/>
+              <a:t>contains </a:t>
             </a:r>
             <a:r>
               <a:rPr lang="en-GB" sz="3200" dirty="0"/>
-              <a:t>table containing all the podium finishes </a:t>
+              <a:t>the podium finishes </a:t>
             </a:r>
             <a:r>
               <a:rPr lang="en-GB" sz="3200" dirty="0" smtClean="0"/>
@@ -5677,11 +5667,7 @@
           <a:p>
             <a:r>
               <a:rPr lang="en-US" sz="4000" dirty="0" smtClean="0"/>
-              <a:t>Data </a:t>
-            </a:r>
-            <a:r>
-              <a:rPr lang="en-US" sz="4000" dirty="0" smtClean="0"/>
-              <a:t>sample</a:t>
+              <a:t>Data sample</a:t>
             </a:r>
           </a:p>
           <a:p>
@@ -5698,13 +5684,13 @@
           <p:nvPr>
             <p:extLst>
               <p:ext uri="{D42A27DB-BD31-4B8C-83A1-F6EECF244321}">
-                <p14:modId xmlns:p14="http://schemas.microsoft.com/office/powerpoint/2010/main" val="192736160"/>
+                <p14:modId xmlns:p14="http://schemas.microsoft.com/office/powerpoint/2010/main" val="2755826523"/>
               </p:ext>
             </p:extLst>
           </p:nvPr>
         </p:nvGraphicFramePr>
         <p:xfrm>
-          <a:off x="395536" y="4077072"/>
+          <a:off x="611560" y="4077072"/>
           <a:ext cx="7992889" cy="576064"/>
         </p:xfrm>
         <a:graphic>

</xml_diff>

<commit_message>
update of the ppt
</commit_message>
<xml_diff>
--- a/checkpoint2/G01A - Checkpoint2 Presentation.pptx
+++ b/checkpoint2/G01A - Checkpoint2 Presentation.pptx
@@ -5,31 +5,33 @@
     <p:sldMasterId id="2147483648" r:id="rId1"/>
   </p:sldMasterIdLst>
   <p:notesMasterIdLst>
-    <p:notesMasterId r:id="rId21"/>
+    <p:notesMasterId r:id="rId23"/>
   </p:notesMasterIdLst>
   <p:handoutMasterIdLst>
-    <p:handoutMasterId r:id="rId22"/>
+    <p:handoutMasterId r:id="rId24"/>
   </p:handoutMasterIdLst>
   <p:sldIdLst>
     <p:sldId id="256" r:id="rId2"/>
     <p:sldId id="257" r:id="rId3"/>
     <p:sldId id="1096" r:id="rId4"/>
-    <p:sldId id="1109" r:id="rId5"/>
-    <p:sldId id="1110" r:id="rId6"/>
+    <p:sldId id="1110" r:id="rId5"/>
+    <p:sldId id="1109" r:id="rId6"/>
     <p:sldId id="1111" r:id="rId7"/>
-    <p:sldId id="1112" r:id="rId8"/>
-    <p:sldId id="1097" r:id="rId9"/>
-    <p:sldId id="1098" r:id="rId10"/>
-    <p:sldId id="1105" r:id="rId11"/>
-    <p:sldId id="1099" r:id="rId12"/>
-    <p:sldId id="1100" r:id="rId13"/>
-    <p:sldId id="1106" r:id="rId14"/>
-    <p:sldId id="1107" r:id="rId15"/>
-    <p:sldId id="1101" r:id="rId16"/>
-    <p:sldId id="1102" r:id="rId17"/>
-    <p:sldId id="1108" r:id="rId18"/>
-    <p:sldId id="1103" r:id="rId19"/>
-    <p:sldId id="1104" r:id="rId20"/>
+    <p:sldId id="1097" r:id="rId8"/>
+    <p:sldId id="1098" r:id="rId9"/>
+    <p:sldId id="1112" r:id="rId10"/>
+    <p:sldId id="1113" r:id="rId11"/>
+    <p:sldId id="1114" r:id="rId12"/>
+    <p:sldId id="1105" r:id="rId13"/>
+    <p:sldId id="1099" r:id="rId14"/>
+    <p:sldId id="1100" r:id="rId15"/>
+    <p:sldId id="1106" r:id="rId16"/>
+    <p:sldId id="1107" r:id="rId17"/>
+    <p:sldId id="1101" r:id="rId18"/>
+    <p:sldId id="1102" r:id="rId19"/>
+    <p:sldId id="1108" r:id="rId20"/>
+    <p:sldId id="1103" r:id="rId21"/>
+    <p:sldId id="1104" r:id="rId22"/>
   </p:sldIdLst>
   <p:sldSz cx="9144000" cy="6858000" type="screen4x3"/>
   <p:notesSz cx="6858000" cy="9144000"/>
@@ -130,7 +132,7 @@
   </p:defaultTextStyle>
   <p:extLst>
     <p:ext uri="{EFAFB233-063F-42B5-8137-9DF3F51BA10A}">
-      <p15:sldGuideLst xmlns:p15="http://schemas.microsoft.com/office/powerpoint/2012/main" xmlns="">
+      <p15:sldGuideLst xmlns="" xmlns:p15="http://schemas.microsoft.com/office/powerpoint/2012/main">
         <p15:guide id="1" orient="horz" pos="2160">
           <p15:clr>
             <a:srgbClr val="A4A3A4"/>
@@ -229,7 +231,7 @@
           <a:p>
             <a:fld id="{745C36E7-9E00-462E-80A3-32F2BE615C7A}" type="datetimeFigureOut">
               <a:rPr lang="en-US" smtClean="0"/>
-              <a:t>17-Oct-15</a:t>
+              <a:t>10/18/2015</a:t>
             </a:fld>
             <a:endParaRPr lang="en-US"/>
           </a:p>
@@ -295,7 +297,7 @@
           <a:p>
             <a:fld id="{C7B702CB-D988-47C5-8204-95032A6A7C26}" type="slidenum">
               <a:rPr lang="en-US" smtClean="0"/>
-              <a:t>‹#›</a:t>
+              <a:t>‹nº›</a:t>
             </a:fld>
             <a:endParaRPr lang="en-US"/>
           </a:p>
@@ -395,7 +397,7 @@
             <a:fld id="{01F3E309-ED8D-4193-99AF-E5EA90965E98}" type="datetimeFigureOut">
               <a:rPr lang="en-US" smtClean="0"/>
               <a:pPr/>
-              <a:t>17-Oct-15</a:t>
+              <a:t>10/18/2015</a:t>
             </a:fld>
             <a:endParaRPr lang="en-US"/>
           </a:p>
@@ -557,7 +559,7 @@
             <a:fld id="{F535F173-C1DD-4975-94BF-5B9ED67F7674}" type="slidenum">
               <a:rPr lang="en-US" smtClean="0"/>
               <a:pPr/>
-              <a:t>‹#›</a:t>
+              <a:t>‹nº›</a:t>
             </a:fld>
             <a:endParaRPr lang="en-US"/>
           </a:p>
@@ -902,7 +904,7 @@
             <a:fld id="{F535F173-C1DD-4975-94BF-5B9ED67F7674}" type="slidenum">
               <a:rPr lang="en-US" smtClean="0"/>
               <a:pPr/>
-              <a:t>16</a:t>
+              <a:t>15</a:t>
             </a:fld>
             <a:endParaRPr lang="en-US"/>
           </a:p>
@@ -987,7 +989,7 @@
             <a:fld id="{F535F173-C1DD-4975-94BF-5B9ED67F7674}" type="slidenum">
               <a:rPr lang="en-US" smtClean="0"/>
               <a:pPr/>
-              <a:t>17</a:t>
+              <a:t>16</a:t>
             </a:fld>
             <a:endParaRPr lang="en-US"/>
           </a:p>
@@ -1072,7 +1074,177 @@
             <a:fld id="{F535F173-C1DD-4975-94BF-5B9ED67F7674}" type="slidenum">
               <a:rPr lang="en-US" smtClean="0"/>
               <a:pPr/>
+              <a:t>18</a:t>
+            </a:fld>
+            <a:endParaRPr lang="en-US"/>
+          </a:p>
+        </p:txBody>
+      </p:sp>
+    </p:spTree>
+    <p:extLst>
+      <p:ext uri="{BB962C8B-B14F-4D97-AF65-F5344CB8AC3E}">
+        <p14:creationId xmlns:p14="http://schemas.microsoft.com/office/powerpoint/2010/main" val="1355792998"/>
+      </p:ext>
+    </p:extLst>
+  </p:cSld>
+  <p:clrMapOvr>
+    <a:masterClrMapping/>
+  </p:clrMapOvr>
+</p:notes>
+</file>
+
+<file path=ppt/notesSlides/notesSlide14.xml><?xml version="1.0" encoding="utf-8"?>
+<p:notes xmlns:a="http://schemas.openxmlformats.org/drawingml/2006/main" xmlns:r="http://schemas.openxmlformats.org/officeDocument/2006/relationships" xmlns:p="http://schemas.openxmlformats.org/presentationml/2006/main">
+  <p:cSld>
+    <p:spTree>
+      <p:nvGrpSpPr>
+        <p:cNvPr id="1" name=""/>
+        <p:cNvGrpSpPr/>
+        <p:nvPr/>
+      </p:nvGrpSpPr>
+      <p:grpSpPr>
+        <a:xfrm>
+          <a:off x="0" y="0"/>
+          <a:ext cx="0" cy="0"/>
+          <a:chOff x="0" y="0"/>
+          <a:chExt cx="0" cy="0"/>
+        </a:xfrm>
+      </p:grpSpPr>
+      <p:sp>
+        <p:nvSpPr>
+          <p:cNvPr id="2" name="Slide Image Placeholder 1"/>
+          <p:cNvSpPr>
+            <a:spLocks noGrp="1" noRot="1" noChangeAspect="1"/>
+          </p:cNvSpPr>
+          <p:nvPr>
+            <p:ph type="sldImg"/>
+          </p:nvPr>
+        </p:nvSpPr>
+        <p:spPr/>
+      </p:sp>
+      <p:sp>
+        <p:nvSpPr>
+          <p:cNvPr id="3" name="Notes Placeholder 2"/>
+          <p:cNvSpPr>
+            <a:spLocks noGrp="1"/>
+          </p:cNvSpPr>
+          <p:nvPr>
+            <p:ph type="body" idx="1"/>
+          </p:nvPr>
+        </p:nvSpPr>
+        <p:spPr/>
+        <p:txBody>
+          <a:bodyPr/>
+          <a:lstStyle/>
+          <a:p>
+            <a:endParaRPr lang="en-US" baseline="0" dirty="0" smtClean="0"/>
+          </a:p>
+        </p:txBody>
+      </p:sp>
+      <p:sp>
+        <p:nvSpPr>
+          <p:cNvPr id="4" name="Slide Number Placeholder 3"/>
+          <p:cNvSpPr>
+            <a:spLocks noGrp="1"/>
+          </p:cNvSpPr>
+          <p:nvPr>
+            <p:ph type="sldNum" sz="quarter" idx="10"/>
+          </p:nvPr>
+        </p:nvSpPr>
+        <p:spPr/>
+        <p:txBody>
+          <a:bodyPr/>
+          <a:lstStyle/>
+          <a:p>
+            <a:fld id="{F535F173-C1DD-4975-94BF-5B9ED67F7674}" type="slidenum">
+              <a:rPr lang="en-US" smtClean="0"/>
+              <a:pPr/>
               <a:t>19</a:t>
+            </a:fld>
+            <a:endParaRPr lang="en-US"/>
+          </a:p>
+        </p:txBody>
+      </p:sp>
+    </p:spTree>
+    <p:extLst>
+      <p:ext uri="{BB962C8B-B14F-4D97-AF65-F5344CB8AC3E}">
+        <p14:creationId xmlns:p14="http://schemas.microsoft.com/office/powerpoint/2010/main" val="1355792998"/>
+      </p:ext>
+    </p:extLst>
+  </p:cSld>
+  <p:clrMapOvr>
+    <a:masterClrMapping/>
+  </p:clrMapOvr>
+</p:notes>
+</file>
+
+<file path=ppt/notesSlides/notesSlide15.xml><?xml version="1.0" encoding="utf-8"?>
+<p:notes xmlns:a="http://schemas.openxmlformats.org/drawingml/2006/main" xmlns:r="http://schemas.openxmlformats.org/officeDocument/2006/relationships" xmlns:p="http://schemas.openxmlformats.org/presentationml/2006/main">
+  <p:cSld>
+    <p:spTree>
+      <p:nvGrpSpPr>
+        <p:cNvPr id="1" name=""/>
+        <p:cNvGrpSpPr/>
+        <p:nvPr/>
+      </p:nvGrpSpPr>
+      <p:grpSpPr>
+        <a:xfrm>
+          <a:off x="0" y="0"/>
+          <a:ext cx="0" cy="0"/>
+          <a:chOff x="0" y="0"/>
+          <a:chExt cx="0" cy="0"/>
+        </a:xfrm>
+      </p:grpSpPr>
+      <p:sp>
+        <p:nvSpPr>
+          <p:cNvPr id="2" name="Slide Image Placeholder 1"/>
+          <p:cNvSpPr>
+            <a:spLocks noGrp="1" noRot="1" noChangeAspect="1"/>
+          </p:cNvSpPr>
+          <p:nvPr>
+            <p:ph type="sldImg"/>
+          </p:nvPr>
+        </p:nvSpPr>
+        <p:spPr/>
+      </p:sp>
+      <p:sp>
+        <p:nvSpPr>
+          <p:cNvPr id="3" name="Notes Placeholder 2"/>
+          <p:cNvSpPr>
+            <a:spLocks noGrp="1"/>
+          </p:cNvSpPr>
+          <p:nvPr>
+            <p:ph type="body" idx="1"/>
+          </p:nvPr>
+        </p:nvSpPr>
+        <p:spPr/>
+        <p:txBody>
+          <a:bodyPr/>
+          <a:lstStyle/>
+          <a:p>
+            <a:endParaRPr lang="en-US" baseline="0" dirty="0" smtClean="0"/>
+          </a:p>
+        </p:txBody>
+      </p:sp>
+      <p:sp>
+        <p:nvSpPr>
+          <p:cNvPr id="4" name="Slide Number Placeholder 3"/>
+          <p:cNvSpPr>
+            <a:spLocks noGrp="1"/>
+          </p:cNvSpPr>
+          <p:nvPr>
+            <p:ph type="sldNum" sz="quarter" idx="10"/>
+          </p:nvPr>
+        </p:nvSpPr>
+        <p:spPr/>
+        <p:txBody>
+          <a:bodyPr/>
+          <a:lstStyle/>
+          <a:p>
+            <a:fld id="{F535F173-C1DD-4975-94BF-5B9ED67F7674}" type="slidenum">
+              <a:rPr lang="en-US" smtClean="0"/>
+              <a:pPr/>
+              <a:t>21</a:t>
             </a:fld>
             <a:endParaRPr lang="en-US"/>
           </a:p>
@@ -1390,6 +1562,18 @@
           <a:bodyPr/>
           <a:lstStyle/>
           <a:p>
+            <a:r>
+              <a:rPr lang="en-US" baseline="0" dirty="0" smtClean="0"/>
+              <a:t>OG – </a:t>
+            </a:r>
+            <a:r>
+              <a:rPr lang="en-US" baseline="0" dirty="0" err="1" smtClean="0"/>
+              <a:t>Olimpic</a:t>
+            </a:r>
+            <a:r>
+              <a:rPr lang="en-US" baseline="0" dirty="0" smtClean="0"/>
+              <a:t> Games</a:t>
+            </a:r>
             <a:endParaRPr lang="en-US" baseline="0" dirty="0" smtClean="0"/>
           </a:p>
         </p:txBody>
@@ -1412,7 +1596,7 @@
             <a:fld id="{F535F173-C1DD-4975-94BF-5B9ED67F7674}" type="slidenum">
               <a:rPr lang="en-US" smtClean="0"/>
               <a:pPr/>
-              <a:t>7</a:t>
+              <a:t>8</a:t>
             </a:fld>
             <a:endParaRPr lang="en-US"/>
           </a:p>
@@ -1475,6 +1659,18 @@
           <a:bodyPr/>
           <a:lstStyle/>
           <a:p>
+            <a:r>
+              <a:rPr lang="en-US" baseline="0" dirty="0" smtClean="0"/>
+              <a:t>OG – </a:t>
+            </a:r>
+            <a:r>
+              <a:rPr lang="en-US" baseline="0" dirty="0" err="1" smtClean="0"/>
+              <a:t>Olimpic</a:t>
+            </a:r>
+            <a:r>
+              <a:rPr lang="en-US" baseline="0" dirty="0" smtClean="0"/>
+              <a:t> Games</a:t>
+            </a:r>
             <a:endParaRPr lang="en-US" baseline="0" dirty="0" smtClean="0"/>
           </a:p>
         </p:txBody>
@@ -1560,6 +1756,18 @@
           <a:bodyPr/>
           <a:lstStyle/>
           <a:p>
+            <a:r>
+              <a:rPr lang="en-US" baseline="0" dirty="0" smtClean="0"/>
+              <a:t>OG – </a:t>
+            </a:r>
+            <a:r>
+              <a:rPr lang="en-US" baseline="0" dirty="0" err="1" smtClean="0"/>
+              <a:t>Olimpic</a:t>
+            </a:r>
+            <a:r>
+              <a:rPr lang="en-US" baseline="0" dirty="0" smtClean="0"/>
+              <a:t> Games</a:t>
+            </a:r>
             <a:endParaRPr lang="en-US" baseline="0" dirty="0" smtClean="0"/>
           </a:p>
         </p:txBody>
@@ -1645,6 +1853,18 @@
           <a:bodyPr/>
           <a:lstStyle/>
           <a:p>
+            <a:r>
+              <a:rPr lang="en-US" baseline="0" dirty="0" smtClean="0"/>
+              <a:t>OG – </a:t>
+            </a:r>
+            <a:r>
+              <a:rPr lang="en-US" baseline="0" dirty="0" err="1" smtClean="0"/>
+              <a:t>Olimpic</a:t>
+            </a:r>
+            <a:r>
+              <a:rPr lang="en-US" baseline="0" dirty="0" smtClean="0"/>
+              <a:t> Games</a:t>
+            </a:r>
             <a:endParaRPr lang="en-US" baseline="0" dirty="0" smtClean="0"/>
           </a:p>
         </p:txBody>
@@ -1667,7 +1887,7 @@
             <a:fld id="{F535F173-C1DD-4975-94BF-5B9ED67F7674}" type="slidenum">
               <a:rPr lang="en-US" smtClean="0"/>
               <a:pPr/>
-              <a:t>12</a:t>
+              <a:t>11</a:t>
             </a:fld>
             <a:endParaRPr lang="en-US"/>
           </a:p>
@@ -1752,7 +1972,7 @@
             <a:fld id="{F535F173-C1DD-4975-94BF-5B9ED67F7674}" type="slidenum">
               <a:rPr lang="en-US" smtClean="0"/>
               <a:pPr/>
-              <a:t>13</a:t>
+              <a:t>12</a:t>
             </a:fld>
             <a:endParaRPr lang="en-US"/>
           </a:p>
@@ -2263,7 +2483,7 @@
             <a:fld id="{F3CC9924-33BC-4796-B0F9-D37DB5D899BF}" type="datetimeFigureOut">
               <a:rPr lang="pt-PT" smtClean="0"/>
               <a:pPr/>
-              <a:t>17-10-2015</a:t>
+              <a:t>18/10/2015</a:t>
             </a:fld>
             <a:endParaRPr lang="pt-PT"/>
           </a:p>
@@ -2322,7 +2542,7 @@
             <a:fld id="{B5EBF8D4-C87A-47B7-9996-84452461937B}" type="slidenum">
               <a:rPr lang="pt-PT" smtClean="0"/>
               <a:pPr/>
-              <a:t>‹#›</a:t>
+              <a:t>‹nº›</a:t>
             </a:fld>
             <a:endParaRPr lang="pt-PT"/>
           </a:p>
@@ -4315,7 +4535,7 @@
           <a:p>
             <a:r>
               <a:rPr lang="en-US" dirty="0" smtClean="0"/>
-              <a:t>Derived data</a:t>
+              <a:t>Selected data</a:t>
             </a:r>
             <a:endParaRPr lang="pt-PT" dirty="0"/>
           </a:p>
@@ -4340,22 +4560,101 @@
           <a:p>
             <a:r>
               <a:rPr lang="en-US" sz="4000" dirty="0" smtClean="0"/>
-              <a:t>Derived data description</a:t>
-            </a:r>
-          </a:p>
-          <a:p>
-            <a:pPr lvl="1"/>
-            <a:r>
-              <a:rPr lang="en-US" sz="3600" dirty="0" smtClean="0"/>
-              <a:t>Which measures?</a:t>
-            </a:r>
-          </a:p>
-          <a:p>
-            <a:pPr lvl="1"/>
-            <a:r>
-              <a:rPr lang="en-US" sz="3600" dirty="0" smtClean="0"/>
-              <a:t>Why?</a:t>
-            </a:r>
+              <a:t>Data </a:t>
+            </a:r>
+            <a:r>
+              <a:rPr lang="en-US" sz="4000" dirty="0" smtClean="0"/>
+              <a:t>description</a:t>
+            </a:r>
+          </a:p>
+          <a:p>
+            <a:pPr marL="342900" lvl="1" indent="-342900">
+              <a:spcBef>
+                <a:spcPts val="1800"/>
+              </a:spcBef>
+            </a:pPr>
+            <a:r>
+              <a:rPr lang="en-US" sz="4000" dirty="0"/>
+              <a:t>	</a:t>
+            </a:r>
+            <a:r>
+              <a:rPr lang="pt-PT" sz="3200" dirty="0" err="1" smtClean="0"/>
+              <a:t>From</a:t>
+            </a:r>
+            <a:r>
+              <a:rPr lang="pt-PT" sz="3200" dirty="0" smtClean="0"/>
+              <a:t> </a:t>
+            </a:r>
+            <a:r>
+              <a:rPr lang="pt-PT" sz="3200" dirty="0" err="1" smtClean="0"/>
+              <a:t>the</a:t>
+            </a:r>
+            <a:r>
+              <a:rPr lang="pt-PT" sz="3200" dirty="0" smtClean="0"/>
+              <a:t> “</a:t>
+            </a:r>
+            <a:r>
+              <a:rPr lang="pt-PT" sz="3200" dirty="0" err="1" smtClean="0"/>
+              <a:t>All</a:t>
+            </a:r>
+            <a:r>
+              <a:rPr lang="pt-PT" sz="3200" dirty="0" smtClean="0"/>
+              <a:t> Winners” </a:t>
+            </a:r>
+            <a:r>
+              <a:rPr lang="pt-PT" sz="3200" dirty="0" err="1" smtClean="0"/>
+              <a:t>dataset</a:t>
+            </a:r>
+            <a:r>
+              <a:rPr lang="pt-PT" sz="3200" dirty="0" smtClean="0"/>
+              <a:t>, </a:t>
+            </a:r>
+            <a:r>
+              <a:rPr lang="pt-PT" sz="3200" dirty="0" err="1" smtClean="0"/>
+              <a:t>we</a:t>
+            </a:r>
+            <a:r>
+              <a:rPr lang="pt-PT" sz="3200" dirty="0" smtClean="0"/>
+              <a:t> </a:t>
+            </a:r>
+            <a:r>
+              <a:rPr lang="pt-PT" sz="3200" dirty="0" err="1" smtClean="0"/>
+              <a:t>wanted</a:t>
+            </a:r>
+            <a:r>
+              <a:rPr lang="pt-PT" sz="3200" dirty="0" smtClean="0"/>
+              <a:t>:</a:t>
+            </a:r>
+          </a:p>
+          <a:p>
+            <a:pPr marL="1428750" lvl="3" indent="-571500">
+              <a:spcBef>
+                <a:spcPts val="1800"/>
+              </a:spcBef>
+              <a:buFont typeface="Arial" panose="020B0604020202020204" pitchFamily="34" charset="0"/>
+              <a:buChar char="•"/>
+            </a:pPr>
+            <a:r>
+              <a:rPr lang="en-US" sz="3200" dirty="0" smtClean="0"/>
+              <a:t>The NOC code</a:t>
+            </a:r>
+          </a:p>
+          <a:p>
+            <a:pPr marL="1428750" lvl="3" indent="-571500">
+              <a:spcBef>
+                <a:spcPts val="1800"/>
+              </a:spcBef>
+              <a:buFont typeface="Arial" panose="020B0604020202020204" pitchFamily="34" charset="0"/>
+              <a:buChar char="•"/>
+            </a:pPr>
+            <a:r>
+              <a:rPr lang="en-US" sz="3200" dirty="0" smtClean="0"/>
+              <a:t>Total of Medals</a:t>
+            </a:r>
+            <a:endParaRPr lang="en-US" sz="3200" dirty="0"/>
+          </a:p>
+          <a:p>
+            <a:endParaRPr lang="en-US" sz="4000" dirty="0" smtClean="0"/>
           </a:p>
           <a:p>
             <a:pPr lvl="1"/>
@@ -4366,7 +4665,7 @@
     </p:spTree>
     <p:extLst>
       <p:ext uri="{BB962C8B-B14F-4D97-AF65-F5344CB8AC3E}">
-        <p14:creationId xmlns:p14="http://schemas.microsoft.com/office/powerpoint/2010/main" val="1783310095"/>
+        <p14:creationId xmlns:p14="http://schemas.microsoft.com/office/powerpoint/2010/main" val="3933692299"/>
       </p:ext>
     </p:extLst>
   </p:cSld>
@@ -4402,12 +4701,12 @@
       </p:grpSpPr>
       <p:sp>
         <p:nvSpPr>
-          <p:cNvPr id="6" name="Text Placeholder 5"/>
-          <p:cNvSpPr>
-            <a:spLocks noGrp="1"/>
-          </p:cNvSpPr>
-          <p:nvPr>
-            <p:ph type="body" sz="quarter" idx="11"/>
+          <p:cNvPr id="2" name="Title 1"/>
+          <p:cNvSpPr>
+            <a:spLocks noGrp="1"/>
+          </p:cNvSpPr>
+          <p:nvPr>
+            <p:ph type="title"/>
           </p:nvPr>
         </p:nvSpPr>
         <p:spPr/>
@@ -4415,77 +4714,247 @@
           <a:bodyPr/>
           <a:lstStyle/>
           <a:p>
-            <a:endParaRPr lang="en-US" dirty="0"/>
-          </a:p>
-        </p:txBody>
-      </p:sp>
-      <p:sp>
-        <p:nvSpPr>
-          <p:cNvPr id="29" name="Text Placeholder 28"/>
-          <p:cNvSpPr>
-            <a:spLocks noGrp="1"/>
-          </p:cNvSpPr>
-          <p:nvPr>
-            <p:ph type="body" sz="quarter" idx="10"/>
+            <a:r>
+              <a:rPr lang="en-US" dirty="0" smtClean="0"/>
+              <a:t>Selected data</a:t>
+            </a:r>
+            <a:endParaRPr lang="pt-PT" dirty="0"/>
+          </a:p>
+        </p:txBody>
+      </p:sp>
+      <p:sp>
+        <p:nvSpPr>
+          <p:cNvPr id="3" name="Content Placeholder 2"/>
+          <p:cNvSpPr>
+            <a:spLocks noGrp="1"/>
+          </p:cNvSpPr>
+          <p:nvPr>
+            <p:ph idx="1"/>
           </p:nvPr>
         </p:nvSpPr>
         <p:spPr/>
         <p:txBody>
-          <a:bodyPr/>
-          <a:lstStyle/>
-          <a:p>
-            <a:r>
-              <a:rPr lang="pt-PT" sz="16600" dirty="0" smtClean="0"/>
-              <a:t>03</a:t>
-            </a:r>
-            <a:endParaRPr lang="pt-PT" sz="16600" dirty="0"/>
-          </a:p>
-        </p:txBody>
-      </p:sp>
-      <p:sp>
-        <p:nvSpPr>
-          <p:cNvPr id="4" name="Title 3"/>
-          <p:cNvSpPr>
-            <a:spLocks noGrp="1"/>
-          </p:cNvSpPr>
-          <p:nvPr>
-            <p:ph type="title"/>
-          </p:nvPr>
-        </p:nvSpPr>
-        <p:spPr>
-          <a:xfrm>
-            <a:off x="2281222" y="3214686"/>
-            <a:ext cx="6786578" cy="3033714"/>
-          </a:xfrm>
-          <a:solidFill>
-            <a:srgbClr val="FFFFFF">
-              <a:alpha val="80000"/>
-            </a:srgbClr>
-          </a:solidFill>
-        </p:spPr>
-        <p:txBody>
-          <a:bodyPr rIns="288000">
+          <a:bodyPr>
             <a:noAutofit/>
           </a:bodyPr>
           <a:lstStyle/>
           <a:p>
-            <a:pPr marL="0" algn="r"/>
-            <a:r>
-              <a:rPr lang="pt-PT" sz="6000" dirty="0" smtClean="0"/>
+            <a:r>
+              <a:rPr lang="en-US" sz="4000" dirty="0" smtClean="0"/>
               <a:t>Data </a:t>
             </a:r>
             <a:r>
-              <a:rPr lang="pt-PT" sz="6000" dirty="0" err="1" smtClean="0"/>
-              <a:t>abstraction</a:t>
-            </a:r>
-            <a:endParaRPr lang="pt-PT" sz="6000" dirty="0"/>
-          </a:p>
-        </p:txBody>
-      </p:sp>
+              <a:rPr lang="en-US" sz="4000" dirty="0" smtClean="0"/>
+              <a:t>description</a:t>
+            </a:r>
+          </a:p>
+          <a:p>
+            <a:pPr marL="342900" lvl="1" indent="-342900">
+              <a:spcBef>
+                <a:spcPts val="1800"/>
+              </a:spcBef>
+            </a:pPr>
+            <a:r>
+              <a:rPr lang="en-US" sz="4000" dirty="0"/>
+              <a:t>	</a:t>
+            </a:r>
+            <a:r>
+              <a:rPr lang="pt-PT" sz="3200" dirty="0" err="1" smtClean="0"/>
+              <a:t>From</a:t>
+            </a:r>
+            <a:r>
+              <a:rPr lang="pt-PT" sz="3200" dirty="0" smtClean="0"/>
+              <a:t> </a:t>
+            </a:r>
+            <a:r>
+              <a:rPr lang="pt-PT" sz="3200" dirty="0" err="1" smtClean="0"/>
+              <a:t>the</a:t>
+            </a:r>
+            <a:r>
+              <a:rPr lang="pt-PT" sz="3200" dirty="0" smtClean="0"/>
+              <a:t> “</a:t>
+            </a:r>
+            <a:r>
+              <a:rPr lang="pt-PT" sz="3200" dirty="0" err="1" smtClean="0"/>
+              <a:t>All</a:t>
+            </a:r>
+            <a:r>
+              <a:rPr lang="pt-PT" sz="3200" dirty="0" smtClean="0"/>
+              <a:t> Winners” </a:t>
+            </a:r>
+            <a:r>
+              <a:rPr lang="pt-PT" sz="3200" dirty="0" err="1" smtClean="0"/>
+              <a:t>dataset</a:t>
+            </a:r>
+            <a:r>
+              <a:rPr lang="pt-PT" sz="3200" dirty="0" smtClean="0"/>
+              <a:t>, </a:t>
+            </a:r>
+            <a:r>
+              <a:rPr lang="pt-PT" sz="3200" dirty="0" err="1" smtClean="0"/>
+              <a:t>we</a:t>
+            </a:r>
+            <a:r>
+              <a:rPr lang="pt-PT" sz="3200" dirty="0" smtClean="0"/>
+              <a:t> </a:t>
+            </a:r>
+            <a:r>
+              <a:rPr lang="pt-PT" sz="3200" dirty="0" err="1" smtClean="0"/>
+              <a:t>wanted</a:t>
+            </a:r>
+            <a:r>
+              <a:rPr lang="pt-PT" sz="3200" dirty="0" smtClean="0"/>
+              <a:t>:</a:t>
+            </a:r>
+          </a:p>
+          <a:p>
+            <a:pPr marL="1428750" lvl="3" indent="-571500">
+              <a:spcBef>
+                <a:spcPts val="1800"/>
+              </a:spcBef>
+              <a:buFont typeface="Arial" panose="020B0604020202020204" pitchFamily="34" charset="0"/>
+              <a:buChar char="•"/>
+            </a:pPr>
+            <a:r>
+              <a:rPr lang="en-US" sz="3200" dirty="0" smtClean="0"/>
+              <a:t>The NOC code</a:t>
+            </a:r>
+          </a:p>
+          <a:p>
+            <a:pPr marL="1428750" lvl="3" indent="-571500">
+              <a:spcBef>
+                <a:spcPts val="1800"/>
+              </a:spcBef>
+              <a:buFont typeface="Arial" panose="020B0604020202020204" pitchFamily="34" charset="0"/>
+              <a:buChar char="•"/>
+            </a:pPr>
+            <a:r>
+              <a:rPr lang="en-US" sz="3200" dirty="0" smtClean="0"/>
+              <a:t>Total of Medals</a:t>
+            </a:r>
+            <a:endParaRPr lang="en-US" sz="3200" dirty="0"/>
+          </a:p>
+          <a:p>
+            <a:endParaRPr lang="en-US" sz="4000" dirty="0" smtClean="0"/>
+          </a:p>
+          <a:p>
+            <a:pPr lvl="1"/>
+            <a:endParaRPr lang="en-US" dirty="0" smtClean="0"/>
+          </a:p>
+        </p:txBody>
+      </p:sp>
+      <p:sp>
+        <p:nvSpPr>
+          <p:cNvPr id="4" name="Seta em curva 3"/>
+          <p:cNvSpPr/>
+          <p:nvPr/>
+        </p:nvSpPr>
+        <p:spPr>
+          <a:xfrm rot="5400000">
+            <a:off x="5652120" y="3284984"/>
+            <a:ext cx="1008112" cy="720080"/>
+          </a:xfrm>
+          <a:prstGeom prst="bentArrow">
+            <a:avLst/>
+          </a:prstGeom>
+        </p:spPr>
+        <p:style>
+          <a:lnRef idx="2">
+            <a:schemeClr val="accent1">
+              <a:shade val="50000"/>
+            </a:schemeClr>
+          </a:lnRef>
+          <a:fillRef idx="1">
+            <a:schemeClr val="accent1"/>
+          </a:fillRef>
+          <a:effectRef idx="0">
+            <a:schemeClr val="accent1"/>
+          </a:effectRef>
+          <a:fontRef idx="minor">
+            <a:schemeClr val="lt1"/>
+          </a:fontRef>
+        </p:style>
+        <p:txBody>
+          <a:bodyPr rtlCol="0" anchor="ctr"/>
+          <a:lstStyle/>
+          <a:p>
+            <a:pPr algn="ctr"/>
+            <a:endParaRPr lang="pt-PT">
+              <a:solidFill>
+                <a:schemeClr val="tx1"/>
+              </a:solidFill>
+            </a:endParaRPr>
+          </a:p>
+        </p:txBody>
+      </p:sp>
+      <p:pic>
+        <p:nvPicPr>
+          <p:cNvPr id="2049" name="Picture 1"/>
+          <p:cNvPicPr>
+            <a:picLocks noChangeAspect="1" noChangeArrowheads="1"/>
+          </p:cNvPicPr>
+          <p:nvPr/>
+        </p:nvPicPr>
+        <p:blipFill>
+          <a:blip r:embed="rId3">
+            <a:extLst>
+              <a:ext uri="{28A0092B-C50C-407E-A947-70E740481C1C}">
+                <a14:useLocalDpi xmlns:a14="http://schemas.microsoft.com/office/drawing/2010/main" val="0"/>
+              </a:ext>
+            </a:extLst>
+          </a:blip>
+          <a:srcRect/>
+          <a:stretch>
+            <a:fillRect/>
+          </a:stretch>
+        </p:blipFill>
+        <p:spPr bwMode="auto">
+          <a:xfrm>
+            <a:off x="1115616" y="4653136"/>
+            <a:ext cx="7448550" cy="981075"/>
+          </a:xfrm>
+          <a:prstGeom prst="rect">
+            <a:avLst/>
+          </a:prstGeom>
+          <a:noFill/>
+          <a:ln>
+            <a:noFill/>
+          </a:ln>
+          <a:effectLst/>
+          <a:extLst>
+            <a:ext uri="{909E8E84-426E-40DD-AFC4-6F175D3DCCD1}">
+              <a14:hiddenFill xmlns:a14="http://schemas.microsoft.com/office/drawing/2010/main">
+                <a:solidFill>
+                  <a:schemeClr val="accent1"/>
+                </a:solidFill>
+              </a14:hiddenFill>
+            </a:ext>
+            <a:ext uri="{91240B29-F687-4F45-9708-019B960494DF}">
+              <a14:hiddenLine xmlns:a14="http://schemas.microsoft.com/office/drawing/2010/main" w="9525">
+                <a:solidFill>
+                  <a:schemeClr val="tx1"/>
+                </a:solidFill>
+                <a:miter lim="800000"/>
+                <a:headEnd/>
+                <a:tailEnd/>
+              </a14:hiddenLine>
+            </a:ext>
+            <a:ext uri="{AF507438-7753-43E0-B8FC-AC1667EBCBE1}">
+              <a14:hiddenEffects xmlns:a14="http://schemas.microsoft.com/office/drawing/2010/main">
+                <a:effectLst>
+                  <a:outerShdw dist="35921" dir="2700000" algn="ctr" rotWithShape="0">
+                    <a:schemeClr val="bg2"/>
+                  </a:outerShdw>
+                </a:effectLst>
+              </a14:hiddenEffects>
+            </a:ext>
+          </a:extLst>
+        </p:spPr>
+      </p:pic>
     </p:spTree>
     <p:extLst>
       <p:ext uri="{BB962C8B-B14F-4D97-AF65-F5344CB8AC3E}">
-        <p14:creationId xmlns:p14="http://schemas.microsoft.com/office/powerpoint/2010/main" val="760072998"/>
+        <p14:creationId xmlns:p14="http://schemas.microsoft.com/office/powerpoint/2010/main" val="3226317819"/>
       </p:ext>
     </p:extLst>
   </p:cSld>
@@ -4536,7 +5005,7 @@
           <a:p>
             <a:r>
               <a:rPr lang="en-US" dirty="0" smtClean="0"/>
-              <a:t>Data abstraction</a:t>
+              <a:t>Derived data</a:t>
             </a:r>
             <a:endParaRPr lang="pt-PT" dirty="0"/>
           </a:p>
@@ -4552,12 +5021,7 @@
             <p:ph idx="1"/>
           </p:nvPr>
         </p:nvSpPr>
-        <p:spPr>
-          <a:xfrm>
-            <a:off x="457200" y="1094346"/>
-            <a:ext cx="8229600" cy="5214974"/>
-          </a:xfrm>
-        </p:spPr>
+        <p:spPr/>
         <p:txBody>
           <a:bodyPr>
             <a:noAutofit/>
@@ -4565,45 +5029,34 @@
           <a:lstStyle/>
           <a:p>
             <a:r>
+              <a:rPr lang="en-US" sz="4000" dirty="0" smtClean="0"/>
+              <a:t>Derived data description</a:t>
+            </a:r>
+          </a:p>
+          <a:p>
+            <a:pPr lvl="1"/>
+            <a:r>
               <a:rPr lang="en-US" sz="3600" dirty="0" smtClean="0"/>
-              <a:t>Description:</a:t>
+              <a:t>Which measures?</a:t>
             </a:r>
           </a:p>
           <a:p>
             <a:pPr lvl="1"/>
             <a:r>
-              <a:rPr lang="en-GB" sz="3200" dirty="0" smtClean="0"/>
-              <a:t>All Winners – A table </a:t>
-            </a:r>
-            <a:r>
-              <a:rPr lang="en-GB" sz="3200" dirty="0"/>
-              <a:t>containing all the podium finishes of the countries since 1896 until 2008.</a:t>
-            </a:r>
-            <a:endParaRPr lang="en-US" sz="3200" dirty="0" smtClean="0"/>
-          </a:p>
-          <a:p>
-            <a:r>
               <a:rPr lang="en-US" sz="3600" dirty="0" smtClean="0"/>
-              <a:t>Dataset type:</a:t>
+              <a:t>Why?</a:t>
             </a:r>
           </a:p>
           <a:p>
             <a:pPr lvl="1"/>
-            <a:r>
-              <a:rPr lang="pt-PT" sz="3200" dirty="0" smtClean="0"/>
-              <a:t>Organized as a tree, first by the year, then the sport and then the NOC country code and the medal.</a:t>
-            </a:r>
-            <a:endParaRPr lang="en-US" sz="3600" dirty="0" smtClean="0"/>
-          </a:p>
-          <a:p>
-            <a:endParaRPr lang="en-US" sz="3600" dirty="0" smtClean="0"/>
+            <a:endParaRPr lang="en-US" dirty="0" smtClean="0"/>
           </a:p>
         </p:txBody>
       </p:sp>
     </p:spTree>
     <p:extLst>
       <p:ext uri="{BB962C8B-B14F-4D97-AF65-F5344CB8AC3E}">
-        <p14:creationId xmlns:p14="http://schemas.microsoft.com/office/powerpoint/2010/main" val="1967416131"/>
+        <p14:creationId xmlns:p14="http://schemas.microsoft.com/office/powerpoint/2010/main" val="1783310095"/>
       </p:ext>
     </p:extLst>
   </p:cSld>
@@ -4639,12 +5092,12 @@
       </p:grpSpPr>
       <p:sp>
         <p:nvSpPr>
-          <p:cNvPr id="2" name="Title 1"/>
-          <p:cNvSpPr>
-            <a:spLocks noGrp="1"/>
-          </p:cNvSpPr>
-          <p:nvPr>
-            <p:ph type="title"/>
+          <p:cNvPr id="6" name="Text Placeholder 5"/>
+          <p:cNvSpPr>
+            <a:spLocks noGrp="1"/>
+          </p:cNvSpPr>
+          <p:nvPr>
+            <p:ph type="body" sz="quarter" idx="11"/>
           </p:nvPr>
         </p:nvSpPr>
         <p:spPr/>
@@ -4652,110 +5105,77 @@
           <a:bodyPr/>
           <a:lstStyle/>
           <a:p>
-            <a:r>
-              <a:rPr lang="en-US" dirty="0" smtClean="0"/>
-              <a:t>Data abstraction</a:t>
-            </a:r>
-            <a:endParaRPr lang="pt-PT" dirty="0"/>
-          </a:p>
-        </p:txBody>
-      </p:sp>
-      <p:sp>
-        <p:nvSpPr>
-          <p:cNvPr id="3" name="Content Placeholder 2"/>
-          <p:cNvSpPr>
-            <a:spLocks noGrp="1"/>
-          </p:cNvSpPr>
-          <p:nvPr>
-            <p:ph idx="1"/>
+            <a:endParaRPr lang="en-US" dirty="0"/>
+          </a:p>
+        </p:txBody>
+      </p:sp>
+      <p:sp>
+        <p:nvSpPr>
+          <p:cNvPr id="29" name="Text Placeholder 28"/>
+          <p:cNvSpPr>
+            <a:spLocks noGrp="1"/>
+          </p:cNvSpPr>
+          <p:nvPr>
+            <p:ph type="body" sz="quarter" idx="10"/>
+          </p:nvPr>
+        </p:nvSpPr>
+        <p:spPr/>
+        <p:txBody>
+          <a:bodyPr/>
+          <a:lstStyle/>
+          <a:p>
+            <a:r>
+              <a:rPr lang="pt-PT" sz="16600" dirty="0" smtClean="0"/>
+              <a:t>03</a:t>
+            </a:r>
+            <a:endParaRPr lang="pt-PT" sz="16600" dirty="0"/>
+          </a:p>
+        </p:txBody>
+      </p:sp>
+      <p:sp>
+        <p:nvSpPr>
+          <p:cNvPr id="4" name="Title 3"/>
+          <p:cNvSpPr>
+            <a:spLocks noGrp="1"/>
+          </p:cNvSpPr>
+          <p:nvPr>
+            <p:ph type="title"/>
           </p:nvPr>
         </p:nvSpPr>
         <p:spPr>
           <a:xfrm>
-            <a:off x="457200" y="1094346"/>
-            <a:ext cx="8229600" cy="5214974"/>
+            <a:off x="2281222" y="3214686"/>
+            <a:ext cx="6786578" cy="3033714"/>
           </a:xfrm>
+          <a:solidFill>
+            <a:srgbClr val="FFFFFF">
+              <a:alpha val="80000"/>
+            </a:srgbClr>
+          </a:solidFill>
         </p:spPr>
         <p:txBody>
-          <a:bodyPr>
+          <a:bodyPr rIns="288000">
             <a:noAutofit/>
           </a:bodyPr>
           <a:lstStyle/>
           <a:p>
-            <a:pPr lvl="1"/>
-            <a:r>
-              <a:rPr lang="en-US" sz="3200" dirty="0" smtClean="0"/>
-              <a:t>Item1 description</a:t>
-            </a:r>
-          </a:p>
-          <a:p>
-            <a:pPr lvl="1"/>
-            <a:r>
-              <a:rPr lang="en-US" sz="2400" dirty="0" smtClean="0"/>
-              <a:t>	Attribute1 description</a:t>
-            </a:r>
-            <a:endParaRPr lang="en-US" sz="1800" dirty="0"/>
-          </a:p>
-          <a:p>
-            <a:pPr lvl="1"/>
-            <a:r>
-              <a:rPr lang="en-US" sz="2400" dirty="0" smtClean="0"/>
-              <a:t>	Attribute2 description</a:t>
-            </a:r>
-          </a:p>
-          <a:p>
-            <a:pPr lvl="1"/>
-            <a:endParaRPr lang="en-US" sz="1800" dirty="0"/>
-          </a:p>
-          <a:p>
-            <a:pPr lvl="1"/>
-            <a:r>
-              <a:rPr lang="en-US" sz="3200" dirty="0" smtClean="0"/>
-              <a:t>Item2 description</a:t>
-            </a:r>
-          </a:p>
-          <a:p>
-            <a:pPr lvl="1"/>
-            <a:r>
-              <a:rPr lang="en-US" sz="2400" dirty="0" smtClean="0"/>
-              <a:t>	Attribute1 </a:t>
-            </a:r>
-            <a:r>
-              <a:rPr lang="en-US" sz="2400" dirty="0"/>
-              <a:t>description</a:t>
-            </a:r>
-            <a:endParaRPr lang="en-US" sz="1800" dirty="0"/>
-          </a:p>
-          <a:p>
-            <a:pPr lvl="1"/>
-            <a:r>
-              <a:rPr lang="en-US" sz="2400" dirty="0" smtClean="0"/>
-              <a:t>	Attribute2 </a:t>
-            </a:r>
-            <a:r>
-              <a:rPr lang="en-US" sz="2400" dirty="0"/>
-              <a:t>description</a:t>
-            </a:r>
-            <a:endParaRPr lang="en-US" sz="1800" dirty="0"/>
-          </a:p>
-          <a:p>
-            <a:pPr lvl="1"/>
-            <a:endParaRPr lang="en-US" sz="3200" dirty="0" smtClean="0"/>
-          </a:p>
-          <a:p>
-            <a:pPr lvl="1"/>
-            <a:r>
-              <a:rPr lang="en-US" sz="3200" dirty="0" smtClean="0"/>
-              <a:t>…</a:t>
-            </a:r>
-            <a:endParaRPr lang="en-US" sz="3200" dirty="0"/>
+            <a:pPr marL="0" algn="r"/>
+            <a:r>
+              <a:rPr lang="pt-PT" sz="6000" dirty="0" smtClean="0"/>
+              <a:t>Data </a:t>
+            </a:r>
+            <a:r>
+              <a:rPr lang="pt-PT" sz="6000" dirty="0" err="1" smtClean="0"/>
+              <a:t>abstraction</a:t>
+            </a:r>
+            <a:endParaRPr lang="pt-PT" sz="6000" dirty="0"/>
           </a:p>
         </p:txBody>
       </p:sp>
     </p:spTree>
     <p:extLst>
       <p:ext uri="{BB962C8B-B14F-4D97-AF65-F5344CB8AC3E}">
-        <p14:creationId xmlns:p14="http://schemas.microsoft.com/office/powerpoint/2010/main" val="1828594822"/>
+        <p14:creationId xmlns:p14="http://schemas.microsoft.com/office/powerpoint/2010/main" val="760072998"/>
       </p:ext>
     </p:extLst>
   </p:cSld>
@@ -4836,15 +5256,44 @@
           <a:p>
             <a:r>
               <a:rPr lang="en-US" sz="3600" dirty="0" smtClean="0"/>
-              <a:t>Semantics:</a:t>
-            </a:r>
+              <a:t>Description:</a:t>
+            </a:r>
+          </a:p>
+          <a:p>
+            <a:pPr lvl="1"/>
+            <a:r>
+              <a:rPr lang="en-GB" sz="3200" dirty="0" smtClean="0"/>
+              <a:t>All Winners – A table </a:t>
+            </a:r>
+            <a:r>
+              <a:rPr lang="en-GB" sz="3200" dirty="0"/>
+              <a:t>containing all the podium finishes of the countries since 1896 until 2008.</a:t>
+            </a:r>
+            <a:endParaRPr lang="en-US" sz="3200" dirty="0" smtClean="0"/>
+          </a:p>
+          <a:p>
+            <a:r>
+              <a:rPr lang="en-US" sz="3600" dirty="0" smtClean="0"/>
+              <a:t>Dataset type:</a:t>
+            </a:r>
+          </a:p>
+          <a:p>
+            <a:pPr lvl="1"/>
+            <a:r>
+              <a:rPr lang="pt-PT" sz="3200" dirty="0" smtClean="0"/>
+              <a:t>Organized as a tree, first by the year, then the sport and then the NOC country code and the medal.</a:t>
+            </a:r>
+            <a:endParaRPr lang="en-US" sz="3600" dirty="0" smtClean="0"/>
+          </a:p>
+          <a:p>
+            <a:endParaRPr lang="en-US" sz="3600" dirty="0" smtClean="0"/>
           </a:p>
         </p:txBody>
       </p:sp>
     </p:spTree>
     <p:extLst>
       <p:ext uri="{BB962C8B-B14F-4D97-AF65-F5344CB8AC3E}">
-        <p14:creationId xmlns:p14="http://schemas.microsoft.com/office/powerpoint/2010/main" val="3208609425"/>
+        <p14:creationId xmlns:p14="http://schemas.microsoft.com/office/powerpoint/2010/main" val="1967416131"/>
       </p:ext>
     </p:extLst>
   </p:cSld>
@@ -4880,12 +5329,12 @@
       </p:grpSpPr>
       <p:sp>
         <p:nvSpPr>
-          <p:cNvPr id="6" name="Text Placeholder 5"/>
-          <p:cNvSpPr>
-            <a:spLocks noGrp="1"/>
-          </p:cNvSpPr>
-          <p:nvPr>
-            <p:ph type="body" sz="quarter" idx="11"/>
+          <p:cNvPr id="2" name="Title 1"/>
+          <p:cNvSpPr>
+            <a:spLocks noGrp="1"/>
+          </p:cNvSpPr>
+          <p:nvPr>
+            <p:ph type="title"/>
           </p:nvPr>
         </p:nvSpPr>
         <p:spPr/>
@@ -4893,81 +5342,110 @@
           <a:bodyPr/>
           <a:lstStyle/>
           <a:p>
-            <a:endParaRPr lang="en-US" dirty="0"/>
-          </a:p>
-        </p:txBody>
-      </p:sp>
-      <p:sp>
-        <p:nvSpPr>
-          <p:cNvPr id="29" name="Text Placeholder 28"/>
-          <p:cNvSpPr>
-            <a:spLocks noGrp="1"/>
-          </p:cNvSpPr>
-          <p:nvPr>
-            <p:ph type="body" sz="quarter" idx="10"/>
-          </p:nvPr>
-        </p:nvSpPr>
-        <p:spPr/>
-        <p:txBody>
-          <a:bodyPr/>
-          <a:lstStyle/>
-          <a:p>
-            <a:r>
-              <a:rPr lang="pt-PT" sz="16600" dirty="0" smtClean="0"/>
-              <a:t>04</a:t>
-            </a:r>
-            <a:endParaRPr lang="pt-PT" sz="16600" dirty="0"/>
-          </a:p>
-        </p:txBody>
-      </p:sp>
-      <p:sp>
-        <p:nvSpPr>
-          <p:cNvPr id="4" name="Title 3"/>
-          <p:cNvSpPr>
-            <a:spLocks noGrp="1"/>
-          </p:cNvSpPr>
-          <p:nvPr>
-            <p:ph type="title"/>
+            <a:r>
+              <a:rPr lang="en-US" dirty="0" smtClean="0"/>
+              <a:t>Data abstraction</a:t>
+            </a:r>
+            <a:endParaRPr lang="pt-PT" dirty="0"/>
+          </a:p>
+        </p:txBody>
+      </p:sp>
+      <p:sp>
+        <p:nvSpPr>
+          <p:cNvPr id="3" name="Content Placeholder 2"/>
+          <p:cNvSpPr>
+            <a:spLocks noGrp="1"/>
+          </p:cNvSpPr>
+          <p:nvPr>
+            <p:ph idx="1"/>
           </p:nvPr>
         </p:nvSpPr>
         <p:spPr>
           <a:xfrm>
-            <a:off x="2281222" y="3214686"/>
-            <a:ext cx="6786578" cy="3033714"/>
+            <a:off x="457200" y="1094346"/>
+            <a:ext cx="8229600" cy="5214974"/>
           </a:xfrm>
-          <a:solidFill>
-            <a:srgbClr val="FFFFFF">
-              <a:alpha val="80000"/>
-            </a:srgbClr>
-          </a:solidFill>
         </p:spPr>
         <p:txBody>
-          <a:bodyPr rIns="288000">
+          <a:bodyPr>
             <a:noAutofit/>
           </a:bodyPr>
           <a:lstStyle/>
           <a:p>
-            <a:pPr marL="0" algn="r"/>
-            <a:r>
-              <a:rPr lang="pt-PT" sz="6000" dirty="0" err="1" smtClean="0"/>
-              <a:t>Dataset</a:t>
-            </a:r>
-            <a:r>
-              <a:rPr lang="pt-PT" sz="6000" dirty="0" smtClean="0"/>
-              <a:t> </a:t>
-            </a:r>
-            <a:r>
-              <a:rPr lang="pt-PT" sz="6000" dirty="0" err="1" smtClean="0"/>
-              <a:t>processing</a:t>
-            </a:r>
-            <a:endParaRPr lang="pt-PT" sz="6000" dirty="0"/>
+            <a:pPr lvl="1"/>
+            <a:r>
+              <a:rPr lang="en-US" sz="3200" dirty="0" smtClean="0"/>
+              <a:t>Item1 description</a:t>
+            </a:r>
+          </a:p>
+          <a:p>
+            <a:pPr lvl="1"/>
+            <a:r>
+              <a:rPr lang="en-US" sz="2400" dirty="0" smtClean="0"/>
+              <a:t>	Attribute1 description</a:t>
+            </a:r>
+            <a:endParaRPr lang="en-US" sz="1800" dirty="0"/>
+          </a:p>
+          <a:p>
+            <a:pPr lvl="1"/>
+            <a:r>
+              <a:rPr lang="en-US" sz="2400" dirty="0" smtClean="0"/>
+              <a:t>	Attribute2 description</a:t>
+            </a:r>
+          </a:p>
+          <a:p>
+            <a:pPr lvl="1"/>
+            <a:endParaRPr lang="en-US" sz="1800" dirty="0"/>
+          </a:p>
+          <a:p>
+            <a:pPr lvl="1"/>
+            <a:r>
+              <a:rPr lang="en-US" sz="3200" dirty="0" smtClean="0"/>
+              <a:t>Item2 description</a:t>
+            </a:r>
+          </a:p>
+          <a:p>
+            <a:pPr lvl="1"/>
+            <a:r>
+              <a:rPr lang="en-US" sz="2400" dirty="0" smtClean="0"/>
+              <a:t>	Attribute1 </a:t>
+            </a:r>
+            <a:r>
+              <a:rPr lang="en-US" sz="2400" dirty="0"/>
+              <a:t>description</a:t>
+            </a:r>
+            <a:endParaRPr lang="en-US" sz="1800" dirty="0"/>
+          </a:p>
+          <a:p>
+            <a:pPr lvl="1"/>
+            <a:r>
+              <a:rPr lang="en-US" sz="2400" dirty="0" smtClean="0"/>
+              <a:t>	Attribute2 </a:t>
+            </a:r>
+            <a:r>
+              <a:rPr lang="en-US" sz="2400" dirty="0"/>
+              <a:t>description</a:t>
+            </a:r>
+            <a:endParaRPr lang="en-US" sz="1800" dirty="0"/>
+          </a:p>
+          <a:p>
+            <a:pPr lvl="1"/>
+            <a:endParaRPr lang="en-US" sz="3200" dirty="0" smtClean="0"/>
+          </a:p>
+          <a:p>
+            <a:pPr lvl="1"/>
+            <a:r>
+              <a:rPr lang="en-US" sz="3200" dirty="0" smtClean="0"/>
+              <a:t>…</a:t>
+            </a:r>
+            <a:endParaRPr lang="en-US" sz="3200" dirty="0"/>
           </a:p>
         </p:txBody>
       </p:sp>
     </p:spTree>
     <p:extLst>
       <p:ext uri="{BB962C8B-B14F-4D97-AF65-F5344CB8AC3E}">
-        <p14:creationId xmlns:p14="http://schemas.microsoft.com/office/powerpoint/2010/main" val="4045494449"/>
+        <p14:creationId xmlns:p14="http://schemas.microsoft.com/office/powerpoint/2010/main" val="1828594822"/>
       </p:ext>
     </p:extLst>
   </p:cSld>
@@ -5018,7 +5496,7 @@
           <a:p>
             <a:r>
               <a:rPr lang="en-US" dirty="0" smtClean="0"/>
-              <a:t>Dataset processing</a:t>
+              <a:t>Data abstraction</a:t>
             </a:r>
             <a:endParaRPr lang="pt-PT" dirty="0"/>
           </a:p>
@@ -5047,37 +5525,8 @@
           <a:lstStyle/>
           <a:p>
             <a:r>
-              <a:rPr lang="en-US" sz="4000" dirty="0" smtClean="0"/>
-              <a:t>Dataset cleaning description</a:t>
-            </a:r>
-          </a:p>
-          <a:p>
-            <a:endParaRPr lang="en-US" sz="4000" dirty="0"/>
-          </a:p>
-          <a:p>
-            <a:pPr lvl="1"/>
-            <a:r>
               <a:rPr lang="en-US" sz="3600" dirty="0" smtClean="0"/>
-              <a:t>Entry1</a:t>
-            </a:r>
-            <a:endParaRPr lang="en-US" sz="3600" dirty="0"/>
-          </a:p>
-          <a:p>
-            <a:pPr lvl="1"/>
-            <a:r>
-              <a:rPr lang="en-US" sz="3600" dirty="0" smtClean="0"/>
-              <a:t>Entry2</a:t>
-            </a:r>
-          </a:p>
-          <a:p>
-            <a:pPr lvl="1"/>
-            <a:endParaRPr lang="en-US" sz="3600" dirty="0"/>
-          </a:p>
-          <a:p>
-            <a:pPr lvl="1"/>
-            <a:r>
-              <a:rPr lang="en-US" sz="3600" dirty="0" smtClean="0"/>
-              <a:t>…</a:t>
+              <a:t>Semantics:</a:t>
             </a:r>
           </a:p>
         </p:txBody>
@@ -5085,7 +5534,7 @@
     </p:spTree>
     <p:extLst>
       <p:ext uri="{BB962C8B-B14F-4D97-AF65-F5344CB8AC3E}">
-        <p14:creationId xmlns:p14="http://schemas.microsoft.com/office/powerpoint/2010/main" val="3456915046"/>
+        <p14:creationId xmlns:p14="http://schemas.microsoft.com/office/powerpoint/2010/main" val="3208609425"/>
       </p:ext>
     </p:extLst>
   </p:cSld>
@@ -5121,12 +5570,12 @@
       </p:grpSpPr>
       <p:sp>
         <p:nvSpPr>
-          <p:cNvPr id="2" name="Title 1"/>
-          <p:cNvSpPr>
-            <a:spLocks noGrp="1"/>
-          </p:cNvSpPr>
-          <p:nvPr>
-            <p:ph type="title"/>
+          <p:cNvPr id="6" name="Text Placeholder 5"/>
+          <p:cNvSpPr>
+            <a:spLocks noGrp="1"/>
+          </p:cNvSpPr>
+          <p:nvPr>
+            <p:ph type="body" sz="quarter" idx="11"/>
           </p:nvPr>
         </p:nvSpPr>
         <p:spPr/>
@@ -5134,83 +5583,81 @@
           <a:bodyPr/>
           <a:lstStyle/>
           <a:p>
-            <a:r>
-              <a:rPr lang="en-US" dirty="0" smtClean="0"/>
-              <a:t>Dataset processing</a:t>
-            </a:r>
-            <a:endParaRPr lang="pt-PT" dirty="0"/>
-          </a:p>
-        </p:txBody>
-      </p:sp>
-      <p:sp>
-        <p:nvSpPr>
-          <p:cNvPr id="3" name="Content Placeholder 2"/>
-          <p:cNvSpPr>
-            <a:spLocks noGrp="1"/>
-          </p:cNvSpPr>
-          <p:nvPr>
-            <p:ph idx="1"/>
+            <a:endParaRPr lang="en-US" dirty="0"/>
+          </a:p>
+        </p:txBody>
+      </p:sp>
+      <p:sp>
+        <p:nvSpPr>
+          <p:cNvPr id="29" name="Text Placeholder 28"/>
+          <p:cNvSpPr>
+            <a:spLocks noGrp="1"/>
+          </p:cNvSpPr>
+          <p:nvPr>
+            <p:ph type="body" sz="quarter" idx="10"/>
+          </p:nvPr>
+        </p:nvSpPr>
+        <p:spPr/>
+        <p:txBody>
+          <a:bodyPr/>
+          <a:lstStyle/>
+          <a:p>
+            <a:r>
+              <a:rPr lang="pt-PT" sz="16600" dirty="0" smtClean="0"/>
+              <a:t>04</a:t>
+            </a:r>
+            <a:endParaRPr lang="pt-PT" sz="16600" dirty="0"/>
+          </a:p>
+        </p:txBody>
+      </p:sp>
+      <p:sp>
+        <p:nvSpPr>
+          <p:cNvPr id="4" name="Title 3"/>
+          <p:cNvSpPr>
+            <a:spLocks noGrp="1"/>
+          </p:cNvSpPr>
+          <p:nvPr>
+            <p:ph type="title"/>
           </p:nvPr>
         </p:nvSpPr>
         <p:spPr>
           <a:xfrm>
-            <a:off x="457200" y="1094346"/>
-            <a:ext cx="8229600" cy="5214974"/>
+            <a:off x="2281222" y="3214686"/>
+            <a:ext cx="6786578" cy="3033714"/>
           </a:xfrm>
+          <a:solidFill>
+            <a:srgbClr val="FFFFFF">
+              <a:alpha val="80000"/>
+            </a:srgbClr>
+          </a:solidFill>
         </p:spPr>
         <p:txBody>
-          <a:bodyPr>
+          <a:bodyPr rIns="288000">
             <a:noAutofit/>
           </a:bodyPr>
           <a:lstStyle/>
           <a:p>
-            <a:r>
-              <a:rPr lang="en-US" sz="4000" dirty="0" smtClean="0"/>
-              <a:t>Problems found:</a:t>
-            </a:r>
-          </a:p>
-          <a:p>
-            <a:pPr lvl="1"/>
-            <a:r>
-              <a:rPr lang="en-US" sz="3600" dirty="0" smtClean="0"/>
-              <a:t>Problem 1</a:t>
-            </a:r>
-          </a:p>
-          <a:p>
-            <a:pPr lvl="1"/>
-            <a:r>
-              <a:rPr lang="en-US" sz="3600" dirty="0" smtClean="0"/>
-              <a:t>Solution</a:t>
-            </a:r>
-          </a:p>
-          <a:p>
-            <a:pPr lvl="1"/>
-            <a:endParaRPr lang="en-US" sz="3600" dirty="0" smtClean="0"/>
-          </a:p>
-          <a:p>
-            <a:pPr lvl="1"/>
-            <a:r>
-              <a:rPr lang="en-US" sz="3600" dirty="0" smtClean="0"/>
-              <a:t>Problem 2</a:t>
-            </a:r>
-          </a:p>
-          <a:p>
-            <a:pPr lvl="1"/>
-            <a:r>
-              <a:rPr lang="en-US" sz="3600" dirty="0" smtClean="0"/>
-              <a:t>Solution</a:t>
-            </a:r>
-            <a:endParaRPr lang="en-US" sz="4000" dirty="0" smtClean="0"/>
-          </a:p>
-          <a:p>
-            <a:endParaRPr lang="en-US" sz="4000" dirty="0"/>
+            <a:pPr marL="0" algn="r"/>
+            <a:r>
+              <a:rPr lang="pt-PT" sz="6000" dirty="0" err="1" smtClean="0"/>
+              <a:t>Dataset</a:t>
+            </a:r>
+            <a:r>
+              <a:rPr lang="pt-PT" sz="6000" dirty="0" smtClean="0"/>
+              <a:t> </a:t>
+            </a:r>
+            <a:r>
+              <a:rPr lang="pt-PT" sz="6000" dirty="0" err="1" smtClean="0"/>
+              <a:t>processing</a:t>
+            </a:r>
+            <a:endParaRPr lang="pt-PT" sz="6000" dirty="0"/>
           </a:p>
         </p:txBody>
       </p:sp>
     </p:spTree>
     <p:extLst>
       <p:ext uri="{BB962C8B-B14F-4D97-AF65-F5344CB8AC3E}">
-        <p14:creationId xmlns:p14="http://schemas.microsoft.com/office/powerpoint/2010/main" val="2665434140"/>
+        <p14:creationId xmlns:p14="http://schemas.microsoft.com/office/powerpoint/2010/main" val="4045494449"/>
       </p:ext>
     </p:extLst>
   </p:cSld>
@@ -5246,12 +5693,12 @@
       </p:grpSpPr>
       <p:sp>
         <p:nvSpPr>
-          <p:cNvPr id="6" name="Text Placeholder 5"/>
-          <p:cNvSpPr>
-            <a:spLocks noGrp="1"/>
-          </p:cNvSpPr>
-          <p:nvPr>
-            <p:ph type="body" sz="quarter" idx="11"/>
+          <p:cNvPr id="2" name="Title 1"/>
+          <p:cNvSpPr>
+            <a:spLocks noGrp="1"/>
+          </p:cNvSpPr>
+          <p:nvPr>
+            <p:ph type="title"/>
           </p:nvPr>
         </p:nvSpPr>
         <p:spPr/>
@@ -5259,73 +5706,76 @@
           <a:bodyPr/>
           <a:lstStyle/>
           <a:p>
-            <a:endParaRPr lang="en-US" dirty="0"/>
-          </a:p>
-        </p:txBody>
-      </p:sp>
-      <p:sp>
-        <p:nvSpPr>
-          <p:cNvPr id="29" name="Text Placeholder 28"/>
-          <p:cNvSpPr>
-            <a:spLocks noGrp="1"/>
-          </p:cNvSpPr>
-          <p:nvPr>
-            <p:ph type="body" sz="quarter" idx="10"/>
-          </p:nvPr>
-        </p:nvSpPr>
-        <p:spPr/>
-        <p:txBody>
-          <a:bodyPr/>
-          <a:lstStyle/>
-          <a:p>
-            <a:r>
-              <a:rPr lang="pt-PT" sz="16600" dirty="0" smtClean="0"/>
-              <a:t>05</a:t>
-            </a:r>
-            <a:endParaRPr lang="pt-PT" sz="16600" dirty="0"/>
-          </a:p>
-        </p:txBody>
-      </p:sp>
-      <p:sp>
-        <p:nvSpPr>
-          <p:cNvPr id="4" name="Title 3"/>
-          <p:cNvSpPr>
-            <a:spLocks noGrp="1"/>
-          </p:cNvSpPr>
-          <p:nvPr>
-            <p:ph type="title"/>
+            <a:r>
+              <a:rPr lang="en-US" dirty="0" smtClean="0"/>
+              <a:t>Dataset processing</a:t>
+            </a:r>
+            <a:endParaRPr lang="pt-PT" dirty="0"/>
+          </a:p>
+        </p:txBody>
+      </p:sp>
+      <p:sp>
+        <p:nvSpPr>
+          <p:cNvPr id="3" name="Content Placeholder 2"/>
+          <p:cNvSpPr>
+            <a:spLocks noGrp="1"/>
+          </p:cNvSpPr>
+          <p:nvPr>
+            <p:ph idx="1"/>
           </p:nvPr>
         </p:nvSpPr>
         <p:spPr>
           <a:xfrm>
-            <a:off x="2281222" y="3214686"/>
-            <a:ext cx="6786578" cy="3033714"/>
+            <a:off x="457200" y="1094346"/>
+            <a:ext cx="8229600" cy="5214974"/>
           </a:xfrm>
-          <a:solidFill>
-            <a:srgbClr val="FFFFFF">
-              <a:alpha val="80000"/>
-            </a:srgbClr>
-          </a:solidFill>
         </p:spPr>
         <p:txBody>
-          <a:bodyPr rIns="288000">
+          <a:bodyPr>
             <a:noAutofit/>
           </a:bodyPr>
           <a:lstStyle/>
           <a:p>
-            <a:pPr marL="0" algn="r"/>
-            <a:r>
-              <a:rPr lang="pt-PT" sz="6000" dirty="0" err="1" smtClean="0"/>
-              <a:t>Mapping</a:t>
-            </a:r>
-            <a:endParaRPr lang="pt-PT" sz="6000" dirty="0"/>
+            <a:r>
+              <a:rPr lang="en-US" sz="4000" dirty="0" smtClean="0"/>
+              <a:t>Dataset cleaning description</a:t>
+            </a:r>
+          </a:p>
+          <a:p>
+            <a:endParaRPr lang="en-US" sz="4000" dirty="0"/>
+          </a:p>
+          <a:p>
+            <a:pPr lvl="1"/>
+            <a:r>
+              <a:rPr lang="en-US" sz="3600" dirty="0" smtClean="0"/>
+              <a:t>Entry1</a:t>
+            </a:r>
+            <a:endParaRPr lang="en-US" sz="3600" dirty="0"/>
+          </a:p>
+          <a:p>
+            <a:pPr lvl="1"/>
+            <a:r>
+              <a:rPr lang="en-US" sz="3600" dirty="0" smtClean="0"/>
+              <a:t>Entry2</a:t>
+            </a:r>
+          </a:p>
+          <a:p>
+            <a:pPr lvl="1"/>
+            <a:endParaRPr lang="en-US" sz="3600" dirty="0"/>
+          </a:p>
+          <a:p>
+            <a:pPr lvl="1"/>
+            <a:r>
+              <a:rPr lang="en-US" sz="3600" dirty="0" smtClean="0"/>
+              <a:t>…</a:t>
+            </a:r>
           </a:p>
         </p:txBody>
       </p:sp>
     </p:spTree>
     <p:extLst>
       <p:ext uri="{BB962C8B-B14F-4D97-AF65-F5344CB8AC3E}">
-        <p14:creationId xmlns:p14="http://schemas.microsoft.com/office/powerpoint/2010/main" val="2312607420"/>
+        <p14:creationId xmlns:p14="http://schemas.microsoft.com/office/powerpoint/2010/main" val="3456915046"/>
       </p:ext>
     </p:extLst>
   </p:cSld>
@@ -5376,7 +5826,7 @@
           <a:p>
             <a:r>
               <a:rPr lang="en-US" dirty="0" smtClean="0"/>
-              <a:t>Mapping</a:t>
+              <a:t>Dataset processing</a:t>
             </a:r>
             <a:endParaRPr lang="pt-PT" dirty="0"/>
           </a:p>
@@ -5384,7 +5834,7 @@
       </p:sp>
       <p:sp>
         <p:nvSpPr>
-          <p:cNvPr id="5" name="Content Placeholder 2"/>
+          <p:cNvPr id="3" name="Content Placeholder 2"/>
           <p:cNvSpPr>
             <a:spLocks noGrp="1"/>
           </p:cNvSpPr>
@@ -5406,14 +5856,21 @@
           <a:p>
             <a:r>
               <a:rPr lang="en-US" sz="4000" dirty="0" smtClean="0"/>
-              <a:t>Question 1</a:t>
+              <a:t>Problems found:</a:t>
             </a:r>
           </a:p>
           <a:p>
             <a:pPr lvl="1"/>
             <a:r>
               <a:rPr lang="en-US" sz="3600" dirty="0" smtClean="0"/>
-              <a:t>Data</a:t>
+              <a:t>Problem 1</a:t>
+            </a:r>
+          </a:p>
+          <a:p>
+            <a:pPr lvl="1"/>
+            <a:r>
+              <a:rPr lang="en-US" sz="3600" dirty="0" smtClean="0"/>
+              <a:t>Solution</a:t>
             </a:r>
           </a:p>
           <a:p>
@@ -5421,40 +5878,29 @@
             <a:endParaRPr lang="en-US" sz="3600" dirty="0" smtClean="0"/>
           </a:p>
           <a:p>
-            <a:r>
-              <a:rPr lang="en-US" sz="4000" dirty="0"/>
-              <a:t>Question </a:t>
-            </a:r>
-            <a:r>
-              <a:rPr lang="en-US" sz="4000" dirty="0" smtClean="0"/>
-              <a:t>2</a:t>
-            </a:r>
+            <a:pPr lvl="1"/>
+            <a:r>
+              <a:rPr lang="en-US" sz="3600" dirty="0" smtClean="0"/>
+              <a:t>Problem 2</a:t>
+            </a:r>
+          </a:p>
+          <a:p>
+            <a:pPr lvl="1"/>
+            <a:r>
+              <a:rPr lang="en-US" sz="3600" dirty="0" smtClean="0"/>
+              <a:t>Solution</a:t>
+            </a:r>
+            <a:endParaRPr lang="en-US" sz="4000" dirty="0" smtClean="0"/>
+          </a:p>
+          <a:p>
             <a:endParaRPr lang="en-US" sz="4000" dirty="0"/>
-          </a:p>
-          <a:p>
-            <a:pPr lvl="1"/>
-            <a:r>
-              <a:rPr lang="en-US" sz="3600" dirty="0" smtClean="0"/>
-              <a:t>Data</a:t>
-            </a:r>
-          </a:p>
-          <a:p>
-            <a:pPr lvl="1"/>
-            <a:endParaRPr lang="en-US" sz="3600" dirty="0"/>
-          </a:p>
-          <a:p>
-            <a:r>
-              <a:rPr lang="en-US" sz="4000" dirty="0" smtClean="0"/>
-              <a:t>…</a:t>
-            </a:r>
-            <a:endParaRPr lang="en-US" sz="4400" dirty="0"/>
           </a:p>
         </p:txBody>
       </p:sp>
     </p:spTree>
     <p:extLst>
       <p:ext uri="{BB962C8B-B14F-4D97-AF65-F5344CB8AC3E}">
-        <p14:creationId xmlns:p14="http://schemas.microsoft.com/office/powerpoint/2010/main" val="2292396113"/>
+        <p14:creationId xmlns:p14="http://schemas.microsoft.com/office/powerpoint/2010/main" val="2665434140"/>
       </p:ext>
     </p:extLst>
   </p:cSld>
@@ -5581,6 +6027,250 @@
 </p:sld>
 </file>
 
+<file path=ppt/slides/slide20.xml><?xml version="1.0" encoding="utf-8"?>
+<p:sld xmlns:a="http://schemas.openxmlformats.org/drawingml/2006/main" xmlns:r="http://schemas.openxmlformats.org/officeDocument/2006/relationships" xmlns:p="http://schemas.openxmlformats.org/presentationml/2006/main">
+  <p:cSld>
+    <p:spTree>
+      <p:nvGrpSpPr>
+        <p:cNvPr id="1" name=""/>
+        <p:cNvGrpSpPr/>
+        <p:nvPr/>
+      </p:nvGrpSpPr>
+      <p:grpSpPr>
+        <a:xfrm>
+          <a:off x="0" y="0"/>
+          <a:ext cx="0" cy="0"/>
+          <a:chOff x="0" y="0"/>
+          <a:chExt cx="0" cy="0"/>
+        </a:xfrm>
+      </p:grpSpPr>
+      <p:sp>
+        <p:nvSpPr>
+          <p:cNvPr id="6" name="Text Placeholder 5"/>
+          <p:cNvSpPr>
+            <a:spLocks noGrp="1"/>
+          </p:cNvSpPr>
+          <p:nvPr>
+            <p:ph type="body" sz="quarter" idx="11"/>
+          </p:nvPr>
+        </p:nvSpPr>
+        <p:spPr/>
+        <p:txBody>
+          <a:bodyPr/>
+          <a:lstStyle/>
+          <a:p>
+            <a:endParaRPr lang="en-US" dirty="0"/>
+          </a:p>
+        </p:txBody>
+      </p:sp>
+      <p:sp>
+        <p:nvSpPr>
+          <p:cNvPr id="29" name="Text Placeholder 28"/>
+          <p:cNvSpPr>
+            <a:spLocks noGrp="1"/>
+          </p:cNvSpPr>
+          <p:nvPr>
+            <p:ph type="body" sz="quarter" idx="10"/>
+          </p:nvPr>
+        </p:nvSpPr>
+        <p:spPr/>
+        <p:txBody>
+          <a:bodyPr/>
+          <a:lstStyle/>
+          <a:p>
+            <a:r>
+              <a:rPr lang="pt-PT" sz="16600" dirty="0" smtClean="0"/>
+              <a:t>05</a:t>
+            </a:r>
+            <a:endParaRPr lang="pt-PT" sz="16600" dirty="0"/>
+          </a:p>
+        </p:txBody>
+      </p:sp>
+      <p:sp>
+        <p:nvSpPr>
+          <p:cNvPr id="4" name="Title 3"/>
+          <p:cNvSpPr>
+            <a:spLocks noGrp="1"/>
+          </p:cNvSpPr>
+          <p:nvPr>
+            <p:ph type="title"/>
+          </p:nvPr>
+        </p:nvSpPr>
+        <p:spPr>
+          <a:xfrm>
+            <a:off x="2281222" y="3214686"/>
+            <a:ext cx="6786578" cy="3033714"/>
+          </a:xfrm>
+          <a:solidFill>
+            <a:srgbClr val="FFFFFF">
+              <a:alpha val="80000"/>
+            </a:srgbClr>
+          </a:solidFill>
+        </p:spPr>
+        <p:txBody>
+          <a:bodyPr rIns="288000">
+            <a:noAutofit/>
+          </a:bodyPr>
+          <a:lstStyle/>
+          <a:p>
+            <a:pPr marL="0" algn="r"/>
+            <a:r>
+              <a:rPr lang="pt-PT" sz="6000" dirty="0" err="1" smtClean="0"/>
+              <a:t>Mapping</a:t>
+            </a:r>
+            <a:endParaRPr lang="pt-PT" sz="6000" dirty="0"/>
+          </a:p>
+        </p:txBody>
+      </p:sp>
+    </p:spTree>
+    <p:extLst>
+      <p:ext uri="{BB962C8B-B14F-4D97-AF65-F5344CB8AC3E}">
+        <p14:creationId xmlns:p14="http://schemas.microsoft.com/office/powerpoint/2010/main" val="2312607420"/>
+      </p:ext>
+    </p:extLst>
+  </p:cSld>
+  <p:clrMapOvr>
+    <a:masterClrMapping/>
+  </p:clrMapOvr>
+  <p:timing>
+    <p:tnLst>
+      <p:par>
+        <p:cTn id="1" dur="indefinite" restart="never" nodeType="tmRoot"/>
+      </p:par>
+    </p:tnLst>
+  </p:timing>
+</p:sld>
+</file>
+
+<file path=ppt/slides/slide21.xml><?xml version="1.0" encoding="utf-8"?>
+<p:sld xmlns:a="http://schemas.openxmlformats.org/drawingml/2006/main" xmlns:r="http://schemas.openxmlformats.org/officeDocument/2006/relationships" xmlns:p="http://schemas.openxmlformats.org/presentationml/2006/main">
+  <p:cSld>
+    <p:spTree>
+      <p:nvGrpSpPr>
+        <p:cNvPr id="1" name=""/>
+        <p:cNvGrpSpPr/>
+        <p:nvPr/>
+      </p:nvGrpSpPr>
+      <p:grpSpPr>
+        <a:xfrm>
+          <a:off x="0" y="0"/>
+          <a:ext cx="0" cy="0"/>
+          <a:chOff x="0" y="0"/>
+          <a:chExt cx="0" cy="0"/>
+        </a:xfrm>
+      </p:grpSpPr>
+      <p:sp>
+        <p:nvSpPr>
+          <p:cNvPr id="2" name="Title 1"/>
+          <p:cNvSpPr>
+            <a:spLocks noGrp="1"/>
+          </p:cNvSpPr>
+          <p:nvPr>
+            <p:ph type="title"/>
+          </p:nvPr>
+        </p:nvSpPr>
+        <p:spPr/>
+        <p:txBody>
+          <a:bodyPr/>
+          <a:lstStyle/>
+          <a:p>
+            <a:r>
+              <a:rPr lang="en-US" dirty="0" smtClean="0"/>
+              <a:t>Mapping</a:t>
+            </a:r>
+            <a:endParaRPr lang="pt-PT" dirty="0"/>
+          </a:p>
+        </p:txBody>
+      </p:sp>
+      <p:sp>
+        <p:nvSpPr>
+          <p:cNvPr id="5" name="Content Placeholder 2"/>
+          <p:cNvSpPr>
+            <a:spLocks noGrp="1"/>
+          </p:cNvSpPr>
+          <p:nvPr>
+            <p:ph idx="1"/>
+          </p:nvPr>
+        </p:nvSpPr>
+        <p:spPr>
+          <a:xfrm>
+            <a:off x="457200" y="1094346"/>
+            <a:ext cx="8229600" cy="5214974"/>
+          </a:xfrm>
+        </p:spPr>
+        <p:txBody>
+          <a:bodyPr>
+            <a:noAutofit/>
+          </a:bodyPr>
+          <a:lstStyle/>
+          <a:p>
+            <a:r>
+              <a:rPr lang="en-US" sz="4000" dirty="0" smtClean="0"/>
+              <a:t>Question 1</a:t>
+            </a:r>
+          </a:p>
+          <a:p>
+            <a:pPr lvl="1"/>
+            <a:r>
+              <a:rPr lang="en-US" sz="3600" dirty="0" smtClean="0"/>
+              <a:t>Data</a:t>
+            </a:r>
+          </a:p>
+          <a:p>
+            <a:pPr lvl="1"/>
+            <a:endParaRPr lang="en-US" sz="3600" dirty="0" smtClean="0"/>
+          </a:p>
+          <a:p>
+            <a:r>
+              <a:rPr lang="en-US" sz="4000" dirty="0"/>
+              <a:t>Question </a:t>
+            </a:r>
+            <a:r>
+              <a:rPr lang="en-US" sz="4000" dirty="0" smtClean="0"/>
+              <a:t>2</a:t>
+            </a:r>
+            <a:endParaRPr lang="en-US" sz="4000" dirty="0"/>
+          </a:p>
+          <a:p>
+            <a:pPr lvl="1"/>
+            <a:r>
+              <a:rPr lang="en-US" sz="3600" dirty="0" smtClean="0"/>
+              <a:t>Data</a:t>
+            </a:r>
+          </a:p>
+          <a:p>
+            <a:pPr lvl="1"/>
+            <a:endParaRPr lang="en-US" sz="3600" dirty="0"/>
+          </a:p>
+          <a:p>
+            <a:r>
+              <a:rPr lang="en-US" sz="4000" dirty="0" smtClean="0"/>
+              <a:t>…</a:t>
+            </a:r>
+            <a:endParaRPr lang="en-US" sz="4400" dirty="0"/>
+          </a:p>
+        </p:txBody>
+      </p:sp>
+    </p:spTree>
+    <p:extLst>
+      <p:ext uri="{BB962C8B-B14F-4D97-AF65-F5344CB8AC3E}">
+        <p14:creationId xmlns:p14="http://schemas.microsoft.com/office/powerpoint/2010/main" val="2292396113"/>
+      </p:ext>
+    </p:extLst>
+  </p:cSld>
+  <p:clrMapOvr>
+    <a:masterClrMapping/>
+  </p:clrMapOvr>
+  <p:timing>
+    <p:tnLst>
+      <p:par>
+        <p:cTn id="1" dur="indefinite" restart="never" nodeType="tmRoot"/>
+      </p:par>
+    </p:tnLst>
+  </p:timing>
+</p:sld>
+</file>
+
 <file path=ppt/slides/slide3.xml><?xml version="1.0" encoding="utf-8"?>
 <p:sld xmlns:a="http://schemas.openxmlformats.org/drawingml/2006/main" xmlns:r="http://schemas.openxmlformats.org/officeDocument/2006/relationships" xmlns:p="http://schemas.openxmlformats.org/presentationml/2006/main">
   <p:cSld>
@@ -5648,11 +6338,7 @@
             <a:pPr lvl="1"/>
             <a:r>
               <a:rPr lang="en-GB" sz="3200" dirty="0" smtClean="0"/>
-              <a:t>All Winners – </a:t>
-            </a:r>
-            <a:r>
-              <a:rPr lang="en-GB" sz="3200" dirty="0" smtClean="0"/>
-              <a:t>contains </a:t>
+              <a:t>All Winners – contains </a:t>
             </a:r>
             <a:r>
               <a:rPr lang="en-GB" sz="3200" dirty="0"/>
@@ -5719,12 +6405,12 @@
                     <a:p>
                       <a:pPr algn="l" fontAlgn="t"/>
                       <a:r>
-                        <a:rPr lang="en-US" sz="1400" u="none" strike="noStrike">
+                        <a:rPr lang="en-US" sz="1400" u="none" strike="noStrike" dirty="0">
                           <a:effectLst/>
                         </a:rPr>
                         <a:t>City</a:t>
                       </a:r>
-                      <a:endParaRPr lang="en-US" sz="1400" b="1" i="0" u="none" strike="noStrike">
+                      <a:endParaRPr lang="en-US" sz="1400" b="1" i="0" u="none" strike="noStrike" dirty="0">
                         <a:solidFill>
                           <a:srgbClr val="000000"/>
                         </a:solidFill>
@@ -5742,12 +6428,12 @@
                     <a:p>
                       <a:pPr algn="l" fontAlgn="t"/>
                       <a:r>
-                        <a:rPr lang="en-US" sz="1400" u="none" strike="noStrike">
+                        <a:rPr lang="en-US" sz="1400" u="none" strike="noStrike" dirty="0">
                           <a:effectLst/>
                         </a:rPr>
                         <a:t>Edition</a:t>
                       </a:r>
-                      <a:endParaRPr lang="en-US" sz="1400" b="1" i="0" u="none" strike="noStrike">
+                      <a:endParaRPr lang="en-US" sz="1400" b="1" i="0" u="none" strike="noStrike" dirty="0">
                         <a:solidFill>
                           <a:srgbClr val="000000"/>
                         </a:solidFill>
@@ -6262,6 +6948,23 @@
             </a:r>
           </a:p>
           <a:p>
+            <a:pPr marL="342900" lvl="1" indent="-342900">
+              <a:spcBef>
+                <a:spcPts val="1800"/>
+              </a:spcBef>
+            </a:pPr>
+            <a:r>
+              <a:rPr lang="en-GB" sz="3200" dirty="0" smtClean="0"/>
+              <a:t>Population – </a:t>
+            </a:r>
+            <a:r>
+              <a:rPr lang="en-GB" sz="3200" dirty="0"/>
+              <a:t>contains </a:t>
+            </a:r>
+            <a:r>
+              <a:rPr lang="en-GB" sz="3200" dirty="0" smtClean="0"/>
+              <a:t>the country name, their ISO codes (with 3 letters) and their population between 1960 and 2014. </a:t>
+            </a:r>
             <a:endParaRPr lang="en-US" sz="4000" dirty="0" smtClean="0"/>
           </a:p>
           <a:p>
@@ -6269,6 +6972,322 @@
               <a:rPr lang="en-US" sz="4000" dirty="0" smtClean="0"/>
               <a:t>Data sample</a:t>
             </a:r>
+          </a:p>
+        </p:txBody>
+      </p:sp>
+      <p:graphicFrame>
+        <p:nvGraphicFramePr>
+          <p:cNvPr id="5" name="Table 4"/>
+          <p:cNvGraphicFramePr>
+            <a:graphicFrameLocks noGrp="1"/>
+          </p:cNvGraphicFramePr>
+          <p:nvPr>
+            <p:extLst>
+              <p:ext uri="{D42A27DB-BD31-4B8C-83A1-F6EECF244321}">
+                <p14:modId xmlns:p14="http://schemas.microsoft.com/office/powerpoint/2010/main" val="2436335713"/>
+              </p:ext>
+            </p:extLst>
+          </p:nvPr>
+        </p:nvGraphicFramePr>
+        <p:xfrm>
+          <a:off x="755576" y="5010247"/>
+          <a:ext cx="6912768" cy="576064"/>
+        </p:xfrm>
+        <a:graphic>
+          <a:graphicData uri="http://schemas.openxmlformats.org/drawingml/2006/table">
+            <a:tbl>
+              <a:tblPr>
+                <a:tableStyleId>{5C22544A-7EE6-4342-B048-85BDC9FD1C3A}</a:tableStyleId>
+              </a:tblPr>
+              <a:tblGrid>
+                <a:gridCol w="1202220"/>
+                <a:gridCol w="1653053"/>
+                <a:gridCol w="1463930"/>
+                <a:gridCol w="1165925"/>
+                <a:gridCol w="1427640"/>
+              </a:tblGrid>
+              <a:tr h="288032">
+                <a:tc>
+                  <a:txBody>
+                    <a:bodyPr/>
+                    <a:lstStyle/>
+                    <a:p>
+                      <a:pPr algn="ctr" fontAlgn="t"/>
+                      <a:r>
+                        <a:rPr lang="en-US" sz="1400" u="none" strike="noStrike" dirty="0" smtClean="0">
+                          <a:effectLst/>
+                        </a:rPr>
+                        <a:t>Country Name</a:t>
+                      </a:r>
+                      <a:endParaRPr lang="en-US" sz="1400" b="1" i="0" u="none" strike="noStrike" dirty="0">
+                        <a:solidFill>
+                          <a:srgbClr val="000000"/>
+                        </a:solidFill>
+                        <a:effectLst/>
+                        <a:latin typeface="Arial"/>
+                      </a:endParaRPr>
+                    </a:p>
+                  </a:txBody>
+                  <a:tcPr marL="5935" marR="5935" marT="5935" marB="0"/>
+                </a:tc>
+                <a:tc>
+                  <a:txBody>
+                    <a:bodyPr/>
+                    <a:lstStyle/>
+                    <a:p>
+                      <a:pPr algn="ctr" fontAlgn="t"/>
+                      <a:r>
+                        <a:rPr lang="en-US" sz="1400" u="none" strike="noStrike" dirty="0" smtClean="0">
+                          <a:effectLst/>
+                        </a:rPr>
+                        <a:t>Country</a:t>
+                      </a:r>
+                      <a:r>
+                        <a:rPr lang="en-US" sz="1400" u="none" strike="noStrike" baseline="0" dirty="0" smtClean="0">
+                          <a:effectLst/>
+                        </a:rPr>
+                        <a:t> Code</a:t>
+                      </a:r>
+                      <a:endParaRPr lang="en-US" sz="1400" b="1" i="0" u="none" strike="noStrike" dirty="0">
+                        <a:solidFill>
+                          <a:srgbClr val="000000"/>
+                        </a:solidFill>
+                        <a:effectLst/>
+                        <a:latin typeface="Arial"/>
+                      </a:endParaRPr>
+                    </a:p>
+                  </a:txBody>
+                  <a:tcPr marL="5935" marR="5935" marT="5935" marB="0"/>
+                </a:tc>
+                <a:tc>
+                  <a:txBody>
+                    <a:bodyPr/>
+                    <a:lstStyle/>
+                    <a:p>
+                      <a:pPr algn="ctr" fontAlgn="t"/>
+                      <a:r>
+                        <a:rPr lang="en-US" sz="1400" u="none" strike="noStrike" dirty="0" smtClean="0">
+                          <a:effectLst/>
+                        </a:rPr>
+                        <a:t>Indicator Name</a:t>
+                      </a:r>
+                      <a:endParaRPr lang="en-US" sz="1400" b="1" i="0" u="none" strike="noStrike" dirty="0">
+                        <a:solidFill>
+                          <a:srgbClr val="000000"/>
+                        </a:solidFill>
+                        <a:effectLst/>
+                        <a:latin typeface="Arial"/>
+                      </a:endParaRPr>
+                    </a:p>
+                  </a:txBody>
+                  <a:tcPr marL="5935" marR="5935" marT="5935" marB="0"/>
+                </a:tc>
+                <a:tc>
+                  <a:txBody>
+                    <a:bodyPr/>
+                    <a:lstStyle/>
+                    <a:p>
+                      <a:pPr algn="ctr" fontAlgn="t"/>
+                      <a:r>
+                        <a:rPr lang="en-US" sz="1400" b="0" i="0" u="none" strike="noStrike" dirty="0" smtClean="0">
+                          <a:solidFill>
+                            <a:srgbClr val="000000"/>
+                          </a:solidFill>
+                          <a:effectLst/>
+                          <a:latin typeface="+mn-lt"/>
+                        </a:rPr>
+                        <a:t>Indicator</a:t>
+                      </a:r>
+                      <a:r>
+                        <a:rPr lang="en-US" sz="1400" b="0" i="0" u="none" strike="noStrike" baseline="0" dirty="0" smtClean="0">
+                          <a:solidFill>
+                            <a:srgbClr val="000000"/>
+                          </a:solidFill>
+                          <a:effectLst/>
+                          <a:latin typeface="+mn-lt"/>
+                        </a:rPr>
+                        <a:t> Code</a:t>
+                      </a:r>
+                      <a:endParaRPr lang="en-US" sz="1400" b="0" i="0" u="none" strike="noStrike" dirty="0">
+                        <a:solidFill>
+                          <a:srgbClr val="000000"/>
+                        </a:solidFill>
+                        <a:effectLst/>
+                        <a:latin typeface="+mn-lt"/>
+                      </a:endParaRPr>
+                    </a:p>
+                  </a:txBody>
+                  <a:tcPr marL="5935" marR="5935" marT="5935" marB="0"/>
+                </a:tc>
+                <a:tc>
+                  <a:txBody>
+                    <a:bodyPr/>
+                    <a:lstStyle/>
+                    <a:p>
+                      <a:pPr algn="ctr" fontAlgn="t"/>
+                      <a:r>
+                        <a:rPr lang="en-US" sz="1400" u="none" strike="noStrike" dirty="0" smtClean="0">
+                          <a:effectLst/>
+                        </a:rPr>
+                        <a:t>1960</a:t>
+                      </a:r>
+                    </a:p>
+                  </a:txBody>
+                  <a:tcPr marL="5935" marR="5935" marT="5935" marB="0"/>
+                </a:tc>
+              </a:tr>
+              <a:tr h="288032">
+                <a:tc>
+                  <a:txBody>
+                    <a:bodyPr/>
+                    <a:lstStyle/>
+                    <a:p>
+                      <a:pPr algn="ctr" fontAlgn="t"/>
+                      <a:r>
+                        <a:rPr lang="en-US" sz="1400" u="none" strike="noStrike" dirty="0" smtClean="0">
+                          <a:effectLst/>
+                        </a:rPr>
+                        <a:t>Aruba</a:t>
+                      </a:r>
+                      <a:endParaRPr lang="en-US" sz="1400" b="0" i="0" u="none" strike="noStrike" dirty="0">
+                        <a:solidFill>
+                          <a:srgbClr val="000000"/>
+                        </a:solidFill>
+                        <a:effectLst/>
+                        <a:latin typeface="Arial"/>
+                      </a:endParaRPr>
+                    </a:p>
+                  </a:txBody>
+                  <a:tcPr marL="5935" marR="5935" marT="5935" marB="0"/>
+                </a:tc>
+                <a:tc>
+                  <a:txBody>
+                    <a:bodyPr/>
+                    <a:lstStyle/>
+                    <a:p>
+                      <a:pPr algn="ctr" fontAlgn="t"/>
+                      <a:r>
+                        <a:rPr lang="en-US" sz="1400" u="none" strike="noStrike" dirty="0" smtClean="0">
+                          <a:effectLst/>
+                        </a:rPr>
+                        <a:t>ABW</a:t>
+                      </a:r>
+                      <a:endParaRPr lang="en-US" sz="1400" b="0" i="0" u="none" strike="noStrike" dirty="0">
+                        <a:solidFill>
+                          <a:srgbClr val="000000"/>
+                        </a:solidFill>
+                        <a:effectLst/>
+                        <a:latin typeface="Arial"/>
+                      </a:endParaRPr>
+                    </a:p>
+                  </a:txBody>
+                  <a:tcPr marL="5935" marR="5935" marT="5935" marB="0"/>
+                </a:tc>
+                <a:tc>
+                  <a:txBody>
+                    <a:bodyPr/>
+                    <a:lstStyle/>
+                    <a:p>
+                      <a:pPr algn="ctr" fontAlgn="t"/>
+                      <a:r>
+                        <a:rPr lang="en-US" sz="1400" u="none" strike="noStrike" dirty="0" smtClean="0">
+                          <a:effectLst/>
+                        </a:rPr>
+                        <a:t>Population, total</a:t>
+                      </a:r>
+                      <a:endParaRPr lang="en-US" sz="1400" b="0" i="0" u="none" strike="noStrike" dirty="0">
+                        <a:solidFill>
+                          <a:srgbClr val="000000"/>
+                        </a:solidFill>
+                        <a:effectLst/>
+                        <a:latin typeface="Arial"/>
+                      </a:endParaRPr>
+                    </a:p>
+                  </a:txBody>
+                  <a:tcPr marL="5935" marR="5935" marT="5935" marB="0"/>
+                </a:tc>
+                <a:tc>
+                  <a:txBody>
+                    <a:bodyPr/>
+                    <a:lstStyle/>
+                    <a:p>
+                      <a:pPr algn="ctr" fontAlgn="t"/>
+                      <a:r>
+                        <a:rPr lang="en-US" sz="1400" b="0" i="0" u="none" strike="noStrike" dirty="0" smtClean="0">
+                          <a:solidFill>
+                            <a:srgbClr val="000000"/>
+                          </a:solidFill>
+                          <a:effectLst/>
+                          <a:latin typeface="Arial"/>
+                        </a:rPr>
+                        <a:t>SP.POP.TOTL</a:t>
+                      </a:r>
+                      <a:endParaRPr lang="en-US" sz="1400" b="0" i="0" u="none" strike="noStrike" dirty="0">
+                        <a:solidFill>
+                          <a:srgbClr val="000000"/>
+                        </a:solidFill>
+                        <a:effectLst/>
+                        <a:latin typeface="Arial"/>
+                      </a:endParaRPr>
+                    </a:p>
+                  </a:txBody>
+                  <a:tcPr marL="5935" marR="5935" marT="5935" marB="0"/>
+                </a:tc>
+                <a:tc>
+                  <a:txBody>
+                    <a:bodyPr/>
+                    <a:lstStyle/>
+                    <a:p>
+                      <a:pPr algn="ctr" fontAlgn="t"/>
+                      <a:r>
+                        <a:rPr lang="en-US" sz="1400" u="none" strike="noStrike" dirty="0" smtClean="0">
+                          <a:effectLst/>
+                        </a:rPr>
+                        <a:t>54208</a:t>
+                      </a:r>
+                      <a:endParaRPr lang="en-US" sz="1400" b="0" i="0" u="none" strike="noStrike" dirty="0">
+                        <a:solidFill>
+                          <a:srgbClr val="000000"/>
+                        </a:solidFill>
+                        <a:effectLst/>
+                        <a:latin typeface="Arial"/>
+                      </a:endParaRPr>
+                    </a:p>
+                  </a:txBody>
+                  <a:tcPr marL="5935" marR="5935" marT="5935" marB="0"/>
+                </a:tc>
+              </a:tr>
+            </a:tbl>
+          </a:graphicData>
+        </a:graphic>
+      </p:graphicFrame>
+      <p:sp>
+        <p:nvSpPr>
+          <p:cNvPr id="6" name="CaixaDeTexto 5"/>
+          <p:cNvSpPr txBox="1"/>
+          <p:nvPr/>
+        </p:nvSpPr>
+        <p:spPr>
+          <a:xfrm>
+            <a:off x="7668344" y="4869160"/>
+            <a:ext cx="720080" cy="861774"/>
+          </a:xfrm>
+          <a:prstGeom prst="rect">
+            <a:avLst/>
+          </a:prstGeom>
+          <a:noFill/>
+        </p:spPr>
+        <p:txBody>
+          <a:bodyPr wrap="square" rtlCol="0">
+            <a:spAutoFit/>
+          </a:bodyPr>
+          <a:lstStyle/>
+          <a:p>
+            <a:r>
+              <a:rPr lang="pt-PT" sz="5000" dirty="0" smtClean="0"/>
+              <a:t>…</a:t>
+            </a:r>
+            <a:endParaRPr lang="pt-PT" sz="5000" dirty="0"/>
           </a:p>
         </p:txBody>
       </p:sp>
@@ -6355,16 +7374,261 @@
             </a:r>
           </a:p>
           <a:p>
+            <a:pPr marL="342900" lvl="1" indent="-342900">
+              <a:spcBef>
+                <a:spcPts val="1800"/>
+              </a:spcBef>
+            </a:pPr>
+            <a:r>
+              <a:rPr lang="en-GB" sz="3200" dirty="0" smtClean="0"/>
+              <a:t>Codes – </a:t>
+            </a:r>
+            <a:r>
+              <a:rPr lang="en-GB" sz="3200" dirty="0"/>
+              <a:t>contains the </a:t>
+            </a:r>
+            <a:r>
+              <a:rPr lang="en-GB" sz="3200" dirty="0" smtClean="0"/>
+              <a:t>2-letter ISO and IOC codes from all countries.</a:t>
+            </a:r>
             <a:endParaRPr lang="en-US" sz="4000" dirty="0" smtClean="0"/>
           </a:p>
           <a:p>
             <a:r>
               <a:rPr lang="en-US" sz="4000" dirty="0" smtClean="0"/>
-              <a:t>Data sample</a:t>
-            </a:r>
-          </a:p>
-        </p:txBody>
-      </p:sp>
+              <a:t>Data </a:t>
+            </a:r>
+            <a:r>
+              <a:rPr lang="en-US" sz="4000" dirty="0" smtClean="0"/>
+              <a:t>sample</a:t>
+            </a:r>
+          </a:p>
+          <a:p>
+            <a:endParaRPr lang="en-US" sz="4000" dirty="0" smtClean="0"/>
+          </a:p>
+        </p:txBody>
+      </p:sp>
+      <p:graphicFrame>
+        <p:nvGraphicFramePr>
+          <p:cNvPr id="4" name="Table 4"/>
+          <p:cNvGraphicFramePr>
+            <a:graphicFrameLocks noGrp="1"/>
+          </p:cNvGraphicFramePr>
+          <p:nvPr>
+            <p:extLst>
+              <p:ext uri="{D42A27DB-BD31-4B8C-83A1-F6EECF244321}">
+                <p14:modId xmlns:p14="http://schemas.microsoft.com/office/powerpoint/2010/main" val="3671686434"/>
+              </p:ext>
+            </p:extLst>
+          </p:nvPr>
+        </p:nvGraphicFramePr>
+        <p:xfrm>
+          <a:off x="971600" y="4149080"/>
+          <a:ext cx="6624736" cy="576064"/>
+        </p:xfrm>
+        <a:graphic>
+          <a:graphicData uri="http://schemas.openxmlformats.org/drawingml/2006/table">
+            <a:tbl>
+              <a:tblPr>
+                <a:tableStyleId>{5C22544A-7EE6-4342-B048-85BDC9FD1C3A}</a:tableStyleId>
+              </a:tblPr>
+              <a:tblGrid>
+                <a:gridCol w="1224136"/>
+                <a:gridCol w="2536552"/>
+                <a:gridCol w="1008965"/>
+                <a:gridCol w="1855083"/>
+              </a:tblGrid>
+              <a:tr h="288032">
+                <a:tc>
+                  <a:txBody>
+                    <a:bodyPr/>
+                    <a:lstStyle/>
+                    <a:p>
+                      <a:pPr algn="ctr" fontAlgn="t"/>
+                      <a:r>
+                        <a:rPr lang="en-US" sz="1400" u="none" strike="noStrike" dirty="0" smtClean="0">
+                          <a:effectLst/>
+                        </a:rPr>
+                        <a:t>Country</a:t>
+                      </a:r>
+                      <a:endParaRPr lang="en-US" sz="1400" b="1" i="0" u="none" strike="noStrike" dirty="0">
+                        <a:solidFill>
+                          <a:srgbClr val="000000"/>
+                        </a:solidFill>
+                        <a:effectLst/>
+                        <a:latin typeface="Arial"/>
+                      </a:endParaRPr>
+                    </a:p>
+                  </a:txBody>
+                  <a:tcPr marL="5935" marR="5935" marT="5935" marB="0"/>
+                </a:tc>
+                <a:tc>
+                  <a:txBody>
+                    <a:bodyPr/>
+                    <a:lstStyle/>
+                    <a:p>
+                      <a:pPr algn="ctr" fontAlgn="t"/>
+                      <a:r>
+                        <a:rPr lang="en-US" sz="1400" u="none" strike="noStrike" dirty="0" err="1" smtClean="0">
+                          <a:effectLst/>
+                        </a:rPr>
+                        <a:t>Int</a:t>
+                      </a:r>
+                      <a:r>
+                        <a:rPr lang="en-US" sz="1400" u="none" strike="noStrike" baseline="0" dirty="0" smtClean="0">
+                          <a:effectLst/>
+                        </a:rPr>
+                        <a:t> Olympic Committee code</a:t>
+                      </a:r>
+                      <a:endParaRPr lang="en-US" sz="1400" b="1" i="0" u="none" strike="noStrike" dirty="0">
+                        <a:solidFill>
+                          <a:srgbClr val="000000"/>
+                        </a:solidFill>
+                        <a:effectLst/>
+                        <a:latin typeface="Arial"/>
+                      </a:endParaRPr>
+                    </a:p>
+                  </a:txBody>
+                  <a:tcPr marL="5935" marR="5935" marT="5935" marB="0"/>
+                </a:tc>
+                <a:tc>
+                  <a:txBody>
+                    <a:bodyPr/>
+                    <a:lstStyle/>
+                    <a:p>
+                      <a:pPr algn="ctr" fontAlgn="t"/>
+                      <a:r>
+                        <a:rPr lang="en-US" sz="1400" u="none" strike="noStrike" dirty="0" smtClean="0">
+                          <a:effectLst/>
+                        </a:rPr>
+                        <a:t>ISO code</a:t>
+                      </a:r>
+                      <a:endParaRPr lang="en-US" sz="1400" b="1" i="0" u="none" strike="noStrike" dirty="0">
+                        <a:solidFill>
+                          <a:srgbClr val="000000"/>
+                        </a:solidFill>
+                        <a:effectLst/>
+                        <a:latin typeface="Arial"/>
+                      </a:endParaRPr>
+                    </a:p>
+                  </a:txBody>
+                  <a:tcPr marL="5935" marR="5935" marT="5935" marB="0"/>
+                </a:tc>
+                <a:tc>
+                  <a:txBody>
+                    <a:bodyPr/>
+                    <a:lstStyle/>
+                    <a:p>
+                      <a:pPr algn="ctr" fontAlgn="t"/>
+                      <a:r>
+                        <a:rPr lang="en-US" sz="1400" u="none" strike="noStrike" dirty="0" smtClean="0">
+                          <a:effectLst/>
+                        </a:rPr>
+                        <a:t>Country</a:t>
+                      </a:r>
+                    </a:p>
+                  </a:txBody>
+                  <a:tcPr marL="5935" marR="5935" marT="5935" marB="0"/>
+                </a:tc>
+              </a:tr>
+              <a:tr h="288032">
+                <a:tc>
+                  <a:txBody>
+                    <a:bodyPr/>
+                    <a:lstStyle/>
+                    <a:p>
+                      <a:pPr algn="ctr" fontAlgn="t"/>
+                      <a:r>
+                        <a:rPr lang="en-US" sz="1400" u="none" strike="noStrike" dirty="0" smtClean="0">
+                          <a:effectLst/>
+                        </a:rPr>
+                        <a:t>Afghanistan</a:t>
+                      </a:r>
+                      <a:endParaRPr lang="en-US" sz="1400" b="0" i="0" u="none" strike="noStrike" dirty="0">
+                        <a:solidFill>
+                          <a:srgbClr val="000000"/>
+                        </a:solidFill>
+                        <a:effectLst/>
+                        <a:latin typeface="Arial"/>
+                      </a:endParaRPr>
+                    </a:p>
+                  </a:txBody>
+                  <a:tcPr marL="5935" marR="5935" marT="5935" marB="0"/>
+                </a:tc>
+                <a:tc>
+                  <a:txBody>
+                    <a:bodyPr/>
+                    <a:lstStyle/>
+                    <a:p>
+                      <a:pPr algn="ctr" fontAlgn="t"/>
+                      <a:r>
+                        <a:rPr lang="en-US" sz="1400" u="none" strike="noStrike" dirty="0" smtClean="0">
+                          <a:effectLst/>
+                        </a:rPr>
+                        <a:t>AFG</a:t>
+                      </a:r>
+                      <a:endParaRPr lang="en-US" sz="1400" b="0" i="0" u="none" strike="noStrike" dirty="0">
+                        <a:solidFill>
+                          <a:srgbClr val="000000"/>
+                        </a:solidFill>
+                        <a:effectLst/>
+                        <a:latin typeface="Arial"/>
+                      </a:endParaRPr>
+                    </a:p>
+                  </a:txBody>
+                  <a:tcPr marL="5935" marR="5935" marT="5935" marB="0"/>
+                </a:tc>
+                <a:tc>
+                  <a:txBody>
+                    <a:bodyPr/>
+                    <a:lstStyle/>
+                    <a:p>
+                      <a:pPr algn="ctr" fontAlgn="t"/>
+                      <a:r>
+                        <a:rPr lang="en-US" sz="1400" u="none" strike="noStrike" dirty="0" smtClean="0">
+                          <a:effectLst/>
+                        </a:rPr>
+                        <a:t>AF</a:t>
+                      </a:r>
+                      <a:endParaRPr lang="en-US" sz="1400" b="0" i="0" u="none" strike="noStrike" dirty="0">
+                        <a:solidFill>
+                          <a:srgbClr val="000000"/>
+                        </a:solidFill>
+                        <a:effectLst/>
+                        <a:latin typeface="Arial"/>
+                      </a:endParaRPr>
+                    </a:p>
+                  </a:txBody>
+                  <a:tcPr marL="5935" marR="5935" marT="5935" marB="0"/>
+                </a:tc>
+                <a:tc>
+                  <a:txBody>
+                    <a:bodyPr/>
+                    <a:lstStyle/>
+                    <a:p>
+                      <a:pPr algn="ctr" fontAlgn="t"/>
+                      <a:r>
+                        <a:rPr lang="en-US" sz="1400" u="none" strike="noStrike" dirty="0" smtClean="0">
+                          <a:effectLst/>
+                        </a:rPr>
+                        <a:t>Afghanistan</a:t>
+                      </a:r>
+                      <a:endParaRPr lang="en-US" sz="1400" b="0" i="0" u="none" strike="noStrike" dirty="0">
+                        <a:solidFill>
+                          <a:srgbClr val="000000"/>
+                        </a:solidFill>
+                        <a:effectLst/>
+                        <a:latin typeface="Arial"/>
+                      </a:endParaRPr>
+                    </a:p>
+                  </a:txBody>
+                  <a:tcPr marL="5935" marR="5935" marT="5935" marB="0"/>
+                </a:tc>
+              </a:tr>
+            </a:tbl>
+          </a:graphicData>
+        </a:graphic>
+      </p:graphicFrame>
     </p:spTree>
     <p:extLst>
       <p:ext uri="{BB962C8B-B14F-4D97-AF65-F5344CB8AC3E}">
@@ -6448,6 +7712,99 @@
             </a:r>
           </a:p>
           <a:p>
+            <a:pPr marL="342900" lvl="1" indent="-342900">
+              <a:spcBef>
+                <a:spcPts val="1800"/>
+              </a:spcBef>
+            </a:pPr>
+            <a:r>
+              <a:rPr lang="en-GB" sz="3200" dirty="0" smtClean="0"/>
+              <a:t>Coordinates – </a:t>
+            </a:r>
+            <a:r>
+              <a:rPr lang="en-GB" sz="3200" dirty="0"/>
+              <a:t>contains </a:t>
+            </a:r>
+            <a:r>
+              <a:rPr lang="pt-PT" sz="3200" dirty="0" err="1" smtClean="0"/>
+              <a:t>the</a:t>
+            </a:r>
+            <a:r>
+              <a:rPr lang="pt-PT" sz="3200" dirty="0" smtClean="0"/>
+              <a:t> 2-letter ISO </a:t>
+            </a:r>
+            <a:r>
+              <a:rPr lang="pt-PT" sz="3200" dirty="0" err="1" smtClean="0"/>
+              <a:t>code</a:t>
+            </a:r>
+            <a:r>
+              <a:rPr lang="pt-PT" sz="3200" dirty="0" smtClean="0"/>
+              <a:t> </a:t>
+            </a:r>
+            <a:r>
+              <a:rPr lang="pt-PT" sz="3200" dirty="0" err="1" smtClean="0"/>
+              <a:t>of</a:t>
+            </a:r>
+            <a:r>
+              <a:rPr lang="pt-PT" sz="3200" dirty="0" smtClean="0"/>
+              <a:t> a country,  </a:t>
+            </a:r>
+            <a:r>
+              <a:rPr lang="pt-PT" sz="3200" dirty="0" err="1" smtClean="0"/>
+              <a:t>their</a:t>
+            </a:r>
+            <a:r>
+              <a:rPr lang="pt-PT" sz="3200" dirty="0" smtClean="0"/>
+              <a:t> </a:t>
+            </a:r>
+            <a:r>
+              <a:rPr lang="pt-PT" sz="3200" dirty="0" err="1" smtClean="0"/>
+              <a:t>coordinates</a:t>
+            </a:r>
+            <a:r>
+              <a:rPr lang="pt-PT" sz="3200" dirty="0" smtClean="0"/>
+              <a:t> </a:t>
+            </a:r>
+            <a:r>
+              <a:rPr lang="pt-PT" sz="3200" dirty="0" err="1" smtClean="0"/>
+              <a:t>and</a:t>
+            </a:r>
+            <a:r>
+              <a:rPr lang="pt-PT" sz="3200" dirty="0" smtClean="0"/>
+              <a:t> </a:t>
+            </a:r>
+            <a:r>
+              <a:rPr lang="pt-PT" sz="3200" dirty="0" err="1" smtClean="0"/>
+              <a:t>the</a:t>
+            </a:r>
+            <a:r>
+              <a:rPr lang="pt-PT" sz="3200" dirty="0" smtClean="0"/>
+              <a:t> </a:t>
+            </a:r>
+            <a:r>
+              <a:rPr lang="pt-PT" sz="3200" dirty="0" err="1" smtClean="0"/>
+              <a:t>names</a:t>
+            </a:r>
+            <a:r>
+              <a:rPr lang="pt-PT" sz="3200" dirty="0" smtClean="0"/>
+              <a:t> </a:t>
+            </a:r>
+            <a:r>
+              <a:rPr lang="pt-PT" sz="3200" dirty="0" err="1" smtClean="0"/>
+              <a:t>of</a:t>
+            </a:r>
+            <a:r>
+              <a:rPr lang="pt-PT" sz="3200" dirty="0" smtClean="0"/>
+              <a:t> </a:t>
+            </a:r>
+            <a:r>
+              <a:rPr lang="pt-PT" sz="3200" dirty="0" err="1" smtClean="0"/>
+              <a:t>the</a:t>
+            </a:r>
+            <a:r>
+              <a:rPr lang="pt-PT" sz="3200" dirty="0" smtClean="0"/>
+              <a:t> country.</a:t>
+            </a:r>
             <a:endParaRPr lang="en-US" sz="4000" dirty="0" smtClean="0"/>
           </a:p>
           <a:p>
@@ -6458,6 +7815,236 @@
           </a:p>
         </p:txBody>
       </p:sp>
+      <p:graphicFrame>
+        <p:nvGraphicFramePr>
+          <p:cNvPr id="4" name="Table 4"/>
+          <p:cNvGraphicFramePr>
+            <a:graphicFrameLocks noGrp="1"/>
+          </p:cNvGraphicFramePr>
+          <p:nvPr>
+            <p:extLst>
+              <p:ext uri="{D42A27DB-BD31-4B8C-83A1-F6EECF244321}">
+                <p14:modId xmlns:p14="http://schemas.microsoft.com/office/powerpoint/2010/main" val="2402047593"/>
+              </p:ext>
+            </p:extLst>
+          </p:nvPr>
+        </p:nvGraphicFramePr>
+        <p:xfrm>
+          <a:off x="1979711" y="4653136"/>
+          <a:ext cx="4751253" cy="576064"/>
+        </p:xfrm>
+        <a:graphic>
+          <a:graphicData uri="http://schemas.openxmlformats.org/drawingml/2006/table">
+            <a:tbl>
+              <a:tblPr>
+                <a:tableStyleId>{5C22544A-7EE6-4342-B048-85BDC9FD1C3A}</a:tableStyleId>
+              </a:tblPr>
+              <a:tblGrid>
+                <a:gridCol w="987709"/>
+                <a:gridCol w="1358100"/>
+                <a:gridCol w="1202722"/>
+                <a:gridCol w="1202722"/>
+              </a:tblGrid>
+              <a:tr h="288032">
+                <a:tc>
+                  <a:txBody>
+                    <a:bodyPr/>
+                    <a:lstStyle/>
+                    <a:p>
+                      <a:pPr algn="ctr" fontAlgn="t"/>
+                      <a:r>
+                        <a:rPr lang="en-US" sz="1400" u="none" strike="noStrike" dirty="0" smtClean="0">
+                          <a:effectLst/>
+                        </a:rPr>
+                        <a:t>country</a:t>
+                      </a:r>
+                      <a:endParaRPr lang="en-US" sz="1400" b="1" i="0" u="none" strike="noStrike" dirty="0">
+                        <a:solidFill>
+                          <a:srgbClr val="000000"/>
+                        </a:solidFill>
+                        <a:effectLst/>
+                        <a:latin typeface="Arial"/>
+                      </a:endParaRPr>
+                    </a:p>
+                  </a:txBody>
+                  <a:tcPr marL="5935" marR="5935" marT="5935" marB="0"/>
+                </a:tc>
+                <a:tc>
+                  <a:txBody>
+                    <a:bodyPr/>
+                    <a:lstStyle/>
+                    <a:p>
+                      <a:pPr algn="ctr" fontAlgn="t"/>
+                      <a:r>
+                        <a:rPr lang="en-US" sz="1400" u="none" strike="noStrike" dirty="0" smtClean="0">
+                          <a:effectLst/>
+                        </a:rPr>
+                        <a:t>Latitude</a:t>
+                      </a:r>
+                      <a:endParaRPr lang="en-US" sz="1400" b="1" i="0" u="none" strike="noStrike" dirty="0">
+                        <a:solidFill>
+                          <a:srgbClr val="000000"/>
+                        </a:solidFill>
+                        <a:effectLst/>
+                        <a:latin typeface="Arial"/>
+                      </a:endParaRPr>
+                    </a:p>
+                  </a:txBody>
+                  <a:tcPr marL="5935" marR="5935" marT="5935" marB="0"/>
+                </a:tc>
+                <a:tc>
+                  <a:txBody>
+                    <a:bodyPr/>
+                    <a:lstStyle/>
+                    <a:p>
+                      <a:pPr algn="ctr" fontAlgn="t"/>
+                      <a:r>
+                        <a:rPr lang="en-US" sz="1400" u="none" strike="noStrike" dirty="0" smtClean="0">
+                          <a:effectLst/>
+                        </a:rPr>
+                        <a:t>Longitude</a:t>
+                      </a:r>
+                      <a:endParaRPr lang="en-US" sz="1400" b="1" i="0" u="none" strike="noStrike" dirty="0">
+                        <a:solidFill>
+                          <a:srgbClr val="000000"/>
+                        </a:solidFill>
+                        <a:effectLst/>
+                        <a:latin typeface="Arial"/>
+                      </a:endParaRPr>
+                    </a:p>
+                  </a:txBody>
+                  <a:tcPr marL="5935" marR="5935" marT="5935" marB="0"/>
+                </a:tc>
+                <a:tc>
+                  <a:txBody>
+                    <a:bodyPr/>
+                    <a:lstStyle/>
+                    <a:p>
+                      <a:pPr algn="ctr" fontAlgn="t"/>
+                      <a:r>
+                        <a:rPr lang="en-US" sz="1400" b="0" i="0" u="none" strike="noStrike" dirty="0" smtClean="0">
+                          <a:solidFill>
+                            <a:srgbClr val="000000"/>
+                          </a:solidFill>
+                          <a:effectLst/>
+                          <a:latin typeface="+mn-lt"/>
+                        </a:rPr>
+                        <a:t>name</a:t>
+                      </a:r>
+                      <a:endParaRPr lang="en-US" sz="1400" b="0" i="0" u="none" strike="noStrike" dirty="0">
+                        <a:solidFill>
+                          <a:srgbClr val="000000"/>
+                        </a:solidFill>
+                        <a:effectLst/>
+                        <a:latin typeface="+mn-lt"/>
+                      </a:endParaRPr>
+                    </a:p>
+                  </a:txBody>
+                  <a:tcPr marL="5935" marR="5935" marT="5935" marB="0"/>
+                </a:tc>
+              </a:tr>
+              <a:tr h="288032">
+                <a:tc>
+                  <a:txBody>
+                    <a:bodyPr/>
+                    <a:lstStyle/>
+                    <a:p>
+                      <a:pPr algn="ctr" fontAlgn="t"/>
+                      <a:r>
+                        <a:rPr lang="en-US" sz="1400" u="none" strike="noStrike" dirty="0" smtClean="0">
+                          <a:effectLst/>
+                        </a:rPr>
+                        <a:t>AD</a:t>
+                      </a:r>
+                      <a:endParaRPr lang="en-US" sz="1400" b="0" i="0" u="none" strike="noStrike" dirty="0">
+                        <a:solidFill>
+                          <a:srgbClr val="000000"/>
+                        </a:solidFill>
+                        <a:effectLst/>
+                        <a:latin typeface="Arial"/>
+                      </a:endParaRPr>
+                    </a:p>
+                  </a:txBody>
+                  <a:tcPr marL="5935" marR="5935" marT="5935" marB="0"/>
+                </a:tc>
+                <a:tc>
+                  <a:txBody>
+                    <a:bodyPr/>
+                    <a:lstStyle/>
+                    <a:p>
+                      <a:pPr algn="ctr" fontAlgn="t"/>
+                      <a:r>
+                        <a:rPr lang="en-US" sz="1400" u="none" strike="noStrike" dirty="0" smtClean="0">
+                          <a:effectLst/>
+                        </a:rPr>
+                        <a:t>33</a:t>
+                      </a:r>
+                      <a:endParaRPr lang="en-US" sz="1400" b="0" i="0" u="none" strike="noStrike" dirty="0">
+                        <a:solidFill>
+                          <a:srgbClr val="000000"/>
+                        </a:solidFill>
+                        <a:effectLst/>
+                        <a:latin typeface="Arial"/>
+                      </a:endParaRPr>
+                    </a:p>
+                  </a:txBody>
+                  <a:tcPr marL="5935" marR="5935" marT="5935" marB="0"/>
+                </a:tc>
+                <a:tc>
+                  <a:txBody>
+                    <a:bodyPr/>
+                    <a:lstStyle/>
+                    <a:p>
+                      <a:pPr algn="ctr" fontAlgn="t"/>
+                      <a:r>
+                        <a:rPr lang="en-US" sz="1400" u="none" strike="noStrike" dirty="0" smtClean="0">
+                          <a:effectLst/>
+                        </a:rPr>
+                        <a:t>65</a:t>
+                      </a:r>
+                      <a:endParaRPr lang="en-US" sz="1400" b="0" i="0" u="none" strike="noStrike" dirty="0">
+                        <a:solidFill>
+                          <a:srgbClr val="000000"/>
+                        </a:solidFill>
+                        <a:effectLst/>
+                        <a:latin typeface="Arial"/>
+                      </a:endParaRPr>
+                    </a:p>
+                  </a:txBody>
+                  <a:tcPr marL="5935" marR="5935" marT="5935" marB="0"/>
+                </a:tc>
+                <a:tc>
+                  <a:txBody>
+                    <a:bodyPr/>
+                    <a:lstStyle/>
+                    <a:p>
+                      <a:pPr algn="ctr" fontAlgn="t"/>
+                      <a:r>
+                        <a:rPr lang="en-US" sz="1400" b="0" i="0" u="none" strike="noStrike" dirty="0" smtClean="0">
+                          <a:solidFill>
+                            <a:srgbClr val="000000"/>
+                          </a:solidFill>
+                          <a:effectLst/>
+                          <a:latin typeface="Arial"/>
+                        </a:rPr>
+                        <a:t>Andorra</a:t>
+                      </a:r>
+                      <a:endParaRPr lang="en-US" sz="1400" b="0" i="0" u="none" strike="noStrike" dirty="0">
+                        <a:solidFill>
+                          <a:srgbClr val="000000"/>
+                        </a:solidFill>
+                        <a:effectLst/>
+                        <a:latin typeface="Arial"/>
+                      </a:endParaRPr>
+                    </a:p>
+                  </a:txBody>
+                  <a:tcPr marL="5935" marR="5935" marT="5935" marB="0"/>
+                </a:tc>
+              </a:tr>
+            </a:tbl>
+          </a:graphicData>
+        </a:graphic>
+      </p:graphicFrame>
     </p:spTree>
     <p:extLst>
       <p:ext uri="{BB962C8B-B14F-4D97-AF65-F5344CB8AC3E}">
@@ -6497,12 +8084,12 @@
       </p:grpSpPr>
       <p:sp>
         <p:nvSpPr>
-          <p:cNvPr id="2" name="Title 1"/>
-          <p:cNvSpPr>
-            <a:spLocks noGrp="1"/>
-          </p:cNvSpPr>
-          <p:nvPr>
-            <p:ph type="title"/>
+          <p:cNvPr id="6" name="Text Placeholder 5"/>
+          <p:cNvSpPr>
+            <a:spLocks noGrp="1"/>
+          </p:cNvSpPr>
+          <p:nvPr>
+            <p:ph type="body" sz="quarter" idx="11"/>
           </p:nvPr>
         </p:nvSpPr>
         <p:spPr/>
@@ -6510,51 +8097,85 @@
           <a:bodyPr/>
           <a:lstStyle/>
           <a:p>
-            <a:r>
-              <a:rPr lang="en-US" dirty="0" smtClean="0"/>
-              <a:t>Initial Dataset</a:t>
-            </a:r>
-            <a:endParaRPr lang="pt-PT" dirty="0"/>
-          </a:p>
-        </p:txBody>
-      </p:sp>
-      <p:sp>
-        <p:nvSpPr>
-          <p:cNvPr id="3" name="Content Placeholder 2"/>
-          <p:cNvSpPr>
-            <a:spLocks noGrp="1"/>
-          </p:cNvSpPr>
-          <p:nvPr>
-            <p:ph idx="1"/>
+            <a:endParaRPr lang="en-US" dirty="0"/>
+          </a:p>
+        </p:txBody>
+      </p:sp>
+      <p:sp>
+        <p:nvSpPr>
+          <p:cNvPr id="29" name="Text Placeholder 28"/>
+          <p:cNvSpPr>
+            <a:spLocks noGrp="1"/>
+          </p:cNvSpPr>
+          <p:nvPr>
+            <p:ph type="body" sz="quarter" idx="10"/>
           </p:nvPr>
         </p:nvSpPr>
         <p:spPr/>
         <p:txBody>
-          <a:bodyPr>
+          <a:bodyPr/>
+          <a:lstStyle/>
+          <a:p>
+            <a:r>
+              <a:rPr lang="pt-PT" sz="16600" dirty="0" smtClean="0"/>
+              <a:t>02</a:t>
+            </a:r>
+            <a:endParaRPr lang="pt-PT" sz="16600" dirty="0"/>
+          </a:p>
+        </p:txBody>
+      </p:sp>
+      <p:sp>
+        <p:nvSpPr>
+          <p:cNvPr id="4" name="Title 3"/>
+          <p:cNvSpPr>
+            <a:spLocks noGrp="1"/>
+          </p:cNvSpPr>
+          <p:nvPr>
+            <p:ph type="title"/>
+          </p:nvPr>
+        </p:nvSpPr>
+        <p:spPr>
+          <a:xfrm>
+            <a:off x="1907704" y="3214686"/>
+            <a:ext cx="7160096" cy="3033714"/>
+          </a:xfrm>
+          <a:solidFill>
+            <a:srgbClr val="FFFFFF">
+              <a:alpha val="80000"/>
+            </a:srgbClr>
+          </a:solidFill>
+        </p:spPr>
+        <p:txBody>
+          <a:bodyPr rIns="288000">
             <a:noAutofit/>
           </a:bodyPr>
           <a:lstStyle/>
           <a:p>
-            <a:r>
-              <a:rPr lang="en-US" sz="4000" dirty="0" smtClean="0"/>
-              <a:t>Description</a:t>
-            </a:r>
-          </a:p>
-          <a:p>
-            <a:endParaRPr lang="en-US" sz="4000" dirty="0" smtClean="0"/>
-          </a:p>
-          <a:p>
-            <a:r>
-              <a:rPr lang="en-US" sz="4000" dirty="0" smtClean="0"/>
-              <a:t>Data sample</a:t>
-            </a:r>
+            <a:pPr marL="0" algn="r"/>
+            <a:r>
+              <a:rPr lang="pt-PT" sz="6000" dirty="0" err="1" smtClean="0"/>
+              <a:t>Selected</a:t>
+            </a:r>
+            <a:r>
+              <a:rPr lang="pt-PT" sz="6000" dirty="0" smtClean="0"/>
+              <a:t> / </a:t>
+            </a:r>
+            <a:r>
+              <a:rPr lang="pt-PT" sz="6000" dirty="0" err="1" smtClean="0"/>
+              <a:t>derived</a:t>
+            </a:r>
+            <a:r>
+              <a:rPr lang="pt-PT" sz="6000" dirty="0" smtClean="0"/>
+              <a:t> data</a:t>
+            </a:r>
+            <a:endParaRPr lang="pt-PT" sz="6000" dirty="0"/>
           </a:p>
         </p:txBody>
       </p:sp>
     </p:spTree>
     <p:extLst>
       <p:ext uri="{BB962C8B-B14F-4D97-AF65-F5344CB8AC3E}">
-        <p14:creationId xmlns:p14="http://schemas.microsoft.com/office/powerpoint/2010/main" val="1560467961"/>
+        <p14:creationId xmlns:p14="http://schemas.microsoft.com/office/powerpoint/2010/main" val="627357321"/>
       </p:ext>
     </p:extLst>
   </p:cSld>
@@ -6590,12 +8211,12 @@
       </p:grpSpPr>
       <p:sp>
         <p:nvSpPr>
-          <p:cNvPr id="6" name="Text Placeholder 5"/>
-          <p:cNvSpPr>
-            <a:spLocks noGrp="1"/>
-          </p:cNvSpPr>
-          <p:nvPr>
-            <p:ph type="body" sz="quarter" idx="11"/>
+          <p:cNvPr id="2" name="Title 1"/>
+          <p:cNvSpPr>
+            <a:spLocks noGrp="1"/>
+          </p:cNvSpPr>
+          <p:nvPr>
+            <p:ph type="title"/>
           </p:nvPr>
         </p:nvSpPr>
         <p:spPr/>
@@ -6603,85 +8224,165 @@
           <a:bodyPr/>
           <a:lstStyle/>
           <a:p>
-            <a:endParaRPr lang="en-US" dirty="0"/>
-          </a:p>
-        </p:txBody>
-      </p:sp>
-      <p:sp>
-        <p:nvSpPr>
-          <p:cNvPr id="29" name="Text Placeholder 28"/>
-          <p:cNvSpPr>
-            <a:spLocks noGrp="1"/>
-          </p:cNvSpPr>
-          <p:nvPr>
-            <p:ph type="body" sz="quarter" idx="10"/>
+            <a:r>
+              <a:rPr lang="en-US" dirty="0" smtClean="0"/>
+              <a:t>Selected data</a:t>
+            </a:r>
+            <a:endParaRPr lang="pt-PT" dirty="0"/>
+          </a:p>
+        </p:txBody>
+      </p:sp>
+      <p:sp>
+        <p:nvSpPr>
+          <p:cNvPr id="3" name="Content Placeholder 2"/>
+          <p:cNvSpPr>
+            <a:spLocks noGrp="1"/>
+          </p:cNvSpPr>
+          <p:nvPr>
+            <p:ph idx="1"/>
           </p:nvPr>
         </p:nvSpPr>
         <p:spPr/>
         <p:txBody>
-          <a:bodyPr/>
-          <a:lstStyle/>
-          <a:p>
-            <a:r>
-              <a:rPr lang="pt-PT" sz="16600" dirty="0" smtClean="0"/>
-              <a:t>02</a:t>
-            </a:r>
-            <a:endParaRPr lang="pt-PT" sz="16600" dirty="0"/>
-          </a:p>
-        </p:txBody>
-      </p:sp>
-      <p:sp>
-        <p:nvSpPr>
-          <p:cNvPr id="4" name="Title 3"/>
-          <p:cNvSpPr>
-            <a:spLocks noGrp="1"/>
-          </p:cNvSpPr>
-          <p:nvPr>
-            <p:ph type="title"/>
-          </p:nvPr>
-        </p:nvSpPr>
-        <p:spPr>
-          <a:xfrm>
-            <a:off x="1907704" y="3214686"/>
-            <a:ext cx="7160096" cy="3033714"/>
-          </a:xfrm>
-          <a:solidFill>
-            <a:srgbClr val="FFFFFF">
-              <a:alpha val="80000"/>
-            </a:srgbClr>
-          </a:solidFill>
-        </p:spPr>
-        <p:txBody>
-          <a:bodyPr rIns="288000">
+          <a:bodyPr>
             <a:noAutofit/>
           </a:bodyPr>
           <a:lstStyle/>
           <a:p>
-            <a:pPr marL="0" algn="r"/>
-            <a:r>
-              <a:rPr lang="pt-PT" sz="6000" dirty="0" err="1" smtClean="0"/>
-              <a:t>Selected</a:t>
-            </a:r>
-            <a:r>
-              <a:rPr lang="pt-PT" sz="6000" dirty="0" smtClean="0"/>
-              <a:t> / </a:t>
-            </a:r>
-            <a:r>
-              <a:rPr lang="pt-PT" sz="6000" dirty="0" err="1" smtClean="0"/>
-              <a:t>derived</a:t>
-            </a:r>
-            <a:r>
-              <a:rPr lang="pt-PT" sz="6000" dirty="0" smtClean="0"/>
-              <a:t> data</a:t>
-            </a:r>
-            <a:endParaRPr lang="pt-PT" sz="6000" dirty="0"/>
+            <a:r>
+              <a:rPr lang="en-US" sz="4000" dirty="0" smtClean="0"/>
+              <a:t>Data </a:t>
+            </a:r>
+            <a:r>
+              <a:rPr lang="en-US" sz="4000" dirty="0" smtClean="0"/>
+              <a:t>description</a:t>
+            </a:r>
+          </a:p>
+          <a:p>
+            <a:pPr marL="342900" lvl="1" indent="-342900">
+              <a:spcBef>
+                <a:spcPts val="1800"/>
+              </a:spcBef>
+            </a:pPr>
+            <a:r>
+              <a:rPr lang="en-US" sz="4000" dirty="0"/>
+              <a:t>	</a:t>
+            </a:r>
+            <a:r>
+              <a:rPr lang="pt-PT" sz="3200" dirty="0" err="1" smtClean="0"/>
+              <a:t>From</a:t>
+            </a:r>
+            <a:r>
+              <a:rPr lang="pt-PT" sz="3200" dirty="0" smtClean="0"/>
+              <a:t> </a:t>
+            </a:r>
+            <a:r>
+              <a:rPr lang="pt-PT" sz="3200" dirty="0" err="1" smtClean="0"/>
+              <a:t>the</a:t>
+            </a:r>
+            <a:r>
+              <a:rPr lang="pt-PT" sz="3200" dirty="0" smtClean="0"/>
+              <a:t> “</a:t>
+            </a:r>
+            <a:r>
+              <a:rPr lang="pt-PT" sz="3200" dirty="0" err="1" smtClean="0"/>
+              <a:t>All</a:t>
+            </a:r>
+            <a:r>
+              <a:rPr lang="pt-PT" sz="3200" dirty="0" smtClean="0"/>
+              <a:t> Winners” </a:t>
+            </a:r>
+            <a:r>
+              <a:rPr lang="pt-PT" sz="3200" dirty="0" err="1" smtClean="0"/>
+              <a:t>dataset</a:t>
+            </a:r>
+            <a:r>
+              <a:rPr lang="pt-PT" sz="3200" dirty="0" smtClean="0"/>
+              <a:t>, </a:t>
+            </a:r>
+            <a:r>
+              <a:rPr lang="pt-PT" sz="3200" dirty="0" err="1" smtClean="0"/>
+              <a:t>we</a:t>
+            </a:r>
+            <a:r>
+              <a:rPr lang="pt-PT" sz="3200" dirty="0" smtClean="0"/>
+              <a:t> </a:t>
+            </a:r>
+            <a:r>
+              <a:rPr lang="pt-PT" sz="3200" dirty="0" err="1" smtClean="0"/>
+              <a:t>wanted</a:t>
+            </a:r>
+            <a:r>
+              <a:rPr lang="pt-PT" sz="3200" dirty="0" smtClean="0"/>
+              <a:t>:</a:t>
+            </a:r>
+          </a:p>
+          <a:p>
+            <a:pPr marL="1428750" lvl="3" indent="-571500">
+              <a:spcBef>
+                <a:spcPts val="1800"/>
+              </a:spcBef>
+              <a:buFont typeface="Arial" panose="020B0604020202020204" pitchFamily="34" charset="0"/>
+              <a:buChar char="•"/>
+            </a:pPr>
+            <a:r>
+              <a:rPr lang="en-US" sz="3200" dirty="0" smtClean="0"/>
+              <a:t>The OG edition;</a:t>
+            </a:r>
+          </a:p>
+          <a:p>
+            <a:pPr marL="1428750" lvl="3" indent="-571500">
+              <a:spcBef>
+                <a:spcPts val="1800"/>
+              </a:spcBef>
+              <a:buFont typeface="Arial" panose="020B0604020202020204" pitchFamily="34" charset="0"/>
+              <a:buChar char="•"/>
+            </a:pPr>
+            <a:r>
+              <a:rPr lang="en-US" sz="3200" dirty="0" smtClean="0"/>
+              <a:t>The Sport;</a:t>
+            </a:r>
+          </a:p>
+          <a:p>
+            <a:pPr marL="1428750" lvl="3" indent="-571500">
+              <a:spcBef>
+                <a:spcPts val="1800"/>
+              </a:spcBef>
+              <a:buFont typeface="Arial" panose="020B0604020202020204" pitchFamily="34" charset="0"/>
+              <a:buChar char="•"/>
+            </a:pPr>
+            <a:r>
+              <a:rPr lang="en-US" sz="3200" dirty="0" smtClean="0"/>
+              <a:t>The winning medal</a:t>
+            </a:r>
+          </a:p>
+          <a:p>
+            <a:pPr marL="1428750" lvl="3" indent="-571500">
+              <a:spcBef>
+                <a:spcPts val="1800"/>
+              </a:spcBef>
+              <a:buFont typeface="Arial" panose="020B0604020202020204" pitchFamily="34" charset="0"/>
+              <a:buChar char="•"/>
+            </a:pPr>
+            <a:r>
+              <a:rPr lang="en-US" sz="3200" dirty="0" smtClean="0"/>
+              <a:t>The NOC code</a:t>
+            </a:r>
+            <a:endParaRPr lang="en-US" sz="3200" dirty="0"/>
+          </a:p>
+          <a:p>
+            <a:endParaRPr lang="en-US" sz="4000" dirty="0" smtClean="0"/>
+          </a:p>
+          <a:p>
+            <a:pPr lvl="1"/>
+            <a:endParaRPr lang="en-US" dirty="0" smtClean="0"/>
           </a:p>
         </p:txBody>
       </p:sp>
     </p:spTree>
     <p:extLst>
       <p:ext uri="{BB962C8B-B14F-4D97-AF65-F5344CB8AC3E}">
-        <p14:creationId xmlns:p14="http://schemas.microsoft.com/office/powerpoint/2010/main" val="627357321"/>
+        <p14:creationId xmlns:p14="http://schemas.microsoft.com/office/powerpoint/2010/main" val="2962997025"/>
       </p:ext>
     </p:extLst>
   </p:cSld>
@@ -6757,19 +8458,1134 @@
           <a:p>
             <a:r>
               <a:rPr lang="en-US" sz="4000" dirty="0" smtClean="0"/>
-              <a:t>Data description</a:t>
-            </a:r>
+              <a:t>Data </a:t>
+            </a:r>
+            <a:r>
+              <a:rPr lang="en-US" sz="4000" dirty="0" smtClean="0"/>
+              <a:t>description</a:t>
+            </a:r>
+          </a:p>
+          <a:p>
+            <a:pPr marL="342900" lvl="1" indent="-342900">
+              <a:spcBef>
+                <a:spcPts val="1800"/>
+              </a:spcBef>
+            </a:pPr>
+            <a:r>
+              <a:rPr lang="en-US" sz="4000" dirty="0"/>
+              <a:t>	</a:t>
+            </a:r>
+            <a:r>
+              <a:rPr lang="pt-PT" sz="3200" dirty="0" err="1" smtClean="0"/>
+              <a:t>From</a:t>
+            </a:r>
+            <a:r>
+              <a:rPr lang="pt-PT" sz="3200" dirty="0" smtClean="0"/>
+              <a:t> </a:t>
+            </a:r>
+            <a:r>
+              <a:rPr lang="pt-PT" sz="3200" dirty="0" err="1" smtClean="0"/>
+              <a:t>the</a:t>
+            </a:r>
+            <a:r>
+              <a:rPr lang="pt-PT" sz="3200" dirty="0" smtClean="0"/>
+              <a:t> “</a:t>
+            </a:r>
+            <a:r>
+              <a:rPr lang="pt-PT" sz="3200" dirty="0" err="1" smtClean="0"/>
+              <a:t>All</a:t>
+            </a:r>
+            <a:r>
+              <a:rPr lang="pt-PT" sz="3200" dirty="0" smtClean="0"/>
+              <a:t> Winners” </a:t>
+            </a:r>
+            <a:r>
+              <a:rPr lang="pt-PT" sz="3200" dirty="0" err="1" smtClean="0"/>
+              <a:t>dataset</a:t>
+            </a:r>
+            <a:r>
+              <a:rPr lang="pt-PT" sz="3200" dirty="0" smtClean="0"/>
+              <a:t>, </a:t>
+            </a:r>
+            <a:r>
+              <a:rPr lang="pt-PT" sz="3200" dirty="0" err="1" smtClean="0"/>
+              <a:t>we</a:t>
+            </a:r>
+            <a:r>
+              <a:rPr lang="pt-PT" sz="3200" dirty="0" smtClean="0"/>
+              <a:t> </a:t>
+            </a:r>
+            <a:r>
+              <a:rPr lang="pt-PT" sz="3200" dirty="0" err="1" smtClean="0"/>
+              <a:t>wanted</a:t>
+            </a:r>
+            <a:r>
+              <a:rPr lang="pt-PT" sz="3200" dirty="0" smtClean="0"/>
+              <a:t>:</a:t>
+            </a:r>
+          </a:p>
+          <a:p>
+            <a:pPr marL="1428750" lvl="3" indent="-571500">
+              <a:spcBef>
+                <a:spcPts val="1800"/>
+              </a:spcBef>
+              <a:buFont typeface="Arial" panose="020B0604020202020204" pitchFamily="34" charset="0"/>
+              <a:buChar char="•"/>
+            </a:pPr>
+            <a:r>
+              <a:rPr lang="en-US" sz="3200" dirty="0" smtClean="0"/>
+              <a:t>The OG edition;</a:t>
+            </a:r>
+          </a:p>
+          <a:p>
+            <a:pPr marL="1428750" lvl="3" indent="-571500">
+              <a:spcBef>
+                <a:spcPts val="1800"/>
+              </a:spcBef>
+              <a:buFont typeface="Arial" panose="020B0604020202020204" pitchFamily="34" charset="0"/>
+              <a:buChar char="•"/>
+            </a:pPr>
+            <a:r>
+              <a:rPr lang="en-US" sz="3200" dirty="0" smtClean="0"/>
+              <a:t>The Sport;</a:t>
+            </a:r>
+          </a:p>
+          <a:p>
+            <a:pPr marL="1428750" lvl="3" indent="-571500">
+              <a:spcBef>
+                <a:spcPts val="1800"/>
+              </a:spcBef>
+              <a:buFont typeface="Arial" panose="020B0604020202020204" pitchFamily="34" charset="0"/>
+              <a:buChar char="•"/>
+            </a:pPr>
+            <a:r>
+              <a:rPr lang="en-US" sz="3200" dirty="0" smtClean="0"/>
+              <a:t>The winning medal</a:t>
+            </a:r>
+          </a:p>
+          <a:p>
+            <a:pPr marL="1428750" lvl="3" indent="-571500">
+              <a:spcBef>
+                <a:spcPts val="1800"/>
+              </a:spcBef>
+              <a:buFont typeface="Arial" panose="020B0604020202020204" pitchFamily="34" charset="0"/>
+              <a:buChar char="•"/>
+            </a:pPr>
+            <a:r>
+              <a:rPr lang="en-US" sz="3200" dirty="0" smtClean="0"/>
+              <a:t>The NOC code</a:t>
+            </a:r>
+            <a:endParaRPr lang="en-US" sz="3200" dirty="0"/>
+          </a:p>
+          <a:p>
+            <a:endParaRPr lang="en-US" sz="4000" dirty="0" smtClean="0"/>
           </a:p>
           <a:p>
             <a:pPr lvl="1"/>
             <a:endParaRPr lang="en-US" dirty="0" smtClean="0"/>
+          </a:p>
+        </p:txBody>
+      </p:sp>
+      <p:graphicFrame>
+        <p:nvGraphicFramePr>
+          <p:cNvPr id="5" name="Tabela 4"/>
+          <p:cNvGraphicFramePr>
+            <a:graphicFrameLocks noGrp="1"/>
+          </p:cNvGraphicFramePr>
+          <p:nvPr>
+            <p:extLst>
+              <p:ext uri="{D42A27DB-BD31-4B8C-83A1-F6EECF244321}">
+                <p14:modId xmlns:p14="http://schemas.microsoft.com/office/powerpoint/2010/main" val="1979730242"/>
+              </p:ext>
+            </p:extLst>
+          </p:nvPr>
+        </p:nvGraphicFramePr>
+        <p:xfrm>
+          <a:off x="5550570" y="4437112"/>
+          <a:ext cx="3083420" cy="1334780"/>
+        </p:xfrm>
+        <a:graphic>
+          <a:graphicData uri="http://schemas.openxmlformats.org/drawingml/2006/table">
+            <a:tbl>
+              <a:tblPr/>
+              <a:tblGrid>
+                <a:gridCol w="540465"/>
+                <a:gridCol w="1233368"/>
+                <a:gridCol w="405348"/>
+                <a:gridCol w="904239"/>
+              </a:tblGrid>
+              <a:tr h="333695">
+                <a:tc>
+                  <a:txBody>
+                    <a:bodyPr/>
+                    <a:lstStyle/>
+                    <a:p>
+                      <a:pPr algn="l" fontAlgn="t"/>
+                      <a:r>
+                        <a:rPr lang="pt-PT" sz="1000" b="1" i="0" u="none" strike="noStrike">
+                          <a:solidFill>
+                            <a:srgbClr val="000000"/>
+                          </a:solidFill>
+                          <a:effectLst/>
+                          <a:latin typeface="Arial"/>
+                        </a:rPr>
+                        <a:t>Edition</a:t>
+                      </a:r>
+                    </a:p>
+                  </a:txBody>
+                  <a:tcPr marL="9525" marR="9525" marT="9525" marB="0">
+                    <a:lnL w="6350" cap="flat" cmpd="sng" algn="ctr">
+                      <a:solidFill>
+                        <a:srgbClr val="000000"/>
+                      </a:solidFill>
+                      <a:prstDash val="solid"/>
+                      <a:round/>
+                      <a:headEnd type="none" w="med" len="med"/>
+                      <a:tailEnd type="none" w="med" len="med"/>
+                    </a:lnL>
+                    <a:lnR w="6350" cap="flat" cmpd="sng" algn="ctr">
+                      <a:solidFill>
+                        <a:srgbClr val="000000"/>
+                      </a:solidFill>
+                      <a:prstDash val="solid"/>
+                      <a:round/>
+                      <a:headEnd type="none" w="med" len="med"/>
+                      <a:tailEnd type="none" w="med" len="med"/>
+                    </a:lnR>
+                    <a:lnT w="6350" cap="flat" cmpd="sng" algn="ctr">
+                      <a:solidFill>
+                        <a:srgbClr val="000000"/>
+                      </a:solidFill>
+                      <a:prstDash val="solid"/>
+                      <a:round/>
+                      <a:headEnd type="none" w="med" len="med"/>
+                      <a:tailEnd type="none" w="med" len="med"/>
+                    </a:lnT>
+                    <a:lnB w="6350" cap="flat" cmpd="sng" algn="ctr">
+                      <a:solidFill>
+                        <a:srgbClr val="000000"/>
+                      </a:solidFill>
+                      <a:prstDash val="solid"/>
+                      <a:round/>
+                      <a:headEnd type="none" w="med" len="med"/>
+                      <a:tailEnd type="none" w="med" len="med"/>
+                    </a:lnB>
+                  </a:tcPr>
+                </a:tc>
+                <a:tc>
+                  <a:txBody>
+                    <a:bodyPr/>
+                    <a:lstStyle/>
+                    <a:p>
+                      <a:pPr algn="l" fontAlgn="t"/>
+                      <a:r>
+                        <a:rPr lang="pt-PT" sz="1000" b="1" i="0" u="none" strike="noStrike">
+                          <a:solidFill>
+                            <a:srgbClr val="000000"/>
+                          </a:solidFill>
+                          <a:effectLst/>
+                          <a:latin typeface="Arial"/>
+                        </a:rPr>
+                        <a:t>Sport</a:t>
+                      </a:r>
+                    </a:p>
+                  </a:txBody>
+                  <a:tcPr marL="9525" marR="9525" marT="9525" marB="0">
+                    <a:lnL w="6350" cap="flat" cmpd="sng" algn="ctr">
+                      <a:solidFill>
+                        <a:srgbClr val="000000"/>
+                      </a:solidFill>
+                      <a:prstDash val="solid"/>
+                      <a:round/>
+                      <a:headEnd type="none" w="med" len="med"/>
+                      <a:tailEnd type="none" w="med" len="med"/>
+                    </a:lnL>
+                    <a:lnR w="6350" cap="flat" cmpd="sng" algn="ctr">
+                      <a:solidFill>
+                        <a:srgbClr val="000000"/>
+                      </a:solidFill>
+                      <a:prstDash val="solid"/>
+                      <a:round/>
+                      <a:headEnd type="none" w="med" len="med"/>
+                      <a:tailEnd type="none" w="med" len="med"/>
+                    </a:lnR>
+                    <a:lnT w="6350" cap="flat" cmpd="sng" algn="ctr">
+                      <a:solidFill>
+                        <a:srgbClr val="000000"/>
+                      </a:solidFill>
+                      <a:prstDash val="solid"/>
+                      <a:round/>
+                      <a:headEnd type="none" w="med" len="med"/>
+                      <a:tailEnd type="none" w="med" len="med"/>
+                    </a:lnT>
+                    <a:lnB w="6350" cap="flat" cmpd="sng" algn="ctr">
+                      <a:solidFill>
+                        <a:srgbClr val="000000"/>
+                      </a:solidFill>
+                      <a:prstDash val="solid"/>
+                      <a:round/>
+                      <a:headEnd type="none" w="med" len="med"/>
+                      <a:tailEnd type="none" w="med" len="med"/>
+                    </a:lnB>
+                  </a:tcPr>
+                </a:tc>
+                <a:tc>
+                  <a:txBody>
+                    <a:bodyPr/>
+                    <a:lstStyle/>
+                    <a:p>
+                      <a:pPr algn="l" fontAlgn="t"/>
+                      <a:r>
+                        <a:rPr lang="pt-PT" sz="1000" b="1" i="0" u="none" strike="noStrike">
+                          <a:solidFill>
+                            <a:srgbClr val="000000"/>
+                          </a:solidFill>
+                          <a:effectLst/>
+                          <a:latin typeface="Arial"/>
+                        </a:rPr>
+                        <a:t>NOC</a:t>
+                      </a:r>
+                    </a:p>
+                  </a:txBody>
+                  <a:tcPr marL="9525" marR="9525" marT="9525" marB="0">
+                    <a:lnL w="6350" cap="flat" cmpd="sng" algn="ctr">
+                      <a:solidFill>
+                        <a:srgbClr val="000000"/>
+                      </a:solidFill>
+                      <a:prstDash val="solid"/>
+                      <a:round/>
+                      <a:headEnd type="none" w="med" len="med"/>
+                      <a:tailEnd type="none" w="med" len="med"/>
+                    </a:lnL>
+                    <a:lnR w="6350" cap="flat" cmpd="sng" algn="ctr">
+                      <a:solidFill>
+                        <a:srgbClr val="000000"/>
+                      </a:solidFill>
+                      <a:prstDash val="solid"/>
+                      <a:round/>
+                      <a:headEnd type="none" w="med" len="med"/>
+                      <a:tailEnd type="none" w="med" len="med"/>
+                    </a:lnR>
+                    <a:lnT w="6350" cap="flat" cmpd="sng" algn="ctr">
+                      <a:solidFill>
+                        <a:srgbClr val="000000"/>
+                      </a:solidFill>
+                      <a:prstDash val="solid"/>
+                      <a:round/>
+                      <a:headEnd type="none" w="med" len="med"/>
+                      <a:tailEnd type="none" w="med" len="med"/>
+                    </a:lnT>
+                    <a:lnB w="6350" cap="flat" cmpd="sng" algn="ctr">
+                      <a:solidFill>
+                        <a:srgbClr val="000000"/>
+                      </a:solidFill>
+                      <a:prstDash val="solid"/>
+                      <a:round/>
+                      <a:headEnd type="none" w="med" len="med"/>
+                      <a:tailEnd type="none" w="med" len="med"/>
+                    </a:lnB>
+                  </a:tcPr>
+                </a:tc>
+                <a:tc>
+                  <a:txBody>
+                    <a:bodyPr/>
+                    <a:lstStyle/>
+                    <a:p>
+                      <a:pPr algn="l" fontAlgn="t"/>
+                      <a:r>
+                        <a:rPr lang="pt-PT" sz="1000" b="1" i="0" u="none" strike="noStrike">
+                          <a:solidFill>
+                            <a:srgbClr val="000000"/>
+                          </a:solidFill>
+                          <a:effectLst/>
+                          <a:latin typeface="Arial"/>
+                        </a:rPr>
+                        <a:t>Medal</a:t>
+                      </a:r>
+                    </a:p>
+                  </a:txBody>
+                  <a:tcPr marL="9525" marR="9525" marT="9525" marB="0">
+                    <a:lnL w="6350" cap="flat" cmpd="sng" algn="ctr">
+                      <a:solidFill>
+                        <a:srgbClr val="000000"/>
+                      </a:solidFill>
+                      <a:prstDash val="solid"/>
+                      <a:round/>
+                      <a:headEnd type="none" w="med" len="med"/>
+                      <a:tailEnd type="none" w="med" len="med"/>
+                    </a:lnL>
+                    <a:lnR w="6350" cap="flat" cmpd="sng" algn="ctr">
+                      <a:solidFill>
+                        <a:srgbClr val="000000"/>
+                      </a:solidFill>
+                      <a:prstDash val="solid"/>
+                      <a:round/>
+                      <a:headEnd type="none" w="med" len="med"/>
+                      <a:tailEnd type="none" w="med" len="med"/>
+                    </a:lnR>
+                    <a:lnT w="6350" cap="flat" cmpd="sng" algn="ctr">
+                      <a:solidFill>
+                        <a:srgbClr val="000000"/>
+                      </a:solidFill>
+                      <a:prstDash val="solid"/>
+                      <a:round/>
+                      <a:headEnd type="none" w="med" len="med"/>
+                      <a:tailEnd type="none" w="med" len="med"/>
+                    </a:lnT>
+                    <a:lnB w="6350" cap="flat" cmpd="sng" algn="ctr">
+                      <a:solidFill>
+                        <a:srgbClr val="000000"/>
+                      </a:solidFill>
+                      <a:prstDash val="solid"/>
+                      <a:round/>
+                      <a:headEnd type="none" w="med" len="med"/>
+                      <a:tailEnd type="none" w="med" len="med"/>
+                    </a:lnB>
+                  </a:tcPr>
+                </a:tc>
+              </a:tr>
+              <a:tr h="333695">
+                <a:tc>
+                  <a:txBody>
+                    <a:bodyPr/>
+                    <a:lstStyle/>
+                    <a:p>
+                      <a:pPr algn="ctr" fontAlgn="t"/>
+                      <a:r>
+                        <a:rPr lang="pt-PT" sz="1000" b="0" i="0" u="none" strike="noStrike">
+                          <a:solidFill>
+                            <a:srgbClr val="000000"/>
+                          </a:solidFill>
+                          <a:effectLst/>
+                          <a:latin typeface="Arial"/>
+                        </a:rPr>
+                        <a:t>1896</a:t>
+                      </a:r>
+                    </a:p>
+                  </a:txBody>
+                  <a:tcPr marL="9525" marR="9525" marT="9525" marB="0">
+                    <a:lnL w="6350" cap="flat" cmpd="sng" algn="ctr">
+                      <a:solidFill>
+                        <a:srgbClr val="000000"/>
+                      </a:solidFill>
+                      <a:prstDash val="solid"/>
+                      <a:round/>
+                      <a:headEnd type="none" w="med" len="med"/>
+                      <a:tailEnd type="none" w="med" len="med"/>
+                    </a:lnL>
+                    <a:lnR w="6350" cap="flat" cmpd="sng" algn="ctr">
+                      <a:solidFill>
+                        <a:srgbClr val="000000"/>
+                      </a:solidFill>
+                      <a:prstDash val="solid"/>
+                      <a:round/>
+                      <a:headEnd type="none" w="med" len="med"/>
+                      <a:tailEnd type="none" w="med" len="med"/>
+                    </a:lnR>
+                    <a:lnT w="6350" cap="flat" cmpd="sng" algn="ctr">
+                      <a:solidFill>
+                        <a:srgbClr val="000000"/>
+                      </a:solidFill>
+                      <a:prstDash val="solid"/>
+                      <a:round/>
+                      <a:headEnd type="none" w="med" len="med"/>
+                      <a:tailEnd type="none" w="med" len="med"/>
+                    </a:lnT>
+                    <a:lnB w="6350" cap="flat" cmpd="sng" algn="ctr">
+                      <a:solidFill>
+                        <a:srgbClr val="000000"/>
+                      </a:solidFill>
+                      <a:prstDash val="solid"/>
+                      <a:round/>
+                      <a:headEnd type="none" w="med" len="med"/>
+                      <a:tailEnd type="none" w="med" len="med"/>
+                    </a:lnB>
+                  </a:tcPr>
+                </a:tc>
+                <a:tc>
+                  <a:txBody>
+                    <a:bodyPr/>
+                    <a:lstStyle/>
+                    <a:p>
+                      <a:pPr algn="l" fontAlgn="t"/>
+                      <a:r>
+                        <a:rPr lang="pt-PT" sz="1000" b="0" i="0" u="none" strike="noStrike">
+                          <a:solidFill>
+                            <a:srgbClr val="000000"/>
+                          </a:solidFill>
+                          <a:effectLst/>
+                          <a:latin typeface="Arial"/>
+                        </a:rPr>
+                        <a:t>Aquatics</a:t>
+                      </a:r>
+                    </a:p>
+                  </a:txBody>
+                  <a:tcPr marL="9525" marR="9525" marT="9525" marB="0">
+                    <a:lnL w="6350" cap="flat" cmpd="sng" algn="ctr">
+                      <a:solidFill>
+                        <a:srgbClr val="000000"/>
+                      </a:solidFill>
+                      <a:prstDash val="solid"/>
+                      <a:round/>
+                      <a:headEnd type="none" w="med" len="med"/>
+                      <a:tailEnd type="none" w="med" len="med"/>
+                    </a:lnL>
+                    <a:lnR w="6350" cap="flat" cmpd="sng" algn="ctr">
+                      <a:solidFill>
+                        <a:srgbClr val="000000"/>
+                      </a:solidFill>
+                      <a:prstDash val="solid"/>
+                      <a:round/>
+                      <a:headEnd type="none" w="med" len="med"/>
+                      <a:tailEnd type="none" w="med" len="med"/>
+                    </a:lnR>
+                    <a:lnT w="6350" cap="flat" cmpd="sng" algn="ctr">
+                      <a:solidFill>
+                        <a:srgbClr val="000000"/>
+                      </a:solidFill>
+                      <a:prstDash val="solid"/>
+                      <a:round/>
+                      <a:headEnd type="none" w="med" len="med"/>
+                      <a:tailEnd type="none" w="med" len="med"/>
+                    </a:lnT>
+                    <a:lnB w="6350" cap="flat" cmpd="sng" algn="ctr">
+                      <a:solidFill>
+                        <a:srgbClr val="000000"/>
+                      </a:solidFill>
+                      <a:prstDash val="solid"/>
+                      <a:round/>
+                      <a:headEnd type="none" w="med" len="med"/>
+                      <a:tailEnd type="none" w="med" len="med"/>
+                    </a:lnB>
+                  </a:tcPr>
+                </a:tc>
+                <a:tc>
+                  <a:txBody>
+                    <a:bodyPr/>
+                    <a:lstStyle/>
+                    <a:p>
+                      <a:pPr algn="l" fontAlgn="t"/>
+                      <a:r>
+                        <a:rPr lang="pt-PT" sz="1000" b="0" i="0" u="none" strike="noStrike">
+                          <a:solidFill>
+                            <a:srgbClr val="000000"/>
+                          </a:solidFill>
+                          <a:effectLst/>
+                          <a:latin typeface="Arial"/>
+                        </a:rPr>
+                        <a:t>HUN</a:t>
+                      </a:r>
+                    </a:p>
+                  </a:txBody>
+                  <a:tcPr marL="9525" marR="9525" marT="9525" marB="0">
+                    <a:lnL w="6350" cap="flat" cmpd="sng" algn="ctr">
+                      <a:solidFill>
+                        <a:srgbClr val="000000"/>
+                      </a:solidFill>
+                      <a:prstDash val="solid"/>
+                      <a:round/>
+                      <a:headEnd type="none" w="med" len="med"/>
+                      <a:tailEnd type="none" w="med" len="med"/>
+                    </a:lnL>
+                    <a:lnR w="6350" cap="flat" cmpd="sng" algn="ctr">
+                      <a:solidFill>
+                        <a:srgbClr val="000000"/>
+                      </a:solidFill>
+                      <a:prstDash val="solid"/>
+                      <a:round/>
+                      <a:headEnd type="none" w="med" len="med"/>
+                      <a:tailEnd type="none" w="med" len="med"/>
+                    </a:lnR>
+                    <a:lnT w="6350" cap="flat" cmpd="sng" algn="ctr">
+                      <a:solidFill>
+                        <a:srgbClr val="000000"/>
+                      </a:solidFill>
+                      <a:prstDash val="solid"/>
+                      <a:round/>
+                      <a:headEnd type="none" w="med" len="med"/>
+                      <a:tailEnd type="none" w="med" len="med"/>
+                    </a:lnT>
+                    <a:lnB w="6350" cap="flat" cmpd="sng" algn="ctr">
+                      <a:solidFill>
+                        <a:srgbClr val="000000"/>
+                      </a:solidFill>
+                      <a:prstDash val="solid"/>
+                      <a:round/>
+                      <a:headEnd type="none" w="med" len="med"/>
+                      <a:tailEnd type="none" w="med" len="med"/>
+                    </a:lnB>
+                  </a:tcPr>
+                </a:tc>
+                <a:tc>
+                  <a:txBody>
+                    <a:bodyPr/>
+                    <a:lstStyle/>
+                    <a:p>
+                      <a:pPr algn="l" fontAlgn="t"/>
+                      <a:r>
+                        <a:rPr lang="pt-PT" sz="1000" b="0" i="0" u="none" strike="noStrike">
+                          <a:solidFill>
+                            <a:srgbClr val="000000"/>
+                          </a:solidFill>
+                          <a:effectLst/>
+                          <a:latin typeface="Arial"/>
+                        </a:rPr>
+                        <a:t>Gold</a:t>
+                      </a:r>
+                    </a:p>
+                  </a:txBody>
+                  <a:tcPr marL="9525" marR="9525" marT="9525" marB="0">
+                    <a:lnL w="6350" cap="flat" cmpd="sng" algn="ctr">
+                      <a:solidFill>
+                        <a:srgbClr val="000000"/>
+                      </a:solidFill>
+                      <a:prstDash val="solid"/>
+                      <a:round/>
+                      <a:headEnd type="none" w="med" len="med"/>
+                      <a:tailEnd type="none" w="med" len="med"/>
+                    </a:lnL>
+                    <a:lnR w="6350" cap="flat" cmpd="sng" algn="ctr">
+                      <a:solidFill>
+                        <a:srgbClr val="000000"/>
+                      </a:solidFill>
+                      <a:prstDash val="solid"/>
+                      <a:round/>
+                      <a:headEnd type="none" w="med" len="med"/>
+                      <a:tailEnd type="none" w="med" len="med"/>
+                    </a:lnR>
+                    <a:lnT w="6350" cap="flat" cmpd="sng" algn="ctr">
+                      <a:solidFill>
+                        <a:srgbClr val="000000"/>
+                      </a:solidFill>
+                      <a:prstDash val="solid"/>
+                      <a:round/>
+                      <a:headEnd type="none" w="med" len="med"/>
+                      <a:tailEnd type="none" w="med" len="med"/>
+                    </a:lnT>
+                    <a:lnB w="6350" cap="flat" cmpd="sng" algn="ctr">
+                      <a:solidFill>
+                        <a:srgbClr val="000000"/>
+                      </a:solidFill>
+                      <a:prstDash val="solid"/>
+                      <a:round/>
+                      <a:headEnd type="none" w="med" len="med"/>
+                      <a:tailEnd type="none" w="med" len="med"/>
+                    </a:lnB>
+                  </a:tcPr>
+                </a:tc>
+              </a:tr>
+              <a:tr h="333695">
+                <a:tc>
+                  <a:txBody>
+                    <a:bodyPr/>
+                    <a:lstStyle/>
+                    <a:p>
+                      <a:pPr algn="ctr" fontAlgn="t"/>
+                      <a:r>
+                        <a:rPr lang="pt-PT" sz="1000" b="0" i="0" u="none" strike="noStrike">
+                          <a:solidFill>
+                            <a:srgbClr val="000000"/>
+                          </a:solidFill>
+                          <a:effectLst/>
+                          <a:latin typeface="Arial"/>
+                        </a:rPr>
+                        <a:t>1896</a:t>
+                      </a:r>
+                    </a:p>
+                  </a:txBody>
+                  <a:tcPr marL="9525" marR="9525" marT="9525" marB="0">
+                    <a:lnL w="6350" cap="flat" cmpd="sng" algn="ctr">
+                      <a:solidFill>
+                        <a:srgbClr val="000000"/>
+                      </a:solidFill>
+                      <a:prstDash val="solid"/>
+                      <a:round/>
+                      <a:headEnd type="none" w="med" len="med"/>
+                      <a:tailEnd type="none" w="med" len="med"/>
+                    </a:lnL>
+                    <a:lnR w="6350" cap="flat" cmpd="sng" algn="ctr">
+                      <a:solidFill>
+                        <a:srgbClr val="000000"/>
+                      </a:solidFill>
+                      <a:prstDash val="solid"/>
+                      <a:round/>
+                      <a:headEnd type="none" w="med" len="med"/>
+                      <a:tailEnd type="none" w="med" len="med"/>
+                    </a:lnR>
+                    <a:lnT w="6350" cap="flat" cmpd="sng" algn="ctr">
+                      <a:solidFill>
+                        <a:srgbClr val="000000"/>
+                      </a:solidFill>
+                      <a:prstDash val="solid"/>
+                      <a:round/>
+                      <a:headEnd type="none" w="med" len="med"/>
+                      <a:tailEnd type="none" w="med" len="med"/>
+                    </a:lnT>
+                    <a:lnB w="6350" cap="flat" cmpd="sng" algn="ctr">
+                      <a:solidFill>
+                        <a:srgbClr val="000000"/>
+                      </a:solidFill>
+                      <a:prstDash val="solid"/>
+                      <a:round/>
+                      <a:headEnd type="none" w="med" len="med"/>
+                      <a:tailEnd type="none" w="med" len="med"/>
+                    </a:lnB>
+                  </a:tcPr>
+                </a:tc>
+                <a:tc>
+                  <a:txBody>
+                    <a:bodyPr/>
+                    <a:lstStyle/>
+                    <a:p>
+                      <a:pPr algn="l" fontAlgn="t"/>
+                      <a:r>
+                        <a:rPr lang="pt-PT" sz="1000" b="0" i="0" u="none" strike="noStrike">
+                          <a:solidFill>
+                            <a:srgbClr val="000000"/>
+                          </a:solidFill>
+                          <a:effectLst/>
+                          <a:latin typeface="Arial"/>
+                        </a:rPr>
+                        <a:t>Aquatics</a:t>
+                      </a:r>
+                    </a:p>
+                  </a:txBody>
+                  <a:tcPr marL="9525" marR="9525" marT="9525" marB="0">
+                    <a:lnL w="6350" cap="flat" cmpd="sng" algn="ctr">
+                      <a:solidFill>
+                        <a:srgbClr val="000000"/>
+                      </a:solidFill>
+                      <a:prstDash val="solid"/>
+                      <a:round/>
+                      <a:headEnd type="none" w="med" len="med"/>
+                      <a:tailEnd type="none" w="med" len="med"/>
+                    </a:lnL>
+                    <a:lnR w="6350" cap="flat" cmpd="sng" algn="ctr">
+                      <a:solidFill>
+                        <a:srgbClr val="000000"/>
+                      </a:solidFill>
+                      <a:prstDash val="solid"/>
+                      <a:round/>
+                      <a:headEnd type="none" w="med" len="med"/>
+                      <a:tailEnd type="none" w="med" len="med"/>
+                    </a:lnR>
+                    <a:lnT w="6350" cap="flat" cmpd="sng" algn="ctr">
+                      <a:solidFill>
+                        <a:srgbClr val="000000"/>
+                      </a:solidFill>
+                      <a:prstDash val="solid"/>
+                      <a:round/>
+                      <a:headEnd type="none" w="med" len="med"/>
+                      <a:tailEnd type="none" w="med" len="med"/>
+                    </a:lnT>
+                    <a:lnB w="6350" cap="flat" cmpd="sng" algn="ctr">
+                      <a:solidFill>
+                        <a:srgbClr val="000000"/>
+                      </a:solidFill>
+                      <a:prstDash val="solid"/>
+                      <a:round/>
+                      <a:headEnd type="none" w="med" len="med"/>
+                      <a:tailEnd type="none" w="med" len="med"/>
+                    </a:lnB>
+                  </a:tcPr>
+                </a:tc>
+                <a:tc>
+                  <a:txBody>
+                    <a:bodyPr/>
+                    <a:lstStyle/>
+                    <a:p>
+                      <a:pPr algn="l" fontAlgn="t"/>
+                      <a:r>
+                        <a:rPr lang="pt-PT" sz="1000" b="0" i="0" u="none" strike="noStrike">
+                          <a:solidFill>
+                            <a:srgbClr val="000000"/>
+                          </a:solidFill>
+                          <a:effectLst/>
+                          <a:latin typeface="Arial"/>
+                        </a:rPr>
+                        <a:t>AUT</a:t>
+                      </a:r>
+                    </a:p>
+                  </a:txBody>
+                  <a:tcPr marL="9525" marR="9525" marT="9525" marB="0">
+                    <a:lnL w="6350" cap="flat" cmpd="sng" algn="ctr">
+                      <a:solidFill>
+                        <a:srgbClr val="000000"/>
+                      </a:solidFill>
+                      <a:prstDash val="solid"/>
+                      <a:round/>
+                      <a:headEnd type="none" w="med" len="med"/>
+                      <a:tailEnd type="none" w="med" len="med"/>
+                    </a:lnL>
+                    <a:lnR w="6350" cap="flat" cmpd="sng" algn="ctr">
+                      <a:solidFill>
+                        <a:srgbClr val="000000"/>
+                      </a:solidFill>
+                      <a:prstDash val="solid"/>
+                      <a:round/>
+                      <a:headEnd type="none" w="med" len="med"/>
+                      <a:tailEnd type="none" w="med" len="med"/>
+                    </a:lnR>
+                    <a:lnT w="6350" cap="flat" cmpd="sng" algn="ctr">
+                      <a:solidFill>
+                        <a:srgbClr val="000000"/>
+                      </a:solidFill>
+                      <a:prstDash val="solid"/>
+                      <a:round/>
+                      <a:headEnd type="none" w="med" len="med"/>
+                      <a:tailEnd type="none" w="med" len="med"/>
+                    </a:lnT>
+                    <a:lnB w="6350" cap="flat" cmpd="sng" algn="ctr">
+                      <a:solidFill>
+                        <a:srgbClr val="000000"/>
+                      </a:solidFill>
+                      <a:prstDash val="solid"/>
+                      <a:round/>
+                      <a:headEnd type="none" w="med" len="med"/>
+                      <a:tailEnd type="none" w="med" len="med"/>
+                    </a:lnB>
+                  </a:tcPr>
+                </a:tc>
+                <a:tc>
+                  <a:txBody>
+                    <a:bodyPr/>
+                    <a:lstStyle/>
+                    <a:p>
+                      <a:pPr algn="l" fontAlgn="t"/>
+                      <a:r>
+                        <a:rPr lang="pt-PT" sz="1000" b="0" i="0" u="none" strike="noStrike">
+                          <a:solidFill>
+                            <a:srgbClr val="000000"/>
+                          </a:solidFill>
+                          <a:effectLst/>
+                          <a:latin typeface="Arial"/>
+                        </a:rPr>
+                        <a:t>Silver</a:t>
+                      </a:r>
+                    </a:p>
+                  </a:txBody>
+                  <a:tcPr marL="9525" marR="9525" marT="9525" marB="0">
+                    <a:lnL w="6350" cap="flat" cmpd="sng" algn="ctr">
+                      <a:solidFill>
+                        <a:srgbClr val="000000"/>
+                      </a:solidFill>
+                      <a:prstDash val="solid"/>
+                      <a:round/>
+                      <a:headEnd type="none" w="med" len="med"/>
+                      <a:tailEnd type="none" w="med" len="med"/>
+                    </a:lnL>
+                    <a:lnR w="6350" cap="flat" cmpd="sng" algn="ctr">
+                      <a:solidFill>
+                        <a:srgbClr val="000000"/>
+                      </a:solidFill>
+                      <a:prstDash val="solid"/>
+                      <a:round/>
+                      <a:headEnd type="none" w="med" len="med"/>
+                      <a:tailEnd type="none" w="med" len="med"/>
+                    </a:lnR>
+                    <a:lnT w="6350" cap="flat" cmpd="sng" algn="ctr">
+                      <a:solidFill>
+                        <a:srgbClr val="000000"/>
+                      </a:solidFill>
+                      <a:prstDash val="solid"/>
+                      <a:round/>
+                      <a:headEnd type="none" w="med" len="med"/>
+                      <a:tailEnd type="none" w="med" len="med"/>
+                    </a:lnT>
+                    <a:lnB w="6350" cap="flat" cmpd="sng" algn="ctr">
+                      <a:solidFill>
+                        <a:srgbClr val="000000"/>
+                      </a:solidFill>
+                      <a:prstDash val="solid"/>
+                      <a:round/>
+                      <a:headEnd type="none" w="med" len="med"/>
+                      <a:tailEnd type="none" w="med" len="med"/>
+                    </a:lnB>
+                  </a:tcPr>
+                </a:tc>
+              </a:tr>
+              <a:tr h="333695">
+                <a:tc>
+                  <a:txBody>
+                    <a:bodyPr/>
+                    <a:lstStyle/>
+                    <a:p>
+                      <a:pPr algn="ctr" fontAlgn="t"/>
+                      <a:r>
+                        <a:rPr lang="pt-PT" sz="1000" b="0" i="0" u="none" strike="noStrike">
+                          <a:solidFill>
+                            <a:srgbClr val="000000"/>
+                          </a:solidFill>
+                          <a:effectLst/>
+                          <a:latin typeface="Arial"/>
+                        </a:rPr>
+                        <a:t>1896</a:t>
+                      </a:r>
+                    </a:p>
+                  </a:txBody>
+                  <a:tcPr marL="9525" marR="9525" marT="9525" marB="0">
+                    <a:lnL w="6350" cap="flat" cmpd="sng" algn="ctr">
+                      <a:solidFill>
+                        <a:srgbClr val="000000"/>
+                      </a:solidFill>
+                      <a:prstDash val="solid"/>
+                      <a:round/>
+                      <a:headEnd type="none" w="med" len="med"/>
+                      <a:tailEnd type="none" w="med" len="med"/>
+                    </a:lnL>
+                    <a:lnR w="6350" cap="flat" cmpd="sng" algn="ctr">
+                      <a:solidFill>
+                        <a:srgbClr val="000000"/>
+                      </a:solidFill>
+                      <a:prstDash val="solid"/>
+                      <a:round/>
+                      <a:headEnd type="none" w="med" len="med"/>
+                      <a:tailEnd type="none" w="med" len="med"/>
+                    </a:lnR>
+                    <a:lnT w="6350" cap="flat" cmpd="sng" algn="ctr">
+                      <a:solidFill>
+                        <a:srgbClr val="000000"/>
+                      </a:solidFill>
+                      <a:prstDash val="solid"/>
+                      <a:round/>
+                      <a:headEnd type="none" w="med" len="med"/>
+                      <a:tailEnd type="none" w="med" len="med"/>
+                    </a:lnT>
+                    <a:lnB w="6350" cap="flat" cmpd="sng" algn="ctr">
+                      <a:solidFill>
+                        <a:srgbClr val="000000"/>
+                      </a:solidFill>
+                      <a:prstDash val="solid"/>
+                      <a:round/>
+                      <a:headEnd type="none" w="med" len="med"/>
+                      <a:tailEnd type="none" w="med" len="med"/>
+                    </a:lnB>
+                  </a:tcPr>
+                </a:tc>
+                <a:tc>
+                  <a:txBody>
+                    <a:bodyPr/>
+                    <a:lstStyle/>
+                    <a:p>
+                      <a:pPr algn="l" fontAlgn="t"/>
+                      <a:r>
+                        <a:rPr lang="pt-PT" sz="1000" b="0" i="0" u="none" strike="noStrike">
+                          <a:solidFill>
+                            <a:srgbClr val="000000"/>
+                          </a:solidFill>
+                          <a:effectLst/>
+                          <a:latin typeface="Arial"/>
+                        </a:rPr>
+                        <a:t>Aquatics</a:t>
+                      </a:r>
+                    </a:p>
+                  </a:txBody>
+                  <a:tcPr marL="9525" marR="9525" marT="9525" marB="0">
+                    <a:lnL w="6350" cap="flat" cmpd="sng" algn="ctr">
+                      <a:solidFill>
+                        <a:srgbClr val="000000"/>
+                      </a:solidFill>
+                      <a:prstDash val="solid"/>
+                      <a:round/>
+                      <a:headEnd type="none" w="med" len="med"/>
+                      <a:tailEnd type="none" w="med" len="med"/>
+                    </a:lnL>
+                    <a:lnR w="6350" cap="flat" cmpd="sng" algn="ctr">
+                      <a:solidFill>
+                        <a:srgbClr val="000000"/>
+                      </a:solidFill>
+                      <a:prstDash val="solid"/>
+                      <a:round/>
+                      <a:headEnd type="none" w="med" len="med"/>
+                      <a:tailEnd type="none" w="med" len="med"/>
+                    </a:lnR>
+                    <a:lnT w="6350" cap="flat" cmpd="sng" algn="ctr">
+                      <a:solidFill>
+                        <a:srgbClr val="000000"/>
+                      </a:solidFill>
+                      <a:prstDash val="solid"/>
+                      <a:round/>
+                      <a:headEnd type="none" w="med" len="med"/>
+                      <a:tailEnd type="none" w="med" len="med"/>
+                    </a:lnT>
+                    <a:lnB w="6350" cap="flat" cmpd="sng" algn="ctr">
+                      <a:solidFill>
+                        <a:srgbClr val="000000"/>
+                      </a:solidFill>
+                      <a:prstDash val="solid"/>
+                      <a:round/>
+                      <a:headEnd type="none" w="med" len="med"/>
+                      <a:tailEnd type="none" w="med" len="med"/>
+                    </a:lnB>
+                  </a:tcPr>
+                </a:tc>
+                <a:tc>
+                  <a:txBody>
+                    <a:bodyPr/>
+                    <a:lstStyle/>
+                    <a:p>
+                      <a:pPr algn="l" fontAlgn="t"/>
+                      <a:r>
+                        <a:rPr lang="pt-PT" sz="1000" b="0" i="0" u="none" strike="noStrike">
+                          <a:solidFill>
+                            <a:srgbClr val="000000"/>
+                          </a:solidFill>
+                          <a:effectLst/>
+                          <a:latin typeface="Arial"/>
+                        </a:rPr>
+                        <a:t>GRE</a:t>
+                      </a:r>
+                    </a:p>
+                  </a:txBody>
+                  <a:tcPr marL="9525" marR="9525" marT="9525" marB="0">
+                    <a:lnL w="6350" cap="flat" cmpd="sng" algn="ctr">
+                      <a:solidFill>
+                        <a:srgbClr val="000000"/>
+                      </a:solidFill>
+                      <a:prstDash val="solid"/>
+                      <a:round/>
+                      <a:headEnd type="none" w="med" len="med"/>
+                      <a:tailEnd type="none" w="med" len="med"/>
+                    </a:lnL>
+                    <a:lnR w="6350" cap="flat" cmpd="sng" algn="ctr">
+                      <a:solidFill>
+                        <a:srgbClr val="000000"/>
+                      </a:solidFill>
+                      <a:prstDash val="solid"/>
+                      <a:round/>
+                      <a:headEnd type="none" w="med" len="med"/>
+                      <a:tailEnd type="none" w="med" len="med"/>
+                    </a:lnR>
+                    <a:lnT w="6350" cap="flat" cmpd="sng" algn="ctr">
+                      <a:solidFill>
+                        <a:srgbClr val="000000"/>
+                      </a:solidFill>
+                      <a:prstDash val="solid"/>
+                      <a:round/>
+                      <a:headEnd type="none" w="med" len="med"/>
+                      <a:tailEnd type="none" w="med" len="med"/>
+                    </a:lnT>
+                    <a:lnB w="6350" cap="flat" cmpd="sng" algn="ctr">
+                      <a:solidFill>
+                        <a:srgbClr val="000000"/>
+                      </a:solidFill>
+                      <a:prstDash val="solid"/>
+                      <a:round/>
+                      <a:headEnd type="none" w="med" len="med"/>
+                      <a:tailEnd type="none" w="med" len="med"/>
+                    </a:lnB>
+                  </a:tcPr>
+                </a:tc>
+                <a:tc>
+                  <a:txBody>
+                    <a:bodyPr/>
+                    <a:lstStyle/>
+                    <a:p>
+                      <a:pPr algn="l" fontAlgn="t"/>
+                      <a:r>
+                        <a:rPr lang="pt-PT" sz="1000" b="0" i="0" u="none" strike="noStrike" dirty="0">
+                          <a:solidFill>
+                            <a:srgbClr val="000000"/>
+                          </a:solidFill>
+                          <a:effectLst/>
+                          <a:latin typeface="Arial"/>
+                        </a:rPr>
+                        <a:t>Bronze</a:t>
+                      </a:r>
+                    </a:p>
+                  </a:txBody>
+                  <a:tcPr marL="9525" marR="9525" marT="9525" marB="0">
+                    <a:lnL w="6350" cap="flat" cmpd="sng" algn="ctr">
+                      <a:solidFill>
+                        <a:srgbClr val="000000"/>
+                      </a:solidFill>
+                      <a:prstDash val="solid"/>
+                      <a:round/>
+                      <a:headEnd type="none" w="med" len="med"/>
+                      <a:tailEnd type="none" w="med" len="med"/>
+                    </a:lnL>
+                    <a:lnR w="6350" cap="flat" cmpd="sng" algn="ctr">
+                      <a:solidFill>
+                        <a:srgbClr val="000000"/>
+                      </a:solidFill>
+                      <a:prstDash val="solid"/>
+                      <a:round/>
+                      <a:headEnd type="none" w="med" len="med"/>
+                      <a:tailEnd type="none" w="med" len="med"/>
+                    </a:lnR>
+                    <a:lnT w="6350" cap="flat" cmpd="sng" algn="ctr">
+                      <a:solidFill>
+                        <a:srgbClr val="000000"/>
+                      </a:solidFill>
+                      <a:prstDash val="solid"/>
+                      <a:round/>
+                      <a:headEnd type="none" w="med" len="med"/>
+                      <a:tailEnd type="none" w="med" len="med"/>
+                    </a:lnT>
+                    <a:lnB w="6350" cap="flat" cmpd="sng" algn="ctr">
+                      <a:solidFill>
+                        <a:srgbClr val="000000"/>
+                      </a:solidFill>
+                      <a:prstDash val="solid"/>
+                      <a:round/>
+                      <a:headEnd type="none" w="med" len="med"/>
+                      <a:tailEnd type="none" w="med" len="med"/>
+                    </a:lnB>
+                  </a:tcPr>
+                </a:tc>
+              </a:tr>
+            </a:tbl>
+          </a:graphicData>
+        </a:graphic>
+      </p:graphicFrame>
+      <p:sp>
+        <p:nvSpPr>
+          <p:cNvPr id="4" name="Seta em curva 3"/>
+          <p:cNvSpPr/>
+          <p:nvPr/>
+        </p:nvSpPr>
+        <p:spPr>
+          <a:xfrm rot="5400000">
+            <a:off x="5652120" y="3284984"/>
+            <a:ext cx="1008112" cy="720080"/>
+          </a:xfrm>
+          <a:prstGeom prst="bentArrow">
+            <a:avLst/>
+          </a:prstGeom>
+        </p:spPr>
+        <p:style>
+          <a:lnRef idx="2">
+            <a:schemeClr val="accent1">
+              <a:shade val="50000"/>
+            </a:schemeClr>
+          </a:lnRef>
+          <a:fillRef idx="1">
+            <a:schemeClr val="accent1"/>
+          </a:fillRef>
+          <a:effectRef idx="0">
+            <a:schemeClr val="accent1"/>
+          </a:effectRef>
+          <a:fontRef idx="minor">
+            <a:schemeClr val="lt1"/>
+          </a:fontRef>
+        </p:style>
+        <p:txBody>
+          <a:bodyPr rtlCol="0" anchor="ctr"/>
+          <a:lstStyle/>
+          <a:p>
+            <a:pPr algn="ctr"/>
+            <a:endParaRPr lang="pt-PT">
+              <a:solidFill>
+                <a:schemeClr val="tx1"/>
+              </a:solidFill>
+            </a:endParaRPr>
           </a:p>
         </p:txBody>
       </p:sp>
     </p:spTree>
     <p:extLst>
       <p:ext uri="{BB962C8B-B14F-4D97-AF65-F5344CB8AC3E}">
-        <p14:creationId xmlns:p14="http://schemas.microsoft.com/office/powerpoint/2010/main" val="2962997025"/>
+        <p14:creationId xmlns:p14="http://schemas.microsoft.com/office/powerpoint/2010/main" val="252573806"/>
       </p:ext>
     </p:extLst>
   </p:cSld>

</xml_diff>

<commit_message>
update do PPT - correções
</commit_message>
<xml_diff>
--- a/checkpoint2/G01A - Checkpoint2 Presentation.pptx
+++ b/checkpoint2/G01A - Checkpoint2 Presentation.pptx
@@ -5,45 +5,46 @@
     <p:sldMasterId id="2147483648" r:id="rId1"/>
   </p:sldMasterIdLst>
   <p:notesMasterIdLst>
-    <p:notesMasterId r:id="rId35"/>
+    <p:notesMasterId r:id="rId36"/>
   </p:notesMasterIdLst>
   <p:handoutMasterIdLst>
-    <p:handoutMasterId r:id="rId36"/>
+    <p:handoutMasterId r:id="rId37"/>
   </p:handoutMasterIdLst>
   <p:sldIdLst>
     <p:sldId id="256" r:id="rId2"/>
     <p:sldId id="257" r:id="rId3"/>
     <p:sldId id="1096" r:id="rId4"/>
     <p:sldId id="1110" r:id="rId5"/>
-    <p:sldId id="1109" r:id="rId6"/>
-    <p:sldId id="1111" r:id="rId7"/>
-    <p:sldId id="1097" r:id="rId8"/>
-    <p:sldId id="1105" r:id="rId9"/>
-    <p:sldId id="1116" r:id="rId10"/>
-    <p:sldId id="1117" r:id="rId11"/>
-    <p:sldId id="1098" r:id="rId12"/>
-    <p:sldId id="1112" r:id="rId13"/>
-    <p:sldId id="1119" r:id="rId14"/>
-    <p:sldId id="1113" r:id="rId15"/>
-    <p:sldId id="1120" r:id="rId16"/>
-    <p:sldId id="1121" r:id="rId17"/>
-    <p:sldId id="1099" r:id="rId18"/>
-    <p:sldId id="1100" r:id="rId19"/>
-    <p:sldId id="1106" r:id="rId20"/>
-    <p:sldId id="1107" r:id="rId21"/>
-    <p:sldId id="1101" r:id="rId22"/>
-    <p:sldId id="1102" r:id="rId23"/>
-    <p:sldId id="1108" r:id="rId24"/>
-    <p:sldId id="1122" r:id="rId25"/>
-    <p:sldId id="1123" r:id="rId26"/>
-    <p:sldId id="1124" r:id="rId27"/>
-    <p:sldId id="1125" r:id="rId28"/>
-    <p:sldId id="1126" r:id="rId29"/>
-    <p:sldId id="1127" r:id="rId30"/>
-    <p:sldId id="1128" r:id="rId31"/>
-    <p:sldId id="1103" r:id="rId32"/>
-    <p:sldId id="1104" r:id="rId33"/>
-    <p:sldId id="1129" r:id="rId34"/>
+    <p:sldId id="1130" r:id="rId6"/>
+    <p:sldId id="1109" r:id="rId7"/>
+    <p:sldId id="1111" r:id="rId8"/>
+    <p:sldId id="1097" r:id="rId9"/>
+    <p:sldId id="1105" r:id="rId10"/>
+    <p:sldId id="1116" r:id="rId11"/>
+    <p:sldId id="1117" r:id="rId12"/>
+    <p:sldId id="1098" r:id="rId13"/>
+    <p:sldId id="1112" r:id="rId14"/>
+    <p:sldId id="1119" r:id="rId15"/>
+    <p:sldId id="1113" r:id="rId16"/>
+    <p:sldId id="1120" r:id="rId17"/>
+    <p:sldId id="1121" r:id="rId18"/>
+    <p:sldId id="1099" r:id="rId19"/>
+    <p:sldId id="1100" r:id="rId20"/>
+    <p:sldId id="1106" r:id="rId21"/>
+    <p:sldId id="1107" r:id="rId22"/>
+    <p:sldId id="1101" r:id="rId23"/>
+    <p:sldId id="1102" r:id="rId24"/>
+    <p:sldId id="1108" r:id="rId25"/>
+    <p:sldId id="1122" r:id="rId26"/>
+    <p:sldId id="1123" r:id="rId27"/>
+    <p:sldId id="1124" r:id="rId28"/>
+    <p:sldId id="1125" r:id="rId29"/>
+    <p:sldId id="1126" r:id="rId30"/>
+    <p:sldId id="1127" r:id="rId31"/>
+    <p:sldId id="1128" r:id="rId32"/>
+    <p:sldId id="1103" r:id="rId33"/>
+    <p:sldId id="1104" r:id="rId34"/>
+    <p:sldId id="1129" r:id="rId35"/>
   </p:sldIdLst>
   <p:sldSz cx="9144000" cy="6858000" type="screen4x3"/>
   <p:notesSz cx="6858000" cy="9144000"/>
@@ -144,7 +145,7 @@
   </p:defaultTextStyle>
   <p:extLst>
     <p:ext uri="{EFAFB233-063F-42B5-8137-9DF3F51BA10A}">
-      <p15:sldGuideLst xmlns="" xmlns:p15="http://schemas.microsoft.com/office/powerpoint/2012/main">
+      <p15:sldGuideLst xmlns:p15="http://schemas.microsoft.com/office/powerpoint/2012/main" xmlns="">
         <p15:guide id="1" orient="horz" pos="2160">
           <p15:clr>
             <a:srgbClr val="A4A3A4"/>
@@ -243,7 +244,7 @@
           <a:p>
             <a:fld id="{745C36E7-9E00-462E-80A3-32F2BE615C7A}" type="datetimeFigureOut">
               <a:rPr lang="en-US" smtClean="0"/>
-              <a:t>10/18/2015</a:t>
+              <a:t>10/19/2015</a:t>
             </a:fld>
             <a:endParaRPr lang="en-US"/>
           </a:p>
@@ -409,7 +410,7 @@
             <a:fld id="{01F3E309-ED8D-4193-99AF-E5EA90965E98}" type="datetimeFigureOut">
               <a:rPr lang="en-US" smtClean="0"/>
               <a:pPr/>
-              <a:t>10/18/2015</a:t>
+              <a:t>10/19/2015</a:t>
             </a:fld>
             <a:endParaRPr lang="en-US"/>
           </a:p>
@@ -899,15 +900,7 @@
           <a:p>
             <a:r>
               <a:rPr lang="en-US" baseline="0" dirty="0" smtClean="0"/>
-              <a:t>OG – </a:t>
-            </a:r>
-            <a:r>
-              <a:rPr lang="en-US" baseline="0" dirty="0" err="1" smtClean="0"/>
-              <a:t>Olimpic</a:t>
-            </a:r>
-            <a:r>
-              <a:rPr lang="en-US" baseline="0" dirty="0" smtClean="0"/>
-              <a:t> Games</a:t>
+              <a:t>OG – Olympic Games</a:t>
             </a:r>
           </a:p>
         </p:txBody>
@@ -1089,7 +1082,18 @@
           <a:bodyPr/>
           <a:lstStyle/>
           <a:p>
-            <a:endParaRPr lang="en-US" baseline="0" dirty="0" smtClean="0"/>
+            <a:r>
+              <a:rPr lang="en-US" baseline="0" dirty="0" smtClean="0"/>
+              <a:t>OG – </a:t>
+            </a:r>
+            <a:r>
+              <a:rPr lang="en-US" baseline="0" dirty="0" err="1" smtClean="0"/>
+              <a:t>Olimpic</a:t>
+            </a:r>
+            <a:r>
+              <a:rPr lang="en-US" baseline="0" dirty="0" smtClean="0"/>
+              <a:t> Games</a:t>
+            </a:r>
           </a:p>
         </p:txBody>
       </p:sp>
@@ -1111,7 +1115,7 @@
             <a:fld id="{F535F173-C1DD-4975-94BF-5B9ED67F7674}" type="slidenum">
               <a:rPr lang="en-US" smtClean="0"/>
               <a:pPr/>
-              <a:t>18</a:t>
+              <a:t>16</a:t>
             </a:fld>
             <a:endParaRPr lang="en-US"/>
           </a:p>
@@ -1366,7 +1370,7 @@
             <a:fld id="{F535F173-C1DD-4975-94BF-5B9ED67F7674}" type="slidenum">
               <a:rPr lang="en-US" smtClean="0"/>
               <a:pPr/>
-              <a:t>22</a:t>
+              <a:t>21</a:t>
             </a:fld>
             <a:endParaRPr lang="en-US"/>
           </a:p>
@@ -2216,7 +2220,7 @@
             <a:fld id="{F535F173-C1DD-4975-94BF-5B9ED67F7674}" type="slidenum">
               <a:rPr lang="en-US" smtClean="0"/>
               <a:pPr/>
-              <a:t>32</a:t>
+              <a:t>31</a:t>
             </a:fld>
             <a:endParaRPr lang="en-US"/>
           </a:p>
@@ -2225,7 +2229,7 @@
     </p:spTree>
     <p:extLst>
       <p:ext uri="{BB962C8B-B14F-4D97-AF65-F5344CB8AC3E}">
-        <p14:creationId xmlns:p14="http://schemas.microsoft.com/office/powerpoint/2010/main" val="35205596"/>
+        <p14:creationId xmlns:p14="http://schemas.microsoft.com/office/powerpoint/2010/main" val="1355792998"/>
       </p:ext>
     </p:extLst>
   </p:cSld>
@@ -2302,6 +2306,91 @@
               <a:rPr lang="en-US" smtClean="0"/>
               <a:pPr/>
               <a:t>33</a:t>
+            </a:fld>
+            <a:endParaRPr lang="en-US"/>
+          </a:p>
+        </p:txBody>
+      </p:sp>
+    </p:spTree>
+    <p:extLst>
+      <p:ext uri="{BB962C8B-B14F-4D97-AF65-F5344CB8AC3E}">
+        <p14:creationId xmlns:p14="http://schemas.microsoft.com/office/powerpoint/2010/main" val="35205596"/>
+      </p:ext>
+    </p:extLst>
+  </p:cSld>
+  <p:clrMapOvr>
+    <a:masterClrMapping/>
+  </p:clrMapOvr>
+</p:notes>
+</file>
+
+<file path=ppt/notesSlides/notesSlide27.xml><?xml version="1.0" encoding="utf-8"?>
+<p:notes xmlns:a="http://schemas.openxmlformats.org/drawingml/2006/main" xmlns:r="http://schemas.openxmlformats.org/officeDocument/2006/relationships" xmlns:p="http://schemas.openxmlformats.org/presentationml/2006/main">
+  <p:cSld>
+    <p:spTree>
+      <p:nvGrpSpPr>
+        <p:cNvPr id="1" name=""/>
+        <p:cNvGrpSpPr/>
+        <p:nvPr/>
+      </p:nvGrpSpPr>
+      <p:grpSpPr>
+        <a:xfrm>
+          <a:off x="0" y="0"/>
+          <a:ext cx="0" cy="0"/>
+          <a:chOff x="0" y="0"/>
+          <a:chExt cx="0" cy="0"/>
+        </a:xfrm>
+      </p:grpSpPr>
+      <p:sp>
+        <p:nvSpPr>
+          <p:cNvPr id="2" name="Slide Image Placeholder 1"/>
+          <p:cNvSpPr>
+            <a:spLocks noGrp="1" noRot="1" noChangeAspect="1"/>
+          </p:cNvSpPr>
+          <p:nvPr>
+            <p:ph type="sldImg"/>
+          </p:nvPr>
+        </p:nvSpPr>
+        <p:spPr/>
+      </p:sp>
+      <p:sp>
+        <p:nvSpPr>
+          <p:cNvPr id="3" name="Notes Placeholder 2"/>
+          <p:cNvSpPr>
+            <a:spLocks noGrp="1"/>
+          </p:cNvSpPr>
+          <p:nvPr>
+            <p:ph type="body" idx="1"/>
+          </p:nvPr>
+        </p:nvSpPr>
+        <p:spPr/>
+        <p:txBody>
+          <a:bodyPr/>
+          <a:lstStyle/>
+          <a:p>
+            <a:endParaRPr lang="en-US" baseline="0" dirty="0" smtClean="0"/>
+          </a:p>
+        </p:txBody>
+      </p:sp>
+      <p:sp>
+        <p:nvSpPr>
+          <p:cNvPr id="4" name="Slide Number Placeholder 3"/>
+          <p:cNvSpPr>
+            <a:spLocks noGrp="1"/>
+          </p:cNvSpPr>
+          <p:nvPr>
+            <p:ph type="sldNum" sz="quarter" idx="10"/>
+          </p:nvPr>
+        </p:nvSpPr>
+        <p:spPr/>
+        <p:txBody>
+          <a:bodyPr/>
+          <a:lstStyle/>
+          <a:p>
+            <a:fld id="{F535F173-C1DD-4975-94BF-5B9ED67F7674}" type="slidenum">
+              <a:rPr lang="en-US" smtClean="0"/>
+              <a:pPr/>
+              <a:t>34</a:t>
             </a:fld>
             <a:endParaRPr lang="en-US"/>
           </a:p>
@@ -2556,7 +2645,7 @@
             <a:fld id="{F535F173-C1DD-4975-94BF-5B9ED67F7674}" type="slidenum">
               <a:rPr lang="en-US" smtClean="0"/>
               <a:pPr/>
-              <a:t>8</a:t>
+              <a:t>7</a:t>
             </a:fld>
             <a:endParaRPr lang="en-US"/>
           </a:p>
@@ -2619,126 +2708,7 @@
           <a:bodyPr/>
           <a:lstStyle/>
           <a:p>
-            <a:r>
-              <a:rPr lang="en-US" baseline="0" dirty="0" err="1" smtClean="0"/>
-              <a:t>Porque</a:t>
-            </a:r>
-            <a:r>
-              <a:rPr lang="en-US" baseline="0" dirty="0" smtClean="0"/>
-              <a:t> </a:t>
-            </a:r>
-            <a:r>
-              <a:rPr lang="en-US" baseline="0" dirty="0" err="1" smtClean="0"/>
-              <a:t>assim</a:t>
-            </a:r>
-            <a:r>
-              <a:rPr lang="en-US" baseline="0" dirty="0" smtClean="0"/>
-              <a:t> é </a:t>
-            </a:r>
-            <a:r>
-              <a:rPr lang="en-US" baseline="0" dirty="0" err="1" smtClean="0"/>
-              <a:t>possível</a:t>
-            </a:r>
-            <a:r>
-              <a:rPr lang="en-US" baseline="0" dirty="0" smtClean="0"/>
-              <a:t> </a:t>
-            </a:r>
-            <a:r>
-              <a:rPr lang="en-US" baseline="0" dirty="0" err="1" smtClean="0"/>
-              <a:t>ter</a:t>
-            </a:r>
-            <a:r>
-              <a:rPr lang="en-US" baseline="0" dirty="0" smtClean="0"/>
-              <a:t> </a:t>
-            </a:r>
-            <a:r>
-              <a:rPr lang="en-US" baseline="0" dirty="0" err="1" smtClean="0"/>
-              <a:t>uma</a:t>
-            </a:r>
-            <a:r>
-              <a:rPr lang="en-US" baseline="0" dirty="0" smtClean="0"/>
-              <a:t> </a:t>
-            </a:r>
-            <a:r>
-              <a:rPr lang="en-US" baseline="0" dirty="0" err="1" smtClean="0"/>
-              <a:t>ideia</a:t>
-            </a:r>
-            <a:r>
-              <a:rPr lang="en-US" baseline="0" dirty="0" smtClean="0"/>
-              <a:t> se o </a:t>
-            </a:r>
-            <a:r>
-              <a:rPr lang="en-US" baseline="0" dirty="0" err="1" smtClean="0"/>
-              <a:t>conceito</a:t>
-            </a:r>
-            <a:r>
-              <a:rPr lang="en-US" baseline="0" dirty="0" smtClean="0"/>
-              <a:t> de </a:t>
-            </a:r>
-            <a:r>
-              <a:rPr lang="en-US" baseline="0" dirty="0" err="1" smtClean="0"/>
-              <a:t>ter</a:t>
-            </a:r>
-            <a:r>
-              <a:rPr lang="en-US" baseline="0" dirty="0" smtClean="0"/>
-              <a:t> </a:t>
-            </a:r>
-            <a:r>
-              <a:rPr lang="en-US" baseline="0" dirty="0" err="1" smtClean="0"/>
-              <a:t>mais</a:t>
-            </a:r>
-            <a:r>
-              <a:rPr lang="en-US" baseline="0" dirty="0" smtClean="0"/>
-              <a:t> </a:t>
-            </a:r>
-            <a:r>
-              <a:rPr lang="en-US" baseline="0" dirty="0" err="1" smtClean="0"/>
-              <a:t>população</a:t>
-            </a:r>
-            <a:r>
-              <a:rPr lang="en-US" baseline="0" dirty="0" smtClean="0"/>
-              <a:t>, </a:t>
-            </a:r>
-            <a:r>
-              <a:rPr lang="en-US" baseline="0" dirty="0" err="1" smtClean="0"/>
-              <a:t>influencia</a:t>
-            </a:r>
-            <a:r>
-              <a:rPr lang="en-US" baseline="0" dirty="0" smtClean="0"/>
-              <a:t> </a:t>
-            </a:r>
-            <a:r>
-              <a:rPr lang="en-US" baseline="0" dirty="0" err="1" smtClean="0"/>
-              <a:t>ter</a:t>
-            </a:r>
-            <a:r>
-              <a:rPr lang="en-US" baseline="0" dirty="0" smtClean="0"/>
-              <a:t> </a:t>
-            </a:r>
-            <a:r>
-              <a:rPr lang="en-US" baseline="0" dirty="0" err="1" smtClean="0"/>
-              <a:t>mais</a:t>
-            </a:r>
-            <a:r>
-              <a:rPr lang="en-US" baseline="0" dirty="0" smtClean="0"/>
-              <a:t> </a:t>
-            </a:r>
-            <a:r>
-              <a:rPr lang="en-US" baseline="0" dirty="0" err="1" smtClean="0"/>
-              <a:t>vencedores</a:t>
-            </a:r>
-            <a:r>
-              <a:rPr lang="en-US" baseline="0" dirty="0" smtClean="0"/>
-              <a:t> </a:t>
-            </a:r>
-            <a:r>
-              <a:rPr lang="en-US" baseline="0" dirty="0" err="1" smtClean="0"/>
-              <a:t>olimpicos</a:t>
-            </a:r>
-            <a:r>
-              <a:rPr lang="en-US" baseline="0" dirty="0" smtClean="0"/>
-              <a:t>.</a:t>
-            </a:r>
+            <a:endParaRPr lang="en-US" baseline="0" dirty="0" smtClean="0"/>
           </a:p>
         </p:txBody>
       </p:sp>
@@ -2940,10 +2910,9 @@
               <a:t>olimpicos</a:t>
             </a:r>
             <a:r>
-              <a:rPr lang="en-US" baseline="0" smtClean="0"/>
+              <a:rPr lang="en-US" baseline="0" dirty="0" smtClean="0"/>
               <a:t>.</a:t>
             </a:r>
-            <a:endParaRPr lang="en-US" baseline="0" dirty="0" smtClean="0"/>
           </a:p>
         </p:txBody>
       </p:sp>
@@ -3029,17 +2998,126 @@
           <a:lstStyle/>
           <a:p>
             <a:r>
+              <a:rPr lang="en-US" baseline="0" dirty="0" err="1" smtClean="0"/>
+              <a:t>Porque</a:t>
+            </a:r>
+            <a:r>
               <a:rPr lang="en-US" baseline="0" dirty="0" smtClean="0"/>
-              <a:t>OG – </a:t>
+              <a:t> </a:t>
             </a:r>
             <a:r>
               <a:rPr lang="en-US" baseline="0" dirty="0" err="1" smtClean="0"/>
-              <a:t>Olimpic</a:t>
+              <a:t>assim</a:t>
             </a:r>
             <a:r>
               <a:rPr lang="en-US" baseline="0" dirty="0" smtClean="0"/>
-              <a:t> Games</a:t>
-            </a:r>
+              <a:t> é </a:t>
+            </a:r>
+            <a:r>
+              <a:rPr lang="en-US" baseline="0" dirty="0" err="1" smtClean="0"/>
+              <a:t>possível</a:t>
+            </a:r>
+            <a:r>
+              <a:rPr lang="en-US" baseline="0" dirty="0" smtClean="0"/>
+              <a:t> </a:t>
+            </a:r>
+            <a:r>
+              <a:rPr lang="en-US" baseline="0" dirty="0" err="1" smtClean="0"/>
+              <a:t>ter</a:t>
+            </a:r>
+            <a:r>
+              <a:rPr lang="en-US" baseline="0" dirty="0" smtClean="0"/>
+              <a:t> </a:t>
+            </a:r>
+            <a:r>
+              <a:rPr lang="en-US" baseline="0" dirty="0" err="1" smtClean="0"/>
+              <a:t>uma</a:t>
+            </a:r>
+            <a:r>
+              <a:rPr lang="en-US" baseline="0" dirty="0" smtClean="0"/>
+              <a:t> </a:t>
+            </a:r>
+            <a:r>
+              <a:rPr lang="en-US" baseline="0" dirty="0" err="1" smtClean="0"/>
+              <a:t>ideia</a:t>
+            </a:r>
+            <a:r>
+              <a:rPr lang="en-US" baseline="0" dirty="0" smtClean="0"/>
+              <a:t> se o </a:t>
+            </a:r>
+            <a:r>
+              <a:rPr lang="en-US" baseline="0" dirty="0" err="1" smtClean="0"/>
+              <a:t>conceito</a:t>
+            </a:r>
+            <a:r>
+              <a:rPr lang="en-US" baseline="0" dirty="0" smtClean="0"/>
+              <a:t> de </a:t>
+            </a:r>
+            <a:r>
+              <a:rPr lang="en-US" baseline="0" dirty="0" err="1" smtClean="0"/>
+              <a:t>ter</a:t>
+            </a:r>
+            <a:r>
+              <a:rPr lang="en-US" baseline="0" dirty="0" smtClean="0"/>
+              <a:t> </a:t>
+            </a:r>
+            <a:r>
+              <a:rPr lang="en-US" baseline="0" dirty="0" err="1" smtClean="0"/>
+              <a:t>mais</a:t>
+            </a:r>
+            <a:r>
+              <a:rPr lang="en-US" baseline="0" dirty="0" smtClean="0"/>
+              <a:t> </a:t>
+            </a:r>
+            <a:r>
+              <a:rPr lang="en-US" baseline="0" dirty="0" err="1" smtClean="0"/>
+              <a:t>população</a:t>
+            </a:r>
+            <a:r>
+              <a:rPr lang="en-US" baseline="0" dirty="0" smtClean="0"/>
+              <a:t>, </a:t>
+            </a:r>
+            <a:r>
+              <a:rPr lang="en-US" baseline="0" dirty="0" err="1" smtClean="0"/>
+              <a:t>influencia</a:t>
+            </a:r>
+            <a:r>
+              <a:rPr lang="en-US" baseline="0" dirty="0" smtClean="0"/>
+              <a:t> </a:t>
+            </a:r>
+            <a:r>
+              <a:rPr lang="en-US" baseline="0" dirty="0" err="1" smtClean="0"/>
+              <a:t>ter</a:t>
+            </a:r>
+            <a:r>
+              <a:rPr lang="en-US" baseline="0" dirty="0" smtClean="0"/>
+              <a:t> </a:t>
+            </a:r>
+            <a:r>
+              <a:rPr lang="en-US" baseline="0" dirty="0" err="1" smtClean="0"/>
+              <a:t>mais</a:t>
+            </a:r>
+            <a:r>
+              <a:rPr lang="en-US" baseline="0" dirty="0" smtClean="0"/>
+              <a:t> </a:t>
+            </a:r>
+            <a:r>
+              <a:rPr lang="en-US" baseline="0" dirty="0" err="1" smtClean="0"/>
+              <a:t>vencedores</a:t>
+            </a:r>
+            <a:r>
+              <a:rPr lang="en-US" baseline="0" dirty="0" smtClean="0"/>
+              <a:t> </a:t>
+            </a:r>
+            <a:r>
+              <a:rPr lang="en-US" baseline="0" dirty="0" err="1" smtClean="0"/>
+              <a:t>olimpicos</a:t>
+            </a:r>
+            <a:r>
+              <a:rPr lang="en-US" baseline="0" smtClean="0"/>
+              <a:t>.</a:t>
+            </a:r>
+            <a:endParaRPr lang="en-US" baseline="0" dirty="0" smtClean="0"/>
           </a:p>
         </p:txBody>
       </p:sp>
@@ -3126,7 +3204,15 @@
           <a:p>
             <a:r>
               <a:rPr lang="en-US" baseline="0" dirty="0" smtClean="0"/>
-              <a:t>OG – Olympic Games</a:t>
+              <a:t>OG – </a:t>
+            </a:r>
+            <a:r>
+              <a:rPr lang="en-US" baseline="0" dirty="0" err="1" smtClean="0"/>
+              <a:t>Olimpic</a:t>
+            </a:r>
+            <a:r>
+              <a:rPr lang="en-US" baseline="0" dirty="0" smtClean="0"/>
+              <a:t> Games</a:t>
             </a:r>
           </a:p>
         </p:txBody>
@@ -3660,7 +3746,7 @@
             <a:fld id="{F3CC9924-33BC-4796-B0F9-D37DB5D899BF}" type="datetimeFigureOut">
               <a:rPr lang="pt-PT" smtClean="0"/>
               <a:pPr/>
-              <a:t>18/10/2015</a:t>
+              <a:t>19/10/2015</a:t>
             </a:fld>
             <a:endParaRPr lang="pt-PT"/>
           </a:p>
@@ -5720,60 +5806,6 @@
       </p:sp>
       <p:sp>
         <p:nvSpPr>
-          <p:cNvPr id="3" name="Content Placeholder 2"/>
-          <p:cNvSpPr>
-            <a:spLocks noGrp="1"/>
-          </p:cNvSpPr>
-          <p:nvPr>
-            <p:ph idx="1"/>
-          </p:nvPr>
-        </p:nvSpPr>
-        <p:spPr>
-          <a:xfrm>
-            <a:off x="467544" y="2492896"/>
-            <a:ext cx="8229600" cy="4087356"/>
-          </a:xfrm>
-        </p:spPr>
-        <p:txBody>
-          <a:bodyPr>
-            <a:noAutofit/>
-          </a:bodyPr>
-          <a:lstStyle/>
-          <a:p>
-            <a:pPr lvl="1"/>
-            <a:r>
-              <a:rPr lang="en-US" dirty="0" smtClean="0"/>
-              <a:t>Answer:</a:t>
-            </a:r>
-          </a:p>
-          <a:p>
-            <a:pPr lvl="1"/>
-            <a:r>
-              <a:rPr lang="en-US" dirty="0"/>
-              <a:t>	</a:t>
-            </a:r>
-            <a:r>
-              <a:rPr lang="en-US" dirty="0" smtClean="0"/>
-              <a:t>Is it possible that, the more population a country has, the more probability is to have more winners in the </a:t>
-            </a:r>
-            <a:r>
-              <a:rPr lang="en-US" dirty="0" err="1" smtClean="0"/>
-              <a:t>olympic</a:t>
-            </a:r>
-            <a:r>
-              <a:rPr lang="en-US" dirty="0" smtClean="0"/>
-              <a:t> games?</a:t>
-            </a:r>
-            <a:endParaRPr lang="en-US" dirty="0"/>
-          </a:p>
-          <a:p>
-            <a:pPr lvl="1" algn="ctr"/>
-            <a:endParaRPr lang="en-US" dirty="0" smtClean="0"/>
-          </a:p>
-        </p:txBody>
-      </p:sp>
-      <p:sp>
-        <p:nvSpPr>
           <p:cNvPr id="4" name="CaixaDeTexto 3"/>
           <p:cNvSpPr txBox="1"/>
           <p:nvPr/>
@@ -5822,7 +5854,7 @@
     </p:spTree>
     <p:extLst>
       <p:ext uri="{BB962C8B-B14F-4D97-AF65-F5344CB8AC3E}">
-        <p14:creationId xmlns:p14="http://schemas.microsoft.com/office/powerpoint/2010/main" val="681177764"/>
+        <p14:creationId xmlns:p14="http://schemas.microsoft.com/office/powerpoint/2010/main" val="3543650951"/>
       </p:ext>
     </p:extLst>
   </p:cSld>
@@ -5873,6 +5905,167 @@
           <a:p>
             <a:r>
               <a:rPr lang="en-US" dirty="0" smtClean="0"/>
+              <a:t>Derived data</a:t>
+            </a:r>
+            <a:endParaRPr lang="pt-PT" dirty="0"/>
+          </a:p>
+        </p:txBody>
+      </p:sp>
+      <p:sp>
+        <p:nvSpPr>
+          <p:cNvPr id="3" name="Content Placeholder 2"/>
+          <p:cNvSpPr>
+            <a:spLocks noGrp="1"/>
+          </p:cNvSpPr>
+          <p:nvPr>
+            <p:ph idx="1"/>
+          </p:nvPr>
+        </p:nvSpPr>
+        <p:spPr>
+          <a:xfrm>
+            <a:off x="467544" y="2492896"/>
+            <a:ext cx="8229600" cy="4087356"/>
+          </a:xfrm>
+        </p:spPr>
+        <p:txBody>
+          <a:bodyPr>
+            <a:noAutofit/>
+          </a:bodyPr>
+          <a:lstStyle/>
+          <a:p>
+            <a:pPr lvl="1"/>
+            <a:r>
+              <a:rPr lang="en-US" dirty="0" smtClean="0"/>
+              <a:t>Answer:</a:t>
+            </a:r>
+          </a:p>
+          <a:p>
+            <a:pPr lvl="1"/>
+            <a:r>
+              <a:rPr lang="en-US" dirty="0"/>
+              <a:t>	</a:t>
+            </a:r>
+            <a:r>
+              <a:rPr lang="en-US" dirty="0" smtClean="0"/>
+              <a:t>Is it possible that, the more population a country has, the more probability is to have more winners in the </a:t>
+            </a:r>
+            <a:r>
+              <a:rPr lang="en-US" dirty="0" err="1" smtClean="0"/>
+              <a:t>olympic</a:t>
+            </a:r>
+            <a:r>
+              <a:rPr lang="en-US" dirty="0" smtClean="0"/>
+              <a:t> games?</a:t>
+            </a:r>
+            <a:endParaRPr lang="en-US" dirty="0"/>
+          </a:p>
+          <a:p>
+            <a:pPr lvl="1" algn="ctr"/>
+            <a:endParaRPr lang="en-US" dirty="0" smtClean="0"/>
+          </a:p>
+        </p:txBody>
+      </p:sp>
+      <p:sp>
+        <p:nvSpPr>
+          <p:cNvPr id="4" name="CaixaDeTexto 3"/>
+          <p:cNvSpPr txBox="1"/>
+          <p:nvPr/>
+        </p:nvSpPr>
+        <p:spPr>
+          <a:xfrm>
+            <a:off x="2195736" y="1340768"/>
+            <a:ext cx="4392488" cy="1015663"/>
+          </a:xfrm>
+          <a:prstGeom prst="rect">
+            <a:avLst/>
+          </a:prstGeom>
+          <a:noFill/>
+        </p:spPr>
+        <p:txBody>
+          <a:bodyPr wrap="square" rtlCol="0">
+            <a:spAutoFit/>
+          </a:bodyPr>
+          <a:lstStyle/>
+          <a:p>
+            <a:pPr algn="ctr"/>
+            <a:r>
+              <a:rPr lang="pt-PT" sz="6000" b="1" dirty="0" err="1" smtClean="0">
+                <a:solidFill>
+                  <a:schemeClr val="tx2"/>
+                </a:solidFill>
+              </a:rPr>
+              <a:t>Why</a:t>
+            </a:r>
+            <a:r>
+              <a:rPr lang="pt-PT" sz="6000" b="1" dirty="0" smtClean="0">
+                <a:solidFill>
+                  <a:schemeClr val="tx2"/>
+                </a:solidFill>
+              </a:rPr>
+              <a:t>?</a:t>
+            </a:r>
+            <a:endParaRPr lang="pt-PT" sz="6000" b="1" dirty="0">
+              <a:solidFill>
+                <a:schemeClr val="tx2"/>
+              </a:solidFill>
+            </a:endParaRPr>
+          </a:p>
+        </p:txBody>
+      </p:sp>
+    </p:spTree>
+    <p:extLst>
+      <p:ext uri="{BB962C8B-B14F-4D97-AF65-F5344CB8AC3E}">
+        <p14:creationId xmlns:p14="http://schemas.microsoft.com/office/powerpoint/2010/main" val="681177764"/>
+      </p:ext>
+    </p:extLst>
+  </p:cSld>
+  <p:clrMapOvr>
+    <a:masterClrMapping/>
+  </p:clrMapOvr>
+  <p:timing>
+    <p:tnLst>
+      <p:par>
+        <p:cTn id="1" dur="indefinite" restart="never" nodeType="tmRoot"/>
+      </p:par>
+    </p:tnLst>
+  </p:timing>
+</p:sld>
+</file>
+
+<file path=ppt/slides/slide12.xml><?xml version="1.0" encoding="utf-8"?>
+<p:sld xmlns:a="http://schemas.openxmlformats.org/drawingml/2006/main" xmlns:r="http://schemas.openxmlformats.org/officeDocument/2006/relationships" xmlns:p="http://schemas.openxmlformats.org/presentationml/2006/main">
+  <p:cSld>
+    <p:spTree>
+      <p:nvGrpSpPr>
+        <p:cNvPr id="1" name=""/>
+        <p:cNvGrpSpPr/>
+        <p:nvPr/>
+      </p:nvGrpSpPr>
+      <p:grpSpPr>
+        <a:xfrm>
+          <a:off x="0" y="0"/>
+          <a:ext cx="0" cy="0"/>
+          <a:chOff x="0" y="0"/>
+          <a:chExt cx="0" cy="0"/>
+        </a:xfrm>
+      </p:grpSpPr>
+      <p:sp>
+        <p:nvSpPr>
+          <p:cNvPr id="2" name="Title 1"/>
+          <p:cNvSpPr>
+            <a:spLocks noGrp="1"/>
+          </p:cNvSpPr>
+          <p:nvPr>
+            <p:ph type="title"/>
+          </p:nvPr>
+        </p:nvSpPr>
+        <p:spPr/>
+        <p:txBody>
+          <a:bodyPr/>
+          <a:lstStyle/>
+          <a:p>
+            <a:r>
+              <a:rPr lang="en-US" dirty="0" smtClean="0"/>
               <a:t>Selected data</a:t>
             </a:r>
             <a:endParaRPr lang="pt-PT" dirty="0"/>
@@ -6042,7 +6235,7 @@
 </p:sld>
 </file>
 
-<file path=ppt/slides/slide12.xml><?xml version="1.0" encoding="utf-8"?>
+<file path=ppt/slides/slide13.xml><?xml version="1.0" encoding="utf-8"?>
 <p:sld xmlns:a="http://schemas.openxmlformats.org/drawingml/2006/main" xmlns:r="http://schemas.openxmlformats.org/officeDocument/2006/relationships" xmlns:p="http://schemas.openxmlformats.org/presentationml/2006/main">
   <p:cSld>
     <p:spTree>
@@ -7262,7 +7455,7 @@
 </p:sld>
 </file>
 
-<file path=ppt/slides/slide13.xml><?xml version="1.0" encoding="utf-8"?>
+<file path=ppt/slides/slide14.xml><?xml version="1.0" encoding="utf-8"?>
 <p:sld xmlns:a="http://schemas.openxmlformats.org/drawingml/2006/main" xmlns:r="http://schemas.openxmlformats.org/officeDocument/2006/relationships" xmlns:p="http://schemas.openxmlformats.org/presentationml/2006/main">
   <p:cSld>
     <p:spTree>
@@ -8294,7 +8487,7 @@
 </p:sld>
 </file>
 
-<file path=ppt/slides/slide14.xml><?xml version="1.0" encoding="utf-8"?>
+<file path=ppt/slides/slide15.xml><?xml version="1.0" encoding="utf-8"?>
 <p:sld xmlns:a="http://schemas.openxmlformats.org/drawingml/2006/main" xmlns:r="http://schemas.openxmlformats.org/officeDocument/2006/relationships" xmlns:p="http://schemas.openxmlformats.org/presentationml/2006/main">
   <p:cSld>
     <p:spTree>
@@ -8475,7 +8668,7 @@
 </p:sld>
 </file>
 
-<file path=ppt/slides/slide15.xml><?xml version="1.0" encoding="utf-8"?>
+<file path=ppt/slides/slide16.xml><?xml version="1.0" encoding="utf-8"?>
 <p:sld xmlns:a="http://schemas.openxmlformats.org/drawingml/2006/main" xmlns:r="http://schemas.openxmlformats.org/officeDocument/2006/relationships" xmlns:p="http://schemas.openxmlformats.org/presentationml/2006/main">
   <p:cSld>
     <p:spTree>
@@ -8715,7 +8908,7 @@
 </p:sld>
 </file>
 
-<file path=ppt/slides/slide16.xml><?xml version="1.0" encoding="utf-8"?>
+<file path=ppt/slides/slide17.xml><?xml version="1.0" encoding="utf-8"?>
 <p:sld xmlns:a="http://schemas.openxmlformats.org/drawingml/2006/main" xmlns:r="http://schemas.openxmlformats.org/officeDocument/2006/relationships" xmlns:p="http://schemas.openxmlformats.org/presentationml/2006/main">
   <p:cSld>
     <p:spTree>
@@ -8988,125 +9181,6 @@
 </p:sld>
 </file>
 
-<file path=ppt/slides/slide17.xml><?xml version="1.0" encoding="utf-8"?>
-<p:sld xmlns:a="http://schemas.openxmlformats.org/drawingml/2006/main" xmlns:r="http://schemas.openxmlformats.org/officeDocument/2006/relationships" xmlns:p="http://schemas.openxmlformats.org/presentationml/2006/main">
-  <p:cSld>
-    <p:spTree>
-      <p:nvGrpSpPr>
-        <p:cNvPr id="1" name=""/>
-        <p:cNvGrpSpPr/>
-        <p:nvPr/>
-      </p:nvGrpSpPr>
-      <p:grpSpPr>
-        <a:xfrm>
-          <a:off x="0" y="0"/>
-          <a:ext cx="0" cy="0"/>
-          <a:chOff x="0" y="0"/>
-          <a:chExt cx="0" cy="0"/>
-        </a:xfrm>
-      </p:grpSpPr>
-      <p:sp>
-        <p:nvSpPr>
-          <p:cNvPr id="6" name="Text Placeholder 5"/>
-          <p:cNvSpPr>
-            <a:spLocks noGrp="1"/>
-          </p:cNvSpPr>
-          <p:nvPr>
-            <p:ph type="body" sz="quarter" idx="11"/>
-          </p:nvPr>
-        </p:nvSpPr>
-        <p:spPr/>
-        <p:txBody>
-          <a:bodyPr/>
-          <a:lstStyle/>
-          <a:p>
-            <a:endParaRPr lang="en-US" dirty="0"/>
-          </a:p>
-        </p:txBody>
-      </p:sp>
-      <p:sp>
-        <p:nvSpPr>
-          <p:cNvPr id="29" name="Text Placeholder 28"/>
-          <p:cNvSpPr>
-            <a:spLocks noGrp="1"/>
-          </p:cNvSpPr>
-          <p:nvPr>
-            <p:ph type="body" sz="quarter" idx="10"/>
-          </p:nvPr>
-        </p:nvSpPr>
-        <p:spPr/>
-        <p:txBody>
-          <a:bodyPr/>
-          <a:lstStyle/>
-          <a:p>
-            <a:r>
-              <a:rPr lang="pt-PT" sz="16600" dirty="0" smtClean="0"/>
-              <a:t>03</a:t>
-            </a:r>
-            <a:endParaRPr lang="pt-PT" sz="16600" dirty="0"/>
-          </a:p>
-        </p:txBody>
-      </p:sp>
-      <p:sp>
-        <p:nvSpPr>
-          <p:cNvPr id="4" name="Title 3"/>
-          <p:cNvSpPr>
-            <a:spLocks noGrp="1"/>
-          </p:cNvSpPr>
-          <p:nvPr>
-            <p:ph type="title"/>
-          </p:nvPr>
-        </p:nvSpPr>
-        <p:spPr>
-          <a:xfrm>
-            <a:off x="2281222" y="3214686"/>
-            <a:ext cx="6786578" cy="3033714"/>
-          </a:xfrm>
-          <a:solidFill>
-            <a:srgbClr val="FFFFFF">
-              <a:alpha val="80000"/>
-            </a:srgbClr>
-          </a:solidFill>
-        </p:spPr>
-        <p:txBody>
-          <a:bodyPr rIns="288000">
-            <a:noAutofit/>
-          </a:bodyPr>
-          <a:lstStyle/>
-          <a:p>
-            <a:pPr marL="0" algn="r"/>
-            <a:r>
-              <a:rPr lang="pt-PT" sz="6000" dirty="0" smtClean="0"/>
-              <a:t>Data </a:t>
-            </a:r>
-            <a:r>
-              <a:rPr lang="pt-PT" sz="6000" dirty="0" err="1" smtClean="0"/>
-              <a:t>abstraction</a:t>
-            </a:r>
-            <a:endParaRPr lang="pt-PT" sz="6000" dirty="0"/>
-          </a:p>
-        </p:txBody>
-      </p:sp>
-    </p:spTree>
-    <p:extLst>
-      <p:ext uri="{BB962C8B-B14F-4D97-AF65-F5344CB8AC3E}">
-        <p14:creationId xmlns:p14="http://schemas.microsoft.com/office/powerpoint/2010/main" val="760072998"/>
-      </p:ext>
-    </p:extLst>
-  </p:cSld>
-  <p:clrMapOvr>
-    <a:masterClrMapping/>
-  </p:clrMapOvr>
-  <p:timing>
-    <p:tnLst>
-      <p:par>
-        <p:cTn id="1" dur="indefinite" restart="never" nodeType="tmRoot"/>
-      </p:par>
-    </p:tnLst>
-  </p:timing>
-</p:sld>
-</file>
-
 <file path=ppt/slides/slide18.xml><?xml version="1.0" encoding="utf-8"?>
 <p:sld xmlns:a="http://schemas.openxmlformats.org/drawingml/2006/main" xmlns:r="http://schemas.openxmlformats.org/officeDocument/2006/relationships" xmlns:p="http://schemas.openxmlformats.org/presentationml/2006/main">
   <p:cSld>
@@ -9126,12 +9200,12 @@
       </p:grpSpPr>
       <p:sp>
         <p:nvSpPr>
-          <p:cNvPr id="2" name="Title 1"/>
+          <p:cNvPr id="6" name="Text Placeholder 5"/>
           <p:cNvSpPr>
             <a:spLocks noGrp="1"/>
           </p:cNvSpPr>
           <p:nvPr>
-            <p:ph type="title"/>
+            <p:ph type="body" sz="quarter" idx="11"/>
           </p:nvPr>
         </p:nvSpPr>
         <p:spPr/>
@@ -9139,76 +9213,77 @@
           <a:bodyPr/>
           <a:lstStyle/>
           <a:p>
-            <a:r>
-              <a:rPr lang="en-US" dirty="0" smtClean="0"/>
-              <a:t>Data abstraction</a:t>
-            </a:r>
-            <a:endParaRPr lang="pt-PT" dirty="0"/>
-          </a:p>
-        </p:txBody>
-      </p:sp>
-      <p:sp>
-        <p:nvSpPr>
-          <p:cNvPr id="3" name="Content Placeholder 2"/>
+            <a:endParaRPr lang="en-US" dirty="0"/>
+          </a:p>
+        </p:txBody>
+      </p:sp>
+      <p:sp>
+        <p:nvSpPr>
+          <p:cNvPr id="29" name="Text Placeholder 28"/>
           <p:cNvSpPr>
             <a:spLocks noGrp="1"/>
           </p:cNvSpPr>
           <p:nvPr>
-            <p:ph idx="1"/>
+            <p:ph type="body" sz="quarter" idx="10"/>
+          </p:nvPr>
+        </p:nvSpPr>
+        <p:spPr/>
+        <p:txBody>
+          <a:bodyPr/>
+          <a:lstStyle/>
+          <a:p>
+            <a:r>
+              <a:rPr lang="pt-PT" sz="16600" dirty="0" smtClean="0"/>
+              <a:t>03</a:t>
+            </a:r>
+            <a:endParaRPr lang="pt-PT" sz="16600" dirty="0"/>
+          </a:p>
+        </p:txBody>
+      </p:sp>
+      <p:sp>
+        <p:nvSpPr>
+          <p:cNvPr id="4" name="Title 3"/>
+          <p:cNvSpPr>
+            <a:spLocks noGrp="1"/>
+          </p:cNvSpPr>
+          <p:nvPr>
+            <p:ph type="title"/>
           </p:nvPr>
         </p:nvSpPr>
         <p:spPr>
           <a:xfrm>
-            <a:off x="457200" y="1094346"/>
-            <a:ext cx="8229600" cy="5214974"/>
+            <a:off x="2281222" y="3214686"/>
+            <a:ext cx="6786578" cy="3033714"/>
           </a:xfrm>
+          <a:solidFill>
+            <a:srgbClr val="FFFFFF">
+              <a:alpha val="80000"/>
+            </a:srgbClr>
+          </a:solidFill>
         </p:spPr>
         <p:txBody>
-          <a:bodyPr>
+          <a:bodyPr rIns="288000">
             <a:noAutofit/>
           </a:bodyPr>
           <a:lstStyle/>
           <a:p>
-            <a:r>
-              <a:rPr lang="en-US" sz="3600" dirty="0" smtClean="0"/>
-              <a:t>Description:</a:t>
-            </a:r>
-          </a:p>
-          <a:p>
-            <a:pPr lvl="1"/>
-            <a:r>
-              <a:rPr lang="en-GB" sz="3200" dirty="0" smtClean="0"/>
-              <a:t>All Winners – A table </a:t>
-            </a:r>
-            <a:r>
-              <a:rPr lang="en-GB" sz="3200" dirty="0"/>
-              <a:t>containing all the podium finishes of the countries since 1896 until 2008.</a:t>
-            </a:r>
-            <a:endParaRPr lang="en-US" sz="3200" dirty="0" smtClean="0"/>
-          </a:p>
-          <a:p>
-            <a:r>
-              <a:rPr lang="en-US" sz="3600" dirty="0" smtClean="0"/>
-              <a:t>Dataset type:</a:t>
-            </a:r>
-          </a:p>
-          <a:p>
-            <a:pPr lvl="1"/>
-            <a:r>
-              <a:rPr lang="pt-PT" sz="3200" dirty="0" smtClean="0"/>
-              <a:t>Organized as a tree, first by the year, then the sport and then the NOC country code and the medal.</a:t>
-            </a:r>
-            <a:endParaRPr lang="en-US" sz="3600" dirty="0" smtClean="0"/>
-          </a:p>
-          <a:p>
-            <a:endParaRPr lang="en-US" sz="3600" dirty="0" smtClean="0"/>
+            <a:pPr marL="0" algn="r"/>
+            <a:r>
+              <a:rPr lang="pt-PT" sz="6000" dirty="0" smtClean="0"/>
+              <a:t>Data </a:t>
+            </a:r>
+            <a:r>
+              <a:rPr lang="pt-PT" sz="6000" dirty="0" err="1" smtClean="0"/>
+              <a:t>abstraction</a:t>
+            </a:r>
+            <a:endParaRPr lang="pt-PT" sz="6000" dirty="0"/>
           </a:p>
         </p:txBody>
       </p:sp>
     </p:spTree>
     <p:extLst>
       <p:ext uri="{BB962C8B-B14F-4D97-AF65-F5344CB8AC3E}">
-        <p14:creationId xmlns:p14="http://schemas.microsoft.com/office/powerpoint/2010/main" val="1967416131"/>
+        <p14:creationId xmlns:p14="http://schemas.microsoft.com/office/powerpoint/2010/main" val="760072998"/>
       </p:ext>
     </p:extLst>
   </p:cSld>
@@ -9287,80 +9362,46 @@
           </a:bodyPr>
           <a:lstStyle/>
           <a:p>
+            <a:r>
+              <a:rPr lang="en-US" sz="3600" dirty="0" smtClean="0"/>
+              <a:t>Description:</a:t>
+            </a:r>
+          </a:p>
+          <a:p>
             <a:pPr lvl="1"/>
             <a:r>
-              <a:rPr lang="en-US" sz="3200" dirty="0" smtClean="0"/>
-              <a:t>Item1 description</a:t>
+              <a:rPr lang="en-GB" sz="3200" dirty="0" smtClean="0"/>
+              <a:t>All Winners – A table </a:t>
+            </a:r>
+            <a:r>
+              <a:rPr lang="en-GB" sz="3200" dirty="0"/>
+              <a:t>containing all the podium finishes of the countries since 1896 until 2008.</a:t>
+            </a:r>
+            <a:endParaRPr lang="en-US" sz="3200" dirty="0" smtClean="0"/>
+          </a:p>
+          <a:p>
+            <a:r>
+              <a:rPr lang="en-US" sz="3600" dirty="0" smtClean="0"/>
+              <a:t>Dataset type:</a:t>
             </a:r>
           </a:p>
           <a:p>
             <a:pPr lvl="1"/>
             <a:r>
-              <a:rPr lang="en-US" sz="2400" dirty="0" smtClean="0"/>
-              <a:t>	Attribute1 description</a:t>
-            </a:r>
-            <a:endParaRPr lang="en-US" sz="1800" dirty="0"/>
-          </a:p>
-          <a:p>
-            <a:pPr lvl="1"/>
-            <a:r>
-              <a:rPr lang="en-US" sz="2400" dirty="0" smtClean="0"/>
-              <a:t>	Attribute2 description</a:t>
-            </a:r>
-          </a:p>
-          <a:p>
-            <a:pPr lvl="1"/>
-            <a:endParaRPr lang="en-US" sz="1800" dirty="0"/>
-          </a:p>
-          <a:p>
-            <a:pPr lvl="1"/>
-            <a:r>
-              <a:rPr lang="en-US" sz="3200" dirty="0" smtClean="0"/>
-              <a:t>Item2 description</a:t>
-            </a:r>
-          </a:p>
-          <a:p>
-            <a:pPr lvl="1"/>
-            <a:r>
-              <a:rPr lang="en-US" sz="2400" dirty="0" smtClean="0"/>
-              <a:t>	Attribute1 </a:t>
-            </a:r>
-            <a:r>
-              <a:rPr lang="en-US" sz="2400" dirty="0"/>
-              <a:t>description</a:t>
-            </a:r>
-            <a:endParaRPr lang="en-US" sz="1800" dirty="0"/>
-          </a:p>
-          <a:p>
-            <a:pPr lvl="1"/>
-            <a:r>
-              <a:rPr lang="en-US" sz="2400" dirty="0" smtClean="0"/>
-              <a:t>	Attribute2 </a:t>
-            </a:r>
-            <a:r>
-              <a:rPr lang="en-US" sz="2400" dirty="0"/>
-              <a:t>description</a:t>
-            </a:r>
-            <a:endParaRPr lang="en-US" sz="1800" dirty="0"/>
-          </a:p>
-          <a:p>
-            <a:pPr lvl="1"/>
-            <a:endParaRPr lang="en-US" sz="3200" dirty="0" smtClean="0"/>
-          </a:p>
-          <a:p>
-            <a:pPr lvl="1"/>
-            <a:r>
-              <a:rPr lang="en-US" sz="3200" dirty="0" smtClean="0"/>
-              <a:t>…</a:t>
-            </a:r>
-            <a:endParaRPr lang="en-US" sz="3200" dirty="0"/>
+              <a:rPr lang="pt-PT" sz="3200" dirty="0" smtClean="0"/>
+              <a:t>Organized as a tree, first by the year, then the sport and then the NOC country code and the medal.</a:t>
+            </a:r>
+            <a:endParaRPr lang="en-US" sz="3600" dirty="0" smtClean="0"/>
+          </a:p>
+          <a:p>
+            <a:endParaRPr lang="en-US" sz="3600" dirty="0" smtClean="0"/>
           </a:p>
         </p:txBody>
       </p:sp>
     </p:spTree>
     <p:extLst>
       <p:ext uri="{BB962C8B-B14F-4D97-AF65-F5344CB8AC3E}">
-        <p14:creationId xmlns:p14="http://schemas.microsoft.com/office/powerpoint/2010/main" val="1828594822"/>
+        <p14:creationId xmlns:p14="http://schemas.microsoft.com/office/powerpoint/2010/main" val="1967416131"/>
       </p:ext>
     </p:extLst>
   </p:cSld>
@@ -9549,17 +9590,80 @@
           </a:bodyPr>
           <a:lstStyle/>
           <a:p>
-            <a:r>
-              <a:rPr lang="en-US" sz="3600" dirty="0" smtClean="0"/>
-              <a:t>Semantics:</a:t>
-            </a:r>
+            <a:pPr lvl="1"/>
+            <a:r>
+              <a:rPr lang="en-US" sz="3200" dirty="0" smtClean="0"/>
+              <a:t>Item1 description</a:t>
+            </a:r>
+          </a:p>
+          <a:p>
+            <a:pPr lvl="1"/>
+            <a:r>
+              <a:rPr lang="en-US" sz="2400" dirty="0" smtClean="0"/>
+              <a:t>	Attribute1 description</a:t>
+            </a:r>
+            <a:endParaRPr lang="en-US" sz="1800" dirty="0"/>
+          </a:p>
+          <a:p>
+            <a:pPr lvl="1"/>
+            <a:r>
+              <a:rPr lang="en-US" sz="2400" dirty="0" smtClean="0"/>
+              <a:t>	Attribute2 description</a:t>
+            </a:r>
+          </a:p>
+          <a:p>
+            <a:pPr lvl="1"/>
+            <a:endParaRPr lang="en-US" sz="1800" dirty="0"/>
+          </a:p>
+          <a:p>
+            <a:pPr lvl="1"/>
+            <a:r>
+              <a:rPr lang="en-US" sz="3200" dirty="0" smtClean="0"/>
+              <a:t>Item2 description</a:t>
+            </a:r>
+          </a:p>
+          <a:p>
+            <a:pPr lvl="1"/>
+            <a:r>
+              <a:rPr lang="en-US" sz="2400" dirty="0" smtClean="0"/>
+              <a:t>	Attribute1 </a:t>
+            </a:r>
+            <a:r>
+              <a:rPr lang="en-US" sz="2400" dirty="0"/>
+              <a:t>description</a:t>
+            </a:r>
+            <a:endParaRPr lang="en-US" sz="1800" dirty="0"/>
+          </a:p>
+          <a:p>
+            <a:pPr lvl="1"/>
+            <a:r>
+              <a:rPr lang="en-US" sz="2400" dirty="0" smtClean="0"/>
+              <a:t>	Attribute2 </a:t>
+            </a:r>
+            <a:r>
+              <a:rPr lang="en-US" sz="2400" dirty="0"/>
+              <a:t>description</a:t>
+            </a:r>
+            <a:endParaRPr lang="en-US" sz="1800" dirty="0"/>
+          </a:p>
+          <a:p>
+            <a:pPr lvl="1"/>
+            <a:endParaRPr lang="en-US" sz="3200" dirty="0" smtClean="0"/>
+          </a:p>
+          <a:p>
+            <a:pPr lvl="1"/>
+            <a:r>
+              <a:rPr lang="en-US" sz="3200" dirty="0" smtClean="0"/>
+              <a:t>…</a:t>
+            </a:r>
+            <a:endParaRPr lang="en-US" sz="3200" dirty="0"/>
           </a:p>
         </p:txBody>
       </p:sp>
     </p:spTree>
     <p:extLst>
       <p:ext uri="{BB962C8B-B14F-4D97-AF65-F5344CB8AC3E}">
-        <p14:creationId xmlns:p14="http://schemas.microsoft.com/office/powerpoint/2010/main" val="3208609425"/>
+        <p14:creationId xmlns:p14="http://schemas.microsoft.com/office/powerpoint/2010/main" val="1828594822"/>
       </p:ext>
     </p:extLst>
   </p:cSld>
@@ -9595,12 +9699,12 @@
       </p:grpSpPr>
       <p:sp>
         <p:nvSpPr>
-          <p:cNvPr id="6" name="Text Placeholder 5"/>
+          <p:cNvPr id="2" name="Title 1"/>
           <p:cNvSpPr>
             <a:spLocks noGrp="1"/>
           </p:cNvSpPr>
           <p:nvPr>
-            <p:ph type="body" sz="quarter" idx="11"/>
+            <p:ph type="title"/>
           </p:nvPr>
         </p:nvSpPr>
         <p:spPr/>
@@ -9608,81 +9712,47 @@
           <a:bodyPr/>
           <a:lstStyle/>
           <a:p>
-            <a:endParaRPr lang="en-US" dirty="0"/>
-          </a:p>
-        </p:txBody>
-      </p:sp>
-      <p:sp>
-        <p:nvSpPr>
-          <p:cNvPr id="29" name="Text Placeholder 28"/>
+            <a:r>
+              <a:rPr lang="en-US" dirty="0" smtClean="0"/>
+              <a:t>Data abstraction</a:t>
+            </a:r>
+            <a:endParaRPr lang="pt-PT" dirty="0"/>
+          </a:p>
+        </p:txBody>
+      </p:sp>
+      <p:sp>
+        <p:nvSpPr>
+          <p:cNvPr id="3" name="Content Placeholder 2"/>
           <p:cNvSpPr>
             <a:spLocks noGrp="1"/>
           </p:cNvSpPr>
           <p:nvPr>
-            <p:ph type="body" sz="quarter" idx="10"/>
-          </p:nvPr>
-        </p:nvSpPr>
-        <p:spPr/>
-        <p:txBody>
-          <a:bodyPr/>
-          <a:lstStyle/>
-          <a:p>
-            <a:r>
-              <a:rPr lang="pt-PT" sz="16600" dirty="0" smtClean="0"/>
-              <a:t>04</a:t>
-            </a:r>
-            <a:endParaRPr lang="pt-PT" sz="16600" dirty="0"/>
-          </a:p>
-        </p:txBody>
-      </p:sp>
-      <p:sp>
-        <p:nvSpPr>
-          <p:cNvPr id="4" name="Title 3"/>
-          <p:cNvSpPr>
-            <a:spLocks noGrp="1"/>
-          </p:cNvSpPr>
-          <p:nvPr>
-            <p:ph type="title"/>
+            <p:ph idx="1"/>
           </p:nvPr>
         </p:nvSpPr>
         <p:spPr>
           <a:xfrm>
-            <a:off x="2281222" y="3214686"/>
-            <a:ext cx="6786578" cy="3033714"/>
+            <a:off x="457200" y="1094346"/>
+            <a:ext cx="8229600" cy="5214974"/>
           </a:xfrm>
-          <a:solidFill>
-            <a:srgbClr val="FFFFFF">
-              <a:alpha val="80000"/>
-            </a:srgbClr>
-          </a:solidFill>
         </p:spPr>
         <p:txBody>
-          <a:bodyPr rIns="288000">
+          <a:bodyPr>
             <a:noAutofit/>
           </a:bodyPr>
           <a:lstStyle/>
           <a:p>
-            <a:pPr marL="0" algn="r"/>
-            <a:r>
-              <a:rPr lang="pt-PT" sz="6000" dirty="0" err="1" smtClean="0"/>
-              <a:t>Dataset</a:t>
-            </a:r>
-            <a:r>
-              <a:rPr lang="pt-PT" sz="6000" dirty="0" smtClean="0"/>
-              <a:t> </a:t>
-            </a:r>
-            <a:r>
-              <a:rPr lang="pt-PT" sz="6000" dirty="0" err="1" smtClean="0"/>
-              <a:t>processing</a:t>
-            </a:r>
-            <a:endParaRPr lang="pt-PT" sz="6000" dirty="0"/>
+            <a:r>
+              <a:rPr lang="en-US" sz="3600" dirty="0" smtClean="0"/>
+              <a:t>Semantics:</a:t>
+            </a:r>
           </a:p>
         </p:txBody>
       </p:sp>
     </p:spTree>
     <p:extLst>
       <p:ext uri="{BB962C8B-B14F-4D97-AF65-F5344CB8AC3E}">
-        <p14:creationId xmlns:p14="http://schemas.microsoft.com/office/powerpoint/2010/main" val="4045494449"/>
+        <p14:creationId xmlns:p14="http://schemas.microsoft.com/office/powerpoint/2010/main" val="3208609425"/>
       </p:ext>
     </p:extLst>
   </p:cSld>
@@ -9718,12 +9788,12 @@
       </p:grpSpPr>
       <p:sp>
         <p:nvSpPr>
-          <p:cNvPr id="2" name="Title 1"/>
+          <p:cNvPr id="6" name="Text Placeholder 5"/>
           <p:cNvSpPr>
             <a:spLocks noGrp="1"/>
           </p:cNvSpPr>
           <p:nvPr>
-            <p:ph type="title"/>
+            <p:ph type="body" sz="quarter" idx="11"/>
           </p:nvPr>
         </p:nvSpPr>
         <p:spPr/>
@@ -9731,111 +9801,81 @@
           <a:bodyPr/>
           <a:lstStyle/>
           <a:p>
-            <a:r>
-              <a:rPr lang="en-US" dirty="0" smtClean="0"/>
-              <a:t>Dataset processing</a:t>
-            </a:r>
-            <a:endParaRPr lang="pt-PT" dirty="0"/>
-          </a:p>
-        </p:txBody>
-      </p:sp>
-      <p:sp>
-        <p:nvSpPr>
-          <p:cNvPr id="3" name="Content Placeholder 2"/>
+            <a:endParaRPr lang="en-US" dirty="0"/>
+          </a:p>
+        </p:txBody>
+      </p:sp>
+      <p:sp>
+        <p:nvSpPr>
+          <p:cNvPr id="29" name="Text Placeholder 28"/>
           <p:cNvSpPr>
             <a:spLocks noGrp="1"/>
           </p:cNvSpPr>
           <p:nvPr>
-            <p:ph idx="1"/>
+            <p:ph type="body" sz="quarter" idx="10"/>
+          </p:nvPr>
+        </p:nvSpPr>
+        <p:spPr/>
+        <p:txBody>
+          <a:bodyPr/>
+          <a:lstStyle/>
+          <a:p>
+            <a:r>
+              <a:rPr lang="pt-PT" sz="16600" dirty="0" smtClean="0"/>
+              <a:t>04</a:t>
+            </a:r>
+            <a:endParaRPr lang="pt-PT" sz="16600" dirty="0"/>
+          </a:p>
+        </p:txBody>
+      </p:sp>
+      <p:sp>
+        <p:nvSpPr>
+          <p:cNvPr id="4" name="Title 3"/>
+          <p:cNvSpPr>
+            <a:spLocks noGrp="1"/>
+          </p:cNvSpPr>
+          <p:nvPr>
+            <p:ph type="title"/>
           </p:nvPr>
         </p:nvSpPr>
         <p:spPr>
           <a:xfrm>
-            <a:off x="457200" y="1094346"/>
-            <a:ext cx="8229600" cy="5214974"/>
+            <a:off x="2281222" y="3214686"/>
+            <a:ext cx="6786578" cy="3033714"/>
           </a:xfrm>
+          <a:solidFill>
+            <a:srgbClr val="FFFFFF">
+              <a:alpha val="80000"/>
+            </a:srgbClr>
+          </a:solidFill>
         </p:spPr>
         <p:txBody>
-          <a:bodyPr>
+          <a:bodyPr rIns="288000">
             <a:noAutofit/>
           </a:bodyPr>
           <a:lstStyle/>
           <a:p>
-            <a:r>
-              <a:rPr lang="en-US" sz="4000" dirty="0" smtClean="0"/>
-              <a:t>Dataset cleaning description</a:t>
-            </a:r>
-          </a:p>
-          <a:p>
-            <a:pPr marL="1028700" lvl="1" indent="-571500">
-              <a:buFont typeface="Arial" panose="020B0604020202020204" pitchFamily="34" charset="0"/>
-              <a:buChar char="•"/>
-            </a:pPr>
-            <a:r>
-              <a:rPr lang="en-US" sz="3600" dirty="0" smtClean="0"/>
-              <a:t>Did all IOC values existed?</a:t>
-            </a:r>
-          </a:p>
-          <a:p>
-            <a:pPr marL="1028700" lvl="1" indent="-571500">
-              <a:buFont typeface="Arial" panose="020B0604020202020204" pitchFamily="34" charset="0"/>
-              <a:buChar char="•"/>
-            </a:pPr>
-            <a:r>
-              <a:rPr lang="en-US" sz="3600" dirty="0" smtClean="0"/>
-              <a:t>Were </a:t>
-            </a:r>
-            <a:r>
-              <a:rPr lang="en-US" sz="3600" dirty="0"/>
-              <a:t>the IOC codes the same </a:t>
-            </a:r>
-            <a:r>
-              <a:rPr lang="en-US" sz="3600" dirty="0" smtClean="0"/>
-              <a:t>as NOC </a:t>
-            </a:r>
-            <a:r>
-              <a:rPr lang="en-US" sz="3600" dirty="0"/>
-              <a:t>codes?</a:t>
-            </a:r>
-          </a:p>
-          <a:p>
-            <a:pPr marL="1028700" lvl="1" indent="-571500">
-              <a:buFont typeface="Arial" panose="020B0604020202020204" pitchFamily="34" charset="0"/>
-              <a:buChar char="•"/>
-            </a:pPr>
-            <a:r>
-              <a:rPr lang="en-US" sz="3600" dirty="0" smtClean="0"/>
-              <a:t>What to do with ISO codes with 3 letters?</a:t>
-            </a:r>
-          </a:p>
-          <a:p>
-            <a:pPr marL="1028700" lvl="1" indent="-571500">
-              <a:buFont typeface="Arial" panose="020B0604020202020204" pitchFamily="34" charset="0"/>
-              <a:buChar char="•"/>
-            </a:pPr>
-            <a:r>
-              <a:rPr lang="en-US" sz="3600" dirty="0" smtClean="0"/>
-              <a:t>(Parte do Miguel)</a:t>
-            </a:r>
-            <a:endParaRPr lang="en-US" sz="3600" dirty="0"/>
-          </a:p>
-          <a:p>
-            <a:pPr marL="1028700" lvl="1" indent="-571500">
-              <a:buFont typeface="Arial" panose="020B0604020202020204" pitchFamily="34" charset="0"/>
-              <a:buChar char="•"/>
-            </a:pPr>
-            <a:endParaRPr lang="en-US" sz="3600" dirty="0"/>
-          </a:p>
-          <a:p>
-            <a:pPr lvl="1"/>
-            <a:endParaRPr lang="en-US" sz="3600" dirty="0"/>
+            <a:pPr marL="0" algn="r"/>
+            <a:r>
+              <a:rPr lang="pt-PT" sz="6000" dirty="0" err="1" smtClean="0"/>
+              <a:t>Dataset</a:t>
+            </a:r>
+            <a:r>
+              <a:rPr lang="pt-PT" sz="6000" dirty="0" smtClean="0"/>
+              <a:t> </a:t>
+            </a:r>
+            <a:r>
+              <a:rPr lang="pt-PT" sz="6000" dirty="0" err="1" smtClean="0"/>
+              <a:t>processing</a:t>
+            </a:r>
+            <a:endParaRPr lang="pt-PT" sz="6000" dirty="0"/>
           </a:p>
         </p:txBody>
       </p:sp>
     </p:spTree>
     <p:extLst>
       <p:ext uri="{BB962C8B-B14F-4D97-AF65-F5344CB8AC3E}">
-        <p14:creationId xmlns:p14="http://schemas.microsoft.com/office/powerpoint/2010/main" val="3456915046"/>
+        <p14:creationId xmlns:p14="http://schemas.microsoft.com/office/powerpoint/2010/main" val="4045494449"/>
       </p:ext>
     </p:extLst>
   </p:cSld>
@@ -9916,9 +9956,161 @@
           <a:p>
             <a:r>
               <a:rPr lang="en-US" sz="4000" dirty="0" smtClean="0"/>
+              <a:t>Dataset cleaning description</a:t>
+            </a:r>
+          </a:p>
+          <a:p>
+            <a:pPr marL="1028700" lvl="1" indent="-571500">
+              <a:buFont typeface="Arial" panose="020B0604020202020204" pitchFamily="34" charset="0"/>
+              <a:buChar char="•"/>
+            </a:pPr>
+            <a:r>
+              <a:rPr lang="en-US" sz="3600" dirty="0" smtClean="0"/>
+              <a:t>Did all IOC values existed?</a:t>
+            </a:r>
+          </a:p>
+          <a:p>
+            <a:pPr marL="1028700" lvl="1" indent="-571500">
+              <a:buFont typeface="Arial" panose="020B0604020202020204" pitchFamily="34" charset="0"/>
+              <a:buChar char="•"/>
+            </a:pPr>
+            <a:r>
+              <a:rPr lang="en-US" sz="3600" dirty="0" smtClean="0"/>
+              <a:t>Were </a:t>
+            </a:r>
+            <a:r>
+              <a:rPr lang="en-US" sz="3600" dirty="0"/>
+              <a:t>the IOC codes the same </a:t>
+            </a:r>
+            <a:r>
+              <a:rPr lang="en-US" sz="3600" dirty="0" smtClean="0"/>
+              <a:t>as NOC </a:t>
+            </a:r>
+            <a:r>
+              <a:rPr lang="en-US" sz="3600" dirty="0"/>
+              <a:t>codes?</a:t>
+            </a:r>
+          </a:p>
+          <a:p>
+            <a:pPr marL="1028700" lvl="1" indent="-571500">
+              <a:buFont typeface="Arial" panose="020B0604020202020204" pitchFamily="34" charset="0"/>
+              <a:buChar char="•"/>
+            </a:pPr>
+            <a:r>
+              <a:rPr lang="en-US" sz="3600" dirty="0" smtClean="0"/>
+              <a:t>What to do with ISO codes with 3 letters?</a:t>
+            </a:r>
+          </a:p>
+          <a:p>
+            <a:pPr marL="1028700" lvl="1" indent="-571500">
+              <a:buFont typeface="Arial" panose="020B0604020202020204" pitchFamily="34" charset="0"/>
+              <a:buChar char="•"/>
+            </a:pPr>
+            <a:r>
+              <a:rPr lang="en-US" sz="3600" dirty="0" smtClean="0"/>
+              <a:t>(Parte do Miguel)</a:t>
+            </a:r>
+            <a:endParaRPr lang="en-US" sz="3600" dirty="0"/>
+          </a:p>
+          <a:p>
+            <a:pPr marL="1028700" lvl="1" indent="-571500">
+              <a:buFont typeface="Arial" panose="020B0604020202020204" pitchFamily="34" charset="0"/>
+              <a:buChar char="•"/>
+            </a:pPr>
+            <a:endParaRPr lang="en-US" sz="3600" dirty="0"/>
+          </a:p>
+          <a:p>
+            <a:pPr lvl="1"/>
+            <a:endParaRPr lang="en-US" sz="3600" dirty="0"/>
+          </a:p>
+        </p:txBody>
+      </p:sp>
+    </p:spTree>
+    <p:extLst>
+      <p:ext uri="{BB962C8B-B14F-4D97-AF65-F5344CB8AC3E}">
+        <p14:creationId xmlns:p14="http://schemas.microsoft.com/office/powerpoint/2010/main" val="3456915046"/>
+      </p:ext>
+    </p:extLst>
+  </p:cSld>
+  <p:clrMapOvr>
+    <a:masterClrMapping/>
+  </p:clrMapOvr>
+  <p:timing>
+    <p:tnLst>
+      <p:par>
+        <p:cTn id="1" dur="indefinite" restart="never" nodeType="tmRoot"/>
+      </p:par>
+    </p:tnLst>
+  </p:timing>
+</p:sld>
+</file>
+
+<file path=ppt/slides/slide24.xml><?xml version="1.0" encoding="utf-8"?>
+<p:sld xmlns:a="http://schemas.openxmlformats.org/drawingml/2006/main" xmlns:r="http://schemas.openxmlformats.org/officeDocument/2006/relationships" xmlns:p="http://schemas.openxmlformats.org/presentationml/2006/main">
+  <p:cSld>
+    <p:spTree>
+      <p:nvGrpSpPr>
+        <p:cNvPr id="1" name=""/>
+        <p:cNvGrpSpPr/>
+        <p:nvPr/>
+      </p:nvGrpSpPr>
+      <p:grpSpPr>
+        <a:xfrm>
+          <a:off x="0" y="0"/>
+          <a:ext cx="0" cy="0"/>
+          <a:chOff x="0" y="0"/>
+          <a:chExt cx="0" cy="0"/>
+        </a:xfrm>
+      </p:grpSpPr>
+      <p:sp>
+        <p:nvSpPr>
+          <p:cNvPr id="2" name="Title 1"/>
+          <p:cNvSpPr>
+            <a:spLocks noGrp="1"/>
+          </p:cNvSpPr>
+          <p:nvPr>
+            <p:ph type="title"/>
+          </p:nvPr>
+        </p:nvSpPr>
+        <p:spPr/>
+        <p:txBody>
+          <a:bodyPr/>
+          <a:lstStyle/>
+          <a:p>
+            <a:r>
+              <a:rPr lang="en-US" dirty="0" smtClean="0"/>
+              <a:t>Dataset processing</a:t>
+            </a:r>
+            <a:endParaRPr lang="pt-PT" dirty="0"/>
+          </a:p>
+        </p:txBody>
+      </p:sp>
+      <p:sp>
+        <p:nvSpPr>
+          <p:cNvPr id="3" name="Content Placeholder 2"/>
+          <p:cNvSpPr>
+            <a:spLocks noGrp="1"/>
+          </p:cNvSpPr>
+          <p:nvPr>
+            <p:ph idx="1"/>
+          </p:nvPr>
+        </p:nvSpPr>
+        <p:spPr>
+          <a:xfrm>
+            <a:off x="457200" y="1094346"/>
+            <a:ext cx="8229600" cy="5214974"/>
+          </a:xfrm>
+        </p:spPr>
+        <p:txBody>
+          <a:bodyPr>
+            <a:noAutofit/>
+          </a:bodyPr>
+          <a:lstStyle/>
+          <a:p>
+            <a:r>
+              <a:rPr lang="en-US" sz="4000" dirty="0" smtClean="0"/>
               <a:t>Problem found</a:t>
             </a:r>
-            <a:endParaRPr lang="en-US" sz="4000" dirty="0" smtClean="0"/>
           </a:p>
           <a:p>
             <a:pPr lvl="1"/>
@@ -10118,7 +10310,7 @@
 </p:sld>
 </file>
 
-<file path=ppt/slides/slide24.xml><?xml version="1.0" encoding="utf-8"?>
+<file path=ppt/slides/slide25.xml><?xml version="1.0" encoding="utf-8"?>
 <p:sld xmlns:a="http://schemas.openxmlformats.org/drawingml/2006/main" xmlns:r="http://schemas.openxmlformats.org/officeDocument/2006/relationships" xmlns:p="http://schemas.openxmlformats.org/presentationml/2006/main">
   <p:cSld>
     <p:spTree>
@@ -10184,7 +10376,6 @@
               <a:rPr lang="en-US" sz="4000" dirty="0" smtClean="0"/>
               <a:t>Problem found</a:t>
             </a:r>
-            <a:endParaRPr lang="en-US" sz="4000" dirty="0" smtClean="0"/>
           </a:p>
           <a:p>
             <a:pPr lvl="1"/>
@@ -10476,7 +10667,7 @@
 </p:sld>
 </file>
 
-<file path=ppt/slides/slide25.xml><?xml version="1.0" encoding="utf-8"?>
+<file path=ppt/slides/slide26.xml><?xml version="1.0" encoding="utf-8"?>
 <p:sld xmlns:a="http://schemas.openxmlformats.org/drawingml/2006/main" xmlns:r="http://schemas.openxmlformats.org/officeDocument/2006/relationships" xmlns:p="http://schemas.openxmlformats.org/presentationml/2006/main">
   <p:cSld>
     <p:spTree>
@@ -10540,13 +10731,8 @@
           <a:p>
             <a:r>
               <a:rPr lang="en-US" sz="4000" dirty="0" smtClean="0"/>
-              <a:t>Solution for Problem 1</a:t>
-            </a:r>
-            <a:r>
-              <a:rPr lang="en-US" sz="4000" dirty="0" smtClean="0"/>
-              <a:t>:</a:t>
-            </a:r>
-            <a:endParaRPr lang="en-US" sz="4000" dirty="0" smtClean="0"/>
+              <a:t>Solution for Problem 1:</a:t>
+            </a:r>
           </a:p>
           <a:p>
             <a:pPr lvl="1"/>
@@ -10554,7 +10740,6 @@
               <a:rPr lang="en-US" sz="3600" dirty="0" smtClean="0"/>
               <a:t>Gave the medals they won to the actual Germany</a:t>
             </a:r>
-            <a:endParaRPr lang="en-US" sz="3600" dirty="0" smtClean="0"/>
           </a:p>
           <a:p>
             <a:endParaRPr lang="en-US" sz="4000" dirty="0"/>
@@ -11045,7 +11230,7 @@
 </p:sld>
 </file>
 
-<file path=ppt/slides/slide26.xml><?xml version="1.0" encoding="utf-8"?>
+<file path=ppt/slides/slide27.xml><?xml version="1.0" encoding="utf-8"?>
 <p:sld xmlns:a="http://schemas.openxmlformats.org/drawingml/2006/main" xmlns:r="http://schemas.openxmlformats.org/officeDocument/2006/relationships" xmlns:p="http://schemas.openxmlformats.org/presentationml/2006/main">
   <p:cSld>
     <p:spTree>
@@ -11203,7 +11388,7 @@
 </p:sld>
 </file>
 
-<file path=ppt/slides/slide27.xml><?xml version="1.0" encoding="utf-8"?>
+<file path=ppt/slides/slide28.xml><?xml version="1.0" encoding="utf-8"?>
 <p:sld xmlns:a="http://schemas.openxmlformats.org/drawingml/2006/main" xmlns:r="http://schemas.openxmlformats.org/officeDocument/2006/relationships" xmlns:p="http://schemas.openxmlformats.org/presentationml/2006/main">
   <p:cSld>
     <p:spTree>
@@ -11437,7 +11622,7 @@
 </p:sld>
 </file>
 
-<file path=ppt/slides/slide28.xml><?xml version="1.0" encoding="utf-8"?>
+<file path=ppt/slides/slide29.xml><?xml version="1.0" encoding="utf-8"?>
 <p:sld xmlns:a="http://schemas.openxmlformats.org/drawingml/2006/main" xmlns:r="http://schemas.openxmlformats.org/officeDocument/2006/relationships" xmlns:p="http://schemas.openxmlformats.org/presentationml/2006/main">
   <p:cSld>
     <p:spTree>
@@ -11864,206 +12049,6 @@
 </p:sld>
 </file>
 
-<file path=ppt/slides/slide29.xml><?xml version="1.0" encoding="utf-8"?>
-<p:sld xmlns:a="http://schemas.openxmlformats.org/drawingml/2006/main" xmlns:r="http://schemas.openxmlformats.org/officeDocument/2006/relationships" xmlns:p="http://schemas.openxmlformats.org/presentationml/2006/main">
-  <p:cSld>
-    <p:spTree>
-      <p:nvGrpSpPr>
-        <p:cNvPr id="1" name=""/>
-        <p:cNvGrpSpPr/>
-        <p:nvPr/>
-      </p:nvGrpSpPr>
-      <p:grpSpPr>
-        <a:xfrm>
-          <a:off x="0" y="0"/>
-          <a:ext cx="0" cy="0"/>
-          <a:chOff x="0" y="0"/>
-          <a:chExt cx="0" cy="0"/>
-        </a:xfrm>
-      </p:grpSpPr>
-      <p:sp>
-        <p:nvSpPr>
-          <p:cNvPr id="2" name="Title 1"/>
-          <p:cNvSpPr>
-            <a:spLocks noGrp="1"/>
-          </p:cNvSpPr>
-          <p:nvPr>
-            <p:ph type="title"/>
-          </p:nvPr>
-        </p:nvSpPr>
-        <p:spPr/>
-        <p:txBody>
-          <a:bodyPr/>
-          <a:lstStyle/>
-          <a:p>
-            <a:r>
-              <a:rPr lang="en-US" dirty="0" smtClean="0"/>
-              <a:t>Dataset processing</a:t>
-            </a:r>
-            <a:endParaRPr lang="pt-PT" dirty="0"/>
-          </a:p>
-        </p:txBody>
-      </p:sp>
-      <p:sp>
-        <p:nvSpPr>
-          <p:cNvPr id="3" name="Content Placeholder 2"/>
-          <p:cNvSpPr>
-            <a:spLocks noGrp="1"/>
-          </p:cNvSpPr>
-          <p:nvPr>
-            <p:ph idx="1"/>
-          </p:nvPr>
-        </p:nvSpPr>
-        <p:spPr>
-          <a:xfrm>
-            <a:off x="457200" y="1094346"/>
-            <a:ext cx="8229600" cy="5214974"/>
-          </a:xfrm>
-        </p:spPr>
-        <p:txBody>
-          <a:bodyPr>
-            <a:noAutofit/>
-          </a:bodyPr>
-          <a:lstStyle/>
-          <a:p>
-            <a:r>
-              <a:rPr lang="en-US" sz="4000" dirty="0"/>
-              <a:t>Problem found</a:t>
-            </a:r>
-          </a:p>
-          <a:p>
-            <a:pPr lvl="1"/>
-            <a:r>
-              <a:rPr lang="en-US" sz="3600" dirty="0" smtClean="0"/>
-              <a:t>3-letter ISO Codes </a:t>
-            </a:r>
-            <a:r>
-              <a:rPr lang="en-US" sz="3600" dirty="0" err="1" smtClean="0"/>
-              <a:t>Conflite</a:t>
-            </a:r>
-            <a:endParaRPr lang="en-US" sz="3600" dirty="0"/>
-          </a:p>
-          <a:p>
-            <a:r>
-              <a:rPr lang="en-US" sz="4000" dirty="0" smtClean="0"/>
-              <a:t>	</a:t>
-            </a:r>
-            <a:endParaRPr lang="en-US" sz="4000" dirty="0"/>
-          </a:p>
-        </p:txBody>
-      </p:sp>
-      <p:pic>
-        <p:nvPicPr>
-          <p:cNvPr id="7170" name="Picture 2"/>
-          <p:cNvPicPr>
-            <a:picLocks noChangeAspect="1" noChangeArrowheads="1"/>
-          </p:cNvPicPr>
-          <p:nvPr/>
-        </p:nvPicPr>
-        <p:blipFill>
-          <a:blip r:embed="rId3">
-            <a:extLst>
-              <a:ext uri="{28A0092B-C50C-407E-A947-70E740481C1C}">
-                <a14:useLocalDpi xmlns:a14="http://schemas.microsoft.com/office/drawing/2010/main" val="0"/>
-              </a:ext>
-            </a:extLst>
-          </a:blip>
-          <a:srcRect/>
-          <a:stretch>
-            <a:fillRect/>
-          </a:stretch>
-        </p:blipFill>
-        <p:spPr bwMode="auto">
-          <a:xfrm>
-            <a:off x="1043608" y="2492896"/>
-            <a:ext cx="4094820" cy="2729880"/>
-          </a:xfrm>
-          <a:prstGeom prst="rect">
-            <a:avLst/>
-          </a:prstGeom>
-          <a:noFill/>
-          <a:ln>
-            <a:noFill/>
-          </a:ln>
-          <a:extLst>
-            <a:ext uri="{909E8E84-426E-40DD-AFC4-6F175D3DCCD1}">
-              <a14:hiddenFill xmlns:a14="http://schemas.microsoft.com/office/drawing/2010/main">
-                <a:solidFill>
-                  <a:schemeClr val="accent1"/>
-                </a:solidFill>
-              </a14:hiddenFill>
-            </a:ext>
-            <a:ext uri="{91240B29-F687-4F45-9708-019B960494DF}">
-              <a14:hiddenLine xmlns:a14="http://schemas.microsoft.com/office/drawing/2010/main" w="9525">
-                <a:solidFill>
-                  <a:schemeClr val="tx1"/>
-                </a:solidFill>
-                <a:miter lim="800000"/>
-                <a:headEnd/>
-                <a:tailEnd/>
-              </a14:hiddenLine>
-            </a:ext>
-          </a:extLst>
-        </p:spPr>
-      </p:pic>
-      <p:sp>
-        <p:nvSpPr>
-          <p:cNvPr id="8" name="CaixaDeTexto 7"/>
-          <p:cNvSpPr txBox="1"/>
-          <p:nvPr/>
-        </p:nvSpPr>
-        <p:spPr>
-          <a:xfrm>
-            <a:off x="5436096" y="2703215"/>
-            <a:ext cx="2846420" cy="584775"/>
-          </a:xfrm>
-          <a:prstGeom prst="rect">
-            <a:avLst/>
-          </a:prstGeom>
-          <a:noFill/>
-        </p:spPr>
-        <p:txBody>
-          <a:bodyPr wrap="none" rtlCol="0">
-            <a:spAutoFit/>
-          </a:bodyPr>
-          <a:lstStyle/>
-          <a:p>
-            <a:r>
-              <a:rPr lang="pt-PT" sz="3200" dirty="0" smtClean="0"/>
-              <a:t>ISO </a:t>
-            </a:r>
-            <a:r>
-              <a:rPr lang="pt-PT" sz="3200" dirty="0" err="1" smtClean="0"/>
-              <a:t>Code</a:t>
-            </a:r>
-            <a:r>
-              <a:rPr lang="pt-PT" sz="3200" dirty="0" smtClean="0"/>
-              <a:t> -&gt; PRT</a:t>
-            </a:r>
-            <a:endParaRPr lang="pt-PT" sz="3200" dirty="0"/>
-          </a:p>
-        </p:txBody>
-      </p:sp>
-    </p:spTree>
-    <p:extLst>
-      <p:ext uri="{BB962C8B-B14F-4D97-AF65-F5344CB8AC3E}">
-        <p14:creationId xmlns:p14="http://schemas.microsoft.com/office/powerpoint/2010/main" val="3378263978"/>
-      </p:ext>
-    </p:extLst>
-  </p:cSld>
-  <p:clrMapOvr>
-    <a:masterClrMapping/>
-  </p:clrMapOvr>
-  <p:timing>
-    <p:tnLst>
-      <p:par>
-        <p:cTn id="1" dur="indefinite" restart="never" nodeType="tmRoot"/>
-      </p:par>
-    </p:tnLst>
-  </p:timing>
-</p:sld>
-</file>
-
 <file path=ppt/slides/slide3.xml><?xml version="1.0" encoding="utf-8"?>
 <p:sld xmlns:a="http://schemas.openxmlformats.org/drawingml/2006/main" xmlns:r="http://schemas.openxmlformats.org/officeDocument/2006/relationships" xmlns:p="http://schemas.openxmlformats.org/presentationml/2006/main">
   <p:cSld>
@@ -12135,11 +12120,19 @@
             </a:r>
             <a:r>
               <a:rPr lang="en-GB" sz="3200" dirty="0"/>
-              <a:t>the podium finishes </a:t>
+              <a:t>the podium </a:t>
             </a:r>
             <a:r>
               <a:rPr lang="en-GB" sz="3200" dirty="0" smtClean="0"/>
-              <a:t>of all time.</a:t>
+              <a:t>finishers </a:t>
+            </a:r>
+            <a:r>
+              <a:rPr lang="en-GB" sz="3200" dirty="0" smtClean="0"/>
+              <a:t>of all </a:t>
+            </a:r>
+            <a:r>
+              <a:rPr lang="en-GB" sz="3200" dirty="0" smtClean="0"/>
+              <a:t>time, for each edition and for each sport</a:t>
             </a:r>
             <a:endParaRPr lang="en-US" sz="4000" dirty="0" smtClean="0"/>
           </a:p>
@@ -12163,13 +12156,13 @@
           <p:nvPr>
             <p:extLst>
               <p:ext uri="{D42A27DB-BD31-4B8C-83A1-F6EECF244321}">
-                <p14:modId xmlns:p14="http://schemas.microsoft.com/office/powerpoint/2010/main" val="2755826523"/>
+                <p14:modId xmlns:p14="http://schemas.microsoft.com/office/powerpoint/2010/main" val="1390103900"/>
               </p:ext>
             </p:extLst>
           </p:nvPr>
         </p:nvGraphicFramePr>
         <p:xfrm>
-          <a:off x="611560" y="4077072"/>
+          <a:off x="539552" y="4653136"/>
           <a:ext cx="7992889" cy="576064"/>
         </p:xfrm>
         <a:graphic>
@@ -12313,12 +12306,12 @@
                     <a:p>
                       <a:pPr algn="l" fontAlgn="t"/>
                       <a:r>
-                        <a:rPr lang="en-US" sz="1400" u="none" strike="noStrike">
+                        <a:rPr lang="en-US" sz="1400" u="none" strike="noStrike" dirty="0">
                           <a:effectLst/>
                         </a:rPr>
                         <a:t>NOC</a:t>
                       </a:r>
-                      <a:endParaRPr lang="en-US" sz="1400" b="1" i="0" u="none" strike="noStrike">
+                      <a:endParaRPr lang="en-US" sz="1400" b="1" i="0" u="none" strike="noStrike" dirty="0">
                         <a:solidFill>
                           <a:srgbClr val="000000"/>
                         </a:solidFill>
@@ -12741,6 +12734,206 @@
           <a:lstStyle/>
           <a:p>
             <a:r>
+              <a:rPr lang="en-US" sz="4000" dirty="0"/>
+              <a:t>Problem found</a:t>
+            </a:r>
+          </a:p>
+          <a:p>
+            <a:pPr lvl="1"/>
+            <a:r>
+              <a:rPr lang="en-US" sz="3600" dirty="0" smtClean="0"/>
+              <a:t>3-letter ISO Codes </a:t>
+            </a:r>
+            <a:r>
+              <a:rPr lang="en-US" sz="3600" dirty="0" err="1" smtClean="0"/>
+              <a:t>Conflite</a:t>
+            </a:r>
+            <a:endParaRPr lang="en-US" sz="3600" dirty="0"/>
+          </a:p>
+          <a:p>
+            <a:r>
+              <a:rPr lang="en-US" sz="4000" dirty="0" smtClean="0"/>
+              <a:t>	</a:t>
+            </a:r>
+            <a:endParaRPr lang="en-US" sz="4000" dirty="0"/>
+          </a:p>
+        </p:txBody>
+      </p:sp>
+      <p:pic>
+        <p:nvPicPr>
+          <p:cNvPr id="7170" name="Picture 2"/>
+          <p:cNvPicPr>
+            <a:picLocks noChangeAspect="1" noChangeArrowheads="1"/>
+          </p:cNvPicPr>
+          <p:nvPr/>
+        </p:nvPicPr>
+        <p:blipFill>
+          <a:blip r:embed="rId3">
+            <a:extLst>
+              <a:ext uri="{28A0092B-C50C-407E-A947-70E740481C1C}">
+                <a14:useLocalDpi xmlns:a14="http://schemas.microsoft.com/office/drawing/2010/main" val="0"/>
+              </a:ext>
+            </a:extLst>
+          </a:blip>
+          <a:srcRect/>
+          <a:stretch>
+            <a:fillRect/>
+          </a:stretch>
+        </p:blipFill>
+        <p:spPr bwMode="auto">
+          <a:xfrm>
+            <a:off x="1043608" y="2492896"/>
+            <a:ext cx="4094820" cy="2729880"/>
+          </a:xfrm>
+          <a:prstGeom prst="rect">
+            <a:avLst/>
+          </a:prstGeom>
+          <a:noFill/>
+          <a:ln>
+            <a:noFill/>
+          </a:ln>
+          <a:extLst>
+            <a:ext uri="{909E8E84-426E-40DD-AFC4-6F175D3DCCD1}">
+              <a14:hiddenFill xmlns:a14="http://schemas.microsoft.com/office/drawing/2010/main">
+                <a:solidFill>
+                  <a:schemeClr val="accent1"/>
+                </a:solidFill>
+              </a14:hiddenFill>
+            </a:ext>
+            <a:ext uri="{91240B29-F687-4F45-9708-019B960494DF}">
+              <a14:hiddenLine xmlns:a14="http://schemas.microsoft.com/office/drawing/2010/main" w="9525">
+                <a:solidFill>
+                  <a:schemeClr val="tx1"/>
+                </a:solidFill>
+                <a:miter lim="800000"/>
+                <a:headEnd/>
+                <a:tailEnd/>
+              </a14:hiddenLine>
+            </a:ext>
+          </a:extLst>
+        </p:spPr>
+      </p:pic>
+      <p:sp>
+        <p:nvSpPr>
+          <p:cNvPr id="8" name="CaixaDeTexto 7"/>
+          <p:cNvSpPr txBox="1"/>
+          <p:nvPr/>
+        </p:nvSpPr>
+        <p:spPr>
+          <a:xfrm>
+            <a:off x="5436096" y="2703215"/>
+            <a:ext cx="2846420" cy="584775"/>
+          </a:xfrm>
+          <a:prstGeom prst="rect">
+            <a:avLst/>
+          </a:prstGeom>
+          <a:noFill/>
+        </p:spPr>
+        <p:txBody>
+          <a:bodyPr wrap="none" rtlCol="0">
+            <a:spAutoFit/>
+          </a:bodyPr>
+          <a:lstStyle/>
+          <a:p>
+            <a:r>
+              <a:rPr lang="pt-PT" sz="3200" dirty="0" smtClean="0"/>
+              <a:t>ISO </a:t>
+            </a:r>
+            <a:r>
+              <a:rPr lang="pt-PT" sz="3200" dirty="0" err="1" smtClean="0"/>
+              <a:t>Code</a:t>
+            </a:r>
+            <a:r>
+              <a:rPr lang="pt-PT" sz="3200" dirty="0" smtClean="0"/>
+              <a:t> -&gt; PRT</a:t>
+            </a:r>
+            <a:endParaRPr lang="pt-PT" sz="3200" dirty="0"/>
+          </a:p>
+        </p:txBody>
+      </p:sp>
+    </p:spTree>
+    <p:extLst>
+      <p:ext uri="{BB962C8B-B14F-4D97-AF65-F5344CB8AC3E}">
+        <p14:creationId xmlns:p14="http://schemas.microsoft.com/office/powerpoint/2010/main" val="3378263978"/>
+      </p:ext>
+    </p:extLst>
+  </p:cSld>
+  <p:clrMapOvr>
+    <a:masterClrMapping/>
+  </p:clrMapOvr>
+  <p:timing>
+    <p:tnLst>
+      <p:par>
+        <p:cTn id="1" dur="indefinite" restart="never" nodeType="tmRoot"/>
+      </p:par>
+    </p:tnLst>
+  </p:timing>
+</p:sld>
+</file>
+
+<file path=ppt/slides/slide31.xml><?xml version="1.0" encoding="utf-8"?>
+<p:sld xmlns:a="http://schemas.openxmlformats.org/drawingml/2006/main" xmlns:r="http://schemas.openxmlformats.org/officeDocument/2006/relationships" xmlns:p="http://schemas.openxmlformats.org/presentationml/2006/main">
+  <p:cSld>
+    <p:spTree>
+      <p:nvGrpSpPr>
+        <p:cNvPr id="1" name=""/>
+        <p:cNvGrpSpPr/>
+        <p:nvPr/>
+      </p:nvGrpSpPr>
+      <p:grpSpPr>
+        <a:xfrm>
+          <a:off x="0" y="0"/>
+          <a:ext cx="0" cy="0"/>
+          <a:chOff x="0" y="0"/>
+          <a:chExt cx="0" cy="0"/>
+        </a:xfrm>
+      </p:grpSpPr>
+      <p:sp>
+        <p:nvSpPr>
+          <p:cNvPr id="2" name="Title 1"/>
+          <p:cNvSpPr>
+            <a:spLocks noGrp="1"/>
+          </p:cNvSpPr>
+          <p:nvPr>
+            <p:ph type="title"/>
+          </p:nvPr>
+        </p:nvSpPr>
+        <p:spPr/>
+        <p:txBody>
+          <a:bodyPr/>
+          <a:lstStyle/>
+          <a:p>
+            <a:r>
+              <a:rPr lang="en-US" dirty="0" smtClean="0"/>
+              <a:t>Dataset processing</a:t>
+            </a:r>
+            <a:endParaRPr lang="pt-PT" dirty="0"/>
+          </a:p>
+        </p:txBody>
+      </p:sp>
+      <p:sp>
+        <p:nvSpPr>
+          <p:cNvPr id="3" name="Content Placeholder 2"/>
+          <p:cNvSpPr>
+            <a:spLocks noGrp="1"/>
+          </p:cNvSpPr>
+          <p:nvPr>
+            <p:ph idx="1"/>
+          </p:nvPr>
+        </p:nvSpPr>
+        <p:spPr>
+          <a:xfrm>
+            <a:off x="457200" y="1094346"/>
+            <a:ext cx="8229600" cy="5214974"/>
+          </a:xfrm>
+        </p:spPr>
+        <p:txBody>
+          <a:bodyPr>
+            <a:noAutofit/>
+          </a:bodyPr>
+          <a:lstStyle/>
+          <a:p>
+            <a:r>
               <a:rPr lang="en-US" sz="4000" dirty="0" smtClean="0"/>
               <a:t>Solution for problem 3</a:t>
             </a:r>
@@ -13099,7 +13292,7 @@
 </p:sld>
 </file>
 
-<file path=ppt/slides/slide31.xml><?xml version="1.0" encoding="utf-8"?>
+<file path=ppt/slides/slide32.xml><?xml version="1.0" encoding="utf-8"?>
 <p:sld xmlns:a="http://schemas.openxmlformats.org/drawingml/2006/main" xmlns:r="http://schemas.openxmlformats.org/officeDocument/2006/relationships" xmlns:p="http://schemas.openxmlformats.org/presentationml/2006/main">
   <p:cSld>
     <p:spTree>
@@ -13214,7 +13407,7 @@
 </p:sld>
 </file>
 
-<file path=ppt/slides/slide32.xml><?xml version="1.0" encoding="utf-8"?>
+<file path=ppt/slides/slide33.xml><?xml version="1.0" encoding="utf-8"?>
 <p:sld xmlns:a="http://schemas.openxmlformats.org/drawingml/2006/main" xmlns:r="http://schemas.openxmlformats.org/officeDocument/2006/relationships" xmlns:p="http://schemas.openxmlformats.org/presentationml/2006/main">
   <p:cSld>
     <p:spTree>
@@ -13557,7 +13750,7 @@
 </p:sld>
 </file>
 
-<file path=ppt/slides/slide33.xml><?xml version="1.0" encoding="utf-8"?>
+<file path=ppt/slides/slide34.xml><?xml version="1.0" encoding="utf-8"?>
 <p:sld xmlns:a="http://schemas.openxmlformats.org/drawingml/2006/main" xmlns:r="http://schemas.openxmlformats.org/officeDocument/2006/relationships" xmlns:p="http://schemas.openxmlformats.org/presentationml/2006/main">
   <p:cSld>
     <p:spTree>
@@ -14327,6 +14520,436 @@
             </a:pPr>
             <a:r>
               <a:rPr lang="en-GB" sz="3200" dirty="0" smtClean="0"/>
+              <a:t>Total – </a:t>
+            </a:r>
+            <a:r>
+              <a:rPr lang="en-GB" sz="3200" dirty="0"/>
+              <a:t>contains </a:t>
+            </a:r>
+            <a:r>
+              <a:rPr lang="en-GB" sz="3200" dirty="0" smtClean="0"/>
+              <a:t>the country name, their </a:t>
+            </a:r>
+            <a:r>
+              <a:rPr lang="en-GB" sz="3200" dirty="0" smtClean="0"/>
+              <a:t>NOC code and the medals won since the beginning of the Olympic Games</a:t>
+            </a:r>
+            <a:endParaRPr lang="en-US" sz="4000" dirty="0" smtClean="0"/>
+          </a:p>
+          <a:p>
+            <a:r>
+              <a:rPr lang="en-US" sz="4000" dirty="0" smtClean="0"/>
+              <a:t>Data sample</a:t>
+            </a:r>
+          </a:p>
+        </p:txBody>
+      </p:sp>
+      <p:graphicFrame>
+        <p:nvGraphicFramePr>
+          <p:cNvPr id="4" name="Tabela 3"/>
+          <p:cNvGraphicFramePr>
+            <a:graphicFrameLocks noGrp="1"/>
+          </p:cNvGraphicFramePr>
+          <p:nvPr>
+            <p:extLst>
+              <p:ext uri="{D42A27DB-BD31-4B8C-83A1-F6EECF244321}">
+                <p14:modId xmlns:p14="http://schemas.microsoft.com/office/powerpoint/2010/main" val="2643973528"/>
+              </p:ext>
+            </p:extLst>
+          </p:nvPr>
+        </p:nvGraphicFramePr>
+        <p:xfrm>
+          <a:off x="755576" y="4842296"/>
+          <a:ext cx="7454900" cy="323850"/>
+        </p:xfrm>
+        <a:graphic>
+          <a:graphicData uri="http://schemas.openxmlformats.org/drawingml/2006/table">
+            <a:tbl>
+              <a:tblPr>
+                <a:tableStyleId>{5C22544A-7EE6-4342-B048-85BDC9FD1C3A}</a:tableStyleId>
+              </a:tblPr>
+              <a:tblGrid>
+                <a:gridCol w="1676400"/>
+                <a:gridCol w="1155700"/>
+                <a:gridCol w="1155700"/>
+                <a:gridCol w="1155700"/>
+                <a:gridCol w="1155700"/>
+                <a:gridCol w="1155700"/>
+              </a:tblGrid>
+              <a:tr h="161925">
+                <a:tc>
+                  <a:txBody>
+                    <a:bodyPr/>
+                    <a:lstStyle/>
+                    <a:p>
+                      <a:pPr algn="ctr" fontAlgn="b"/>
+                      <a:r>
+                        <a:rPr lang="pt-PT" sz="1000" u="none" strike="noStrike" dirty="0">
+                          <a:effectLst/>
+                        </a:rPr>
+                        <a:t>Country</a:t>
+                      </a:r>
+                      <a:endParaRPr lang="pt-PT" sz="1000" b="1" i="0" u="none" strike="noStrike" dirty="0">
+                        <a:solidFill>
+                          <a:srgbClr val="000000"/>
+                        </a:solidFill>
+                        <a:effectLst/>
+                        <a:latin typeface="Arial"/>
+                      </a:endParaRPr>
+                    </a:p>
+                  </a:txBody>
+                  <a:tcPr marL="9525" marR="9525" marT="9525" marB="0" anchor="b"/>
+                </a:tc>
+                <a:tc>
+                  <a:txBody>
+                    <a:bodyPr/>
+                    <a:lstStyle/>
+                    <a:p>
+                      <a:pPr algn="ctr" fontAlgn="b"/>
+                      <a:r>
+                        <a:rPr lang="pt-PT" sz="1000" u="none" strike="noStrike">
+                          <a:effectLst/>
+                        </a:rPr>
+                        <a:t>NOC CODE</a:t>
+                      </a:r>
+                      <a:endParaRPr lang="pt-PT" sz="1000" b="1" i="0" u="none" strike="noStrike">
+                        <a:solidFill>
+                          <a:srgbClr val="000000"/>
+                        </a:solidFill>
+                        <a:effectLst/>
+                        <a:latin typeface="Arial"/>
+                      </a:endParaRPr>
+                    </a:p>
+                  </a:txBody>
+                  <a:tcPr marL="9525" marR="9525" marT="9525" marB="0" anchor="b"/>
+                </a:tc>
+                <a:tc>
+                  <a:txBody>
+                    <a:bodyPr/>
+                    <a:lstStyle/>
+                    <a:p>
+                      <a:pPr algn="ctr" fontAlgn="b"/>
+                      <a:r>
+                        <a:rPr lang="pt-PT" sz="1000" u="none" strike="noStrike" dirty="0">
+                          <a:effectLst/>
+                        </a:rPr>
+                        <a:t>Total</a:t>
+                      </a:r>
+                      <a:endParaRPr lang="pt-PT" sz="1000" b="1" i="0" u="none" strike="noStrike" dirty="0">
+                        <a:solidFill>
+                          <a:srgbClr val="000000"/>
+                        </a:solidFill>
+                        <a:effectLst/>
+                        <a:latin typeface="Arial"/>
+                      </a:endParaRPr>
+                    </a:p>
+                  </a:txBody>
+                  <a:tcPr marL="9525" marR="9525" marT="9525" marB="0" anchor="b"/>
+                </a:tc>
+                <a:tc>
+                  <a:txBody>
+                    <a:bodyPr/>
+                    <a:lstStyle/>
+                    <a:p>
+                      <a:pPr algn="ctr" fontAlgn="b"/>
+                      <a:r>
+                        <a:rPr lang="pt-PT" sz="1000" u="none" strike="noStrike">
+                          <a:effectLst/>
+                        </a:rPr>
+                        <a:t>Golds</a:t>
+                      </a:r>
+                      <a:endParaRPr lang="pt-PT" sz="1000" b="1" i="0" u="none" strike="noStrike">
+                        <a:solidFill>
+                          <a:srgbClr val="000000"/>
+                        </a:solidFill>
+                        <a:effectLst/>
+                        <a:latin typeface="Arial"/>
+                      </a:endParaRPr>
+                    </a:p>
+                  </a:txBody>
+                  <a:tcPr marL="9525" marR="9525" marT="9525" marB="0" anchor="b"/>
+                </a:tc>
+                <a:tc>
+                  <a:txBody>
+                    <a:bodyPr/>
+                    <a:lstStyle/>
+                    <a:p>
+                      <a:pPr algn="ctr" fontAlgn="b"/>
+                      <a:r>
+                        <a:rPr lang="pt-PT" sz="1000" u="none" strike="noStrike">
+                          <a:effectLst/>
+                        </a:rPr>
+                        <a:t>Silvers</a:t>
+                      </a:r>
+                      <a:endParaRPr lang="pt-PT" sz="1000" b="1" i="0" u="none" strike="noStrike">
+                        <a:solidFill>
+                          <a:srgbClr val="000000"/>
+                        </a:solidFill>
+                        <a:effectLst/>
+                        <a:latin typeface="Arial"/>
+                      </a:endParaRPr>
+                    </a:p>
+                  </a:txBody>
+                  <a:tcPr marL="9525" marR="9525" marT="9525" marB="0" anchor="b"/>
+                </a:tc>
+                <a:tc>
+                  <a:txBody>
+                    <a:bodyPr/>
+                    <a:lstStyle/>
+                    <a:p>
+                      <a:pPr algn="ctr" fontAlgn="b"/>
+                      <a:r>
+                        <a:rPr lang="pt-PT" sz="1000" u="none" strike="noStrike">
+                          <a:effectLst/>
+                        </a:rPr>
+                        <a:t>Bronzes</a:t>
+                      </a:r>
+                      <a:endParaRPr lang="pt-PT" sz="1000" b="1" i="0" u="none" strike="noStrike">
+                        <a:solidFill>
+                          <a:srgbClr val="000000"/>
+                        </a:solidFill>
+                        <a:effectLst/>
+                        <a:latin typeface="Arial"/>
+                      </a:endParaRPr>
+                    </a:p>
+                  </a:txBody>
+                  <a:tcPr marL="9525" marR="9525" marT="9525" marB="0" anchor="b"/>
+                </a:tc>
+              </a:tr>
+              <a:tr h="161925">
+                <a:tc>
+                  <a:txBody>
+                    <a:bodyPr/>
+                    <a:lstStyle/>
+                    <a:p>
+                      <a:pPr algn="ctr" fontAlgn="b"/>
+                      <a:r>
+                        <a:rPr lang="pt-PT" sz="1000" u="none" strike="noStrike" dirty="0">
+                          <a:effectLst/>
+                        </a:rPr>
+                        <a:t>USA</a:t>
+                      </a:r>
+                      <a:endParaRPr lang="pt-PT" sz="1000" b="0" i="0" u="none" strike="noStrike" dirty="0">
+                        <a:solidFill>
+                          <a:srgbClr val="000000"/>
+                        </a:solidFill>
+                        <a:effectLst/>
+                        <a:latin typeface="Arial"/>
+                      </a:endParaRPr>
+                    </a:p>
+                  </a:txBody>
+                  <a:tcPr marL="9525" marR="9525" marT="9525" marB="0" anchor="b"/>
+                </a:tc>
+                <a:tc>
+                  <a:txBody>
+                    <a:bodyPr/>
+                    <a:lstStyle/>
+                    <a:p>
+                      <a:pPr algn="ctr" fontAlgn="b"/>
+                      <a:r>
+                        <a:rPr lang="pt-PT" sz="1000" u="none" strike="noStrike" dirty="0">
+                          <a:effectLst/>
+                        </a:rPr>
+                        <a:t>USA</a:t>
+                      </a:r>
+                      <a:endParaRPr lang="pt-PT" sz="1000" b="0" i="0" u="none" strike="noStrike" dirty="0">
+                        <a:solidFill>
+                          <a:srgbClr val="000000"/>
+                        </a:solidFill>
+                        <a:effectLst/>
+                        <a:latin typeface="Arial"/>
+                      </a:endParaRPr>
+                    </a:p>
+                  </a:txBody>
+                  <a:tcPr marL="9525" marR="9525" marT="9525" marB="0" anchor="b"/>
+                </a:tc>
+                <a:tc>
+                  <a:txBody>
+                    <a:bodyPr/>
+                    <a:lstStyle/>
+                    <a:p>
+                      <a:pPr algn="ctr" fontAlgn="b"/>
+                      <a:r>
+                        <a:rPr lang="pt-PT" sz="1000" u="none" strike="noStrike" dirty="0">
+                          <a:effectLst/>
+                        </a:rPr>
+                        <a:t>2297</a:t>
+                      </a:r>
+                      <a:endParaRPr lang="pt-PT" sz="1000" b="0" i="0" u="none" strike="noStrike" dirty="0">
+                        <a:solidFill>
+                          <a:srgbClr val="000000"/>
+                        </a:solidFill>
+                        <a:effectLst/>
+                        <a:latin typeface="Arial"/>
+                      </a:endParaRPr>
+                    </a:p>
+                  </a:txBody>
+                  <a:tcPr marL="9525" marR="9525" marT="9525" marB="0" anchor="b"/>
+                </a:tc>
+                <a:tc>
+                  <a:txBody>
+                    <a:bodyPr/>
+                    <a:lstStyle/>
+                    <a:p>
+                      <a:pPr algn="ctr" fontAlgn="b"/>
+                      <a:r>
+                        <a:rPr lang="pt-PT" sz="1000" u="none" strike="noStrike" dirty="0">
+                          <a:effectLst/>
+                        </a:rPr>
+                        <a:t>930</a:t>
+                      </a:r>
+                      <a:endParaRPr lang="pt-PT" sz="1000" b="0" i="0" u="none" strike="noStrike" dirty="0">
+                        <a:solidFill>
+                          <a:srgbClr val="000000"/>
+                        </a:solidFill>
+                        <a:effectLst/>
+                        <a:latin typeface="Arial"/>
+                      </a:endParaRPr>
+                    </a:p>
+                  </a:txBody>
+                  <a:tcPr marL="9525" marR="9525" marT="9525" marB="0" anchor="b"/>
+                </a:tc>
+                <a:tc>
+                  <a:txBody>
+                    <a:bodyPr/>
+                    <a:lstStyle/>
+                    <a:p>
+                      <a:pPr algn="ctr" fontAlgn="b"/>
+                      <a:r>
+                        <a:rPr lang="pt-PT" sz="1000" u="none" strike="noStrike" dirty="0">
+                          <a:effectLst/>
+                        </a:rPr>
+                        <a:t>728</a:t>
+                      </a:r>
+                      <a:endParaRPr lang="pt-PT" sz="1000" b="0" i="0" u="none" strike="noStrike" dirty="0">
+                        <a:solidFill>
+                          <a:srgbClr val="000000"/>
+                        </a:solidFill>
+                        <a:effectLst/>
+                        <a:latin typeface="Arial"/>
+                      </a:endParaRPr>
+                    </a:p>
+                  </a:txBody>
+                  <a:tcPr marL="9525" marR="9525" marT="9525" marB="0" anchor="b"/>
+                </a:tc>
+                <a:tc>
+                  <a:txBody>
+                    <a:bodyPr/>
+                    <a:lstStyle/>
+                    <a:p>
+                      <a:pPr algn="ctr" fontAlgn="b"/>
+                      <a:r>
+                        <a:rPr lang="pt-PT" sz="1000" u="none" strike="noStrike" dirty="0">
+                          <a:effectLst/>
+                        </a:rPr>
+                        <a:t>639</a:t>
+                      </a:r>
+                      <a:endParaRPr lang="pt-PT" sz="1000" b="0" i="0" u="none" strike="noStrike" dirty="0">
+                        <a:solidFill>
+                          <a:srgbClr val="000000"/>
+                        </a:solidFill>
+                        <a:effectLst/>
+                        <a:latin typeface="Arial"/>
+                      </a:endParaRPr>
+                    </a:p>
+                  </a:txBody>
+                  <a:tcPr marL="9525" marR="9525" marT="9525" marB="0" anchor="b"/>
+                </a:tc>
+              </a:tr>
+            </a:tbl>
+          </a:graphicData>
+        </a:graphic>
+      </p:graphicFrame>
+    </p:spTree>
+    <p:extLst>
+      <p:ext uri="{BB962C8B-B14F-4D97-AF65-F5344CB8AC3E}">
+        <p14:creationId xmlns:p14="http://schemas.microsoft.com/office/powerpoint/2010/main" val="2752060379"/>
+      </p:ext>
+    </p:extLst>
+  </p:cSld>
+  <p:clrMapOvr>
+    <a:masterClrMapping/>
+  </p:clrMapOvr>
+  <p:timing>
+    <p:tnLst>
+      <p:par>
+        <p:cTn id="1" dur="indefinite" restart="never" nodeType="tmRoot"/>
+      </p:par>
+    </p:tnLst>
+  </p:timing>
+</p:sld>
+</file>
+
+<file path=ppt/slides/slide6.xml><?xml version="1.0" encoding="utf-8"?>
+<p:sld xmlns:a="http://schemas.openxmlformats.org/drawingml/2006/main" xmlns:r="http://schemas.openxmlformats.org/officeDocument/2006/relationships" xmlns:p="http://schemas.openxmlformats.org/presentationml/2006/main">
+  <p:cSld>
+    <p:spTree>
+      <p:nvGrpSpPr>
+        <p:cNvPr id="1" name=""/>
+        <p:cNvGrpSpPr/>
+        <p:nvPr/>
+      </p:nvGrpSpPr>
+      <p:grpSpPr>
+        <a:xfrm>
+          <a:off x="0" y="0"/>
+          <a:ext cx="0" cy="0"/>
+          <a:chOff x="0" y="0"/>
+          <a:chExt cx="0" cy="0"/>
+        </a:xfrm>
+      </p:grpSpPr>
+      <p:sp>
+        <p:nvSpPr>
+          <p:cNvPr id="2" name="Title 1"/>
+          <p:cNvSpPr>
+            <a:spLocks noGrp="1"/>
+          </p:cNvSpPr>
+          <p:nvPr>
+            <p:ph type="title"/>
+          </p:nvPr>
+        </p:nvSpPr>
+        <p:spPr/>
+        <p:txBody>
+          <a:bodyPr/>
+          <a:lstStyle/>
+          <a:p>
+            <a:r>
+              <a:rPr lang="en-US" dirty="0" smtClean="0"/>
+              <a:t>Initial Dataset</a:t>
+            </a:r>
+            <a:endParaRPr lang="pt-PT" dirty="0"/>
+          </a:p>
+        </p:txBody>
+      </p:sp>
+      <p:sp>
+        <p:nvSpPr>
+          <p:cNvPr id="3" name="Content Placeholder 2"/>
+          <p:cNvSpPr>
+            <a:spLocks noGrp="1"/>
+          </p:cNvSpPr>
+          <p:nvPr>
+            <p:ph idx="1"/>
+          </p:nvPr>
+        </p:nvSpPr>
+        <p:spPr/>
+        <p:txBody>
+          <a:bodyPr>
+            <a:noAutofit/>
+          </a:bodyPr>
+          <a:lstStyle/>
+          <a:p>
+            <a:r>
+              <a:rPr lang="en-US" sz="4000" dirty="0" smtClean="0"/>
+              <a:t>Description</a:t>
+            </a:r>
+          </a:p>
+          <a:p>
+            <a:pPr marL="342900" lvl="1" indent="-342900">
+              <a:spcBef>
+                <a:spcPts val="1800"/>
+              </a:spcBef>
+            </a:pPr>
+            <a:r>
+              <a:rPr lang="en-GB" sz="3200" dirty="0" smtClean="0"/>
               <a:t>Codes – </a:t>
             </a:r>
             <a:r>
@@ -14591,7 +15214,7 @@
 </p:sld>
 </file>
 
-<file path=ppt/slides/slide6.xml><?xml version="1.0" encoding="utf-8"?>
+<file path=ppt/slides/slide7.xml><?xml version="1.0" encoding="utf-8"?>
 <p:sld xmlns:a="http://schemas.openxmlformats.org/drawingml/2006/main" xmlns:r="http://schemas.openxmlformats.org/officeDocument/2006/relationships" xmlns:p="http://schemas.openxmlformats.org/presentationml/2006/main">
   <p:cSld>
     <p:spTree>
@@ -15007,133 +15630,6 @@
 </p:sld>
 </file>
 
-<file path=ppt/slides/slide7.xml><?xml version="1.0" encoding="utf-8"?>
-<p:sld xmlns:a="http://schemas.openxmlformats.org/drawingml/2006/main" xmlns:r="http://schemas.openxmlformats.org/officeDocument/2006/relationships" xmlns:p="http://schemas.openxmlformats.org/presentationml/2006/main">
-  <p:cSld>
-    <p:spTree>
-      <p:nvGrpSpPr>
-        <p:cNvPr id="1" name=""/>
-        <p:cNvGrpSpPr/>
-        <p:nvPr/>
-      </p:nvGrpSpPr>
-      <p:grpSpPr>
-        <a:xfrm>
-          <a:off x="0" y="0"/>
-          <a:ext cx="0" cy="0"/>
-          <a:chOff x="0" y="0"/>
-          <a:chExt cx="0" cy="0"/>
-        </a:xfrm>
-      </p:grpSpPr>
-      <p:sp>
-        <p:nvSpPr>
-          <p:cNvPr id="6" name="Text Placeholder 5"/>
-          <p:cNvSpPr>
-            <a:spLocks noGrp="1"/>
-          </p:cNvSpPr>
-          <p:nvPr>
-            <p:ph type="body" sz="quarter" idx="11"/>
-          </p:nvPr>
-        </p:nvSpPr>
-        <p:spPr/>
-        <p:txBody>
-          <a:bodyPr/>
-          <a:lstStyle/>
-          <a:p>
-            <a:endParaRPr lang="en-US" dirty="0"/>
-          </a:p>
-        </p:txBody>
-      </p:sp>
-      <p:sp>
-        <p:nvSpPr>
-          <p:cNvPr id="29" name="Text Placeholder 28"/>
-          <p:cNvSpPr>
-            <a:spLocks noGrp="1"/>
-          </p:cNvSpPr>
-          <p:nvPr>
-            <p:ph type="body" sz="quarter" idx="10"/>
-          </p:nvPr>
-        </p:nvSpPr>
-        <p:spPr/>
-        <p:txBody>
-          <a:bodyPr/>
-          <a:lstStyle/>
-          <a:p>
-            <a:r>
-              <a:rPr lang="pt-PT" sz="16600" dirty="0" smtClean="0"/>
-              <a:t>02</a:t>
-            </a:r>
-            <a:endParaRPr lang="pt-PT" sz="16600" dirty="0"/>
-          </a:p>
-        </p:txBody>
-      </p:sp>
-      <p:sp>
-        <p:nvSpPr>
-          <p:cNvPr id="4" name="Title 3"/>
-          <p:cNvSpPr>
-            <a:spLocks noGrp="1"/>
-          </p:cNvSpPr>
-          <p:nvPr>
-            <p:ph type="title"/>
-          </p:nvPr>
-        </p:nvSpPr>
-        <p:spPr>
-          <a:xfrm>
-            <a:off x="1907704" y="3214686"/>
-            <a:ext cx="7160096" cy="3033714"/>
-          </a:xfrm>
-          <a:solidFill>
-            <a:srgbClr val="FFFFFF">
-              <a:alpha val="80000"/>
-            </a:srgbClr>
-          </a:solidFill>
-        </p:spPr>
-        <p:txBody>
-          <a:bodyPr rIns="288000">
-            <a:noAutofit/>
-          </a:bodyPr>
-          <a:lstStyle/>
-          <a:p>
-            <a:pPr marL="0" algn="r"/>
-            <a:r>
-              <a:rPr lang="pt-PT" sz="6000" dirty="0" err="1" smtClean="0"/>
-              <a:t>Selected</a:t>
-            </a:r>
-            <a:r>
-              <a:rPr lang="pt-PT" sz="6000" dirty="0" smtClean="0"/>
-              <a:t> / </a:t>
-            </a:r>
-            <a:r>
-              <a:rPr lang="pt-PT" sz="6000" dirty="0" err="1" smtClean="0"/>
-              <a:t>derived</a:t>
-            </a:r>
-            <a:r>
-              <a:rPr lang="pt-PT" sz="6000" dirty="0" smtClean="0"/>
-              <a:t> data</a:t>
-            </a:r>
-            <a:endParaRPr lang="pt-PT" sz="6000" dirty="0"/>
-          </a:p>
-        </p:txBody>
-      </p:sp>
-    </p:spTree>
-    <p:extLst>
-      <p:ext uri="{BB962C8B-B14F-4D97-AF65-F5344CB8AC3E}">
-        <p14:creationId xmlns:p14="http://schemas.microsoft.com/office/powerpoint/2010/main" val="627357321"/>
-      </p:ext>
-    </p:extLst>
-  </p:cSld>
-  <p:clrMapOvr>
-    <a:masterClrMapping/>
-  </p:clrMapOvr>
-  <p:timing>
-    <p:tnLst>
-      <p:par>
-        <p:cTn id="1" dur="indefinite" restart="never" nodeType="tmRoot"/>
-      </p:par>
-    </p:tnLst>
-  </p:timing>
-</p:sld>
-</file>
-
 <file path=ppt/slides/slide8.xml><?xml version="1.0" encoding="utf-8"?>
 <p:sld xmlns:a="http://schemas.openxmlformats.org/drawingml/2006/main" xmlns:r="http://schemas.openxmlformats.org/officeDocument/2006/relationships" xmlns:p="http://schemas.openxmlformats.org/presentationml/2006/main">
   <p:cSld>
@@ -15153,12 +15649,12 @@
       </p:grpSpPr>
       <p:sp>
         <p:nvSpPr>
-          <p:cNvPr id="2" name="Title 1"/>
+          <p:cNvPr id="6" name="Text Placeholder 5"/>
           <p:cNvSpPr>
             <a:spLocks noGrp="1"/>
           </p:cNvSpPr>
           <p:nvPr>
-            <p:ph type="title"/>
+            <p:ph type="body" sz="quarter" idx="11"/>
           </p:nvPr>
         </p:nvSpPr>
         <p:spPr/>
@@ -15166,80 +15662,85 @@
           <a:bodyPr/>
           <a:lstStyle/>
           <a:p>
-            <a:r>
-              <a:rPr lang="en-US" dirty="0" smtClean="0"/>
-              <a:t>Derived data</a:t>
-            </a:r>
-            <a:endParaRPr lang="pt-PT" dirty="0"/>
-          </a:p>
-        </p:txBody>
-      </p:sp>
-      <p:sp>
-        <p:nvSpPr>
-          <p:cNvPr id="3" name="Content Placeholder 2"/>
+            <a:endParaRPr lang="en-US" dirty="0"/>
+          </a:p>
+        </p:txBody>
+      </p:sp>
+      <p:sp>
+        <p:nvSpPr>
+          <p:cNvPr id="29" name="Text Placeholder 28"/>
           <p:cNvSpPr>
             <a:spLocks noGrp="1"/>
           </p:cNvSpPr>
           <p:nvPr>
-            <p:ph idx="1"/>
+            <p:ph type="body" sz="quarter" idx="10"/>
+          </p:nvPr>
+        </p:nvSpPr>
+        <p:spPr/>
+        <p:txBody>
+          <a:bodyPr/>
+          <a:lstStyle/>
+          <a:p>
+            <a:r>
+              <a:rPr lang="pt-PT" sz="16600" dirty="0" smtClean="0"/>
+              <a:t>02</a:t>
+            </a:r>
+            <a:endParaRPr lang="pt-PT" sz="16600" dirty="0"/>
+          </a:p>
+        </p:txBody>
+      </p:sp>
+      <p:sp>
+        <p:nvSpPr>
+          <p:cNvPr id="4" name="Title 3"/>
+          <p:cNvSpPr>
+            <a:spLocks noGrp="1"/>
+          </p:cNvSpPr>
+          <p:nvPr>
+            <p:ph type="title"/>
           </p:nvPr>
         </p:nvSpPr>
         <p:spPr>
           <a:xfrm>
-            <a:off x="457200" y="1285860"/>
-            <a:ext cx="8229600" cy="4375388"/>
+            <a:off x="1907704" y="3214686"/>
+            <a:ext cx="7160096" cy="3033714"/>
           </a:xfrm>
+          <a:solidFill>
+            <a:srgbClr val="FFFFFF">
+              <a:alpha val="80000"/>
+            </a:srgbClr>
+          </a:solidFill>
         </p:spPr>
         <p:txBody>
-          <a:bodyPr>
+          <a:bodyPr rIns="288000">
             <a:noAutofit/>
           </a:bodyPr>
           <a:lstStyle/>
           <a:p>
-            <a:r>
-              <a:rPr lang="en-US" sz="4000" dirty="0" smtClean="0"/>
-              <a:t>Derived data description</a:t>
-            </a:r>
-          </a:p>
-          <a:p>
-            <a:pPr lvl="1"/>
-            <a:r>
-              <a:rPr lang="en-US" sz="3600" dirty="0" smtClean="0"/>
-              <a:t>Compare the medals per capita over the years:</a:t>
-            </a:r>
-          </a:p>
-          <a:p>
-            <a:pPr lvl="1"/>
-            <a:r>
-              <a:rPr lang="en-US" sz="3600" dirty="0"/>
-              <a:t>	</a:t>
-            </a:r>
-            <a:r>
-              <a:rPr lang="en-US" sz="3600" dirty="0" smtClean="0"/>
-              <a:t>1) Count the medals each country won in each year</a:t>
-            </a:r>
-          </a:p>
-          <a:p>
-            <a:pPr lvl="1"/>
-            <a:r>
-              <a:rPr lang="en-US" sz="3600" dirty="0"/>
-              <a:t>	</a:t>
-            </a:r>
-            <a:r>
-              <a:rPr lang="en-US" sz="3600" dirty="0" smtClean="0"/>
-              <a:t>2) Know the population of a country in that year</a:t>
-            </a:r>
-          </a:p>
-          <a:p>
-            <a:pPr lvl="1" algn="ctr"/>
-            <a:endParaRPr lang="en-US" dirty="0" smtClean="0"/>
+            <a:pPr marL="0" algn="r"/>
+            <a:r>
+              <a:rPr lang="pt-PT" sz="6000" dirty="0" err="1" smtClean="0"/>
+              <a:t>Selected</a:t>
+            </a:r>
+            <a:r>
+              <a:rPr lang="pt-PT" sz="6000" dirty="0" smtClean="0"/>
+              <a:t> / </a:t>
+            </a:r>
+            <a:r>
+              <a:rPr lang="pt-PT" sz="6000" dirty="0" err="1" smtClean="0"/>
+              <a:t>derived</a:t>
+            </a:r>
+            <a:r>
+              <a:rPr lang="pt-PT" sz="6000" dirty="0" smtClean="0"/>
+              <a:t> data</a:t>
+            </a:r>
+            <a:endParaRPr lang="pt-PT" sz="6000" dirty="0"/>
           </a:p>
         </p:txBody>
       </p:sp>
     </p:spTree>
     <p:extLst>
       <p:ext uri="{BB962C8B-B14F-4D97-AF65-F5344CB8AC3E}">
-        <p14:creationId xmlns:p14="http://schemas.microsoft.com/office/powerpoint/2010/main" val="1783310095"/>
+        <p14:creationId xmlns:p14="http://schemas.microsoft.com/office/powerpoint/2010/main" val="627357321"/>
       </p:ext>
     </p:extLst>
   </p:cSld>
@@ -15298,55 +15799,70 @@
       </p:sp>
       <p:sp>
         <p:nvSpPr>
-          <p:cNvPr id="4" name="CaixaDeTexto 3"/>
-          <p:cNvSpPr txBox="1"/>
-          <p:nvPr/>
+          <p:cNvPr id="3" name="Content Placeholder 2"/>
+          <p:cNvSpPr>
+            <a:spLocks noGrp="1"/>
+          </p:cNvSpPr>
+          <p:nvPr>
+            <p:ph idx="1"/>
+          </p:nvPr>
         </p:nvSpPr>
         <p:spPr>
           <a:xfrm>
-            <a:off x="2195736" y="1340768"/>
-            <a:ext cx="4392488" cy="1015663"/>
+            <a:off x="457200" y="1285860"/>
+            <a:ext cx="8229600" cy="4375388"/>
           </a:xfrm>
-          <a:prstGeom prst="rect">
-            <a:avLst/>
-          </a:prstGeom>
-          <a:noFill/>
         </p:spPr>
         <p:txBody>
-          <a:bodyPr wrap="square" rtlCol="0">
-            <a:spAutoFit/>
+          <a:bodyPr>
+            <a:noAutofit/>
           </a:bodyPr>
           <a:lstStyle/>
           <a:p>
-            <a:pPr algn="ctr"/>
-            <a:r>
-              <a:rPr lang="pt-PT" sz="6000" b="1" dirty="0" err="1" smtClean="0">
-                <a:solidFill>
-                  <a:schemeClr val="tx2"/>
-                </a:solidFill>
-              </a:rPr>
-              <a:t>Why</a:t>
-            </a:r>
-            <a:r>
-              <a:rPr lang="pt-PT" sz="6000" b="1" dirty="0" smtClean="0">
-                <a:solidFill>
-                  <a:schemeClr val="tx2"/>
-                </a:solidFill>
-              </a:rPr>
-              <a:t>?</a:t>
-            </a:r>
-            <a:endParaRPr lang="pt-PT" sz="6000" b="1" dirty="0">
-              <a:solidFill>
-                <a:schemeClr val="tx2"/>
-              </a:solidFill>
-            </a:endParaRPr>
+            <a:r>
+              <a:rPr lang="en-US" sz="4000" dirty="0" smtClean="0"/>
+              <a:t>Derived data description</a:t>
+            </a:r>
+          </a:p>
+          <a:p>
+            <a:pPr lvl="1"/>
+            <a:r>
+              <a:rPr lang="en-US" sz="3600" dirty="0" smtClean="0"/>
+              <a:t>Compare the medals per capita over the years:</a:t>
+            </a:r>
+          </a:p>
+          <a:p>
+            <a:pPr lvl="1"/>
+            <a:r>
+              <a:rPr lang="en-US" sz="3600" dirty="0"/>
+              <a:t>	</a:t>
+            </a:r>
+            <a:r>
+              <a:rPr lang="en-US" sz="3600" dirty="0" smtClean="0"/>
+              <a:t>1) Count the medals each country won in each year</a:t>
+            </a:r>
+          </a:p>
+          <a:p>
+            <a:pPr lvl="1"/>
+            <a:r>
+              <a:rPr lang="en-US" sz="3600" dirty="0"/>
+              <a:t>	</a:t>
+            </a:r>
+            <a:r>
+              <a:rPr lang="en-US" sz="3600" dirty="0" smtClean="0"/>
+              <a:t>2) Know the population of a country in that year</a:t>
+            </a:r>
+          </a:p>
+          <a:p>
+            <a:pPr lvl="1" algn="ctr"/>
+            <a:endParaRPr lang="en-US" dirty="0" smtClean="0"/>
           </a:p>
         </p:txBody>
       </p:sp>
     </p:spTree>
     <p:extLst>
       <p:ext uri="{BB962C8B-B14F-4D97-AF65-F5344CB8AC3E}">
-        <p14:creationId xmlns:p14="http://schemas.microsoft.com/office/powerpoint/2010/main" val="3543650951"/>
+        <p14:creationId xmlns:p14="http://schemas.microsoft.com/office/powerpoint/2010/main" val="1783310095"/>
       </p:ext>
     </p:extLst>
   </p:cSld>

</xml_diff>

<commit_message>
PPT check 2 acabado + pdf
</commit_message>
<xml_diff>
--- a/checkpoint2/G01A - Checkpoint2 Presentation.pptx
+++ b/checkpoint2/G01A - Checkpoint2 Presentation.pptx
@@ -5,10 +5,10 @@
     <p:sldMasterId id="2147483648" r:id="rId1"/>
   </p:sldMasterIdLst>
   <p:notesMasterIdLst>
-    <p:notesMasterId r:id="rId48"/>
+    <p:notesMasterId r:id="rId52"/>
   </p:notesMasterIdLst>
   <p:handoutMasterIdLst>
-    <p:handoutMasterId r:id="rId49"/>
+    <p:handoutMasterId r:id="rId53"/>
   </p:handoutMasterIdLst>
   <p:sldIdLst>
     <p:sldId id="256" r:id="rId2"/>
@@ -54,9 +54,13 @@
     <p:sldId id="1126" r:id="rId42"/>
     <p:sldId id="1127" r:id="rId43"/>
     <p:sldId id="1128" r:id="rId44"/>
-    <p:sldId id="1103" r:id="rId45"/>
-    <p:sldId id="1104" r:id="rId46"/>
-    <p:sldId id="1129" r:id="rId47"/>
+    <p:sldId id="1146" r:id="rId45"/>
+    <p:sldId id="1147" r:id="rId46"/>
+    <p:sldId id="1148" r:id="rId47"/>
+    <p:sldId id="1149" r:id="rId48"/>
+    <p:sldId id="1103" r:id="rId49"/>
+    <p:sldId id="1104" r:id="rId50"/>
+    <p:sldId id="1129" r:id="rId51"/>
   </p:sldIdLst>
   <p:sldSz cx="9144000" cy="6858000" type="screen4x3"/>
   <p:notesSz cx="6858000" cy="9144000"/>
@@ -157,7 +161,7 @@
   </p:defaultTextStyle>
   <p:extLst>
     <p:ext uri="{EFAFB233-063F-42B5-8137-9DF3F51BA10A}">
-      <p15:sldGuideLst xmlns="" xmlns:p15="http://schemas.microsoft.com/office/powerpoint/2012/main">
+      <p15:sldGuideLst xmlns:p15="http://schemas.microsoft.com/office/powerpoint/2012/main" xmlns="">
         <p15:guide id="1" orient="horz" pos="2160">
           <p15:clr>
             <a:srgbClr val="A4A3A4"/>
@@ -256,7 +260,7 @@
           <a:p>
             <a:fld id="{745C36E7-9E00-462E-80A3-32F2BE615C7A}" type="datetimeFigureOut">
               <a:rPr lang="en-US" smtClean="0"/>
-              <a:t>10/19/2015</a:t>
+              <a:t>19-Oct-15</a:t>
             </a:fld>
             <a:endParaRPr lang="en-US"/>
           </a:p>
@@ -322,7 +326,7 @@
           <a:p>
             <a:fld id="{C7B702CB-D988-47C5-8204-95032A6A7C26}" type="slidenum">
               <a:rPr lang="en-US" smtClean="0"/>
-              <a:t>‹nº›</a:t>
+              <a:t>‹#›</a:t>
             </a:fld>
             <a:endParaRPr lang="en-US"/>
           </a:p>
@@ -422,7 +426,7 @@
             <a:fld id="{01F3E309-ED8D-4193-99AF-E5EA90965E98}" type="datetimeFigureOut">
               <a:rPr lang="en-US" smtClean="0"/>
               <a:pPr/>
-              <a:t>10/19/2015</a:t>
+              <a:t>19-Oct-15</a:t>
             </a:fld>
             <a:endParaRPr lang="en-US"/>
           </a:p>
@@ -584,7 +588,7 @@
             <a:fld id="{F535F173-C1DD-4975-94BF-5B9ED67F7674}" type="slidenum">
               <a:rPr lang="en-US" smtClean="0"/>
               <a:pPr/>
-              <a:t>‹nº›</a:t>
+              <a:t>‹#›</a:t>
             </a:fld>
             <a:endParaRPr lang="en-US"/>
           </a:p>
@@ -3422,7 +3426,7 @@
             <a:fld id="{F535F173-C1DD-4975-94BF-5B9ED67F7674}" type="slidenum">
               <a:rPr lang="en-US" smtClean="0"/>
               <a:pPr/>
-              <a:t>45</a:t>
+              <a:t>44</a:t>
             </a:fld>
             <a:endParaRPr lang="en-US"/>
           </a:p>
@@ -3431,7 +3435,7 @@
     </p:spTree>
     <p:extLst>
       <p:ext uri="{BB962C8B-B14F-4D97-AF65-F5344CB8AC3E}">
-        <p14:creationId xmlns:p14="http://schemas.microsoft.com/office/powerpoint/2010/main" val="35205596"/>
+        <p14:creationId xmlns:p14="http://schemas.microsoft.com/office/powerpoint/2010/main" val="1355792998"/>
       </p:ext>
     </p:extLst>
   </p:cSld>
@@ -3507,7 +3511,7 @@
             <a:fld id="{F535F173-C1DD-4975-94BF-5B9ED67F7674}" type="slidenum">
               <a:rPr lang="en-US" smtClean="0"/>
               <a:pPr/>
-              <a:t>46</a:t>
+              <a:t>45</a:t>
             </a:fld>
             <a:endParaRPr lang="en-US"/>
           </a:p>
@@ -3516,7 +3520,7 @@
     </p:spTree>
     <p:extLst>
       <p:ext uri="{BB962C8B-B14F-4D97-AF65-F5344CB8AC3E}">
-        <p14:creationId xmlns:p14="http://schemas.microsoft.com/office/powerpoint/2010/main" val="35205596"/>
+        <p14:creationId xmlns:p14="http://schemas.microsoft.com/office/powerpoint/2010/main" val="1355792998"/>
       </p:ext>
     </p:extLst>
   </p:cSld>
@@ -3602,6 +3606,346 @@
     <p:extLst>
       <p:ext uri="{BB962C8B-B14F-4D97-AF65-F5344CB8AC3E}">
         <p14:creationId xmlns:p14="http://schemas.microsoft.com/office/powerpoint/2010/main" val="1355792998"/>
+      </p:ext>
+    </p:extLst>
+  </p:cSld>
+  <p:clrMapOvr>
+    <a:masterClrMapping/>
+  </p:clrMapOvr>
+</p:notes>
+</file>
+
+<file path=ppt/notesSlides/notesSlide40.xml><?xml version="1.0" encoding="utf-8"?>
+<p:notes xmlns:a="http://schemas.openxmlformats.org/drawingml/2006/main" xmlns:r="http://schemas.openxmlformats.org/officeDocument/2006/relationships" xmlns:p="http://schemas.openxmlformats.org/presentationml/2006/main">
+  <p:cSld>
+    <p:spTree>
+      <p:nvGrpSpPr>
+        <p:cNvPr id="1" name=""/>
+        <p:cNvGrpSpPr/>
+        <p:nvPr/>
+      </p:nvGrpSpPr>
+      <p:grpSpPr>
+        <a:xfrm>
+          <a:off x="0" y="0"/>
+          <a:ext cx="0" cy="0"/>
+          <a:chOff x="0" y="0"/>
+          <a:chExt cx="0" cy="0"/>
+        </a:xfrm>
+      </p:grpSpPr>
+      <p:sp>
+        <p:nvSpPr>
+          <p:cNvPr id="2" name="Slide Image Placeholder 1"/>
+          <p:cNvSpPr>
+            <a:spLocks noGrp="1" noRot="1" noChangeAspect="1"/>
+          </p:cNvSpPr>
+          <p:nvPr>
+            <p:ph type="sldImg"/>
+          </p:nvPr>
+        </p:nvSpPr>
+        <p:spPr/>
+      </p:sp>
+      <p:sp>
+        <p:nvSpPr>
+          <p:cNvPr id="3" name="Notes Placeholder 2"/>
+          <p:cNvSpPr>
+            <a:spLocks noGrp="1"/>
+          </p:cNvSpPr>
+          <p:nvPr>
+            <p:ph type="body" idx="1"/>
+          </p:nvPr>
+        </p:nvSpPr>
+        <p:spPr/>
+        <p:txBody>
+          <a:bodyPr/>
+          <a:lstStyle/>
+          <a:p>
+            <a:endParaRPr lang="en-US" baseline="0" dirty="0" smtClean="0"/>
+          </a:p>
+        </p:txBody>
+      </p:sp>
+      <p:sp>
+        <p:nvSpPr>
+          <p:cNvPr id="4" name="Slide Number Placeholder 3"/>
+          <p:cNvSpPr>
+            <a:spLocks noGrp="1"/>
+          </p:cNvSpPr>
+          <p:nvPr>
+            <p:ph type="sldNum" sz="quarter" idx="10"/>
+          </p:nvPr>
+        </p:nvSpPr>
+        <p:spPr/>
+        <p:txBody>
+          <a:bodyPr/>
+          <a:lstStyle/>
+          <a:p>
+            <a:fld id="{F535F173-C1DD-4975-94BF-5B9ED67F7674}" type="slidenum">
+              <a:rPr lang="en-US" smtClean="0"/>
+              <a:pPr/>
+              <a:t>46</a:t>
+            </a:fld>
+            <a:endParaRPr lang="en-US"/>
+          </a:p>
+        </p:txBody>
+      </p:sp>
+    </p:spTree>
+    <p:extLst>
+      <p:ext uri="{BB962C8B-B14F-4D97-AF65-F5344CB8AC3E}">
+        <p14:creationId xmlns:p14="http://schemas.microsoft.com/office/powerpoint/2010/main" val="1355792998"/>
+      </p:ext>
+    </p:extLst>
+  </p:cSld>
+  <p:clrMapOvr>
+    <a:masterClrMapping/>
+  </p:clrMapOvr>
+</p:notes>
+</file>
+
+<file path=ppt/notesSlides/notesSlide41.xml><?xml version="1.0" encoding="utf-8"?>
+<p:notes xmlns:a="http://schemas.openxmlformats.org/drawingml/2006/main" xmlns:r="http://schemas.openxmlformats.org/officeDocument/2006/relationships" xmlns:p="http://schemas.openxmlformats.org/presentationml/2006/main">
+  <p:cSld>
+    <p:spTree>
+      <p:nvGrpSpPr>
+        <p:cNvPr id="1" name=""/>
+        <p:cNvGrpSpPr/>
+        <p:nvPr/>
+      </p:nvGrpSpPr>
+      <p:grpSpPr>
+        <a:xfrm>
+          <a:off x="0" y="0"/>
+          <a:ext cx="0" cy="0"/>
+          <a:chOff x="0" y="0"/>
+          <a:chExt cx="0" cy="0"/>
+        </a:xfrm>
+      </p:grpSpPr>
+      <p:sp>
+        <p:nvSpPr>
+          <p:cNvPr id="2" name="Slide Image Placeholder 1"/>
+          <p:cNvSpPr>
+            <a:spLocks noGrp="1" noRot="1" noChangeAspect="1"/>
+          </p:cNvSpPr>
+          <p:nvPr>
+            <p:ph type="sldImg"/>
+          </p:nvPr>
+        </p:nvSpPr>
+        <p:spPr/>
+      </p:sp>
+      <p:sp>
+        <p:nvSpPr>
+          <p:cNvPr id="3" name="Notes Placeholder 2"/>
+          <p:cNvSpPr>
+            <a:spLocks noGrp="1"/>
+          </p:cNvSpPr>
+          <p:nvPr>
+            <p:ph type="body" idx="1"/>
+          </p:nvPr>
+        </p:nvSpPr>
+        <p:spPr/>
+        <p:txBody>
+          <a:bodyPr/>
+          <a:lstStyle/>
+          <a:p>
+            <a:endParaRPr lang="en-US" baseline="0" dirty="0" smtClean="0"/>
+          </a:p>
+        </p:txBody>
+      </p:sp>
+      <p:sp>
+        <p:nvSpPr>
+          <p:cNvPr id="4" name="Slide Number Placeholder 3"/>
+          <p:cNvSpPr>
+            <a:spLocks noGrp="1"/>
+          </p:cNvSpPr>
+          <p:nvPr>
+            <p:ph type="sldNum" sz="quarter" idx="10"/>
+          </p:nvPr>
+        </p:nvSpPr>
+        <p:spPr/>
+        <p:txBody>
+          <a:bodyPr/>
+          <a:lstStyle/>
+          <a:p>
+            <a:fld id="{F535F173-C1DD-4975-94BF-5B9ED67F7674}" type="slidenum">
+              <a:rPr lang="en-US" smtClean="0"/>
+              <a:pPr/>
+              <a:t>47</a:t>
+            </a:fld>
+            <a:endParaRPr lang="en-US"/>
+          </a:p>
+        </p:txBody>
+      </p:sp>
+    </p:spTree>
+    <p:extLst>
+      <p:ext uri="{BB962C8B-B14F-4D97-AF65-F5344CB8AC3E}">
+        <p14:creationId xmlns:p14="http://schemas.microsoft.com/office/powerpoint/2010/main" val="1355792998"/>
+      </p:ext>
+    </p:extLst>
+  </p:cSld>
+  <p:clrMapOvr>
+    <a:masterClrMapping/>
+  </p:clrMapOvr>
+</p:notes>
+</file>
+
+<file path=ppt/notesSlides/notesSlide42.xml><?xml version="1.0" encoding="utf-8"?>
+<p:notes xmlns:a="http://schemas.openxmlformats.org/drawingml/2006/main" xmlns:r="http://schemas.openxmlformats.org/officeDocument/2006/relationships" xmlns:p="http://schemas.openxmlformats.org/presentationml/2006/main">
+  <p:cSld>
+    <p:spTree>
+      <p:nvGrpSpPr>
+        <p:cNvPr id="1" name=""/>
+        <p:cNvGrpSpPr/>
+        <p:nvPr/>
+      </p:nvGrpSpPr>
+      <p:grpSpPr>
+        <a:xfrm>
+          <a:off x="0" y="0"/>
+          <a:ext cx="0" cy="0"/>
+          <a:chOff x="0" y="0"/>
+          <a:chExt cx="0" cy="0"/>
+        </a:xfrm>
+      </p:grpSpPr>
+      <p:sp>
+        <p:nvSpPr>
+          <p:cNvPr id="2" name="Slide Image Placeholder 1"/>
+          <p:cNvSpPr>
+            <a:spLocks noGrp="1" noRot="1" noChangeAspect="1"/>
+          </p:cNvSpPr>
+          <p:nvPr>
+            <p:ph type="sldImg"/>
+          </p:nvPr>
+        </p:nvSpPr>
+        <p:spPr/>
+      </p:sp>
+      <p:sp>
+        <p:nvSpPr>
+          <p:cNvPr id="3" name="Notes Placeholder 2"/>
+          <p:cNvSpPr>
+            <a:spLocks noGrp="1"/>
+          </p:cNvSpPr>
+          <p:nvPr>
+            <p:ph type="body" idx="1"/>
+          </p:nvPr>
+        </p:nvSpPr>
+        <p:spPr/>
+        <p:txBody>
+          <a:bodyPr/>
+          <a:lstStyle/>
+          <a:p>
+            <a:endParaRPr lang="en-US" baseline="0" dirty="0" smtClean="0"/>
+          </a:p>
+        </p:txBody>
+      </p:sp>
+      <p:sp>
+        <p:nvSpPr>
+          <p:cNvPr id="4" name="Slide Number Placeholder 3"/>
+          <p:cNvSpPr>
+            <a:spLocks noGrp="1"/>
+          </p:cNvSpPr>
+          <p:nvPr>
+            <p:ph type="sldNum" sz="quarter" idx="10"/>
+          </p:nvPr>
+        </p:nvSpPr>
+        <p:spPr/>
+        <p:txBody>
+          <a:bodyPr/>
+          <a:lstStyle/>
+          <a:p>
+            <a:fld id="{F535F173-C1DD-4975-94BF-5B9ED67F7674}" type="slidenum">
+              <a:rPr lang="en-US" smtClean="0"/>
+              <a:pPr/>
+              <a:t>49</a:t>
+            </a:fld>
+            <a:endParaRPr lang="en-US"/>
+          </a:p>
+        </p:txBody>
+      </p:sp>
+    </p:spTree>
+    <p:extLst>
+      <p:ext uri="{BB962C8B-B14F-4D97-AF65-F5344CB8AC3E}">
+        <p14:creationId xmlns:p14="http://schemas.microsoft.com/office/powerpoint/2010/main" val="35205596"/>
+      </p:ext>
+    </p:extLst>
+  </p:cSld>
+  <p:clrMapOvr>
+    <a:masterClrMapping/>
+  </p:clrMapOvr>
+</p:notes>
+</file>
+
+<file path=ppt/notesSlides/notesSlide43.xml><?xml version="1.0" encoding="utf-8"?>
+<p:notes xmlns:a="http://schemas.openxmlformats.org/drawingml/2006/main" xmlns:r="http://schemas.openxmlformats.org/officeDocument/2006/relationships" xmlns:p="http://schemas.openxmlformats.org/presentationml/2006/main">
+  <p:cSld>
+    <p:spTree>
+      <p:nvGrpSpPr>
+        <p:cNvPr id="1" name=""/>
+        <p:cNvGrpSpPr/>
+        <p:nvPr/>
+      </p:nvGrpSpPr>
+      <p:grpSpPr>
+        <a:xfrm>
+          <a:off x="0" y="0"/>
+          <a:ext cx="0" cy="0"/>
+          <a:chOff x="0" y="0"/>
+          <a:chExt cx="0" cy="0"/>
+        </a:xfrm>
+      </p:grpSpPr>
+      <p:sp>
+        <p:nvSpPr>
+          <p:cNvPr id="2" name="Slide Image Placeholder 1"/>
+          <p:cNvSpPr>
+            <a:spLocks noGrp="1" noRot="1" noChangeAspect="1"/>
+          </p:cNvSpPr>
+          <p:nvPr>
+            <p:ph type="sldImg"/>
+          </p:nvPr>
+        </p:nvSpPr>
+        <p:spPr/>
+      </p:sp>
+      <p:sp>
+        <p:nvSpPr>
+          <p:cNvPr id="3" name="Notes Placeholder 2"/>
+          <p:cNvSpPr>
+            <a:spLocks noGrp="1"/>
+          </p:cNvSpPr>
+          <p:nvPr>
+            <p:ph type="body" idx="1"/>
+          </p:nvPr>
+        </p:nvSpPr>
+        <p:spPr/>
+        <p:txBody>
+          <a:bodyPr/>
+          <a:lstStyle/>
+          <a:p>
+            <a:endParaRPr lang="en-US" baseline="0" dirty="0" smtClean="0"/>
+          </a:p>
+        </p:txBody>
+      </p:sp>
+      <p:sp>
+        <p:nvSpPr>
+          <p:cNvPr id="4" name="Slide Number Placeholder 3"/>
+          <p:cNvSpPr>
+            <a:spLocks noGrp="1"/>
+          </p:cNvSpPr>
+          <p:nvPr>
+            <p:ph type="sldNum" sz="quarter" idx="10"/>
+          </p:nvPr>
+        </p:nvSpPr>
+        <p:spPr/>
+        <p:txBody>
+          <a:bodyPr/>
+          <a:lstStyle/>
+          <a:p>
+            <a:fld id="{F535F173-C1DD-4975-94BF-5B9ED67F7674}" type="slidenum">
+              <a:rPr lang="en-US" smtClean="0"/>
+              <a:pPr/>
+              <a:t>50</a:t>
+            </a:fld>
+            <a:endParaRPr lang="en-US"/>
+          </a:p>
+        </p:txBody>
+      </p:sp>
+    </p:spTree>
+    <p:extLst>
+      <p:ext uri="{BB962C8B-B14F-4D97-AF65-F5344CB8AC3E}">
+        <p14:creationId xmlns:p14="http://schemas.microsoft.com/office/powerpoint/2010/main" val="35205596"/>
       </p:ext>
     </p:extLst>
   </p:cSld>
@@ -4778,7 +5122,7 @@
             <a:fld id="{F3CC9924-33BC-4796-B0F9-D37DB5D899BF}" type="datetimeFigureOut">
               <a:rPr lang="pt-PT" smtClean="0"/>
               <a:pPr/>
-              <a:t>19/10/2015</a:t>
+              <a:t>19-10-2015</a:t>
             </a:fld>
             <a:endParaRPr lang="pt-PT"/>
           </a:p>
@@ -4837,7 +5181,7 @@
             <a:fld id="{B5EBF8D4-C87A-47B7-9996-84452461937B}" type="slidenum">
               <a:rPr lang="pt-PT" smtClean="0"/>
               <a:pPr/>
-              <a:t>‹nº›</a:t>
+              <a:t>‹#›</a:t>
             </a:fld>
             <a:endParaRPr lang="pt-PT"/>
           </a:p>
@@ -18375,6 +18719,1536 @@
       </p:grpSpPr>
       <p:sp>
         <p:nvSpPr>
+          <p:cNvPr id="2" name="Title 1"/>
+          <p:cNvSpPr>
+            <a:spLocks noGrp="1"/>
+          </p:cNvSpPr>
+          <p:nvPr>
+            <p:ph type="title"/>
+          </p:nvPr>
+        </p:nvSpPr>
+        <p:spPr/>
+        <p:txBody>
+          <a:bodyPr/>
+          <a:lstStyle/>
+          <a:p>
+            <a:r>
+              <a:rPr lang="en-US" dirty="0" smtClean="0"/>
+              <a:t>Dataset processing</a:t>
+            </a:r>
+            <a:endParaRPr lang="pt-PT" dirty="0"/>
+          </a:p>
+        </p:txBody>
+      </p:sp>
+      <p:sp>
+        <p:nvSpPr>
+          <p:cNvPr id="3" name="Content Placeholder 2"/>
+          <p:cNvSpPr>
+            <a:spLocks noGrp="1"/>
+          </p:cNvSpPr>
+          <p:nvPr>
+            <p:ph idx="1"/>
+          </p:nvPr>
+        </p:nvSpPr>
+        <p:spPr>
+          <a:xfrm>
+            <a:off x="457200" y="1094346"/>
+            <a:ext cx="8229600" cy="5214974"/>
+          </a:xfrm>
+        </p:spPr>
+        <p:txBody>
+          <a:bodyPr>
+            <a:noAutofit/>
+          </a:bodyPr>
+          <a:lstStyle/>
+          <a:p>
+            <a:r>
+              <a:rPr lang="en-US" sz="4000" dirty="0" smtClean="0"/>
+              <a:t>How to get the winners/population coefficient?</a:t>
+            </a:r>
+            <a:endParaRPr lang="en-US" sz="4000" dirty="0"/>
+          </a:p>
+          <a:p>
+            <a:pPr lvl="1"/>
+            <a:r>
+              <a:rPr lang="pt-PT" sz="3600" dirty="0" smtClean="0"/>
+              <a:t>We needed the amount of medals for each country, each year...</a:t>
+            </a:r>
+            <a:endParaRPr lang="en-US" sz="3600" dirty="0"/>
+          </a:p>
+          <a:p>
+            <a:r>
+              <a:rPr lang="en-US" sz="4000" dirty="0" smtClean="0"/>
+              <a:t>	</a:t>
+            </a:r>
+            <a:endParaRPr lang="en-US" sz="4000" dirty="0"/>
+          </a:p>
+        </p:txBody>
+      </p:sp>
+      <p:graphicFrame>
+        <p:nvGraphicFramePr>
+          <p:cNvPr id="5" name="Tabela 4"/>
+          <p:cNvGraphicFramePr>
+            <a:graphicFrameLocks noGrp="1"/>
+          </p:cNvGraphicFramePr>
+          <p:nvPr>
+            <p:extLst>
+              <p:ext uri="{D42A27DB-BD31-4B8C-83A1-F6EECF244321}">
+                <p14:modId xmlns:p14="http://schemas.microsoft.com/office/powerpoint/2010/main" val="3764811357"/>
+              </p:ext>
+            </p:extLst>
+          </p:nvPr>
+        </p:nvGraphicFramePr>
+        <p:xfrm>
+          <a:off x="1043608" y="3645024"/>
+          <a:ext cx="2261790" cy="1334780"/>
+        </p:xfrm>
+        <a:graphic>
+          <a:graphicData uri="http://schemas.openxmlformats.org/drawingml/2006/table">
+            <a:tbl>
+              <a:tblPr/>
+              <a:tblGrid>
+                <a:gridCol w="660748"/>
+                <a:gridCol w="495560"/>
+                <a:gridCol w="1105482"/>
+              </a:tblGrid>
+              <a:tr h="333695">
+                <a:tc>
+                  <a:txBody>
+                    <a:bodyPr/>
+                    <a:lstStyle/>
+                    <a:p>
+                      <a:pPr algn="l" fontAlgn="t"/>
+                      <a:r>
+                        <a:rPr lang="pt-PT" sz="1000" b="1" i="0" u="none" strike="noStrike" dirty="0" err="1">
+                          <a:solidFill>
+                            <a:srgbClr val="000000"/>
+                          </a:solidFill>
+                          <a:effectLst/>
+                          <a:latin typeface="Arial"/>
+                        </a:rPr>
+                        <a:t>Edition</a:t>
+                      </a:r>
+                      <a:endParaRPr lang="pt-PT" sz="1000" b="1" i="0" u="none" strike="noStrike" dirty="0">
+                        <a:solidFill>
+                          <a:srgbClr val="000000"/>
+                        </a:solidFill>
+                        <a:effectLst/>
+                        <a:latin typeface="Arial"/>
+                      </a:endParaRPr>
+                    </a:p>
+                  </a:txBody>
+                  <a:tcPr marL="9525" marR="9525" marT="9525" marB="0">
+                    <a:lnL w="6350" cap="flat" cmpd="sng" algn="ctr">
+                      <a:solidFill>
+                        <a:srgbClr val="000000"/>
+                      </a:solidFill>
+                      <a:prstDash val="solid"/>
+                      <a:round/>
+                      <a:headEnd type="none" w="med" len="med"/>
+                      <a:tailEnd type="none" w="med" len="med"/>
+                    </a:lnL>
+                    <a:lnR w="6350" cap="flat" cmpd="sng" algn="ctr">
+                      <a:solidFill>
+                        <a:srgbClr val="000000"/>
+                      </a:solidFill>
+                      <a:prstDash val="solid"/>
+                      <a:round/>
+                      <a:headEnd type="none" w="med" len="med"/>
+                      <a:tailEnd type="none" w="med" len="med"/>
+                    </a:lnR>
+                    <a:lnT w="6350" cap="flat" cmpd="sng" algn="ctr">
+                      <a:solidFill>
+                        <a:srgbClr val="000000"/>
+                      </a:solidFill>
+                      <a:prstDash val="solid"/>
+                      <a:round/>
+                      <a:headEnd type="none" w="med" len="med"/>
+                      <a:tailEnd type="none" w="med" len="med"/>
+                    </a:lnT>
+                    <a:lnB w="6350" cap="flat" cmpd="sng" algn="ctr">
+                      <a:solidFill>
+                        <a:srgbClr val="000000"/>
+                      </a:solidFill>
+                      <a:prstDash val="solid"/>
+                      <a:round/>
+                      <a:headEnd type="none" w="med" len="med"/>
+                      <a:tailEnd type="none" w="med" len="med"/>
+                    </a:lnB>
+                  </a:tcPr>
+                </a:tc>
+                <a:tc>
+                  <a:txBody>
+                    <a:bodyPr/>
+                    <a:lstStyle/>
+                    <a:p>
+                      <a:pPr algn="l" fontAlgn="t"/>
+                      <a:r>
+                        <a:rPr lang="pt-PT" sz="1000" b="1" i="0" u="none" strike="noStrike" dirty="0">
+                          <a:solidFill>
+                            <a:srgbClr val="000000"/>
+                          </a:solidFill>
+                          <a:effectLst/>
+                          <a:latin typeface="Arial"/>
+                        </a:rPr>
+                        <a:t>NOC</a:t>
+                      </a:r>
+                    </a:p>
+                  </a:txBody>
+                  <a:tcPr marL="9525" marR="9525" marT="9525" marB="0">
+                    <a:lnL w="6350" cap="flat" cmpd="sng" algn="ctr">
+                      <a:solidFill>
+                        <a:srgbClr val="000000"/>
+                      </a:solidFill>
+                      <a:prstDash val="solid"/>
+                      <a:round/>
+                      <a:headEnd type="none" w="med" len="med"/>
+                      <a:tailEnd type="none" w="med" len="med"/>
+                    </a:lnL>
+                    <a:lnR w="6350" cap="flat" cmpd="sng" algn="ctr">
+                      <a:solidFill>
+                        <a:srgbClr val="000000"/>
+                      </a:solidFill>
+                      <a:prstDash val="solid"/>
+                      <a:round/>
+                      <a:headEnd type="none" w="med" len="med"/>
+                      <a:tailEnd type="none" w="med" len="med"/>
+                    </a:lnR>
+                    <a:lnT w="6350" cap="flat" cmpd="sng" algn="ctr">
+                      <a:solidFill>
+                        <a:srgbClr val="000000"/>
+                      </a:solidFill>
+                      <a:prstDash val="solid"/>
+                      <a:round/>
+                      <a:headEnd type="none" w="med" len="med"/>
+                      <a:tailEnd type="none" w="med" len="med"/>
+                    </a:lnT>
+                    <a:lnB w="6350" cap="flat" cmpd="sng" algn="ctr">
+                      <a:solidFill>
+                        <a:srgbClr val="000000"/>
+                      </a:solidFill>
+                      <a:prstDash val="solid"/>
+                      <a:round/>
+                      <a:headEnd type="none" w="med" len="med"/>
+                      <a:tailEnd type="none" w="med" len="med"/>
+                    </a:lnB>
+                  </a:tcPr>
+                </a:tc>
+                <a:tc>
+                  <a:txBody>
+                    <a:bodyPr/>
+                    <a:lstStyle/>
+                    <a:p>
+                      <a:pPr algn="l" fontAlgn="t"/>
+                      <a:r>
+                        <a:rPr lang="pt-PT" sz="1000" b="1" i="0" u="none" strike="noStrike" dirty="0" err="1">
+                          <a:solidFill>
+                            <a:srgbClr val="000000"/>
+                          </a:solidFill>
+                          <a:effectLst/>
+                          <a:latin typeface="Arial"/>
+                        </a:rPr>
+                        <a:t>Medal</a:t>
+                      </a:r>
+                      <a:endParaRPr lang="pt-PT" sz="1000" b="1" i="0" u="none" strike="noStrike" dirty="0">
+                        <a:solidFill>
+                          <a:srgbClr val="000000"/>
+                        </a:solidFill>
+                        <a:effectLst/>
+                        <a:latin typeface="Arial"/>
+                      </a:endParaRPr>
+                    </a:p>
+                  </a:txBody>
+                  <a:tcPr marL="9525" marR="9525" marT="9525" marB="0">
+                    <a:lnL w="6350" cap="flat" cmpd="sng" algn="ctr">
+                      <a:solidFill>
+                        <a:srgbClr val="000000"/>
+                      </a:solidFill>
+                      <a:prstDash val="solid"/>
+                      <a:round/>
+                      <a:headEnd type="none" w="med" len="med"/>
+                      <a:tailEnd type="none" w="med" len="med"/>
+                    </a:lnL>
+                    <a:lnR w="6350" cap="flat" cmpd="sng" algn="ctr">
+                      <a:solidFill>
+                        <a:srgbClr val="000000"/>
+                      </a:solidFill>
+                      <a:prstDash val="solid"/>
+                      <a:round/>
+                      <a:headEnd type="none" w="med" len="med"/>
+                      <a:tailEnd type="none" w="med" len="med"/>
+                    </a:lnR>
+                    <a:lnT w="6350" cap="flat" cmpd="sng" algn="ctr">
+                      <a:solidFill>
+                        <a:srgbClr val="000000"/>
+                      </a:solidFill>
+                      <a:prstDash val="solid"/>
+                      <a:round/>
+                      <a:headEnd type="none" w="med" len="med"/>
+                      <a:tailEnd type="none" w="med" len="med"/>
+                    </a:lnT>
+                    <a:lnB w="6350" cap="flat" cmpd="sng" algn="ctr">
+                      <a:solidFill>
+                        <a:srgbClr val="000000"/>
+                      </a:solidFill>
+                      <a:prstDash val="solid"/>
+                      <a:round/>
+                      <a:headEnd type="none" w="med" len="med"/>
+                      <a:tailEnd type="none" w="med" len="med"/>
+                    </a:lnB>
+                  </a:tcPr>
+                </a:tc>
+              </a:tr>
+              <a:tr h="333695">
+                <a:tc>
+                  <a:txBody>
+                    <a:bodyPr/>
+                    <a:lstStyle/>
+                    <a:p>
+                      <a:pPr algn="ctr" fontAlgn="t"/>
+                      <a:r>
+                        <a:rPr lang="pt-PT" sz="1000" b="0" i="0" u="none" strike="noStrike" dirty="0">
+                          <a:solidFill>
+                            <a:srgbClr val="000000"/>
+                          </a:solidFill>
+                          <a:effectLst/>
+                          <a:latin typeface="Arial"/>
+                        </a:rPr>
+                        <a:t>1896</a:t>
+                      </a:r>
+                    </a:p>
+                  </a:txBody>
+                  <a:tcPr marL="9525" marR="9525" marT="9525" marB="0">
+                    <a:lnL w="6350" cap="flat" cmpd="sng" algn="ctr">
+                      <a:solidFill>
+                        <a:srgbClr val="000000"/>
+                      </a:solidFill>
+                      <a:prstDash val="solid"/>
+                      <a:round/>
+                      <a:headEnd type="none" w="med" len="med"/>
+                      <a:tailEnd type="none" w="med" len="med"/>
+                    </a:lnL>
+                    <a:lnR w="6350" cap="flat" cmpd="sng" algn="ctr">
+                      <a:solidFill>
+                        <a:srgbClr val="000000"/>
+                      </a:solidFill>
+                      <a:prstDash val="solid"/>
+                      <a:round/>
+                      <a:headEnd type="none" w="med" len="med"/>
+                      <a:tailEnd type="none" w="med" len="med"/>
+                    </a:lnR>
+                    <a:lnT w="6350" cap="flat" cmpd="sng" algn="ctr">
+                      <a:solidFill>
+                        <a:srgbClr val="000000"/>
+                      </a:solidFill>
+                      <a:prstDash val="solid"/>
+                      <a:round/>
+                      <a:headEnd type="none" w="med" len="med"/>
+                      <a:tailEnd type="none" w="med" len="med"/>
+                    </a:lnT>
+                    <a:lnB w="6350" cap="flat" cmpd="sng" algn="ctr">
+                      <a:solidFill>
+                        <a:srgbClr val="000000"/>
+                      </a:solidFill>
+                      <a:prstDash val="solid"/>
+                      <a:round/>
+                      <a:headEnd type="none" w="med" len="med"/>
+                      <a:tailEnd type="none" w="med" len="med"/>
+                    </a:lnB>
+                  </a:tcPr>
+                </a:tc>
+                <a:tc>
+                  <a:txBody>
+                    <a:bodyPr/>
+                    <a:lstStyle/>
+                    <a:p>
+                      <a:pPr algn="l" fontAlgn="t"/>
+                      <a:r>
+                        <a:rPr lang="pt-PT" sz="1000" b="0" i="0" u="none" strike="noStrike">
+                          <a:solidFill>
+                            <a:srgbClr val="000000"/>
+                          </a:solidFill>
+                          <a:effectLst/>
+                          <a:latin typeface="Arial"/>
+                        </a:rPr>
+                        <a:t>HUN</a:t>
+                      </a:r>
+                    </a:p>
+                  </a:txBody>
+                  <a:tcPr marL="9525" marR="9525" marT="9525" marB="0">
+                    <a:lnL w="6350" cap="flat" cmpd="sng" algn="ctr">
+                      <a:solidFill>
+                        <a:srgbClr val="000000"/>
+                      </a:solidFill>
+                      <a:prstDash val="solid"/>
+                      <a:round/>
+                      <a:headEnd type="none" w="med" len="med"/>
+                      <a:tailEnd type="none" w="med" len="med"/>
+                    </a:lnL>
+                    <a:lnR w="6350" cap="flat" cmpd="sng" algn="ctr">
+                      <a:solidFill>
+                        <a:srgbClr val="000000"/>
+                      </a:solidFill>
+                      <a:prstDash val="solid"/>
+                      <a:round/>
+                      <a:headEnd type="none" w="med" len="med"/>
+                      <a:tailEnd type="none" w="med" len="med"/>
+                    </a:lnR>
+                    <a:lnT w="6350" cap="flat" cmpd="sng" algn="ctr">
+                      <a:solidFill>
+                        <a:srgbClr val="000000"/>
+                      </a:solidFill>
+                      <a:prstDash val="solid"/>
+                      <a:round/>
+                      <a:headEnd type="none" w="med" len="med"/>
+                      <a:tailEnd type="none" w="med" len="med"/>
+                    </a:lnT>
+                    <a:lnB w="6350" cap="flat" cmpd="sng" algn="ctr">
+                      <a:solidFill>
+                        <a:srgbClr val="000000"/>
+                      </a:solidFill>
+                      <a:prstDash val="solid"/>
+                      <a:round/>
+                      <a:headEnd type="none" w="med" len="med"/>
+                      <a:tailEnd type="none" w="med" len="med"/>
+                    </a:lnB>
+                  </a:tcPr>
+                </a:tc>
+                <a:tc>
+                  <a:txBody>
+                    <a:bodyPr/>
+                    <a:lstStyle/>
+                    <a:p>
+                      <a:pPr algn="l" fontAlgn="t"/>
+                      <a:r>
+                        <a:rPr lang="pt-PT" sz="1000" b="0" i="0" u="none" strike="noStrike" dirty="0">
+                          <a:solidFill>
+                            <a:srgbClr val="000000"/>
+                          </a:solidFill>
+                          <a:effectLst/>
+                          <a:latin typeface="Arial"/>
+                        </a:rPr>
+                        <a:t>Gold</a:t>
+                      </a:r>
+                    </a:p>
+                  </a:txBody>
+                  <a:tcPr marL="9525" marR="9525" marT="9525" marB="0">
+                    <a:lnL w="6350" cap="flat" cmpd="sng" algn="ctr">
+                      <a:solidFill>
+                        <a:srgbClr val="000000"/>
+                      </a:solidFill>
+                      <a:prstDash val="solid"/>
+                      <a:round/>
+                      <a:headEnd type="none" w="med" len="med"/>
+                      <a:tailEnd type="none" w="med" len="med"/>
+                    </a:lnL>
+                    <a:lnR w="6350" cap="flat" cmpd="sng" algn="ctr">
+                      <a:solidFill>
+                        <a:srgbClr val="000000"/>
+                      </a:solidFill>
+                      <a:prstDash val="solid"/>
+                      <a:round/>
+                      <a:headEnd type="none" w="med" len="med"/>
+                      <a:tailEnd type="none" w="med" len="med"/>
+                    </a:lnR>
+                    <a:lnT w="6350" cap="flat" cmpd="sng" algn="ctr">
+                      <a:solidFill>
+                        <a:srgbClr val="000000"/>
+                      </a:solidFill>
+                      <a:prstDash val="solid"/>
+                      <a:round/>
+                      <a:headEnd type="none" w="med" len="med"/>
+                      <a:tailEnd type="none" w="med" len="med"/>
+                    </a:lnT>
+                    <a:lnB w="6350" cap="flat" cmpd="sng" algn="ctr">
+                      <a:solidFill>
+                        <a:srgbClr val="000000"/>
+                      </a:solidFill>
+                      <a:prstDash val="solid"/>
+                      <a:round/>
+                      <a:headEnd type="none" w="med" len="med"/>
+                      <a:tailEnd type="none" w="med" len="med"/>
+                    </a:lnB>
+                  </a:tcPr>
+                </a:tc>
+              </a:tr>
+              <a:tr h="333695">
+                <a:tc>
+                  <a:txBody>
+                    <a:bodyPr/>
+                    <a:lstStyle/>
+                    <a:p>
+                      <a:pPr algn="ctr" fontAlgn="t"/>
+                      <a:r>
+                        <a:rPr lang="pt-PT" sz="1000" b="0" i="0" u="none" strike="noStrike" dirty="0">
+                          <a:solidFill>
+                            <a:srgbClr val="000000"/>
+                          </a:solidFill>
+                          <a:effectLst/>
+                          <a:latin typeface="Arial"/>
+                        </a:rPr>
+                        <a:t>1896</a:t>
+                      </a:r>
+                    </a:p>
+                  </a:txBody>
+                  <a:tcPr marL="9525" marR="9525" marT="9525" marB="0">
+                    <a:lnL w="6350" cap="flat" cmpd="sng" algn="ctr">
+                      <a:solidFill>
+                        <a:srgbClr val="000000"/>
+                      </a:solidFill>
+                      <a:prstDash val="solid"/>
+                      <a:round/>
+                      <a:headEnd type="none" w="med" len="med"/>
+                      <a:tailEnd type="none" w="med" len="med"/>
+                    </a:lnL>
+                    <a:lnR w="6350" cap="flat" cmpd="sng" algn="ctr">
+                      <a:solidFill>
+                        <a:srgbClr val="000000"/>
+                      </a:solidFill>
+                      <a:prstDash val="solid"/>
+                      <a:round/>
+                      <a:headEnd type="none" w="med" len="med"/>
+                      <a:tailEnd type="none" w="med" len="med"/>
+                    </a:lnR>
+                    <a:lnT w="6350" cap="flat" cmpd="sng" algn="ctr">
+                      <a:solidFill>
+                        <a:srgbClr val="000000"/>
+                      </a:solidFill>
+                      <a:prstDash val="solid"/>
+                      <a:round/>
+                      <a:headEnd type="none" w="med" len="med"/>
+                      <a:tailEnd type="none" w="med" len="med"/>
+                    </a:lnT>
+                    <a:lnB w="6350" cap="flat" cmpd="sng" algn="ctr">
+                      <a:solidFill>
+                        <a:srgbClr val="000000"/>
+                      </a:solidFill>
+                      <a:prstDash val="solid"/>
+                      <a:round/>
+                      <a:headEnd type="none" w="med" len="med"/>
+                      <a:tailEnd type="none" w="med" len="med"/>
+                    </a:lnB>
+                  </a:tcPr>
+                </a:tc>
+                <a:tc>
+                  <a:txBody>
+                    <a:bodyPr/>
+                    <a:lstStyle/>
+                    <a:p>
+                      <a:pPr algn="l" fontAlgn="t"/>
+                      <a:r>
+                        <a:rPr lang="pt-PT" sz="1000" b="0" i="0" u="none" strike="noStrike" dirty="0">
+                          <a:solidFill>
+                            <a:srgbClr val="000000"/>
+                          </a:solidFill>
+                          <a:effectLst/>
+                          <a:latin typeface="Arial"/>
+                        </a:rPr>
+                        <a:t>AUT</a:t>
+                      </a:r>
+                    </a:p>
+                  </a:txBody>
+                  <a:tcPr marL="9525" marR="9525" marT="9525" marB="0">
+                    <a:lnL w="6350" cap="flat" cmpd="sng" algn="ctr">
+                      <a:solidFill>
+                        <a:srgbClr val="000000"/>
+                      </a:solidFill>
+                      <a:prstDash val="solid"/>
+                      <a:round/>
+                      <a:headEnd type="none" w="med" len="med"/>
+                      <a:tailEnd type="none" w="med" len="med"/>
+                    </a:lnL>
+                    <a:lnR w="6350" cap="flat" cmpd="sng" algn="ctr">
+                      <a:solidFill>
+                        <a:srgbClr val="000000"/>
+                      </a:solidFill>
+                      <a:prstDash val="solid"/>
+                      <a:round/>
+                      <a:headEnd type="none" w="med" len="med"/>
+                      <a:tailEnd type="none" w="med" len="med"/>
+                    </a:lnR>
+                    <a:lnT w="6350" cap="flat" cmpd="sng" algn="ctr">
+                      <a:solidFill>
+                        <a:srgbClr val="000000"/>
+                      </a:solidFill>
+                      <a:prstDash val="solid"/>
+                      <a:round/>
+                      <a:headEnd type="none" w="med" len="med"/>
+                      <a:tailEnd type="none" w="med" len="med"/>
+                    </a:lnT>
+                    <a:lnB w="6350" cap="flat" cmpd="sng" algn="ctr">
+                      <a:solidFill>
+                        <a:srgbClr val="000000"/>
+                      </a:solidFill>
+                      <a:prstDash val="solid"/>
+                      <a:round/>
+                      <a:headEnd type="none" w="med" len="med"/>
+                      <a:tailEnd type="none" w="med" len="med"/>
+                    </a:lnB>
+                  </a:tcPr>
+                </a:tc>
+                <a:tc>
+                  <a:txBody>
+                    <a:bodyPr/>
+                    <a:lstStyle/>
+                    <a:p>
+                      <a:pPr algn="l" fontAlgn="t"/>
+                      <a:r>
+                        <a:rPr lang="pt-PT" sz="1000" b="0" i="0" u="none" strike="noStrike">
+                          <a:solidFill>
+                            <a:srgbClr val="000000"/>
+                          </a:solidFill>
+                          <a:effectLst/>
+                          <a:latin typeface="Arial"/>
+                        </a:rPr>
+                        <a:t>Silver</a:t>
+                      </a:r>
+                    </a:p>
+                  </a:txBody>
+                  <a:tcPr marL="9525" marR="9525" marT="9525" marB="0">
+                    <a:lnL w="6350" cap="flat" cmpd="sng" algn="ctr">
+                      <a:solidFill>
+                        <a:srgbClr val="000000"/>
+                      </a:solidFill>
+                      <a:prstDash val="solid"/>
+                      <a:round/>
+                      <a:headEnd type="none" w="med" len="med"/>
+                      <a:tailEnd type="none" w="med" len="med"/>
+                    </a:lnL>
+                    <a:lnR w="6350" cap="flat" cmpd="sng" algn="ctr">
+                      <a:solidFill>
+                        <a:srgbClr val="000000"/>
+                      </a:solidFill>
+                      <a:prstDash val="solid"/>
+                      <a:round/>
+                      <a:headEnd type="none" w="med" len="med"/>
+                      <a:tailEnd type="none" w="med" len="med"/>
+                    </a:lnR>
+                    <a:lnT w="6350" cap="flat" cmpd="sng" algn="ctr">
+                      <a:solidFill>
+                        <a:srgbClr val="000000"/>
+                      </a:solidFill>
+                      <a:prstDash val="solid"/>
+                      <a:round/>
+                      <a:headEnd type="none" w="med" len="med"/>
+                      <a:tailEnd type="none" w="med" len="med"/>
+                    </a:lnT>
+                    <a:lnB w="6350" cap="flat" cmpd="sng" algn="ctr">
+                      <a:solidFill>
+                        <a:srgbClr val="000000"/>
+                      </a:solidFill>
+                      <a:prstDash val="solid"/>
+                      <a:round/>
+                      <a:headEnd type="none" w="med" len="med"/>
+                      <a:tailEnd type="none" w="med" len="med"/>
+                    </a:lnB>
+                  </a:tcPr>
+                </a:tc>
+              </a:tr>
+              <a:tr h="333695">
+                <a:tc>
+                  <a:txBody>
+                    <a:bodyPr/>
+                    <a:lstStyle/>
+                    <a:p>
+                      <a:pPr algn="ctr" fontAlgn="t"/>
+                      <a:r>
+                        <a:rPr lang="pt-PT" sz="1000" b="0" i="0" u="none" strike="noStrike" dirty="0">
+                          <a:solidFill>
+                            <a:srgbClr val="000000"/>
+                          </a:solidFill>
+                          <a:effectLst/>
+                          <a:latin typeface="Arial"/>
+                        </a:rPr>
+                        <a:t>1896</a:t>
+                      </a:r>
+                    </a:p>
+                  </a:txBody>
+                  <a:tcPr marL="9525" marR="9525" marT="9525" marB="0">
+                    <a:lnL w="6350" cap="flat" cmpd="sng" algn="ctr">
+                      <a:solidFill>
+                        <a:srgbClr val="000000"/>
+                      </a:solidFill>
+                      <a:prstDash val="solid"/>
+                      <a:round/>
+                      <a:headEnd type="none" w="med" len="med"/>
+                      <a:tailEnd type="none" w="med" len="med"/>
+                    </a:lnL>
+                    <a:lnR w="6350" cap="flat" cmpd="sng" algn="ctr">
+                      <a:solidFill>
+                        <a:srgbClr val="000000"/>
+                      </a:solidFill>
+                      <a:prstDash val="solid"/>
+                      <a:round/>
+                      <a:headEnd type="none" w="med" len="med"/>
+                      <a:tailEnd type="none" w="med" len="med"/>
+                    </a:lnR>
+                    <a:lnT w="6350" cap="flat" cmpd="sng" algn="ctr">
+                      <a:solidFill>
+                        <a:srgbClr val="000000"/>
+                      </a:solidFill>
+                      <a:prstDash val="solid"/>
+                      <a:round/>
+                      <a:headEnd type="none" w="med" len="med"/>
+                      <a:tailEnd type="none" w="med" len="med"/>
+                    </a:lnT>
+                    <a:lnB w="6350" cap="flat" cmpd="sng" algn="ctr">
+                      <a:solidFill>
+                        <a:srgbClr val="000000"/>
+                      </a:solidFill>
+                      <a:prstDash val="solid"/>
+                      <a:round/>
+                      <a:headEnd type="none" w="med" len="med"/>
+                      <a:tailEnd type="none" w="med" len="med"/>
+                    </a:lnB>
+                  </a:tcPr>
+                </a:tc>
+                <a:tc>
+                  <a:txBody>
+                    <a:bodyPr/>
+                    <a:lstStyle/>
+                    <a:p>
+                      <a:pPr algn="l" fontAlgn="t"/>
+                      <a:r>
+                        <a:rPr lang="pt-PT" sz="1000" b="0" i="0" u="none" strike="noStrike">
+                          <a:solidFill>
+                            <a:srgbClr val="000000"/>
+                          </a:solidFill>
+                          <a:effectLst/>
+                          <a:latin typeface="Arial"/>
+                        </a:rPr>
+                        <a:t>GRE</a:t>
+                      </a:r>
+                    </a:p>
+                  </a:txBody>
+                  <a:tcPr marL="9525" marR="9525" marT="9525" marB="0">
+                    <a:lnL w="6350" cap="flat" cmpd="sng" algn="ctr">
+                      <a:solidFill>
+                        <a:srgbClr val="000000"/>
+                      </a:solidFill>
+                      <a:prstDash val="solid"/>
+                      <a:round/>
+                      <a:headEnd type="none" w="med" len="med"/>
+                      <a:tailEnd type="none" w="med" len="med"/>
+                    </a:lnL>
+                    <a:lnR w="6350" cap="flat" cmpd="sng" algn="ctr">
+                      <a:solidFill>
+                        <a:srgbClr val="000000"/>
+                      </a:solidFill>
+                      <a:prstDash val="solid"/>
+                      <a:round/>
+                      <a:headEnd type="none" w="med" len="med"/>
+                      <a:tailEnd type="none" w="med" len="med"/>
+                    </a:lnR>
+                    <a:lnT w="6350" cap="flat" cmpd="sng" algn="ctr">
+                      <a:solidFill>
+                        <a:srgbClr val="000000"/>
+                      </a:solidFill>
+                      <a:prstDash val="solid"/>
+                      <a:round/>
+                      <a:headEnd type="none" w="med" len="med"/>
+                      <a:tailEnd type="none" w="med" len="med"/>
+                    </a:lnT>
+                    <a:lnB w="6350" cap="flat" cmpd="sng" algn="ctr">
+                      <a:solidFill>
+                        <a:srgbClr val="000000"/>
+                      </a:solidFill>
+                      <a:prstDash val="solid"/>
+                      <a:round/>
+                      <a:headEnd type="none" w="med" len="med"/>
+                      <a:tailEnd type="none" w="med" len="med"/>
+                    </a:lnB>
+                  </a:tcPr>
+                </a:tc>
+                <a:tc>
+                  <a:txBody>
+                    <a:bodyPr/>
+                    <a:lstStyle/>
+                    <a:p>
+                      <a:pPr algn="l" fontAlgn="t"/>
+                      <a:r>
+                        <a:rPr lang="pt-PT" sz="1000" b="0" i="0" u="none" strike="noStrike" dirty="0">
+                          <a:solidFill>
+                            <a:srgbClr val="000000"/>
+                          </a:solidFill>
+                          <a:effectLst/>
+                          <a:latin typeface="Arial"/>
+                        </a:rPr>
+                        <a:t>Bronze</a:t>
+                      </a:r>
+                    </a:p>
+                  </a:txBody>
+                  <a:tcPr marL="9525" marR="9525" marT="9525" marB="0">
+                    <a:lnL w="6350" cap="flat" cmpd="sng" algn="ctr">
+                      <a:solidFill>
+                        <a:srgbClr val="000000"/>
+                      </a:solidFill>
+                      <a:prstDash val="solid"/>
+                      <a:round/>
+                      <a:headEnd type="none" w="med" len="med"/>
+                      <a:tailEnd type="none" w="med" len="med"/>
+                    </a:lnL>
+                    <a:lnR w="6350" cap="flat" cmpd="sng" algn="ctr">
+                      <a:solidFill>
+                        <a:srgbClr val="000000"/>
+                      </a:solidFill>
+                      <a:prstDash val="solid"/>
+                      <a:round/>
+                      <a:headEnd type="none" w="med" len="med"/>
+                      <a:tailEnd type="none" w="med" len="med"/>
+                    </a:lnR>
+                    <a:lnT w="6350" cap="flat" cmpd="sng" algn="ctr">
+                      <a:solidFill>
+                        <a:srgbClr val="000000"/>
+                      </a:solidFill>
+                      <a:prstDash val="solid"/>
+                      <a:round/>
+                      <a:headEnd type="none" w="med" len="med"/>
+                      <a:tailEnd type="none" w="med" len="med"/>
+                    </a:lnT>
+                    <a:lnB w="6350" cap="flat" cmpd="sng" algn="ctr">
+                      <a:solidFill>
+                        <a:srgbClr val="000000"/>
+                      </a:solidFill>
+                      <a:prstDash val="solid"/>
+                      <a:round/>
+                      <a:headEnd type="none" w="med" len="med"/>
+                      <a:tailEnd type="none" w="med" len="med"/>
+                    </a:lnB>
+                  </a:tcPr>
+                </a:tc>
+              </a:tr>
+            </a:tbl>
+          </a:graphicData>
+        </a:graphic>
+      </p:graphicFrame>
+      <p:sp>
+        <p:nvSpPr>
+          <p:cNvPr id="6" name="Right Arrow 5"/>
+          <p:cNvSpPr/>
+          <p:nvPr/>
+        </p:nvSpPr>
+        <p:spPr>
+          <a:xfrm>
+            <a:off x="3707904" y="3933056"/>
+            <a:ext cx="1440160" cy="792088"/>
+          </a:xfrm>
+          <a:prstGeom prst="rightArrow">
+            <a:avLst/>
+          </a:prstGeom>
+        </p:spPr>
+        <p:style>
+          <a:lnRef idx="2">
+            <a:schemeClr val="accent1">
+              <a:shade val="50000"/>
+            </a:schemeClr>
+          </a:lnRef>
+          <a:fillRef idx="1">
+            <a:schemeClr val="accent1"/>
+          </a:fillRef>
+          <a:effectRef idx="0">
+            <a:schemeClr val="accent1"/>
+          </a:effectRef>
+          <a:fontRef idx="minor">
+            <a:schemeClr val="lt1"/>
+          </a:fontRef>
+        </p:style>
+        <p:txBody>
+          <a:bodyPr rtlCol="0" anchor="ctr"/>
+          <a:lstStyle/>
+          <a:p>
+            <a:pPr algn="ctr"/>
+            <a:r>
+              <a:rPr lang="pt-PT" dirty="0" smtClean="0">
+                <a:solidFill>
+                  <a:schemeClr val="bg1"/>
+                </a:solidFill>
+              </a:rPr>
+              <a:t>Group By</a:t>
+            </a:r>
+            <a:endParaRPr lang="en-US" dirty="0">
+              <a:solidFill>
+                <a:schemeClr val="bg1"/>
+              </a:solidFill>
+            </a:endParaRPr>
+          </a:p>
+        </p:txBody>
+      </p:sp>
+      <p:pic>
+        <p:nvPicPr>
+          <p:cNvPr id="1026" name="Picture 2" descr="http://puu.sh/kPiam/dff9a20e8f.png"/>
+          <p:cNvPicPr>
+            <a:picLocks noChangeAspect="1" noChangeArrowheads="1"/>
+          </p:cNvPicPr>
+          <p:nvPr/>
+        </p:nvPicPr>
+        <p:blipFill>
+          <a:blip r:embed="rId3">
+            <a:extLst>
+              <a:ext uri="{28A0092B-C50C-407E-A947-70E740481C1C}">
+                <a14:useLocalDpi xmlns:a14="http://schemas.microsoft.com/office/drawing/2010/main" val="0"/>
+              </a:ext>
+            </a:extLst>
+          </a:blip>
+          <a:srcRect/>
+          <a:stretch>
+            <a:fillRect/>
+          </a:stretch>
+        </p:blipFill>
+        <p:spPr bwMode="auto">
+          <a:xfrm>
+            <a:off x="5508104" y="3519474"/>
+            <a:ext cx="2286000" cy="1619251"/>
+          </a:xfrm>
+          <a:prstGeom prst="rect">
+            <a:avLst/>
+          </a:prstGeom>
+          <a:noFill/>
+          <a:extLst>
+            <a:ext uri="{909E8E84-426E-40DD-AFC4-6F175D3DCCD1}">
+              <a14:hiddenFill xmlns:a14="http://schemas.microsoft.com/office/drawing/2010/main">
+                <a:solidFill>
+                  <a:srgbClr val="FFFFFF"/>
+                </a:solidFill>
+              </a14:hiddenFill>
+            </a:ext>
+          </a:extLst>
+        </p:spPr>
+      </p:pic>
+    </p:spTree>
+    <p:extLst>
+      <p:ext uri="{BB962C8B-B14F-4D97-AF65-F5344CB8AC3E}">
+        <p14:creationId xmlns:p14="http://schemas.microsoft.com/office/powerpoint/2010/main" val="3320446929"/>
+      </p:ext>
+    </p:extLst>
+  </p:cSld>
+  <p:clrMapOvr>
+    <a:masterClrMapping/>
+  </p:clrMapOvr>
+  <p:timing>
+    <p:tnLst>
+      <p:par>
+        <p:cTn id="1" dur="indefinite" restart="never" nodeType="tmRoot"/>
+      </p:par>
+    </p:tnLst>
+  </p:timing>
+</p:sld>
+</file>
+
+<file path=ppt/slides/slide45.xml><?xml version="1.0" encoding="utf-8"?>
+<p:sld xmlns:a="http://schemas.openxmlformats.org/drawingml/2006/main" xmlns:r="http://schemas.openxmlformats.org/officeDocument/2006/relationships" xmlns:p="http://schemas.openxmlformats.org/presentationml/2006/main">
+  <p:cSld>
+    <p:spTree>
+      <p:nvGrpSpPr>
+        <p:cNvPr id="1" name=""/>
+        <p:cNvGrpSpPr/>
+        <p:nvPr/>
+      </p:nvGrpSpPr>
+      <p:grpSpPr>
+        <a:xfrm>
+          <a:off x="0" y="0"/>
+          <a:ext cx="0" cy="0"/>
+          <a:chOff x="0" y="0"/>
+          <a:chExt cx="0" cy="0"/>
+        </a:xfrm>
+      </p:grpSpPr>
+      <p:sp>
+        <p:nvSpPr>
+          <p:cNvPr id="2" name="Title 1"/>
+          <p:cNvSpPr>
+            <a:spLocks noGrp="1"/>
+          </p:cNvSpPr>
+          <p:nvPr>
+            <p:ph type="title"/>
+          </p:nvPr>
+        </p:nvSpPr>
+        <p:spPr/>
+        <p:txBody>
+          <a:bodyPr/>
+          <a:lstStyle/>
+          <a:p>
+            <a:r>
+              <a:rPr lang="en-US" dirty="0" smtClean="0"/>
+              <a:t>Dataset processing</a:t>
+            </a:r>
+            <a:endParaRPr lang="pt-PT" dirty="0"/>
+          </a:p>
+        </p:txBody>
+      </p:sp>
+      <p:sp>
+        <p:nvSpPr>
+          <p:cNvPr id="3" name="Content Placeholder 2"/>
+          <p:cNvSpPr>
+            <a:spLocks noGrp="1"/>
+          </p:cNvSpPr>
+          <p:nvPr>
+            <p:ph idx="1"/>
+          </p:nvPr>
+        </p:nvSpPr>
+        <p:spPr>
+          <a:xfrm>
+            <a:off x="457200" y="1094346"/>
+            <a:ext cx="8229600" cy="5214974"/>
+          </a:xfrm>
+        </p:spPr>
+        <p:txBody>
+          <a:bodyPr>
+            <a:noAutofit/>
+          </a:bodyPr>
+          <a:lstStyle/>
+          <a:p>
+            <a:r>
+              <a:rPr lang="en-US" sz="4000" dirty="0" smtClean="0"/>
+              <a:t>How to get the winners/population coefficient?</a:t>
+            </a:r>
+            <a:endParaRPr lang="en-US" sz="4000" dirty="0"/>
+          </a:p>
+          <a:p>
+            <a:pPr lvl="1"/>
+            <a:r>
+              <a:rPr lang="pt-PT" sz="3600" dirty="0" smtClean="0"/>
+              <a:t>We also had the population</a:t>
+            </a:r>
+            <a:endParaRPr lang="en-US" sz="3600" dirty="0"/>
+          </a:p>
+          <a:p>
+            <a:r>
+              <a:rPr lang="en-US" sz="4000" dirty="0" smtClean="0"/>
+              <a:t>	</a:t>
+            </a:r>
+            <a:endParaRPr lang="en-US" sz="4000" dirty="0"/>
+          </a:p>
+        </p:txBody>
+      </p:sp>
+      <p:pic>
+        <p:nvPicPr>
+          <p:cNvPr id="7" name="Picture 2"/>
+          <p:cNvPicPr>
+            <a:picLocks noChangeAspect="1" noChangeArrowheads="1"/>
+          </p:cNvPicPr>
+          <p:nvPr/>
+        </p:nvPicPr>
+        <p:blipFill>
+          <a:blip r:embed="rId3">
+            <a:extLst>
+              <a:ext uri="{28A0092B-C50C-407E-A947-70E740481C1C}">
+                <a14:useLocalDpi xmlns:a14="http://schemas.microsoft.com/office/drawing/2010/main" val="0"/>
+              </a:ext>
+            </a:extLst>
+          </a:blip>
+          <a:srcRect/>
+          <a:stretch>
+            <a:fillRect/>
+          </a:stretch>
+        </p:blipFill>
+        <p:spPr bwMode="auto">
+          <a:xfrm>
+            <a:off x="899592" y="3356992"/>
+            <a:ext cx="7311492" cy="1749549"/>
+          </a:xfrm>
+          <a:prstGeom prst="rect">
+            <a:avLst/>
+          </a:prstGeom>
+          <a:noFill/>
+          <a:ln>
+            <a:noFill/>
+          </a:ln>
+          <a:effectLst/>
+          <a:extLst>
+            <a:ext uri="{909E8E84-426E-40DD-AFC4-6F175D3DCCD1}">
+              <a14:hiddenFill xmlns:a14="http://schemas.microsoft.com/office/drawing/2010/main">
+                <a:solidFill>
+                  <a:schemeClr val="accent1"/>
+                </a:solidFill>
+              </a14:hiddenFill>
+            </a:ext>
+            <a:ext uri="{91240B29-F687-4F45-9708-019B960494DF}">
+              <a14:hiddenLine xmlns:a14="http://schemas.microsoft.com/office/drawing/2010/main" w="9525">
+                <a:solidFill>
+                  <a:schemeClr val="tx1"/>
+                </a:solidFill>
+                <a:miter lim="800000"/>
+                <a:headEnd/>
+                <a:tailEnd/>
+              </a14:hiddenLine>
+            </a:ext>
+            <a:ext uri="{AF507438-7753-43E0-B8FC-AC1667EBCBE1}">
+              <a14:hiddenEffects xmlns:a14="http://schemas.microsoft.com/office/drawing/2010/main">
+                <a:effectLst>
+                  <a:outerShdw dist="35921" dir="2700000" algn="ctr" rotWithShape="0">
+                    <a:schemeClr val="bg2"/>
+                  </a:outerShdw>
+                </a:effectLst>
+              </a14:hiddenEffects>
+            </a:ext>
+          </a:extLst>
+        </p:spPr>
+      </p:pic>
+    </p:spTree>
+    <p:extLst>
+      <p:ext uri="{BB962C8B-B14F-4D97-AF65-F5344CB8AC3E}">
+        <p14:creationId xmlns:p14="http://schemas.microsoft.com/office/powerpoint/2010/main" val="3573519053"/>
+      </p:ext>
+    </p:extLst>
+  </p:cSld>
+  <p:clrMapOvr>
+    <a:masterClrMapping/>
+  </p:clrMapOvr>
+  <p:timing>
+    <p:tnLst>
+      <p:par>
+        <p:cTn id="1" dur="indefinite" restart="never" nodeType="tmRoot"/>
+      </p:par>
+    </p:tnLst>
+  </p:timing>
+</p:sld>
+</file>
+
+<file path=ppt/slides/slide46.xml><?xml version="1.0" encoding="utf-8"?>
+<p:sld xmlns:a="http://schemas.openxmlformats.org/drawingml/2006/main" xmlns:r="http://schemas.openxmlformats.org/officeDocument/2006/relationships" xmlns:p="http://schemas.openxmlformats.org/presentationml/2006/main">
+  <p:cSld>
+    <p:spTree>
+      <p:nvGrpSpPr>
+        <p:cNvPr id="1" name=""/>
+        <p:cNvGrpSpPr/>
+        <p:nvPr/>
+      </p:nvGrpSpPr>
+      <p:grpSpPr>
+        <a:xfrm>
+          <a:off x="0" y="0"/>
+          <a:ext cx="0" cy="0"/>
+          <a:chOff x="0" y="0"/>
+          <a:chExt cx="0" cy="0"/>
+        </a:xfrm>
+      </p:grpSpPr>
+      <p:sp>
+        <p:nvSpPr>
+          <p:cNvPr id="2" name="Title 1"/>
+          <p:cNvSpPr>
+            <a:spLocks noGrp="1"/>
+          </p:cNvSpPr>
+          <p:nvPr>
+            <p:ph type="title"/>
+          </p:nvPr>
+        </p:nvSpPr>
+        <p:spPr/>
+        <p:txBody>
+          <a:bodyPr/>
+          <a:lstStyle/>
+          <a:p>
+            <a:r>
+              <a:rPr lang="en-US" dirty="0" smtClean="0"/>
+              <a:t>Dataset processing</a:t>
+            </a:r>
+            <a:endParaRPr lang="pt-PT" dirty="0"/>
+          </a:p>
+        </p:txBody>
+      </p:sp>
+      <p:sp>
+        <p:nvSpPr>
+          <p:cNvPr id="3" name="Content Placeholder 2"/>
+          <p:cNvSpPr>
+            <a:spLocks noGrp="1"/>
+          </p:cNvSpPr>
+          <p:nvPr>
+            <p:ph idx="1"/>
+          </p:nvPr>
+        </p:nvSpPr>
+        <p:spPr>
+          <a:xfrm>
+            <a:off x="457200" y="1094346"/>
+            <a:ext cx="8229600" cy="5214974"/>
+          </a:xfrm>
+        </p:spPr>
+        <p:txBody>
+          <a:bodyPr>
+            <a:noAutofit/>
+          </a:bodyPr>
+          <a:lstStyle/>
+          <a:p>
+            <a:r>
+              <a:rPr lang="en-US" sz="4000" dirty="0" smtClean="0"/>
+              <a:t>How to get the winners/population coefficient?</a:t>
+            </a:r>
+            <a:endParaRPr lang="en-US" sz="4000" dirty="0"/>
+          </a:p>
+          <a:p>
+            <a:pPr lvl="1"/>
+            <a:r>
+              <a:rPr lang="pt-PT" sz="3600" dirty="0" smtClean="0"/>
+              <a:t>We let Pentaho work on that...</a:t>
+            </a:r>
+            <a:endParaRPr lang="en-US" sz="3600" dirty="0"/>
+          </a:p>
+          <a:p>
+            <a:r>
+              <a:rPr lang="en-US" sz="4000" dirty="0" smtClean="0"/>
+              <a:t>	</a:t>
+            </a:r>
+            <a:endParaRPr lang="en-US" sz="4000" dirty="0"/>
+          </a:p>
+        </p:txBody>
+      </p:sp>
+      <p:pic>
+        <p:nvPicPr>
+          <p:cNvPr id="2050" name="Picture 2" descr="http://puu.sh/kPiwT/aed4952bf2.png"/>
+          <p:cNvPicPr>
+            <a:picLocks noChangeAspect="1" noChangeArrowheads="1"/>
+          </p:cNvPicPr>
+          <p:nvPr/>
+        </p:nvPicPr>
+        <p:blipFill>
+          <a:blip r:embed="rId3">
+            <a:extLst>
+              <a:ext uri="{28A0092B-C50C-407E-A947-70E740481C1C}">
+                <a14:useLocalDpi xmlns:a14="http://schemas.microsoft.com/office/drawing/2010/main" val="0"/>
+              </a:ext>
+            </a:extLst>
+          </a:blip>
+          <a:srcRect/>
+          <a:stretch>
+            <a:fillRect/>
+          </a:stretch>
+        </p:blipFill>
+        <p:spPr bwMode="auto">
+          <a:xfrm>
+            <a:off x="395536" y="3717032"/>
+            <a:ext cx="8293418" cy="2232248"/>
+          </a:xfrm>
+          <a:prstGeom prst="rect">
+            <a:avLst/>
+          </a:prstGeom>
+          <a:noFill/>
+          <a:extLst>
+            <a:ext uri="{909E8E84-426E-40DD-AFC4-6F175D3DCCD1}">
+              <a14:hiddenFill xmlns:a14="http://schemas.microsoft.com/office/drawing/2010/main">
+                <a:solidFill>
+                  <a:srgbClr val="FFFFFF"/>
+                </a:solidFill>
+              </a14:hiddenFill>
+            </a:ext>
+          </a:extLst>
+        </p:spPr>
+      </p:pic>
+      <p:sp>
+        <p:nvSpPr>
+          <p:cNvPr id="4" name="TextBox 3"/>
+          <p:cNvSpPr txBox="1"/>
+          <p:nvPr/>
+        </p:nvSpPr>
+        <p:spPr>
+          <a:xfrm>
+            <a:off x="1187624" y="3717032"/>
+            <a:ext cx="7632848" cy="2585323"/>
+          </a:xfrm>
+          <a:prstGeom prst="rect">
+            <a:avLst/>
+          </a:prstGeom>
+          <a:noFill/>
+        </p:spPr>
+        <p:txBody>
+          <a:bodyPr wrap="square" rtlCol="0">
+            <a:spAutoFit/>
+          </a:bodyPr>
+          <a:lstStyle/>
+          <a:p>
+            <a:r>
+              <a:rPr lang="pt-PT" dirty="0" smtClean="0"/>
+              <a:t>	Sort by country code</a:t>
+            </a:r>
+          </a:p>
+          <a:p>
+            <a:endParaRPr lang="pt-PT" dirty="0"/>
+          </a:p>
+          <a:p>
+            <a:r>
+              <a:rPr lang="pt-PT" dirty="0" smtClean="0"/>
+              <a:t>		      Merge by code		Sort by code</a:t>
+            </a:r>
+          </a:p>
+          <a:p>
+            <a:endParaRPr lang="pt-PT" dirty="0"/>
+          </a:p>
+          <a:p>
+            <a:endParaRPr lang="pt-PT" dirty="0" smtClean="0"/>
+          </a:p>
+          <a:p>
+            <a:r>
+              <a:rPr lang="pt-PT" dirty="0" smtClean="0"/>
+              <a:t>			Select those with		Divide</a:t>
+            </a:r>
+            <a:endParaRPr lang="pt-PT" dirty="0"/>
+          </a:p>
+          <a:p>
+            <a:r>
+              <a:rPr lang="pt-PT" dirty="0" smtClean="0"/>
+              <a:t>			     equal years</a:t>
+            </a:r>
+          </a:p>
+          <a:p>
+            <a:r>
+              <a:rPr lang="pt-PT" dirty="0" smtClean="0"/>
+              <a:t>		Normalise by year</a:t>
+            </a:r>
+            <a:endParaRPr lang="pt-PT" dirty="0"/>
+          </a:p>
+          <a:p>
+            <a:r>
+              <a:rPr lang="pt-PT" dirty="0" smtClean="0"/>
+              <a:t>Sort by code</a:t>
+            </a:r>
+            <a:endParaRPr lang="en-US" dirty="0"/>
+          </a:p>
+        </p:txBody>
+      </p:sp>
+      <p:sp>
+        <p:nvSpPr>
+          <p:cNvPr id="5" name="Lightning Bolt 4"/>
+          <p:cNvSpPr/>
+          <p:nvPr/>
+        </p:nvSpPr>
+        <p:spPr>
+          <a:xfrm rot="10426998">
+            <a:off x="7382820" y="5229200"/>
+            <a:ext cx="504056" cy="576064"/>
+          </a:xfrm>
+          <a:prstGeom prst="lightningBolt">
+            <a:avLst/>
+          </a:prstGeom>
+          <a:solidFill>
+            <a:srgbClr val="FFFF00"/>
+          </a:solidFill>
+          <a:ln>
+            <a:solidFill>
+              <a:srgbClr val="C00000"/>
+            </a:solidFill>
+          </a:ln>
+        </p:spPr>
+        <p:style>
+          <a:lnRef idx="2">
+            <a:schemeClr val="accent1">
+              <a:shade val="50000"/>
+            </a:schemeClr>
+          </a:lnRef>
+          <a:fillRef idx="1">
+            <a:schemeClr val="accent1"/>
+          </a:fillRef>
+          <a:effectRef idx="0">
+            <a:schemeClr val="accent1"/>
+          </a:effectRef>
+          <a:fontRef idx="minor">
+            <a:schemeClr val="lt1"/>
+          </a:fontRef>
+        </p:style>
+        <p:txBody>
+          <a:bodyPr rtlCol="0" anchor="ctr"/>
+          <a:lstStyle/>
+          <a:p>
+            <a:pPr algn="ctr"/>
+            <a:endParaRPr lang="en-US"/>
+          </a:p>
+        </p:txBody>
+      </p:sp>
+    </p:spTree>
+    <p:extLst>
+      <p:ext uri="{BB962C8B-B14F-4D97-AF65-F5344CB8AC3E}">
+        <p14:creationId xmlns:p14="http://schemas.microsoft.com/office/powerpoint/2010/main" val="3076064583"/>
+      </p:ext>
+    </p:extLst>
+  </p:cSld>
+  <p:clrMapOvr>
+    <a:masterClrMapping/>
+  </p:clrMapOvr>
+  <p:timing>
+    <p:tnLst>
+      <p:par>
+        <p:cTn id="1" dur="indefinite" restart="never" nodeType="tmRoot"/>
+      </p:par>
+    </p:tnLst>
+  </p:timing>
+</p:sld>
+</file>
+
+<file path=ppt/slides/slide47.xml><?xml version="1.0" encoding="utf-8"?>
+<p:sld xmlns:a="http://schemas.openxmlformats.org/drawingml/2006/main" xmlns:r="http://schemas.openxmlformats.org/officeDocument/2006/relationships" xmlns:p="http://schemas.openxmlformats.org/presentationml/2006/main">
+  <p:cSld>
+    <p:spTree>
+      <p:nvGrpSpPr>
+        <p:cNvPr id="1" name=""/>
+        <p:cNvGrpSpPr/>
+        <p:nvPr/>
+      </p:nvGrpSpPr>
+      <p:grpSpPr>
+        <a:xfrm>
+          <a:off x="0" y="0"/>
+          <a:ext cx="0" cy="0"/>
+          <a:chOff x="0" y="0"/>
+          <a:chExt cx="0" cy="0"/>
+        </a:xfrm>
+      </p:grpSpPr>
+      <p:sp>
+        <p:nvSpPr>
+          <p:cNvPr id="2" name="Title 1"/>
+          <p:cNvSpPr>
+            <a:spLocks noGrp="1"/>
+          </p:cNvSpPr>
+          <p:nvPr>
+            <p:ph type="title"/>
+          </p:nvPr>
+        </p:nvSpPr>
+        <p:spPr/>
+        <p:txBody>
+          <a:bodyPr/>
+          <a:lstStyle/>
+          <a:p>
+            <a:r>
+              <a:rPr lang="en-US" dirty="0" smtClean="0"/>
+              <a:t>Dataset processing</a:t>
+            </a:r>
+            <a:endParaRPr lang="pt-PT" dirty="0"/>
+          </a:p>
+        </p:txBody>
+      </p:sp>
+      <p:sp>
+        <p:nvSpPr>
+          <p:cNvPr id="3" name="Content Placeholder 2"/>
+          <p:cNvSpPr>
+            <a:spLocks noGrp="1"/>
+          </p:cNvSpPr>
+          <p:nvPr>
+            <p:ph idx="1"/>
+          </p:nvPr>
+        </p:nvSpPr>
+        <p:spPr>
+          <a:xfrm>
+            <a:off x="457200" y="1094346"/>
+            <a:ext cx="8229600" cy="5214974"/>
+          </a:xfrm>
+        </p:spPr>
+        <p:txBody>
+          <a:bodyPr>
+            <a:noAutofit/>
+          </a:bodyPr>
+          <a:lstStyle/>
+          <a:p>
+            <a:r>
+              <a:rPr lang="en-US" sz="4000" dirty="0" smtClean="0"/>
+              <a:t>How to get the winners/population coefficient?</a:t>
+            </a:r>
+            <a:endParaRPr lang="en-US" sz="4000" dirty="0"/>
+          </a:p>
+          <a:p>
+            <a:pPr lvl="1"/>
+            <a:r>
+              <a:rPr lang="pt-PT" sz="3600" dirty="0" smtClean="0"/>
+              <a:t>We used Excel to calculate with the needed precision and we made the results more readable:</a:t>
+            </a:r>
+          </a:p>
+          <a:p>
+            <a:pPr lvl="1"/>
+            <a:endParaRPr lang="pt-PT" sz="3600" dirty="0"/>
+          </a:p>
+          <a:p>
+            <a:pPr lvl="1"/>
+            <a:endParaRPr lang="pt-PT" sz="3600" dirty="0" smtClean="0"/>
+          </a:p>
+          <a:p>
+            <a:pPr lvl="1"/>
+            <a:r>
+              <a:rPr lang="en-US" sz="3600" dirty="0" smtClean="0"/>
+              <a:t>Medalists/Population x 1 000 000</a:t>
+            </a:r>
+            <a:endParaRPr lang="en-US" sz="3600" dirty="0"/>
+          </a:p>
+          <a:p>
+            <a:r>
+              <a:rPr lang="en-US" sz="4000" dirty="0" smtClean="0"/>
+              <a:t>	</a:t>
+            </a:r>
+            <a:endParaRPr lang="en-US" sz="4000" dirty="0"/>
+          </a:p>
+        </p:txBody>
+      </p:sp>
+      <p:pic>
+        <p:nvPicPr>
+          <p:cNvPr id="4098" name="Picture 2" descr="http://puu.sh/kPjnH/517bafa75b.png"/>
+          <p:cNvPicPr>
+            <a:picLocks noChangeAspect="1" noChangeArrowheads="1"/>
+          </p:cNvPicPr>
+          <p:nvPr/>
+        </p:nvPicPr>
+        <p:blipFill>
+          <a:blip r:embed="rId3">
+            <a:extLst>
+              <a:ext uri="{28A0092B-C50C-407E-A947-70E740481C1C}">
+                <a14:useLocalDpi xmlns:a14="http://schemas.microsoft.com/office/drawing/2010/main" val="0"/>
+              </a:ext>
+            </a:extLst>
+          </a:blip>
+          <a:srcRect/>
+          <a:stretch>
+            <a:fillRect/>
+          </a:stretch>
+        </p:blipFill>
+        <p:spPr bwMode="auto">
+          <a:xfrm>
+            <a:off x="611559" y="4221088"/>
+            <a:ext cx="6120673" cy="1224136"/>
+          </a:xfrm>
+          <a:prstGeom prst="rect">
+            <a:avLst/>
+          </a:prstGeom>
+          <a:noFill/>
+          <a:extLst>
+            <a:ext uri="{909E8E84-426E-40DD-AFC4-6F175D3DCCD1}">
+              <a14:hiddenFill xmlns:a14="http://schemas.microsoft.com/office/drawing/2010/main">
+                <a:solidFill>
+                  <a:srgbClr val="FFFFFF"/>
+                </a:solidFill>
+              </a14:hiddenFill>
+            </a:ext>
+          </a:extLst>
+        </p:spPr>
+      </p:pic>
+    </p:spTree>
+    <p:extLst>
+      <p:ext uri="{BB962C8B-B14F-4D97-AF65-F5344CB8AC3E}">
+        <p14:creationId xmlns:p14="http://schemas.microsoft.com/office/powerpoint/2010/main" val="797629199"/>
+      </p:ext>
+    </p:extLst>
+  </p:cSld>
+  <p:clrMapOvr>
+    <a:masterClrMapping/>
+  </p:clrMapOvr>
+  <p:timing>
+    <p:tnLst>
+      <p:par>
+        <p:cTn id="1" dur="indefinite" restart="never" nodeType="tmRoot"/>
+      </p:par>
+    </p:tnLst>
+  </p:timing>
+</p:sld>
+</file>
+
+<file path=ppt/slides/slide48.xml><?xml version="1.0" encoding="utf-8"?>
+<p:sld xmlns:a="http://schemas.openxmlformats.org/drawingml/2006/main" xmlns:r="http://schemas.openxmlformats.org/officeDocument/2006/relationships" xmlns:p="http://schemas.openxmlformats.org/presentationml/2006/main">
+  <p:cSld>
+    <p:spTree>
+      <p:nvGrpSpPr>
+        <p:cNvPr id="1" name=""/>
+        <p:cNvGrpSpPr/>
+        <p:nvPr/>
+      </p:nvGrpSpPr>
+      <p:grpSpPr>
+        <a:xfrm>
+          <a:off x="0" y="0"/>
+          <a:ext cx="0" cy="0"/>
+          <a:chOff x="0" y="0"/>
+          <a:chExt cx="0" cy="0"/>
+        </a:xfrm>
+      </p:grpSpPr>
+      <p:sp>
+        <p:nvSpPr>
           <p:cNvPr id="6" name="Text Placeholder 5"/>
           <p:cNvSpPr>
             <a:spLocks noGrp="1"/>
@@ -18471,7 +20345,7 @@
 </p:sld>
 </file>
 
-<file path=ppt/slides/slide45.xml><?xml version="1.0" encoding="utf-8"?>
+<file path=ppt/slides/slide49.xml><?xml version="1.0" encoding="utf-8"?>
 <p:sld xmlns:a="http://schemas.openxmlformats.org/drawingml/2006/main" xmlns:r="http://schemas.openxmlformats.org/officeDocument/2006/relationships" xmlns:p="http://schemas.openxmlformats.org/presentationml/2006/main">
   <p:cSld>
     <p:spTree>
@@ -18798,280 +20672,6 @@
     <p:extLst>
       <p:ext uri="{BB962C8B-B14F-4D97-AF65-F5344CB8AC3E}">
         <p14:creationId xmlns:p14="http://schemas.microsoft.com/office/powerpoint/2010/main" val="2292396113"/>
-      </p:ext>
-    </p:extLst>
-  </p:cSld>
-  <p:clrMapOvr>
-    <a:masterClrMapping/>
-  </p:clrMapOvr>
-  <p:timing>
-    <p:tnLst>
-      <p:par>
-        <p:cTn id="1" dur="indefinite" restart="never" nodeType="tmRoot"/>
-      </p:par>
-    </p:tnLst>
-  </p:timing>
-</p:sld>
-</file>
-
-<file path=ppt/slides/slide46.xml><?xml version="1.0" encoding="utf-8"?>
-<p:sld xmlns:a="http://schemas.openxmlformats.org/drawingml/2006/main" xmlns:r="http://schemas.openxmlformats.org/officeDocument/2006/relationships" xmlns:p="http://schemas.openxmlformats.org/presentationml/2006/main">
-  <p:cSld>
-    <p:spTree>
-      <p:nvGrpSpPr>
-        <p:cNvPr id="1" name=""/>
-        <p:cNvGrpSpPr/>
-        <p:nvPr/>
-      </p:nvGrpSpPr>
-      <p:grpSpPr>
-        <a:xfrm>
-          <a:off x="0" y="0"/>
-          <a:ext cx="0" cy="0"/>
-          <a:chOff x="0" y="0"/>
-          <a:chExt cx="0" cy="0"/>
-        </a:xfrm>
-      </p:grpSpPr>
-      <p:sp>
-        <p:nvSpPr>
-          <p:cNvPr id="2" name="Title 1"/>
-          <p:cNvSpPr>
-            <a:spLocks noGrp="1"/>
-          </p:cNvSpPr>
-          <p:nvPr>
-            <p:ph type="title"/>
-          </p:nvPr>
-        </p:nvSpPr>
-        <p:spPr/>
-        <p:txBody>
-          <a:bodyPr/>
-          <a:lstStyle/>
-          <a:p>
-            <a:r>
-              <a:rPr lang="en-US" dirty="0" smtClean="0"/>
-              <a:t>Mapping</a:t>
-            </a:r>
-            <a:endParaRPr lang="pt-PT" dirty="0"/>
-          </a:p>
-        </p:txBody>
-      </p:sp>
-      <p:sp>
-        <p:nvSpPr>
-          <p:cNvPr id="5" name="Content Placeholder 2"/>
-          <p:cNvSpPr>
-            <a:spLocks noGrp="1"/>
-          </p:cNvSpPr>
-          <p:nvPr>
-            <p:ph idx="1"/>
-          </p:nvPr>
-        </p:nvSpPr>
-        <p:spPr>
-          <a:xfrm>
-            <a:off x="457200" y="1094346"/>
-            <a:ext cx="8229600" cy="5214974"/>
-          </a:xfrm>
-        </p:spPr>
-        <p:txBody>
-          <a:bodyPr>
-            <a:noAutofit/>
-          </a:bodyPr>
-          <a:lstStyle/>
-          <a:p>
-            <a:pPr marL="342900" lvl="3" indent="-342900">
-              <a:spcBef>
-                <a:spcPts val="1800"/>
-              </a:spcBef>
-            </a:pPr>
-            <a:r>
-              <a:rPr lang="en-GB" dirty="0"/>
-              <a:t> </a:t>
-            </a:r>
-            <a:r>
-              <a:rPr lang="en-GB" dirty="0" smtClean="0"/>
-              <a:t>	</a:t>
-            </a:r>
-            <a:r>
-              <a:rPr lang="en-GB" dirty="0"/>
-              <a:t/>
-            </a:r>
-            <a:br>
-              <a:rPr lang="en-GB" dirty="0"/>
-            </a:br>
-            <a:r>
-              <a:rPr lang="en-GB" dirty="0"/>
-              <a:t>4 – See the countries with the most medallists per capita in 2008.</a:t>
-            </a:r>
-          </a:p>
-          <a:p>
-            <a:pPr marL="342900" lvl="3" indent="-342900">
-              <a:spcBef>
-                <a:spcPts val="1800"/>
-              </a:spcBef>
-            </a:pPr>
-            <a:r>
-              <a:rPr lang="en-GB" dirty="0"/>
-              <a:t/>
-            </a:r>
-            <a:br>
-              <a:rPr lang="en-GB" dirty="0"/>
-            </a:br>
-            <a:endParaRPr lang="en-GB" dirty="0" smtClean="0"/>
-          </a:p>
-          <a:p>
-            <a:pPr marL="342900" lvl="3" indent="-342900">
-              <a:spcBef>
-                <a:spcPts val="1800"/>
-              </a:spcBef>
-            </a:pPr>
-            <a:endParaRPr lang="en-GB" dirty="0"/>
-          </a:p>
-          <a:p>
-            <a:pPr marL="342900" lvl="3" indent="-342900">
-              <a:spcBef>
-                <a:spcPts val="1800"/>
-              </a:spcBef>
-            </a:pPr>
-            <a:r>
-              <a:rPr lang="en-GB" dirty="0" smtClean="0"/>
-              <a:t>	5 </a:t>
-            </a:r>
-            <a:r>
-              <a:rPr lang="en-GB" dirty="0"/>
-              <a:t>– How do the USSR and Russia’s cumulative scores compare?</a:t>
-            </a:r>
-            <a:endParaRPr lang="en-US" sz="4400" dirty="0"/>
-          </a:p>
-          <a:p>
-            <a:pPr marL="342900" lvl="3" indent="-342900">
-              <a:spcBef>
-                <a:spcPts val="1800"/>
-              </a:spcBef>
-            </a:pPr>
-            <a:endParaRPr lang="en-GB" dirty="0"/>
-          </a:p>
-        </p:txBody>
-      </p:sp>
-      <p:pic>
-        <p:nvPicPr>
-          <p:cNvPr id="10241" name="Picture 1"/>
-          <p:cNvPicPr>
-            <a:picLocks noChangeAspect="1" noChangeArrowheads="1"/>
-          </p:cNvPicPr>
-          <p:nvPr/>
-        </p:nvPicPr>
-        <p:blipFill>
-          <a:blip r:embed="rId3">
-            <a:extLst>
-              <a:ext uri="{28A0092B-C50C-407E-A947-70E740481C1C}">
-                <a14:useLocalDpi xmlns:a14="http://schemas.microsoft.com/office/drawing/2010/main" val="0"/>
-              </a:ext>
-            </a:extLst>
-          </a:blip>
-          <a:srcRect/>
-          <a:stretch>
-            <a:fillRect/>
-          </a:stretch>
-        </p:blipFill>
-        <p:spPr bwMode="auto">
-          <a:xfrm>
-            <a:off x="2493838" y="1916832"/>
-            <a:ext cx="4152900" cy="1143000"/>
-          </a:xfrm>
-          <a:prstGeom prst="rect">
-            <a:avLst/>
-          </a:prstGeom>
-          <a:noFill/>
-          <a:ln>
-            <a:noFill/>
-          </a:ln>
-          <a:effectLst/>
-          <a:extLst>
-            <a:ext uri="{909E8E84-426E-40DD-AFC4-6F175D3DCCD1}">
-              <a14:hiddenFill xmlns:a14="http://schemas.microsoft.com/office/drawing/2010/main">
-                <a:solidFill>
-                  <a:schemeClr val="accent1"/>
-                </a:solidFill>
-              </a14:hiddenFill>
-            </a:ext>
-            <a:ext uri="{91240B29-F687-4F45-9708-019B960494DF}">
-              <a14:hiddenLine xmlns:a14="http://schemas.microsoft.com/office/drawing/2010/main" w="9525">
-                <a:solidFill>
-                  <a:schemeClr val="tx1"/>
-                </a:solidFill>
-                <a:miter lim="800000"/>
-                <a:headEnd/>
-                <a:tailEnd/>
-              </a14:hiddenLine>
-            </a:ext>
-            <a:ext uri="{AF507438-7753-43E0-B8FC-AC1667EBCBE1}">
-              <a14:hiddenEffects xmlns:a14="http://schemas.microsoft.com/office/drawing/2010/main">
-                <a:effectLst>
-                  <a:outerShdw dist="35921" dir="2700000" algn="ctr" rotWithShape="0">
-                    <a:schemeClr val="bg2"/>
-                  </a:outerShdw>
-                </a:effectLst>
-              </a14:hiddenEffects>
-            </a:ext>
-          </a:extLst>
-        </p:spPr>
-      </p:pic>
-      <p:pic>
-        <p:nvPicPr>
-          <p:cNvPr id="10242" name="Picture 2"/>
-          <p:cNvPicPr>
-            <a:picLocks noChangeAspect="1" noChangeArrowheads="1"/>
-          </p:cNvPicPr>
-          <p:nvPr/>
-        </p:nvPicPr>
-        <p:blipFill>
-          <a:blip r:embed="rId4">
-            <a:extLst>
-              <a:ext uri="{28A0092B-C50C-407E-A947-70E740481C1C}">
-                <a14:useLocalDpi xmlns:a14="http://schemas.microsoft.com/office/drawing/2010/main" val="0"/>
-              </a:ext>
-            </a:extLst>
-          </a:blip>
-          <a:srcRect/>
-          <a:stretch>
-            <a:fillRect/>
-          </a:stretch>
-        </p:blipFill>
-        <p:spPr bwMode="auto">
-          <a:xfrm>
-            <a:off x="1187624" y="3717032"/>
-            <a:ext cx="1847850" cy="2705100"/>
-          </a:xfrm>
-          <a:prstGeom prst="rect">
-            <a:avLst/>
-          </a:prstGeom>
-          <a:noFill/>
-          <a:ln>
-            <a:noFill/>
-          </a:ln>
-          <a:extLst>
-            <a:ext uri="{909E8E84-426E-40DD-AFC4-6F175D3DCCD1}">
-              <a14:hiddenFill xmlns:a14="http://schemas.microsoft.com/office/drawing/2010/main">
-                <a:solidFill>
-                  <a:schemeClr val="accent1"/>
-                </a:solidFill>
-              </a14:hiddenFill>
-            </a:ext>
-            <a:ext uri="{91240B29-F687-4F45-9708-019B960494DF}">
-              <a14:hiddenLine xmlns:a14="http://schemas.microsoft.com/office/drawing/2010/main" w="9525">
-                <a:solidFill>
-                  <a:schemeClr val="tx1"/>
-                </a:solidFill>
-                <a:miter lim="800000"/>
-                <a:headEnd/>
-                <a:tailEnd/>
-              </a14:hiddenLine>
-            </a:ext>
-          </a:extLst>
-        </p:spPr>
-      </p:pic>
-    </p:spTree>
-    <p:extLst>
-      <p:ext uri="{BB962C8B-B14F-4D97-AF65-F5344CB8AC3E}">
-        <p14:creationId xmlns:p14="http://schemas.microsoft.com/office/powerpoint/2010/main" val="974395009"/>
       </p:ext>
     </p:extLst>
   </p:cSld>
@@ -19498,6 +21098,280 @@
     <p:extLst>
       <p:ext uri="{BB962C8B-B14F-4D97-AF65-F5344CB8AC3E}">
         <p14:creationId xmlns:p14="http://schemas.microsoft.com/office/powerpoint/2010/main" val="2752060379"/>
+      </p:ext>
+    </p:extLst>
+  </p:cSld>
+  <p:clrMapOvr>
+    <a:masterClrMapping/>
+  </p:clrMapOvr>
+  <p:timing>
+    <p:tnLst>
+      <p:par>
+        <p:cTn id="1" dur="indefinite" restart="never" nodeType="tmRoot"/>
+      </p:par>
+    </p:tnLst>
+  </p:timing>
+</p:sld>
+</file>
+
+<file path=ppt/slides/slide50.xml><?xml version="1.0" encoding="utf-8"?>
+<p:sld xmlns:a="http://schemas.openxmlformats.org/drawingml/2006/main" xmlns:r="http://schemas.openxmlformats.org/officeDocument/2006/relationships" xmlns:p="http://schemas.openxmlformats.org/presentationml/2006/main">
+  <p:cSld>
+    <p:spTree>
+      <p:nvGrpSpPr>
+        <p:cNvPr id="1" name=""/>
+        <p:cNvGrpSpPr/>
+        <p:nvPr/>
+      </p:nvGrpSpPr>
+      <p:grpSpPr>
+        <a:xfrm>
+          <a:off x="0" y="0"/>
+          <a:ext cx="0" cy="0"/>
+          <a:chOff x="0" y="0"/>
+          <a:chExt cx="0" cy="0"/>
+        </a:xfrm>
+      </p:grpSpPr>
+      <p:sp>
+        <p:nvSpPr>
+          <p:cNvPr id="2" name="Title 1"/>
+          <p:cNvSpPr>
+            <a:spLocks noGrp="1"/>
+          </p:cNvSpPr>
+          <p:nvPr>
+            <p:ph type="title"/>
+          </p:nvPr>
+        </p:nvSpPr>
+        <p:spPr/>
+        <p:txBody>
+          <a:bodyPr/>
+          <a:lstStyle/>
+          <a:p>
+            <a:r>
+              <a:rPr lang="en-US" dirty="0" smtClean="0"/>
+              <a:t>Mapping</a:t>
+            </a:r>
+            <a:endParaRPr lang="pt-PT" dirty="0"/>
+          </a:p>
+        </p:txBody>
+      </p:sp>
+      <p:sp>
+        <p:nvSpPr>
+          <p:cNvPr id="5" name="Content Placeholder 2"/>
+          <p:cNvSpPr>
+            <a:spLocks noGrp="1"/>
+          </p:cNvSpPr>
+          <p:nvPr>
+            <p:ph idx="1"/>
+          </p:nvPr>
+        </p:nvSpPr>
+        <p:spPr>
+          <a:xfrm>
+            <a:off x="457200" y="1094346"/>
+            <a:ext cx="8229600" cy="5214974"/>
+          </a:xfrm>
+        </p:spPr>
+        <p:txBody>
+          <a:bodyPr>
+            <a:noAutofit/>
+          </a:bodyPr>
+          <a:lstStyle/>
+          <a:p>
+            <a:pPr marL="342900" lvl="3" indent="-342900">
+              <a:spcBef>
+                <a:spcPts val="1800"/>
+              </a:spcBef>
+            </a:pPr>
+            <a:r>
+              <a:rPr lang="en-GB" dirty="0"/>
+              <a:t> </a:t>
+            </a:r>
+            <a:r>
+              <a:rPr lang="en-GB" dirty="0" smtClean="0"/>
+              <a:t>	</a:t>
+            </a:r>
+            <a:r>
+              <a:rPr lang="en-GB" dirty="0"/>
+              <a:t/>
+            </a:r>
+            <a:br>
+              <a:rPr lang="en-GB" dirty="0"/>
+            </a:br>
+            <a:r>
+              <a:rPr lang="en-GB" dirty="0"/>
+              <a:t>4 – See the countries with the most medallists per capita in 2008.</a:t>
+            </a:r>
+          </a:p>
+          <a:p>
+            <a:pPr marL="342900" lvl="3" indent="-342900">
+              <a:spcBef>
+                <a:spcPts val="1800"/>
+              </a:spcBef>
+            </a:pPr>
+            <a:r>
+              <a:rPr lang="en-GB" dirty="0"/>
+              <a:t/>
+            </a:r>
+            <a:br>
+              <a:rPr lang="en-GB" dirty="0"/>
+            </a:br>
+            <a:endParaRPr lang="en-GB" dirty="0" smtClean="0"/>
+          </a:p>
+          <a:p>
+            <a:pPr marL="342900" lvl="3" indent="-342900">
+              <a:spcBef>
+                <a:spcPts val="1800"/>
+              </a:spcBef>
+            </a:pPr>
+            <a:endParaRPr lang="en-GB" dirty="0"/>
+          </a:p>
+          <a:p>
+            <a:pPr marL="342900" lvl="3" indent="-342900">
+              <a:spcBef>
+                <a:spcPts val="1800"/>
+              </a:spcBef>
+            </a:pPr>
+            <a:r>
+              <a:rPr lang="en-GB" dirty="0" smtClean="0"/>
+              <a:t>	5 </a:t>
+            </a:r>
+            <a:r>
+              <a:rPr lang="en-GB" dirty="0"/>
+              <a:t>– How do the USSR and Russia’s cumulative scores compare?</a:t>
+            </a:r>
+            <a:endParaRPr lang="en-US" sz="4400" dirty="0"/>
+          </a:p>
+          <a:p>
+            <a:pPr marL="342900" lvl="3" indent="-342900">
+              <a:spcBef>
+                <a:spcPts val="1800"/>
+              </a:spcBef>
+            </a:pPr>
+            <a:endParaRPr lang="en-GB" dirty="0"/>
+          </a:p>
+        </p:txBody>
+      </p:sp>
+      <p:pic>
+        <p:nvPicPr>
+          <p:cNvPr id="10241" name="Picture 1"/>
+          <p:cNvPicPr>
+            <a:picLocks noChangeAspect="1" noChangeArrowheads="1"/>
+          </p:cNvPicPr>
+          <p:nvPr/>
+        </p:nvPicPr>
+        <p:blipFill>
+          <a:blip r:embed="rId3">
+            <a:extLst>
+              <a:ext uri="{28A0092B-C50C-407E-A947-70E740481C1C}">
+                <a14:useLocalDpi xmlns:a14="http://schemas.microsoft.com/office/drawing/2010/main" val="0"/>
+              </a:ext>
+            </a:extLst>
+          </a:blip>
+          <a:srcRect/>
+          <a:stretch>
+            <a:fillRect/>
+          </a:stretch>
+        </p:blipFill>
+        <p:spPr bwMode="auto">
+          <a:xfrm>
+            <a:off x="2493838" y="1916832"/>
+            <a:ext cx="4152900" cy="1143000"/>
+          </a:xfrm>
+          <a:prstGeom prst="rect">
+            <a:avLst/>
+          </a:prstGeom>
+          <a:noFill/>
+          <a:ln>
+            <a:noFill/>
+          </a:ln>
+          <a:effectLst/>
+          <a:extLst>
+            <a:ext uri="{909E8E84-426E-40DD-AFC4-6F175D3DCCD1}">
+              <a14:hiddenFill xmlns:a14="http://schemas.microsoft.com/office/drawing/2010/main">
+                <a:solidFill>
+                  <a:schemeClr val="accent1"/>
+                </a:solidFill>
+              </a14:hiddenFill>
+            </a:ext>
+            <a:ext uri="{91240B29-F687-4F45-9708-019B960494DF}">
+              <a14:hiddenLine xmlns:a14="http://schemas.microsoft.com/office/drawing/2010/main" w="9525">
+                <a:solidFill>
+                  <a:schemeClr val="tx1"/>
+                </a:solidFill>
+                <a:miter lim="800000"/>
+                <a:headEnd/>
+                <a:tailEnd/>
+              </a14:hiddenLine>
+            </a:ext>
+            <a:ext uri="{AF507438-7753-43E0-B8FC-AC1667EBCBE1}">
+              <a14:hiddenEffects xmlns:a14="http://schemas.microsoft.com/office/drawing/2010/main">
+                <a:effectLst>
+                  <a:outerShdw dist="35921" dir="2700000" algn="ctr" rotWithShape="0">
+                    <a:schemeClr val="bg2"/>
+                  </a:outerShdw>
+                </a:effectLst>
+              </a14:hiddenEffects>
+            </a:ext>
+          </a:extLst>
+        </p:spPr>
+      </p:pic>
+      <p:pic>
+        <p:nvPicPr>
+          <p:cNvPr id="10242" name="Picture 2"/>
+          <p:cNvPicPr>
+            <a:picLocks noChangeAspect="1" noChangeArrowheads="1"/>
+          </p:cNvPicPr>
+          <p:nvPr/>
+        </p:nvPicPr>
+        <p:blipFill>
+          <a:blip r:embed="rId4">
+            <a:extLst>
+              <a:ext uri="{28A0092B-C50C-407E-A947-70E740481C1C}">
+                <a14:useLocalDpi xmlns:a14="http://schemas.microsoft.com/office/drawing/2010/main" val="0"/>
+              </a:ext>
+            </a:extLst>
+          </a:blip>
+          <a:srcRect/>
+          <a:stretch>
+            <a:fillRect/>
+          </a:stretch>
+        </p:blipFill>
+        <p:spPr bwMode="auto">
+          <a:xfrm>
+            <a:off x="1187624" y="3717032"/>
+            <a:ext cx="1847850" cy="2705100"/>
+          </a:xfrm>
+          <a:prstGeom prst="rect">
+            <a:avLst/>
+          </a:prstGeom>
+          <a:noFill/>
+          <a:ln>
+            <a:noFill/>
+          </a:ln>
+          <a:extLst>
+            <a:ext uri="{909E8E84-426E-40DD-AFC4-6F175D3DCCD1}">
+              <a14:hiddenFill xmlns:a14="http://schemas.microsoft.com/office/drawing/2010/main">
+                <a:solidFill>
+                  <a:schemeClr val="accent1"/>
+                </a:solidFill>
+              </a14:hiddenFill>
+            </a:ext>
+            <a:ext uri="{91240B29-F687-4F45-9708-019B960494DF}">
+              <a14:hiddenLine xmlns:a14="http://schemas.microsoft.com/office/drawing/2010/main" w="9525">
+                <a:solidFill>
+                  <a:schemeClr val="tx1"/>
+                </a:solidFill>
+                <a:miter lim="800000"/>
+                <a:headEnd/>
+                <a:tailEnd/>
+              </a14:hiddenLine>
+            </a:ext>
+          </a:extLst>
+        </p:spPr>
+      </p:pic>
+    </p:spTree>
+    <p:extLst>
+      <p:ext uri="{BB962C8B-B14F-4D97-AF65-F5344CB8AC3E}">
+        <p14:creationId xmlns:p14="http://schemas.microsoft.com/office/powerpoint/2010/main" val="974395009"/>
       </p:ext>
     </p:extLst>
   </p:cSld>

</xml_diff>